<commit_message>
first edition of presentation and test graphs of l-61
</commit_message>
<xml_diff>
--- a/presentation.pptx
+++ b/presentation.pptx
@@ -5,13 +5,17 @@
     <p:sldMasterId id="2147483686" r:id="rId1"/>
   </p:sldMasterIdLst>
   <p:notesMasterIdLst>
-    <p:notesMasterId r:id="rId6"/>
+    <p:notesMasterId r:id="rId10"/>
   </p:notesMasterIdLst>
   <p:sldIdLst>
     <p:sldId id="256" r:id="rId2"/>
     <p:sldId id="257" r:id="rId3"/>
     <p:sldId id="258" r:id="rId4"/>
     <p:sldId id="259" r:id="rId5"/>
+    <p:sldId id="260" r:id="rId6"/>
+    <p:sldId id="261" r:id="rId7"/>
+    <p:sldId id="262" r:id="rId8"/>
+    <p:sldId id="263" r:id="rId9"/>
   </p:sldIdLst>
   <p:sldSz cx="12192000" cy="6858000"/>
   <p:notesSz cx="6858000" cy="9144000"/>
@@ -121,7 +125,7 @@
 <file path=ppt/revisionInfo.xml><?xml version="1.0" encoding="utf-8"?>
 <p1510:revInfo xmlns:a="http://schemas.openxmlformats.org/drawingml/2006/main" xmlns:r="http://schemas.openxmlformats.org/officeDocument/2006/relationships" xmlns:p1510="http://schemas.microsoft.com/office/powerpoint/2015/10/main">
   <p1510:revLst>
-    <p1510:client id="{C848D9A1-E4C3-4BC8-9DDE-B82935BDE34D}" v="55" dt="2024-08-28T19:44:53.796"/>
+    <p1510:client id="{C848D9A1-E4C3-4BC8-9DDE-B82935BDE34D}" v="212" dt="2024-08-30T16:06:28.827"/>
   </p1510:revLst>
 </p1510:revInfo>
 </file>
@@ -131,7 +135,7 @@
   <pc:docChgLst>
     <pc:chgData name="Erel Dekel" userId="5861eaf1660df668" providerId="LiveId" clId="{C848D9A1-E4C3-4BC8-9DDE-B82935BDE34D}"/>
     <pc:docChg chg="undo custSel addSld modSld addMainMaster delMainMaster">
-      <pc:chgData name="Erel Dekel" userId="5861eaf1660df668" providerId="LiveId" clId="{C848D9A1-E4C3-4BC8-9DDE-B82935BDE34D}" dt="2024-08-28T19:45:13.586" v="2689" actId="1076"/>
+      <pc:chgData name="Erel Dekel" userId="5861eaf1660df668" providerId="LiveId" clId="{C848D9A1-E4C3-4BC8-9DDE-B82935BDE34D}" dt="2024-08-30T21:07:28.957" v="4791" actId="20577"/>
       <pc:docMkLst>
         <pc:docMk/>
       </pc:docMkLst>
@@ -359,13 +363,13 @@
         </pc:picChg>
       </pc:sldChg>
       <pc:sldChg chg="addSp delSp modSp new mod modClrScheme chgLayout">
-        <pc:chgData name="Erel Dekel" userId="5861eaf1660df668" providerId="LiveId" clId="{C848D9A1-E4C3-4BC8-9DDE-B82935BDE34D}" dt="2024-08-28T19:45:13.586" v="2689" actId="1076"/>
+        <pc:chgData name="Erel Dekel" userId="5861eaf1660df668" providerId="LiveId" clId="{C848D9A1-E4C3-4BC8-9DDE-B82935BDE34D}" dt="2024-08-30T15:04:58.412" v="3444" actId="208"/>
         <pc:sldMkLst>
           <pc:docMk/>
           <pc:sldMk cId="3156109269" sldId="257"/>
         </pc:sldMkLst>
         <pc:spChg chg="mod ord">
-          <ac:chgData name="Erel Dekel" userId="5861eaf1660df668" providerId="LiveId" clId="{C848D9A1-E4C3-4BC8-9DDE-B82935BDE34D}" dt="2024-08-28T15:27:21.100" v="1094" actId="1076"/>
+          <ac:chgData name="Erel Dekel" userId="5861eaf1660df668" providerId="LiveId" clId="{C848D9A1-E4C3-4BC8-9DDE-B82935BDE34D}" dt="2024-08-30T15:03:54.368" v="3437" actId="404"/>
           <ac:spMkLst>
             <pc:docMk/>
             <pc:sldMk cId="3156109269" sldId="257"/>
@@ -421,7 +425,7 @@
           </ac:spMkLst>
         </pc:spChg>
         <pc:spChg chg="add del mod ord">
-          <ac:chgData name="Erel Dekel" userId="5861eaf1660df668" providerId="LiveId" clId="{C848D9A1-E4C3-4BC8-9DDE-B82935BDE34D}" dt="2024-08-28T19:10:48.764" v="2507" actId="108"/>
+          <ac:chgData name="Erel Dekel" userId="5861eaf1660df668" providerId="LiveId" clId="{C848D9A1-E4C3-4BC8-9DDE-B82935BDE34D}" dt="2024-08-30T15:02:31.334" v="3404" actId="1037"/>
           <ac:spMkLst>
             <pc:docMk/>
             <pc:sldMk cId="3156109269" sldId="257"/>
@@ -429,7 +433,7 @@
           </ac:spMkLst>
         </pc:spChg>
         <pc:spChg chg="add del mod ord">
-          <ac:chgData name="Erel Dekel" userId="5861eaf1660df668" providerId="LiveId" clId="{C848D9A1-E4C3-4BC8-9DDE-B82935BDE34D}" dt="2024-08-28T16:22:43.997" v="1892" actId="1076"/>
+          <ac:chgData name="Erel Dekel" userId="5861eaf1660df668" providerId="LiveId" clId="{C848D9A1-E4C3-4BC8-9DDE-B82935BDE34D}" dt="2024-08-30T15:02:38.953" v="3419" actId="1038"/>
           <ac:spMkLst>
             <pc:docMk/>
             <pc:sldMk cId="3156109269" sldId="257"/>
@@ -444,6 +448,22 @@
             <ac:picMk id="4" creationId="{07B2E412-8F0E-55AD-7A8D-1E93FE43EA98}"/>
           </ac:picMkLst>
         </pc:picChg>
+        <pc:picChg chg="add del mod">
+          <ac:chgData name="Erel Dekel" userId="5861eaf1660df668" providerId="LiveId" clId="{C848D9A1-E4C3-4BC8-9DDE-B82935BDE34D}" dt="2024-08-30T13:16:59.080" v="2757" actId="478"/>
+          <ac:picMkLst>
+            <pc:docMk/>
+            <pc:sldMk cId="3156109269" sldId="257"/>
+            <ac:picMk id="4" creationId="{59FF8F7B-0D41-49AC-45B6-440076DD1E9E}"/>
+          </ac:picMkLst>
+        </pc:picChg>
+        <pc:picChg chg="add del mod">
+          <ac:chgData name="Erel Dekel" userId="5861eaf1660df668" providerId="LiveId" clId="{C848D9A1-E4C3-4BC8-9DDE-B82935BDE34D}" dt="2024-08-30T14:00:07.973" v="3073" actId="21"/>
+          <ac:picMkLst>
+            <pc:docMk/>
+            <pc:sldMk cId="3156109269" sldId="257"/>
+            <ac:picMk id="6" creationId="{5571F10E-F450-5657-B9FC-3623B5456502}"/>
+          </ac:picMkLst>
+        </pc:picChg>
         <pc:picChg chg="add mod">
           <ac:chgData name="Erel Dekel" userId="5861eaf1660df668" providerId="LiveId" clId="{C848D9A1-E4C3-4BC8-9DDE-B82935BDE34D}" dt="2024-08-28T15:29:58.908" v="1103" actId="931"/>
           <ac:picMkLst>
@@ -469,7 +489,7 @@
           </ac:picMkLst>
         </pc:picChg>
         <pc:picChg chg="add mod">
-          <ac:chgData name="Erel Dekel" userId="5861eaf1660df668" providerId="LiveId" clId="{C848D9A1-E4C3-4BC8-9DDE-B82935BDE34D}" dt="2024-08-28T15:39:24.577" v="1349" actId="1076"/>
+          <ac:chgData name="Erel Dekel" userId="5861eaf1660df668" providerId="LiveId" clId="{C848D9A1-E4C3-4BC8-9DDE-B82935BDE34D}" dt="2024-08-30T15:04:58.412" v="3444" actId="208"/>
           <ac:picMkLst>
             <pc:docMk/>
             <pc:sldMk cId="3156109269" sldId="257"/>
@@ -517,7 +537,7 @@
           </ac:picMkLst>
         </pc:picChg>
         <pc:picChg chg="add mod">
-          <ac:chgData name="Erel Dekel" userId="5861eaf1660df668" providerId="LiveId" clId="{C848D9A1-E4C3-4BC8-9DDE-B82935BDE34D}" dt="2024-08-28T19:45:13.586" v="2689" actId="1076"/>
+          <ac:chgData name="Erel Dekel" userId="5861eaf1660df668" providerId="LiveId" clId="{C848D9A1-E4C3-4BC8-9DDE-B82935BDE34D}" dt="2024-08-30T15:02:47.978" v="3420" actId="1076"/>
           <ac:picMkLst>
             <pc:docMk/>
             <pc:sldMk cId="3156109269" sldId="257"/>
@@ -526,7 +546,7 @@
         </pc:picChg>
       </pc:sldChg>
       <pc:sldChg chg="addSp delSp modSp new mod modClrScheme chgLayout">
-        <pc:chgData name="Erel Dekel" userId="5861eaf1660df668" providerId="LiveId" clId="{C848D9A1-E4C3-4BC8-9DDE-B82935BDE34D}" dt="2024-08-28T19:37:33.986" v="2681" actId="1076"/>
+        <pc:chgData name="Erel Dekel" userId="5861eaf1660df668" providerId="LiveId" clId="{C848D9A1-E4C3-4BC8-9DDE-B82935BDE34D}" dt="2024-08-30T15:18:58.362" v="3805" actId="1076"/>
         <pc:sldMkLst>
           <pc:docMk/>
           <pc:sldMk cId="1620585352" sldId="258"/>
@@ -564,7 +584,7 @@
           </ac:spMkLst>
         </pc:spChg>
         <pc:spChg chg="add mod ord">
-          <ac:chgData name="Erel Dekel" userId="5861eaf1660df668" providerId="LiveId" clId="{C848D9A1-E4C3-4BC8-9DDE-B82935BDE34D}" dt="2024-08-28T19:30:06.558" v="2642" actId="5793"/>
+          <ac:chgData name="Erel Dekel" userId="5861eaf1660df668" providerId="LiveId" clId="{C848D9A1-E4C3-4BC8-9DDE-B82935BDE34D}" dt="2024-08-30T15:18:51.618" v="3803" actId="20577"/>
           <ac:spMkLst>
             <pc:docMk/>
             <pc:sldMk cId="1620585352" sldId="258"/>
@@ -596,13 +616,21 @@
           </ac:spMkLst>
         </pc:spChg>
         <pc:spChg chg="add mod">
-          <ac:chgData name="Erel Dekel" userId="5861eaf1660df668" providerId="LiveId" clId="{C848D9A1-E4C3-4BC8-9DDE-B82935BDE34D}" dt="2024-08-28T15:51:56.970" v="1400" actId="108"/>
+          <ac:chgData name="Erel Dekel" userId="5861eaf1660df668" providerId="LiveId" clId="{C848D9A1-E4C3-4BC8-9DDE-B82935BDE34D}" dt="2024-08-30T15:03:51.042" v="3436" actId="404"/>
           <ac:spMkLst>
             <pc:docMk/>
             <pc:sldMk cId="1620585352" sldId="258"/>
             <ac:spMk id="11" creationId="{0076F699-6989-5E39-ADF0-C2A778B060B3}"/>
           </ac:spMkLst>
         </pc:spChg>
+        <pc:picChg chg="add del mod">
+          <ac:chgData name="Erel Dekel" userId="5861eaf1660df668" providerId="LiveId" clId="{C848D9A1-E4C3-4BC8-9DDE-B82935BDE34D}" dt="2024-08-30T14:00:14.913" v="3077" actId="21"/>
+          <ac:picMkLst>
+            <pc:docMk/>
+            <pc:sldMk cId="1620585352" sldId="258"/>
+            <ac:picMk id="2" creationId="{5571F10E-F450-5657-B9FC-3623B5456502}"/>
+          </ac:picMkLst>
+        </pc:picChg>
         <pc:picChg chg="add del mod">
           <ac:chgData name="Erel Dekel" userId="5861eaf1660df668" providerId="LiveId" clId="{C848D9A1-E4C3-4BC8-9DDE-B82935BDE34D}" dt="2024-08-28T19:22:35.117" v="2556" actId="478"/>
           <ac:picMkLst>
@@ -628,7 +656,7 @@
           </ac:picMkLst>
         </pc:picChg>
         <pc:picChg chg="add mod">
-          <ac:chgData name="Erel Dekel" userId="5861eaf1660df668" providerId="LiveId" clId="{C848D9A1-E4C3-4BC8-9DDE-B82935BDE34D}" dt="2024-08-28T19:30:03.036" v="2640" actId="1035"/>
+          <ac:chgData name="Erel Dekel" userId="5861eaf1660df668" providerId="LiveId" clId="{C848D9A1-E4C3-4BC8-9DDE-B82935BDE34D}" dt="2024-08-30T15:18:56.104" v="3804" actId="1076"/>
           <ac:picMkLst>
             <pc:docMk/>
             <pc:sldMk cId="1620585352" sldId="258"/>
@@ -652,7 +680,7 @@
           </ac:picMkLst>
         </pc:picChg>
         <pc:picChg chg="add mod">
-          <ac:chgData name="Erel Dekel" userId="5861eaf1660df668" providerId="LiveId" clId="{C848D9A1-E4C3-4BC8-9DDE-B82935BDE34D}" dt="2024-08-28T19:37:33.986" v="2681" actId="1076"/>
+          <ac:chgData name="Erel Dekel" userId="5861eaf1660df668" providerId="LiveId" clId="{C848D9A1-E4C3-4BC8-9DDE-B82935BDE34D}" dt="2024-08-30T15:18:58.362" v="3805" actId="1076"/>
           <ac:picMkLst>
             <pc:docMk/>
             <pc:sldMk cId="1620585352" sldId="258"/>
@@ -661,7 +689,7 @@
         </pc:picChg>
       </pc:sldChg>
       <pc:sldChg chg="addSp delSp modSp new mod">
-        <pc:chgData name="Erel Dekel" userId="5861eaf1660df668" providerId="LiveId" clId="{C848D9A1-E4C3-4BC8-9DDE-B82935BDE34D}" dt="2024-08-28T19:26:02.344" v="2575" actId="21"/>
+        <pc:chgData name="Erel Dekel" userId="5861eaf1660df668" providerId="LiveId" clId="{C848D9A1-E4C3-4BC8-9DDE-B82935BDE34D}" dt="2024-08-30T15:03:28.709" v="3430" actId="122"/>
         <pc:sldMkLst>
           <pc:docMk/>
           <pc:sldMk cId="2551144604" sldId="259"/>
@@ -683,7 +711,7 @@
           </ac:spMkLst>
         </pc:spChg>
         <pc:spChg chg="add mod">
-          <ac:chgData name="Erel Dekel" userId="5861eaf1660df668" providerId="LiveId" clId="{C848D9A1-E4C3-4BC8-9DDE-B82935BDE34D}" dt="2024-08-28T18:21:35.762" v="2036" actId="27636"/>
+          <ac:chgData name="Erel Dekel" userId="5861eaf1660df668" providerId="LiveId" clId="{C848D9A1-E4C3-4BC8-9DDE-B82935BDE34D}" dt="2024-08-30T15:03:28.709" v="3430" actId="122"/>
           <ac:spMkLst>
             <pc:docMk/>
             <pc:sldMk cId="2551144604" sldId="259"/>
@@ -707,7 +735,7 @@
           </ac:spMkLst>
         </pc:spChg>
         <pc:spChg chg="add mod">
-          <ac:chgData name="Erel Dekel" userId="5861eaf1660df668" providerId="LiveId" clId="{C848D9A1-E4C3-4BC8-9DDE-B82935BDE34D}" dt="2024-08-28T19:19:12.381" v="2536" actId="5793"/>
+          <ac:chgData name="Erel Dekel" userId="5861eaf1660df668" providerId="LiveId" clId="{C848D9A1-E4C3-4BC8-9DDE-B82935BDE34D}" dt="2024-08-30T13:40:09.474" v="3066" actId="20577"/>
           <ac:spMkLst>
             <pc:docMk/>
             <pc:sldMk cId="2551144604" sldId="259"/>
@@ -723,7 +751,7 @@
           </ac:picMkLst>
         </pc:picChg>
         <pc:picChg chg="add mod">
-          <ac:chgData name="Erel Dekel" userId="5861eaf1660df668" providerId="LiveId" clId="{C848D9A1-E4C3-4BC8-9DDE-B82935BDE34D}" dt="2024-08-28T19:19:15.591" v="2539" actId="1037"/>
+          <ac:chgData name="Erel Dekel" userId="5861eaf1660df668" providerId="LiveId" clId="{C848D9A1-E4C3-4BC8-9DDE-B82935BDE34D}" dt="2024-08-30T12:36:25.220" v="2744" actId="1035"/>
           <ac:picMkLst>
             <pc:docMk/>
             <pc:sldMk cId="2551144604" sldId="259"/>
@@ -731,7 +759,7 @@
           </ac:picMkLst>
         </pc:picChg>
         <pc:picChg chg="add mod">
-          <ac:chgData name="Erel Dekel" userId="5861eaf1660df668" providerId="LiveId" clId="{C848D9A1-E4C3-4BC8-9DDE-B82935BDE34D}" dt="2024-08-28T19:19:19.389" v="2545" actId="1037"/>
+          <ac:chgData name="Erel Dekel" userId="5861eaf1660df668" providerId="LiveId" clId="{C848D9A1-E4C3-4BC8-9DDE-B82935BDE34D}" dt="2024-08-30T12:36:22.842" v="2743" actId="1036"/>
           <ac:picMkLst>
             <pc:docMk/>
             <pc:sldMk cId="2551144604" sldId="259"/>
@@ -739,7 +767,7 @@
           </ac:picMkLst>
         </pc:picChg>
         <pc:picChg chg="add mod">
-          <ac:chgData name="Erel Dekel" userId="5861eaf1660df668" providerId="LiveId" clId="{C848D9A1-E4C3-4BC8-9DDE-B82935BDE34D}" dt="2024-08-28T19:19:23.117" v="2546" actId="1076"/>
+          <ac:chgData name="Erel Dekel" userId="5861eaf1660df668" providerId="LiveId" clId="{C848D9A1-E4C3-4BC8-9DDE-B82935BDE34D}" dt="2024-08-30T12:36:17.643" v="2724" actId="1036"/>
           <ac:picMkLst>
             <pc:docMk/>
             <pc:sldMk cId="2551144604" sldId="259"/>
@@ -754,6 +782,234 @@
             <ac:picMk id="23" creationId="{79F63397-69CC-AAB8-77ED-65BADB0D9B8B}"/>
           </ac:picMkLst>
         </pc:picChg>
+      </pc:sldChg>
+      <pc:sldChg chg="addSp delSp modSp new mod">
+        <pc:chgData name="Erel Dekel" userId="5861eaf1660df668" providerId="LiveId" clId="{C848D9A1-E4C3-4BC8-9DDE-B82935BDE34D}" dt="2024-08-30T15:10:38.854" v="3584" actId="21"/>
+        <pc:sldMkLst>
+          <pc:docMk/>
+          <pc:sldMk cId="3412950082" sldId="260"/>
+        </pc:sldMkLst>
+        <pc:spChg chg="del">
+          <ac:chgData name="Erel Dekel" userId="5861eaf1660df668" providerId="LiveId" clId="{C848D9A1-E4C3-4BC8-9DDE-B82935BDE34D}" dt="2024-08-30T12:38:21.829" v="2746" actId="478"/>
+          <ac:spMkLst>
+            <pc:docMk/>
+            <pc:sldMk cId="3412950082" sldId="260"/>
+            <ac:spMk id="2" creationId="{0A626BE5-EC3E-56E2-0CD0-38C820E3AD25}"/>
+          </ac:spMkLst>
+        </pc:spChg>
+        <pc:spChg chg="del">
+          <ac:chgData name="Erel Dekel" userId="5861eaf1660df668" providerId="LiveId" clId="{C848D9A1-E4C3-4BC8-9DDE-B82935BDE34D}" dt="2024-08-30T13:30:17.072" v="2760" actId="478"/>
+          <ac:spMkLst>
+            <pc:docMk/>
+            <pc:sldMk cId="3412950082" sldId="260"/>
+            <ac:spMk id="3" creationId="{82C6CD10-6C4D-F142-6080-CF454611810E}"/>
+          </ac:spMkLst>
+        </pc:spChg>
+        <pc:spChg chg="add mod">
+          <ac:chgData name="Erel Dekel" userId="5861eaf1660df668" providerId="LiveId" clId="{C848D9A1-E4C3-4BC8-9DDE-B82935BDE34D}" dt="2024-08-30T15:03:39.020" v="3435" actId="122"/>
+          <ac:spMkLst>
+            <pc:docMk/>
+            <pc:sldMk cId="3412950082" sldId="260"/>
+            <ac:spMk id="4" creationId="{9F6A0F8F-A975-8428-A8B2-B42F6EE8FEE9}"/>
+          </ac:spMkLst>
+        </pc:spChg>
+        <pc:spChg chg="add mod">
+          <ac:chgData name="Erel Dekel" userId="5861eaf1660df668" providerId="LiveId" clId="{C848D9A1-E4C3-4BC8-9DDE-B82935BDE34D}" dt="2024-08-30T14:55:23.908" v="3260" actId="20577"/>
+          <ac:spMkLst>
+            <pc:docMk/>
+            <pc:sldMk cId="3412950082" sldId="260"/>
+            <ac:spMk id="5" creationId="{5958648E-A2CC-6831-7C02-271DF1AA57B5}"/>
+          </ac:spMkLst>
+        </pc:spChg>
+        <pc:picChg chg="add mod">
+          <ac:chgData name="Erel Dekel" userId="5861eaf1660df668" providerId="LiveId" clId="{C848D9A1-E4C3-4BC8-9DDE-B82935BDE34D}" dt="2024-08-30T14:01:17.404" v="3090" actId="1076"/>
+          <ac:picMkLst>
+            <pc:docMk/>
+            <pc:sldMk cId="3412950082" sldId="260"/>
+            <ac:picMk id="7" creationId="{1637C9AE-1BF7-8B68-4448-BCD23F92AF3A}"/>
+          </ac:picMkLst>
+        </pc:picChg>
+        <pc:picChg chg="add mod">
+          <ac:chgData name="Erel Dekel" userId="5861eaf1660df668" providerId="LiveId" clId="{C848D9A1-E4C3-4BC8-9DDE-B82935BDE34D}" dt="2024-08-30T14:08:58.346" v="3245" actId="1036"/>
+          <ac:picMkLst>
+            <pc:docMk/>
+            <pc:sldMk cId="3412950082" sldId="260"/>
+            <ac:picMk id="9" creationId="{A57747BD-F2DF-E5F7-3342-330BE7C192E6}"/>
+          </ac:picMkLst>
+        </pc:picChg>
+        <pc:picChg chg="add mod">
+          <ac:chgData name="Erel Dekel" userId="5861eaf1660df668" providerId="LiveId" clId="{C848D9A1-E4C3-4BC8-9DDE-B82935BDE34D}" dt="2024-08-30T14:01:10.081" v="3088" actId="1076"/>
+          <ac:picMkLst>
+            <pc:docMk/>
+            <pc:sldMk cId="3412950082" sldId="260"/>
+            <ac:picMk id="10" creationId="{5571F10E-F450-5657-B9FC-3623B5456502}"/>
+          </ac:picMkLst>
+        </pc:picChg>
+        <pc:picChg chg="add del mod">
+          <ac:chgData name="Erel Dekel" userId="5861eaf1660df668" providerId="LiveId" clId="{C848D9A1-E4C3-4BC8-9DDE-B82935BDE34D}" dt="2024-08-30T15:10:38.854" v="3584" actId="21"/>
+          <ac:picMkLst>
+            <pc:docMk/>
+            <pc:sldMk cId="3412950082" sldId="260"/>
+            <ac:picMk id="11" creationId="{52DBE754-63A6-5D75-8732-290F77399228}"/>
+          </ac:picMkLst>
+        </pc:picChg>
+      </pc:sldChg>
+      <pc:sldChg chg="addSp delSp modSp new mod">
+        <pc:chgData name="Erel Dekel" userId="5861eaf1660df668" providerId="LiveId" clId="{C848D9A1-E4C3-4BC8-9DDE-B82935BDE34D}" dt="2024-08-30T16:02:49.779" v="4270" actId="313"/>
+        <pc:sldMkLst>
+          <pc:docMk/>
+          <pc:sldMk cId="2794924398" sldId="261"/>
+        </pc:sldMkLst>
+        <pc:spChg chg="del">
+          <ac:chgData name="Erel Dekel" userId="5861eaf1660df668" providerId="LiveId" clId="{C848D9A1-E4C3-4BC8-9DDE-B82935BDE34D}" dt="2024-08-30T15:00:35.868" v="3262" actId="478"/>
+          <ac:spMkLst>
+            <pc:docMk/>
+            <pc:sldMk cId="2794924398" sldId="261"/>
+            <ac:spMk id="2" creationId="{A4B07E03-4B91-7462-4015-94045E496AB1}"/>
+          </ac:spMkLst>
+        </pc:spChg>
+        <pc:spChg chg="mod">
+          <ac:chgData name="Erel Dekel" userId="5861eaf1660df668" providerId="LiveId" clId="{C848D9A1-E4C3-4BC8-9DDE-B82935BDE34D}" dt="2024-08-30T16:02:49.779" v="4270" actId="313"/>
+          <ac:spMkLst>
+            <pc:docMk/>
+            <pc:sldMk cId="2794924398" sldId="261"/>
+            <ac:spMk id="3" creationId="{AF6F3683-1026-7671-DC8A-59341AE0E1F5}"/>
+          </ac:spMkLst>
+        </pc:spChg>
+        <pc:spChg chg="add mod">
+          <ac:chgData name="Erel Dekel" userId="5861eaf1660df668" providerId="LiveId" clId="{C848D9A1-E4C3-4BC8-9DDE-B82935BDE34D}" dt="2024-08-30T15:04:08.621" v="3440" actId="122"/>
+          <ac:spMkLst>
+            <pc:docMk/>
+            <pc:sldMk cId="2794924398" sldId="261"/>
+            <ac:spMk id="4" creationId="{06DA16F8-FF8C-B96D-B9CA-F90F9D01900E}"/>
+          </ac:spMkLst>
+        </pc:spChg>
+        <pc:picChg chg="add del mod">
+          <ac:chgData name="Erel Dekel" userId="5861eaf1660df668" providerId="LiveId" clId="{C848D9A1-E4C3-4BC8-9DDE-B82935BDE34D}" dt="2024-08-30T15:10:26.003" v="3580" actId="21"/>
+          <ac:picMkLst>
+            <pc:docMk/>
+            <pc:sldMk cId="2794924398" sldId="261"/>
+            <ac:picMk id="6" creationId="{52DBE754-63A6-5D75-8732-290F77399228}"/>
+          </ac:picMkLst>
+        </pc:picChg>
+        <pc:picChg chg="add mod">
+          <ac:chgData name="Erel Dekel" userId="5861eaf1660df668" providerId="LiveId" clId="{C848D9A1-E4C3-4BC8-9DDE-B82935BDE34D}" dt="2024-08-30T15:10:59.513" v="3593"/>
+          <ac:picMkLst>
+            <pc:docMk/>
+            <pc:sldMk cId="2794924398" sldId="261"/>
+            <ac:picMk id="7" creationId="{AE203965-6AD9-26F8-8366-847DCC004CAA}"/>
+          </ac:picMkLst>
+        </pc:picChg>
+        <pc:picChg chg="add mod">
+          <ac:chgData name="Erel Dekel" userId="5861eaf1660df668" providerId="LiveId" clId="{C848D9A1-E4C3-4BC8-9DDE-B82935BDE34D}" dt="2024-08-30T15:11:04.460" v="3598"/>
+          <ac:picMkLst>
+            <pc:docMk/>
+            <pc:sldMk cId="2794924398" sldId="261"/>
+            <ac:picMk id="8" creationId="{178B7E73-3DB3-DC94-FFBB-12EB639C96E6}"/>
+          </ac:picMkLst>
+        </pc:picChg>
+        <pc:picChg chg="add mod">
+          <ac:chgData name="Erel Dekel" userId="5861eaf1660df668" providerId="LiveId" clId="{C848D9A1-E4C3-4BC8-9DDE-B82935BDE34D}" dt="2024-08-30T15:20:05.597" v="3832" actId="1036"/>
+          <ac:picMkLst>
+            <pc:docMk/>
+            <pc:sldMk cId="2794924398" sldId="261"/>
+            <ac:picMk id="10" creationId="{57CA0F35-95D3-72B2-203D-96D8BB1C9717}"/>
+          </ac:picMkLst>
+        </pc:picChg>
+        <pc:picChg chg="add mod">
+          <ac:chgData name="Erel Dekel" userId="5861eaf1660df668" providerId="LiveId" clId="{C848D9A1-E4C3-4BC8-9DDE-B82935BDE34D}" dt="2024-08-30T15:21:15.715" v="3842" actId="1036"/>
+          <ac:picMkLst>
+            <pc:docMk/>
+            <pc:sldMk cId="2794924398" sldId="261"/>
+            <ac:picMk id="11" creationId="{52DBE754-63A6-5D75-8732-290F77399228}"/>
+          </ac:picMkLst>
+        </pc:picChg>
+        <pc:picChg chg="add mod">
+          <ac:chgData name="Erel Dekel" userId="5861eaf1660df668" providerId="LiveId" clId="{C848D9A1-E4C3-4BC8-9DDE-B82935BDE34D}" dt="2024-08-30T15:21:12.638" v="3841" actId="1036"/>
+          <ac:picMkLst>
+            <pc:docMk/>
+            <pc:sldMk cId="2794924398" sldId="261"/>
+            <ac:picMk id="13" creationId="{8C7660D8-CD06-C984-20AB-93739A684727}"/>
+          </ac:picMkLst>
+        </pc:picChg>
+      </pc:sldChg>
+      <pc:sldChg chg="addSp delSp modSp new mod">
+        <pc:chgData name="Erel Dekel" userId="5861eaf1660df668" providerId="LiveId" clId="{C848D9A1-E4C3-4BC8-9DDE-B82935BDE34D}" dt="2024-08-30T16:05:31.910" v="4392" actId="20577"/>
+        <pc:sldMkLst>
+          <pc:docMk/>
+          <pc:sldMk cId="3951418646" sldId="262"/>
+        </pc:sldMkLst>
+        <pc:spChg chg="del">
+          <ac:chgData name="Erel Dekel" userId="5861eaf1660df668" providerId="LiveId" clId="{C848D9A1-E4C3-4BC8-9DDE-B82935BDE34D}" dt="2024-08-30T15:42:03.108" v="3844" actId="478"/>
+          <ac:spMkLst>
+            <pc:docMk/>
+            <pc:sldMk cId="3951418646" sldId="262"/>
+            <ac:spMk id="2" creationId="{005D49B4-6343-D892-4BF4-E47DD07D2057}"/>
+          </ac:spMkLst>
+        </pc:spChg>
+        <pc:spChg chg="mod">
+          <ac:chgData name="Erel Dekel" userId="5861eaf1660df668" providerId="LiveId" clId="{C848D9A1-E4C3-4BC8-9DDE-B82935BDE34D}" dt="2024-08-30T16:05:31.910" v="4392" actId="20577"/>
+          <ac:spMkLst>
+            <pc:docMk/>
+            <pc:sldMk cId="3951418646" sldId="262"/>
+            <ac:spMk id="3" creationId="{5288FB69-25E3-7F30-2B2F-BF35840B388C}"/>
+          </ac:spMkLst>
+        </pc:spChg>
+        <pc:spChg chg="add mod">
+          <ac:chgData name="Erel Dekel" userId="5861eaf1660df668" providerId="LiveId" clId="{C848D9A1-E4C3-4BC8-9DDE-B82935BDE34D}" dt="2024-08-30T15:42:35.930" v="3896" actId="20577"/>
+          <ac:spMkLst>
+            <pc:docMk/>
+            <pc:sldMk cId="3951418646" sldId="262"/>
+            <ac:spMk id="4" creationId="{AC0E4CD8-E346-923B-DBA5-70F3EC457004}"/>
+          </ac:spMkLst>
+        </pc:spChg>
+      </pc:sldChg>
+      <pc:sldChg chg="addSp delSp modSp new mod">
+        <pc:chgData name="Erel Dekel" userId="5861eaf1660df668" providerId="LiveId" clId="{C848D9A1-E4C3-4BC8-9DDE-B82935BDE34D}" dt="2024-08-30T21:07:28.957" v="4791" actId="20577"/>
+        <pc:sldMkLst>
+          <pc:docMk/>
+          <pc:sldMk cId="1560638069" sldId="263"/>
+        </pc:sldMkLst>
+        <pc:spChg chg="del">
+          <ac:chgData name="Erel Dekel" userId="5861eaf1660df668" providerId="LiveId" clId="{C848D9A1-E4C3-4BC8-9DDE-B82935BDE34D}" dt="2024-08-30T16:06:17.809" v="4394"/>
+          <ac:spMkLst>
+            <pc:docMk/>
+            <pc:sldMk cId="1560638069" sldId="263"/>
+            <ac:spMk id="2" creationId="{E203E832-7A65-688A-C512-9AA36A862680}"/>
+          </ac:spMkLst>
+        </pc:spChg>
+        <pc:spChg chg="mod">
+          <ac:chgData name="Erel Dekel" userId="5861eaf1660df668" providerId="LiveId" clId="{C848D9A1-E4C3-4BC8-9DDE-B82935BDE34D}" dt="2024-08-30T21:07:28.957" v="4791" actId="20577"/>
+          <ac:spMkLst>
+            <pc:docMk/>
+            <pc:sldMk cId="1560638069" sldId="263"/>
+            <ac:spMk id="3" creationId="{C6863F43-40D2-DF33-C901-4A6B8BA47D5C}"/>
+          </ac:spMkLst>
+        </pc:spChg>
+        <pc:spChg chg="add del mod">
+          <ac:chgData name="Erel Dekel" userId="5861eaf1660df668" providerId="LiveId" clId="{C848D9A1-E4C3-4BC8-9DDE-B82935BDE34D}" dt="2024-08-30T16:06:26.174" v="4395" actId="478"/>
+          <ac:spMkLst>
+            <pc:docMk/>
+            <pc:sldMk cId="1560638069" sldId="263"/>
+            <ac:spMk id="4" creationId="{ECF16179-AF21-25FA-D573-0FE55FB5CB69}"/>
+          </ac:spMkLst>
+        </pc:spChg>
+        <pc:spChg chg="add del mod">
+          <ac:chgData name="Erel Dekel" userId="5861eaf1660df668" providerId="LiveId" clId="{C848D9A1-E4C3-4BC8-9DDE-B82935BDE34D}" dt="2024-08-30T16:06:28.360" v="4396" actId="478"/>
+          <ac:spMkLst>
+            <pc:docMk/>
+            <pc:sldMk cId="1560638069" sldId="263"/>
+            <ac:spMk id="6" creationId="{21C18350-1C2A-4459-A813-5C0F228BC1D3}"/>
+          </ac:spMkLst>
+        </pc:spChg>
+        <pc:spChg chg="add mod">
+          <ac:chgData name="Erel Dekel" userId="5861eaf1660df668" providerId="LiveId" clId="{C848D9A1-E4C3-4BC8-9DDE-B82935BDE34D}" dt="2024-08-30T16:10:00.528" v="4439" actId="20577"/>
+          <ac:spMkLst>
+            <pc:docMk/>
+            <pc:sldMk cId="1560638069" sldId="263"/>
+            <ac:spMk id="7" creationId="{671B295D-1E99-662D-E4A5-5984A3193CDC}"/>
+          </ac:spMkLst>
+        </pc:spChg>
       </pc:sldChg>
       <pc:sldMasterChg chg="del delSldLayout">
         <pc:chgData name="Erel Dekel" userId="5861eaf1660df668" providerId="LiveId" clId="{C848D9A1-E4C3-4BC8-9DDE-B82935BDE34D}" dt="2024-08-28T14:14:14.037" v="1" actId="26606"/>
@@ -1032,7 +1288,7 @@
           <a:p>
             <a:fld id="{E9661D1F-6117-4D45-B9D8-177F02A5000A}" type="datetimeFigureOut">
               <a:rPr lang="LID4096" smtClean="0"/>
-              <a:t>08/28/2024</a:t>
+              <a:t>08/30/2024</a:t>
             </a:fld>
             <a:endParaRPr lang="LID4096"/>
           </a:p>
@@ -1458,7 +1714,7 @@
           <a:p>
             <a:fld id="{655A5808-3B61-48CC-92EF-85AC2E0DFA56}" type="datetime2">
               <a:rPr lang="en-US" smtClean="0"/>
-              <a:t>Wednesday, August 28, 2024</a:t>
+              <a:t>Friday, August 30, 2024</a:t>
             </a:fld>
             <a:endParaRPr lang="en-US"/>
           </a:p>
@@ -1656,7 +1912,7 @@
           <a:p>
             <a:fld id="{735E98AF-4574-4509-BF7A-519ACD5BF826}" type="datetime2">
               <a:rPr lang="en-US" smtClean="0"/>
-              <a:t>Wednesday, August 28, 2024</a:t>
+              <a:t>Friday, August 30, 2024</a:t>
             </a:fld>
             <a:endParaRPr lang="en-US"/>
           </a:p>
@@ -1866,7 +2122,7 @@
           <a:p>
             <a:fld id="{93DD97D4-9636-490F-85D0-E926C2B6F3B1}" type="datetime2">
               <a:rPr lang="en-US" smtClean="0"/>
-              <a:t>Wednesday, August 28, 2024</a:t>
+              <a:t>Friday, August 30, 2024</a:t>
             </a:fld>
             <a:endParaRPr lang="en-US"/>
           </a:p>
@@ -2065,7 +2321,7 @@
           <a:p>
             <a:fld id="{2F3AF3C6-0FD4-4939-991C-00DDE5C56815}" type="datetime2">
               <a:rPr lang="en-US" smtClean="0"/>
-              <a:t>Wednesday, August 28, 2024</a:t>
+              <a:t>Friday, August 30, 2024</a:t>
             </a:fld>
             <a:endParaRPr lang="en-US"/>
           </a:p>
@@ -2346,7 +2602,7 @@
           <a:p>
             <a:fld id="{86807482-8128-47C6-A8DD-6452B0291CFF}" type="datetime2">
               <a:rPr lang="en-US" smtClean="0"/>
-              <a:t>Wednesday, August 28, 2024</a:t>
+              <a:t>Friday, August 30, 2024</a:t>
             </a:fld>
             <a:endParaRPr lang="en-US"/>
           </a:p>
@@ -2614,7 +2870,7 @@
           <a:p>
             <a:fld id="{37903F25-275E-41DE-BE3B-EBF0DB49F9B1}" type="datetime2">
               <a:rPr lang="en-US" smtClean="0"/>
-              <a:t>Wednesday, August 28, 2024</a:t>
+              <a:t>Friday, August 30, 2024</a:t>
             </a:fld>
             <a:endParaRPr lang="en-US"/>
           </a:p>
@@ -2995,7 +3251,7 @@
           <a:p>
             <a:fld id="{EE475572-4A44-4171-84AA-64D42C8050A6}" type="datetime2">
               <a:rPr lang="en-US" smtClean="0"/>
-              <a:t>Wednesday, August 28, 2024</a:t>
+              <a:t>Friday, August 30, 2024</a:t>
             </a:fld>
             <a:endParaRPr lang="en-US"/>
           </a:p>
@@ -3165,7 +3421,7 @@
           <a:p>
             <a:fld id="{C4C1612E-528E-4FD5-9E9E-E15F1108F171}" type="datetime2">
               <a:rPr lang="en-US" smtClean="0"/>
-              <a:t>Wednesday, August 28, 2024</a:t>
+              <a:t>Friday, August 30, 2024</a:t>
             </a:fld>
             <a:endParaRPr lang="en-US"/>
           </a:p>
@@ -3278,7 +3534,7 @@
           <a:p>
             <a:fld id="{D4F6D862-A06D-436F-A92E-EBAAD50B6E50}" type="datetime2">
               <a:rPr lang="en-US" smtClean="0"/>
-              <a:t>Wednesday, August 28, 2024</a:t>
+              <a:t>Friday, August 30, 2024</a:t>
             </a:fld>
             <a:endParaRPr lang="en-US"/>
           </a:p>
@@ -3595,7 +3851,7 @@
           <a:p>
             <a:fld id="{B73E0B7D-2260-4809-8F0A-9E5F3E24F169}" type="datetime2">
               <a:rPr lang="en-US" smtClean="0"/>
-              <a:t>Wednesday, August 28, 2024</a:t>
+              <a:t>Friday, August 30, 2024</a:t>
             </a:fld>
             <a:endParaRPr lang="en-US"/>
           </a:p>
@@ -3887,7 +4143,7 @@
           <a:p>
             <a:fld id="{3C8E4735-C637-46A3-94EB-AB3AC4188D2F}" type="datetime2">
               <a:rPr lang="en-US" smtClean="0"/>
-              <a:t>Wednesday, August 28, 2024</a:t>
+              <a:t>Friday, August 30, 2024</a:t>
             </a:fld>
             <a:endParaRPr lang="en-US"/>
           </a:p>
@@ -4255,7 +4511,7 @@
             <a:fld id="{AE0C963C-C1DB-4AFD-9DDC-0691666BF49B}" type="datetime2">
               <a:rPr lang="en-US" smtClean="0"/>
               <a:pPr/>
-              <a:t>Wednesday, August 28, 2024</a:t>
+              <a:t>Friday, August 30, 2024</a:t>
             </a:fld>
             <a:endParaRPr lang="en-US" cap="all" dirty="0"/>
           </a:p>
@@ -5221,39 +5477,34 @@
         </p:nvSpPr>
         <p:spPr>
           <a:xfrm>
-            <a:off x="1371600" y="636638"/>
-            <a:ext cx="10241280" cy="614123"/>
+            <a:off x="0" y="636638"/>
+            <a:ext cx="12192000" cy="614123"/>
           </a:xfrm>
         </p:spPr>
         <p:txBody>
-          <a:bodyPr/>
+          <a:bodyPr>
+            <a:normAutofit/>
+          </a:bodyPr>
           <a:lstStyle/>
           <a:p>
-            <a:r>
-              <a:rPr lang="en-US" cap="none" spc="100" dirty="0" err="1">
+            <a:pPr algn="ctr"/>
+            <a:r>
+              <a:rPr lang="en-US" sz="3200" cap="none" spc="100" dirty="0">
                 <a:latin typeface="Times New Roman" panose="02020603050405020304" pitchFamily="18" charset="0"/>
                 <a:ea typeface="Cambria" panose="02040503050406030204" pitchFamily="18" charset="0"/>
                 <a:cs typeface="Times New Roman" panose="02020603050405020304" pitchFamily="18" charset="0"/>
               </a:rPr>
-              <a:t>Introdction</a:t>
-            </a:r>
-            <a:r>
-              <a:rPr lang="en-US" cap="none" spc="100" dirty="0">
-                <a:latin typeface="Times New Roman" panose="02020603050405020304" pitchFamily="18" charset="0"/>
-                <a:ea typeface="Cambria" panose="02040503050406030204" pitchFamily="18" charset="0"/>
-                <a:cs typeface="Times New Roman" panose="02020603050405020304" pitchFamily="18" charset="0"/>
-              </a:rPr>
-              <a:t> to Formal Verification</a:t>
-            </a:r>
-            <a:r>
-              <a:rPr lang="en-US" cap="none" spc="0" dirty="0">
+              <a:t>Introduction to Formal Verification</a:t>
+            </a:r>
+            <a:r>
+              <a:rPr lang="en-US" sz="3200" cap="none" spc="0" dirty="0">
                 <a:latin typeface="Cambria" panose="02040503050406030204" pitchFamily="18" charset="0"/>
                 <a:ea typeface="Cambria" panose="02040503050406030204" pitchFamily="18" charset="0"/>
                 <a:cs typeface="Times New Roman" panose="02020603050405020304" pitchFamily="18" charset="0"/>
               </a:rPr>
               <a:t> </a:t>
             </a:r>
-            <a:endParaRPr lang="LID4096" cap="none" spc="0" dirty="0">
+            <a:endParaRPr lang="LID4096" sz="3200" cap="none" spc="0" dirty="0">
               <a:latin typeface="Cambria" panose="02040503050406030204" pitchFamily="18" charset="0"/>
               <a:ea typeface="Cambria" panose="02040503050406030204" pitchFamily="18" charset="0"/>
               <a:cs typeface="Times New Roman" panose="02020603050405020304" pitchFamily="18" charset="0"/>
@@ -5279,7 +5530,7 @@
         </p:nvSpPr>
         <p:spPr>
           <a:xfrm>
-            <a:off x="1465498" y="1801761"/>
+            <a:off x="1062872" y="1804219"/>
             <a:ext cx="4846320" cy="3959352"/>
           </a:xfrm>
         </p:spPr>
@@ -5330,7 +5581,7 @@
         </p:nvSpPr>
         <p:spPr>
           <a:xfrm>
-            <a:off x="6766559" y="1801761"/>
+            <a:off x="6243480" y="1804219"/>
             <a:ext cx="4846320" cy="3959351"/>
           </a:xfrm>
         </p:spPr>
@@ -5397,7 +5648,7 @@
         </p:blipFill>
         <p:spPr>
           <a:xfrm>
-            <a:off x="3604751" y="2145890"/>
+            <a:off x="3202125" y="2145888"/>
             <a:ext cx="567813" cy="567813"/>
           </a:xfrm>
           <a:prstGeom prst="rect">
@@ -5433,7 +5684,7 @@
         </p:blipFill>
         <p:spPr>
           <a:xfrm>
-            <a:off x="8882657" y="2122734"/>
+            <a:off x="8359578" y="2122734"/>
             <a:ext cx="614123" cy="614123"/>
           </a:xfrm>
           <a:prstGeom prst="rect">
@@ -5512,8 +5763,14 @@
                 <a:latin typeface="Times New Roman" panose="02020603050405020304" pitchFamily="18" charset="0"/>
                 <a:cs typeface="Times New Roman" panose="02020603050405020304" pitchFamily="18" charset="0"/>
               </a:rPr>
-              <a:t>Formal description of desired system behavior. </a:t>
-            </a:r>
+              <a:t>Formal description of desired system behavior</a:t>
+            </a:r>
+          </a:p>
+          <a:p>
+            <a:endParaRPr lang="en-US" dirty="0">
+              <a:latin typeface="Times New Roman" panose="02020603050405020304" pitchFamily="18" charset="0"/>
+              <a:cs typeface="Times New Roman" panose="02020603050405020304" pitchFamily="18" charset="0"/>
+            </a:endParaRPr>
           </a:p>
           <a:p>
             <a:endParaRPr lang="en-US" dirty="0">
@@ -5547,6 +5804,12 @@
             </a:endParaRPr>
           </a:p>
           <a:p>
+            <a:endParaRPr lang="en-US" dirty="0">
+              <a:latin typeface="Times New Roman" panose="02020603050405020304" pitchFamily="18" charset="0"/>
+              <a:cs typeface="Times New Roman" panose="02020603050405020304" pitchFamily="18" charset="0"/>
+            </a:endParaRPr>
+          </a:p>
+          <a:p>
             <a:pPr marL="0" indent="0">
               <a:buNone/>
             </a:pPr>
@@ -5589,23 +5852,26 @@
         </p:nvSpPr>
         <p:spPr>
           <a:xfrm>
-            <a:off x="1371600" y="636638"/>
-            <a:ext cx="10241280" cy="614123"/>
+            <a:off x="0" y="636638"/>
+            <a:ext cx="12192000" cy="614123"/>
           </a:xfrm>
         </p:spPr>
         <p:txBody>
-          <a:bodyPr/>
+          <a:bodyPr>
+            <a:normAutofit/>
+          </a:bodyPr>
           <a:lstStyle/>
           <a:p>
-            <a:r>
-              <a:rPr lang="en-US" cap="none" spc="100" dirty="0">
+            <a:pPr algn="ctr"/>
+            <a:r>
+              <a:rPr lang="en-US" sz="3200" cap="none" spc="100" dirty="0">
                 <a:latin typeface="Times New Roman" panose="02020603050405020304" pitchFamily="18" charset="0"/>
                 <a:ea typeface="Cambria" panose="02040503050406030204" pitchFamily="18" charset="0"/>
                 <a:cs typeface="Times New Roman" panose="02020603050405020304" pitchFamily="18" charset="0"/>
               </a:rPr>
               <a:t>Key Concepts in Formal Verification</a:t>
             </a:r>
-            <a:endParaRPr lang="LID4096" cap="none" spc="0" dirty="0">
+            <a:endParaRPr lang="LID4096" sz="3200" cap="none" spc="0" dirty="0">
               <a:latin typeface="Cambria" panose="02040503050406030204" pitchFamily="18" charset="0"/>
               <a:ea typeface="Cambria" panose="02040503050406030204" pitchFamily="18" charset="0"/>
               <a:cs typeface="Times New Roman" panose="02020603050405020304" pitchFamily="18" charset="0"/>
@@ -5641,7 +5907,7 @@
         </p:blipFill>
         <p:spPr>
           <a:xfrm>
-            <a:off x="668985" y="3679727"/>
+            <a:off x="668985" y="4790768"/>
             <a:ext cx="614124" cy="614124"/>
           </a:xfrm>
           <a:prstGeom prst="rect">
@@ -5713,7 +5979,7 @@
         </p:blipFill>
         <p:spPr>
           <a:xfrm>
-            <a:off x="668985" y="2677228"/>
+            <a:off x="668985" y="3121937"/>
             <a:ext cx="614125" cy="614125"/>
           </a:xfrm>
           <a:prstGeom prst="rect">
@@ -5767,8 +6033,8 @@
         </p:nvSpPr>
         <p:spPr>
           <a:xfrm>
-            <a:off x="1371600" y="636638"/>
-            <a:ext cx="10241280" cy="614123"/>
+            <a:off x="0" y="636638"/>
+            <a:ext cx="12192000" cy="614123"/>
           </a:xfrm>
           <a:prstGeom prst="rect">
             <a:avLst/>
@@ -5798,6 +6064,7 @@
             </a:lvl1pPr>
           </a:lstStyle>
           <a:p>
+            <a:pPr algn="ctr"/>
             <a:r>
               <a:rPr lang="en-US" sz="3200" cap="none" spc="100" dirty="0">
                 <a:latin typeface="Times New Roman" panose="02020603050405020304" pitchFamily="18" charset="0"/>
@@ -6047,15 +6314,28 @@
                 <a:latin typeface="Times New Roman" panose="02020603050405020304" pitchFamily="18" charset="0"/>
                 <a:cs typeface="Times New Roman" panose="02020603050405020304" pitchFamily="18" charset="0"/>
               </a:rPr>
-              <a:t>Scalability – </a:t>
+              <a:t>Scalability –</a:t>
+            </a:r>
+            <a:r>
+              <a:rPr lang="he-IL" b="1" dirty="0">
+                <a:latin typeface="Times New Roman" panose="02020603050405020304" pitchFamily="18" charset="0"/>
+                <a:cs typeface="Times New Roman" panose="02020603050405020304" pitchFamily="18" charset="0"/>
+              </a:rPr>
+              <a:t> </a:t>
             </a:r>
             <a:r>
               <a:rPr lang="en-US" dirty="0">
                 <a:latin typeface="Times New Roman" panose="02020603050405020304" pitchFamily="18" charset="0"/>
                 <a:cs typeface="Times New Roman" panose="02020603050405020304" pitchFamily="18" charset="0"/>
               </a:rPr>
-              <a:t>NN often has large number of parameters and complex architectures. abstraction and decomposition methods use to simplify the model</a:t>
-            </a:r>
+              <a:t>large number of parameters and complex architectures</a:t>
+            </a:r>
+          </a:p>
+          <a:p>
+            <a:endParaRPr lang="he-IL" dirty="0">
+              <a:latin typeface="Times New Roman" panose="02020603050405020304" pitchFamily="18" charset="0"/>
+              <a:cs typeface="Times New Roman" panose="02020603050405020304" pitchFamily="18" charset="0"/>
+            </a:endParaRPr>
           </a:p>
           <a:p>
             <a:endParaRPr lang="en-US" dirty="0">
@@ -6075,12 +6355,25 @@
               <a:t>Non-linearities –</a:t>
             </a:r>
             <a:r>
+              <a:rPr lang="he-IL" b="1" dirty="0">
+                <a:latin typeface="Times New Roman" panose="02020603050405020304" pitchFamily="18" charset="0"/>
+                <a:cs typeface="Times New Roman" panose="02020603050405020304" pitchFamily="18" charset="0"/>
+              </a:rPr>
+              <a:t> </a:t>
+            </a:r>
+            <a:r>
               <a:rPr lang="en-US" dirty="0">
                 <a:latin typeface="Times New Roman" panose="02020603050405020304" pitchFamily="18" charset="0"/>
                 <a:cs typeface="Times New Roman" panose="02020603050405020304" pitchFamily="18" charset="0"/>
               </a:rPr>
-              <a:t> NN uses activation functions (ReLU) that complicates the verification process. Special tools like SMT developed to address this non-linearities</a:t>
-            </a:r>
+              <a:t>activation functions complicates the verification </a:t>
+            </a:r>
+          </a:p>
+          <a:p>
+            <a:endParaRPr lang="he-IL" dirty="0">
+              <a:latin typeface="Times New Roman" panose="02020603050405020304" pitchFamily="18" charset="0"/>
+              <a:cs typeface="Times New Roman" panose="02020603050405020304" pitchFamily="18" charset="0"/>
+            </a:endParaRPr>
           </a:p>
           <a:p>
             <a:endParaRPr lang="en-US" dirty="0">
@@ -6104,7 +6397,7 @@
                 <a:latin typeface="Times New Roman" panose="02020603050405020304" pitchFamily="18" charset="0"/>
                 <a:cs typeface="Times New Roman" panose="02020603050405020304" pitchFamily="18" charset="0"/>
               </a:rPr>
-              <a:t>Ensuring NN are robust against adversarial attack. Techniques such as symbolic interval propagation and adversarial training maintains its performance under slight perturbations of input data.</a:t>
+              <a:t>Ensuring NN are robust against adversarial attack</a:t>
             </a:r>
             <a:endParaRPr lang="LID4096" dirty="0">
               <a:latin typeface="Times New Roman" panose="02020603050405020304" pitchFamily="18" charset="0"/>
@@ -6141,7 +6434,7 @@
         </p:blipFill>
         <p:spPr>
           <a:xfrm>
-            <a:off x="727979" y="3121938"/>
+            <a:off x="727979" y="3141602"/>
             <a:ext cx="614123" cy="614123"/>
           </a:xfrm>
           <a:prstGeom prst="rect">
@@ -6177,7 +6470,7 @@
         </p:blipFill>
         <p:spPr>
           <a:xfrm>
-            <a:off x="727980" y="1793453"/>
+            <a:off x="727980" y="1675469"/>
             <a:ext cx="614123" cy="614123"/>
           </a:xfrm>
           <a:prstGeom prst="rect">
@@ -6213,7 +6506,7 @@
         </p:blipFill>
         <p:spPr>
           <a:xfrm>
-            <a:off x="727979" y="4450423"/>
+            <a:off x="727979" y="4637231"/>
             <a:ext cx="614124" cy="614124"/>
           </a:xfrm>
           <a:prstGeom prst="rect">
@@ -6225,6 +6518,1641 @@
     <p:extLst>
       <p:ext uri="{BB962C8B-B14F-4D97-AF65-F5344CB8AC3E}">
         <p14:creationId xmlns:p14="http://schemas.microsoft.com/office/powerpoint/2010/main" val="2551144604"/>
+      </p:ext>
+    </p:extLst>
+  </p:cSld>
+  <p:clrMapOvr>
+    <a:masterClrMapping/>
+  </p:clrMapOvr>
+</p:sld>
+</file>
+
+<file path=ppt/slides/slide5.xml><?xml version="1.0" encoding="utf-8"?>
+<p:sld xmlns:a="http://schemas.openxmlformats.org/drawingml/2006/main" xmlns:r="http://schemas.openxmlformats.org/officeDocument/2006/relationships" xmlns:p="http://schemas.openxmlformats.org/presentationml/2006/main">
+  <p:cSld>
+    <p:spTree>
+      <p:nvGrpSpPr>
+        <p:cNvPr id="1" name=""/>
+        <p:cNvGrpSpPr/>
+        <p:nvPr/>
+      </p:nvGrpSpPr>
+      <p:grpSpPr>
+        <a:xfrm>
+          <a:off x="0" y="0"/>
+          <a:ext cx="0" cy="0"/>
+          <a:chOff x="0" y="0"/>
+          <a:chExt cx="0" cy="0"/>
+        </a:xfrm>
+      </p:grpSpPr>
+      <p:sp>
+        <p:nvSpPr>
+          <p:cNvPr id="4" name="Title 1">
+            <a:extLst>
+              <a:ext uri="{FF2B5EF4-FFF2-40B4-BE49-F238E27FC236}">
+                <a16:creationId xmlns:a16="http://schemas.microsoft.com/office/drawing/2014/main" id="{9F6A0F8F-A975-8428-A8B2-B42F6EE8FEE9}"/>
+              </a:ext>
+            </a:extLst>
+          </p:cNvPr>
+          <p:cNvSpPr txBox="1">
+            <a:spLocks/>
+          </p:cNvSpPr>
+          <p:nvPr/>
+        </p:nvSpPr>
+        <p:spPr>
+          <a:xfrm>
+            <a:off x="0" y="636638"/>
+            <a:ext cx="12192000" cy="614123"/>
+          </a:xfrm>
+          <a:prstGeom prst="rect">
+            <a:avLst/>
+          </a:prstGeom>
+        </p:spPr>
+        <p:txBody>
+          <a:bodyPr vert="horz" lIns="0" tIns="0" rIns="0" bIns="0" rtlCol="0" anchor="b">
+            <a:normAutofit/>
+          </a:bodyPr>
+          <a:lstStyle>
+            <a:lvl1pPr algn="l" defTabSz="914400" rtl="0" eaLnBrk="1" latinLnBrk="0" hangingPunct="1">
+              <a:lnSpc>
+                <a:spcPct val="100000"/>
+              </a:lnSpc>
+              <a:spcBef>
+                <a:spcPct val="0"/>
+              </a:spcBef>
+              <a:buNone/>
+              <a:defRPr sz="3600" b="1" i="0" kern="1200" cap="all" spc="700" baseline="0">
+                <a:solidFill>
+                  <a:schemeClr val="tx1"/>
+                </a:solidFill>
+                <a:latin typeface="+mj-lt"/>
+                <a:ea typeface="+mj-ea"/>
+                <a:cs typeface="+mj-cs"/>
+              </a:defRPr>
+            </a:lvl1pPr>
+          </a:lstStyle>
+          <a:p>
+            <a:pPr algn="ctr"/>
+            <a:r>
+              <a:rPr lang="en-US" sz="3200" cap="none" spc="100" dirty="0">
+                <a:latin typeface="Times New Roman" panose="02020603050405020304" pitchFamily="18" charset="0"/>
+                <a:ea typeface="Cambria" panose="02040503050406030204" pitchFamily="18" charset="0"/>
+                <a:cs typeface="Times New Roman" panose="02020603050405020304" pitchFamily="18" charset="0"/>
+              </a:rPr>
+              <a:t>Maraboupy: Python Interface for Neural Network Verification</a:t>
+            </a:r>
+            <a:endParaRPr lang="LID4096" sz="3200" cap="none" spc="100" dirty="0">
+              <a:latin typeface="Times New Roman" panose="02020603050405020304" pitchFamily="18" charset="0"/>
+              <a:ea typeface="Cambria" panose="02040503050406030204" pitchFamily="18" charset="0"/>
+              <a:cs typeface="Times New Roman" panose="02020603050405020304" pitchFamily="18" charset="0"/>
+            </a:endParaRPr>
+          </a:p>
+        </p:txBody>
+      </p:sp>
+      <p:sp>
+        <p:nvSpPr>
+          <p:cNvPr id="5" name="Content Placeholder 5">
+            <a:extLst>
+              <a:ext uri="{FF2B5EF4-FFF2-40B4-BE49-F238E27FC236}">
+                <a16:creationId xmlns:a16="http://schemas.microsoft.com/office/drawing/2014/main" id="{5958648E-A2CC-6831-7C02-271DF1AA57B5}"/>
+              </a:ext>
+            </a:extLst>
+          </p:cNvPr>
+          <p:cNvSpPr txBox="1">
+            <a:spLocks/>
+          </p:cNvSpPr>
+          <p:nvPr/>
+        </p:nvSpPr>
+        <p:spPr>
+          <a:xfrm>
+            <a:off x="1371600" y="1793453"/>
+            <a:ext cx="10241280" cy="3959352"/>
+          </a:xfrm>
+          <a:prstGeom prst="rect">
+            <a:avLst/>
+          </a:prstGeom>
+        </p:spPr>
+        <p:txBody>
+          <a:bodyPr vert="horz" lIns="0" tIns="0" rIns="0" bIns="0" rtlCol="0">
+            <a:normAutofit/>
+          </a:bodyPr>
+          <a:lstStyle>
+            <a:lvl1pPr marL="228600" indent="-228600" algn="l" defTabSz="914400" rtl="0" eaLnBrk="1" latinLnBrk="0" hangingPunct="1">
+              <a:lnSpc>
+                <a:spcPct val="120000"/>
+              </a:lnSpc>
+              <a:spcBef>
+                <a:spcPts val="1000"/>
+              </a:spcBef>
+              <a:buFont typeface="Arial" panose="020B0604020202020204" pitchFamily="34" charset="0"/>
+              <a:buChar char="•"/>
+              <a:defRPr sz="2000" kern="1200">
+                <a:solidFill>
+                  <a:schemeClr val="tx1"/>
+                </a:solidFill>
+                <a:latin typeface="+mn-lt"/>
+                <a:ea typeface="+mn-ea"/>
+                <a:cs typeface="+mn-cs"/>
+              </a:defRPr>
+            </a:lvl1pPr>
+            <a:lvl2pPr marL="685800" indent="-228600" algn="l" defTabSz="914400" rtl="0" eaLnBrk="1" latinLnBrk="0" hangingPunct="1">
+              <a:lnSpc>
+                <a:spcPct val="120000"/>
+              </a:lnSpc>
+              <a:spcBef>
+                <a:spcPts val="500"/>
+              </a:spcBef>
+              <a:buFont typeface="Arial" panose="020B0604020202020204" pitchFamily="34" charset="0"/>
+              <a:buChar char="•"/>
+              <a:defRPr sz="2000" kern="1200">
+                <a:solidFill>
+                  <a:schemeClr val="tx1"/>
+                </a:solidFill>
+                <a:latin typeface="+mn-lt"/>
+                <a:ea typeface="+mn-ea"/>
+                <a:cs typeface="+mn-cs"/>
+              </a:defRPr>
+            </a:lvl2pPr>
+            <a:lvl3pPr marL="1143000" indent="-228600" algn="l" defTabSz="914400" rtl="0" eaLnBrk="1" latinLnBrk="0" hangingPunct="1">
+              <a:lnSpc>
+                <a:spcPct val="120000"/>
+              </a:lnSpc>
+              <a:spcBef>
+                <a:spcPts val="500"/>
+              </a:spcBef>
+              <a:buFont typeface="Arial" panose="020B0604020202020204" pitchFamily="34" charset="0"/>
+              <a:buChar char="•"/>
+              <a:defRPr sz="1800" kern="1200">
+                <a:solidFill>
+                  <a:schemeClr val="tx1"/>
+                </a:solidFill>
+                <a:latin typeface="+mn-lt"/>
+                <a:ea typeface="+mn-ea"/>
+                <a:cs typeface="+mn-cs"/>
+              </a:defRPr>
+            </a:lvl3pPr>
+            <a:lvl4pPr marL="1600200" indent="-228600" algn="l" defTabSz="914400" rtl="0" eaLnBrk="1" latinLnBrk="0" hangingPunct="1">
+              <a:lnSpc>
+                <a:spcPct val="120000"/>
+              </a:lnSpc>
+              <a:spcBef>
+                <a:spcPts val="500"/>
+              </a:spcBef>
+              <a:buFont typeface="Arial" panose="020B0604020202020204" pitchFamily="34" charset="0"/>
+              <a:buChar char="•"/>
+              <a:defRPr sz="1600" kern="1200">
+                <a:solidFill>
+                  <a:schemeClr val="tx1"/>
+                </a:solidFill>
+                <a:latin typeface="+mn-lt"/>
+                <a:ea typeface="+mn-ea"/>
+                <a:cs typeface="+mn-cs"/>
+              </a:defRPr>
+            </a:lvl4pPr>
+            <a:lvl5pPr marL="2057400" indent="-228600" algn="l" defTabSz="914400" rtl="0" eaLnBrk="1" latinLnBrk="0" hangingPunct="1">
+              <a:lnSpc>
+                <a:spcPct val="120000"/>
+              </a:lnSpc>
+              <a:spcBef>
+                <a:spcPts val="500"/>
+              </a:spcBef>
+              <a:buFont typeface="Arial" panose="020B0604020202020204" pitchFamily="34" charset="0"/>
+              <a:buChar char="•"/>
+              <a:defRPr sz="1600" kern="1200">
+                <a:solidFill>
+                  <a:schemeClr val="tx1"/>
+                </a:solidFill>
+                <a:latin typeface="+mn-lt"/>
+                <a:ea typeface="+mn-ea"/>
+                <a:cs typeface="+mn-cs"/>
+              </a:defRPr>
+            </a:lvl5pPr>
+            <a:lvl6pPr marL="2514600" indent="-228600" algn="l" defTabSz="914400" rtl="0" eaLnBrk="1" latinLnBrk="0" hangingPunct="1">
+              <a:lnSpc>
+                <a:spcPct val="90000"/>
+              </a:lnSpc>
+              <a:spcBef>
+                <a:spcPts val="500"/>
+              </a:spcBef>
+              <a:buFont typeface="Arial" panose="020B0604020202020204" pitchFamily="34" charset="0"/>
+              <a:buChar char="•"/>
+              <a:defRPr sz="1800" kern="1200">
+                <a:solidFill>
+                  <a:schemeClr val="tx1"/>
+                </a:solidFill>
+                <a:latin typeface="+mn-lt"/>
+                <a:ea typeface="+mn-ea"/>
+                <a:cs typeface="+mn-cs"/>
+              </a:defRPr>
+            </a:lvl6pPr>
+            <a:lvl7pPr marL="2971800" indent="-228600" algn="l" defTabSz="914400" rtl="0" eaLnBrk="1" latinLnBrk="0" hangingPunct="1">
+              <a:lnSpc>
+                <a:spcPct val="90000"/>
+              </a:lnSpc>
+              <a:spcBef>
+                <a:spcPts val="500"/>
+              </a:spcBef>
+              <a:buFont typeface="Arial" panose="020B0604020202020204" pitchFamily="34" charset="0"/>
+              <a:buChar char="•"/>
+              <a:defRPr sz="1800" kern="1200">
+                <a:solidFill>
+                  <a:schemeClr val="tx1"/>
+                </a:solidFill>
+                <a:latin typeface="+mn-lt"/>
+                <a:ea typeface="+mn-ea"/>
+                <a:cs typeface="+mn-cs"/>
+              </a:defRPr>
+            </a:lvl7pPr>
+            <a:lvl8pPr marL="3429000" indent="-228600" algn="l" defTabSz="914400" rtl="0" eaLnBrk="1" latinLnBrk="0" hangingPunct="1">
+              <a:lnSpc>
+                <a:spcPct val="90000"/>
+              </a:lnSpc>
+              <a:spcBef>
+                <a:spcPts val="500"/>
+              </a:spcBef>
+              <a:buFont typeface="Arial" panose="020B0604020202020204" pitchFamily="34" charset="0"/>
+              <a:buChar char="•"/>
+              <a:defRPr sz="1800" kern="1200">
+                <a:solidFill>
+                  <a:schemeClr val="tx1"/>
+                </a:solidFill>
+                <a:latin typeface="+mn-lt"/>
+                <a:ea typeface="+mn-ea"/>
+                <a:cs typeface="+mn-cs"/>
+              </a:defRPr>
+            </a:lvl8pPr>
+            <a:lvl9pPr marL="3886200" indent="-228600" algn="l" defTabSz="914400" rtl="0" eaLnBrk="1" latinLnBrk="0" hangingPunct="1">
+              <a:lnSpc>
+                <a:spcPct val="90000"/>
+              </a:lnSpc>
+              <a:spcBef>
+                <a:spcPts val="500"/>
+              </a:spcBef>
+              <a:buFont typeface="Arial" panose="020B0604020202020204" pitchFamily="34" charset="0"/>
+              <a:buChar char="•"/>
+              <a:defRPr sz="1800" kern="1200">
+                <a:solidFill>
+                  <a:schemeClr val="tx1"/>
+                </a:solidFill>
+                <a:latin typeface="+mn-lt"/>
+                <a:ea typeface="+mn-ea"/>
+                <a:cs typeface="+mn-cs"/>
+              </a:defRPr>
+            </a:lvl9pPr>
+          </a:lstStyle>
+          <a:p>
+            <a:pPr marL="0" indent="0">
+              <a:buNone/>
+            </a:pPr>
+            <a:r>
+              <a:rPr lang="en-US" b="1" dirty="0">
+                <a:latin typeface="Times New Roman" panose="02020603050405020304" pitchFamily="18" charset="0"/>
+                <a:cs typeface="Times New Roman" panose="02020603050405020304" pitchFamily="18" charset="0"/>
+              </a:rPr>
+              <a:t>Key Features –</a:t>
+            </a:r>
+            <a:r>
+              <a:rPr lang="he-IL" b="1" dirty="0">
+                <a:latin typeface="Times New Roman" panose="02020603050405020304" pitchFamily="18" charset="0"/>
+                <a:cs typeface="Times New Roman" panose="02020603050405020304" pitchFamily="18" charset="0"/>
+              </a:rPr>
+              <a:t> </a:t>
+            </a:r>
+            <a:r>
+              <a:rPr lang="en-US" dirty="0">
+                <a:latin typeface="Times New Roman" panose="02020603050405020304" pitchFamily="18" charset="0"/>
+                <a:cs typeface="Times New Roman" panose="02020603050405020304" pitchFamily="18" charset="0"/>
+              </a:rPr>
+              <a:t>User friendly interface which supports various NN architectures</a:t>
+            </a:r>
+          </a:p>
+          <a:p>
+            <a:endParaRPr lang="he-IL" dirty="0">
+              <a:latin typeface="Times New Roman" panose="02020603050405020304" pitchFamily="18" charset="0"/>
+              <a:cs typeface="Times New Roman" panose="02020603050405020304" pitchFamily="18" charset="0"/>
+            </a:endParaRPr>
+          </a:p>
+          <a:p>
+            <a:endParaRPr lang="en-US" dirty="0">
+              <a:latin typeface="Times New Roman" panose="02020603050405020304" pitchFamily="18" charset="0"/>
+              <a:cs typeface="Times New Roman" panose="02020603050405020304" pitchFamily="18" charset="0"/>
+            </a:endParaRPr>
+          </a:p>
+          <a:p>
+            <a:pPr marL="0" indent="0">
+              <a:buNone/>
+            </a:pPr>
+            <a:r>
+              <a:rPr lang="en-US" b="1" dirty="0">
+                <a:latin typeface="Times New Roman" panose="02020603050405020304" pitchFamily="18" charset="0"/>
+                <a:cs typeface="Times New Roman" panose="02020603050405020304" pitchFamily="18" charset="0"/>
+              </a:rPr>
+              <a:t>Functionality – </a:t>
+            </a:r>
+            <a:r>
+              <a:rPr lang="en-US" dirty="0">
+                <a:latin typeface="Times New Roman" panose="02020603050405020304" pitchFamily="18" charset="0"/>
+                <a:cs typeface="Times New Roman" panose="02020603050405020304" pitchFamily="18" charset="0"/>
+              </a:rPr>
+              <a:t>Imports NN from formats, specify constraints on inputs and outputs, use SMT to prove/disprove properties and generate counterexample </a:t>
+            </a:r>
+          </a:p>
+          <a:p>
+            <a:pPr marL="0" indent="0">
+              <a:buNone/>
+            </a:pPr>
+            <a:endParaRPr lang="en-US" dirty="0">
+              <a:latin typeface="Times New Roman" panose="02020603050405020304" pitchFamily="18" charset="0"/>
+              <a:cs typeface="Times New Roman" panose="02020603050405020304" pitchFamily="18" charset="0"/>
+            </a:endParaRPr>
+          </a:p>
+          <a:p>
+            <a:pPr marL="0" indent="0">
+              <a:buNone/>
+            </a:pPr>
+            <a:endParaRPr lang="he-IL" b="1" dirty="0">
+              <a:latin typeface="Times New Roman" panose="02020603050405020304" pitchFamily="18" charset="0"/>
+              <a:cs typeface="Times New Roman" panose="02020603050405020304" pitchFamily="18" charset="0"/>
+            </a:endParaRPr>
+          </a:p>
+          <a:p>
+            <a:pPr marL="0" indent="0">
+              <a:buNone/>
+            </a:pPr>
+            <a:r>
+              <a:rPr lang="en-US" b="1" dirty="0">
+                <a:latin typeface="Times New Roman" panose="02020603050405020304" pitchFamily="18" charset="0"/>
+                <a:cs typeface="Times New Roman" panose="02020603050405020304" pitchFamily="18" charset="0"/>
+              </a:rPr>
+              <a:t>Use Cases– </a:t>
+            </a:r>
+            <a:r>
+              <a:rPr lang="en-US" dirty="0">
+                <a:latin typeface="Times New Roman" panose="02020603050405020304" pitchFamily="18" charset="0"/>
+                <a:cs typeface="Times New Roman" panose="02020603050405020304" pitchFamily="18" charset="0"/>
+              </a:rPr>
+              <a:t>property checking and mostly robustness verification</a:t>
+            </a:r>
+            <a:endParaRPr lang="LID4096" dirty="0">
+              <a:latin typeface="Times New Roman" panose="02020603050405020304" pitchFamily="18" charset="0"/>
+              <a:cs typeface="Times New Roman" panose="02020603050405020304" pitchFamily="18" charset="0"/>
+            </a:endParaRPr>
+          </a:p>
+        </p:txBody>
+      </p:sp>
+      <p:pic>
+        <p:nvPicPr>
+          <p:cNvPr id="7" name="Graphic 6" descr="Key with solid fill">
+            <a:extLst>
+              <a:ext uri="{FF2B5EF4-FFF2-40B4-BE49-F238E27FC236}">
+                <a16:creationId xmlns:a16="http://schemas.microsoft.com/office/drawing/2014/main" id="{1637C9AE-1BF7-8B68-4448-BCD23F92AF3A}"/>
+              </a:ext>
+            </a:extLst>
+          </p:cNvPr>
+          <p:cNvPicPr>
+            <a:picLocks noChangeAspect="1"/>
+          </p:cNvPicPr>
+          <p:nvPr/>
+        </p:nvPicPr>
+        <p:blipFill>
+          <a:blip r:embed="rId2">
+            <a:extLst>
+              <a:ext uri="{96DAC541-7B7A-43D3-8B79-37D633B846F1}">
+                <asvg:svgBlip xmlns:asvg="http://schemas.microsoft.com/office/drawing/2016/SVG/main" r:embed="rId3"/>
+              </a:ext>
+            </a:extLst>
+          </a:blip>
+          <a:stretch>
+            <a:fillRect/>
+          </a:stretch>
+        </p:blipFill>
+        <p:spPr>
+          <a:xfrm>
+            <a:off x="676748" y="1701937"/>
+            <a:ext cx="614126" cy="614126"/>
+          </a:xfrm>
+          <a:prstGeom prst="rect">
+            <a:avLst/>
+          </a:prstGeom>
+        </p:spPr>
+      </p:pic>
+      <p:pic>
+        <p:nvPicPr>
+          <p:cNvPr id="9" name="Graphic 8" descr="Programmer male with solid fill">
+            <a:extLst>
+              <a:ext uri="{FF2B5EF4-FFF2-40B4-BE49-F238E27FC236}">
+                <a16:creationId xmlns:a16="http://schemas.microsoft.com/office/drawing/2014/main" id="{A57747BD-F2DF-E5F7-3342-330BE7C192E6}"/>
+              </a:ext>
+            </a:extLst>
+          </p:cNvPr>
+          <p:cNvPicPr>
+            <a:picLocks noChangeAspect="1"/>
+          </p:cNvPicPr>
+          <p:nvPr/>
+        </p:nvPicPr>
+        <p:blipFill>
+          <a:blip r:embed="rId4">
+            <a:extLst>
+              <a:ext uri="{96DAC541-7B7A-43D3-8B79-37D633B846F1}">
+                <asvg:svgBlip xmlns:asvg="http://schemas.microsoft.com/office/drawing/2016/SVG/main" r:embed="rId5"/>
+              </a:ext>
+            </a:extLst>
+          </a:blip>
+          <a:stretch>
+            <a:fillRect/>
+          </a:stretch>
+        </p:blipFill>
+        <p:spPr>
+          <a:xfrm>
+            <a:off x="676748" y="3326147"/>
+            <a:ext cx="614126" cy="614126"/>
+          </a:xfrm>
+          <a:prstGeom prst="rect">
+            <a:avLst/>
+          </a:prstGeom>
+        </p:spPr>
+      </p:pic>
+      <p:pic>
+        <p:nvPicPr>
+          <p:cNvPr id="10" name="Graphic 9" descr="Shield Tick with solid fill">
+            <a:extLst>
+              <a:ext uri="{FF2B5EF4-FFF2-40B4-BE49-F238E27FC236}">
+                <a16:creationId xmlns:a16="http://schemas.microsoft.com/office/drawing/2014/main" id="{5571F10E-F450-5657-B9FC-3623B5456502}"/>
+              </a:ext>
+            </a:extLst>
+          </p:cNvPr>
+          <p:cNvPicPr>
+            <a:picLocks noChangeAspect="1"/>
+          </p:cNvPicPr>
+          <p:nvPr/>
+        </p:nvPicPr>
+        <p:blipFill>
+          <a:blip r:embed="rId6">
+            <a:extLst>
+              <a:ext uri="{96DAC541-7B7A-43D3-8B79-37D633B846F1}">
+                <asvg:svgBlip xmlns:asvg="http://schemas.microsoft.com/office/drawing/2016/SVG/main" r:embed="rId7"/>
+              </a:ext>
+            </a:extLst>
+          </a:blip>
+          <a:stretch>
+            <a:fillRect/>
+          </a:stretch>
+        </p:blipFill>
+        <p:spPr>
+          <a:xfrm>
+            <a:off x="676749" y="4994220"/>
+            <a:ext cx="614125" cy="614125"/>
+          </a:xfrm>
+          <a:prstGeom prst="rect">
+            <a:avLst/>
+          </a:prstGeom>
+        </p:spPr>
+      </p:pic>
+    </p:spTree>
+    <p:extLst>
+      <p:ext uri="{BB962C8B-B14F-4D97-AF65-F5344CB8AC3E}">
+        <p14:creationId xmlns:p14="http://schemas.microsoft.com/office/powerpoint/2010/main" val="3412950082"/>
+      </p:ext>
+    </p:extLst>
+  </p:cSld>
+  <p:clrMapOvr>
+    <a:masterClrMapping/>
+  </p:clrMapOvr>
+</p:sld>
+</file>
+
+<file path=ppt/slides/slide6.xml><?xml version="1.0" encoding="utf-8"?>
+<p:sld xmlns:a="http://schemas.openxmlformats.org/drawingml/2006/main" xmlns:r="http://schemas.openxmlformats.org/officeDocument/2006/relationships" xmlns:p="http://schemas.openxmlformats.org/presentationml/2006/main">
+  <p:cSld>
+    <p:spTree>
+      <p:nvGrpSpPr>
+        <p:cNvPr id="1" name=""/>
+        <p:cNvGrpSpPr/>
+        <p:nvPr/>
+      </p:nvGrpSpPr>
+      <p:grpSpPr>
+        <a:xfrm>
+          <a:off x="0" y="0"/>
+          <a:ext cx="0" cy="0"/>
+          <a:chOff x="0" y="0"/>
+          <a:chExt cx="0" cy="0"/>
+        </a:xfrm>
+      </p:grpSpPr>
+      <p:sp>
+        <p:nvSpPr>
+          <p:cNvPr id="3" name="Content Placeholder 2">
+            <a:extLst>
+              <a:ext uri="{FF2B5EF4-FFF2-40B4-BE49-F238E27FC236}">
+                <a16:creationId xmlns:a16="http://schemas.microsoft.com/office/drawing/2014/main" id="{AF6F3683-1026-7671-DC8A-59341AE0E1F5}"/>
+              </a:ext>
+            </a:extLst>
+          </p:cNvPr>
+          <p:cNvSpPr>
+            <a:spLocks noGrp="1"/>
+          </p:cNvSpPr>
+          <p:nvPr>
+            <p:ph idx="1"/>
+          </p:nvPr>
+        </p:nvSpPr>
+        <p:spPr/>
+        <p:txBody>
+          <a:bodyPr/>
+          <a:lstStyle/>
+          <a:p>
+            <a:pPr marL="0" indent="0">
+              <a:buNone/>
+            </a:pPr>
+            <a:r>
+              <a:rPr lang="en-US" b="1" dirty="0">
+                <a:latin typeface="Times New Roman" panose="02020603050405020304" pitchFamily="18" charset="0"/>
+                <a:cs typeface="Times New Roman" panose="02020603050405020304" pitchFamily="18" charset="0"/>
+              </a:rPr>
+              <a:t>Concept – </a:t>
+            </a:r>
+            <a:r>
+              <a:rPr lang="en-US" dirty="0">
+                <a:latin typeface="Times New Roman" panose="02020603050405020304" pitchFamily="18" charset="0"/>
+                <a:cs typeface="Times New Roman" panose="02020603050405020304" pitchFamily="18" charset="0"/>
+              </a:rPr>
+              <a:t>Type of ML where an agent learn how to interact with the environment through actions</a:t>
+            </a:r>
+            <a:endParaRPr lang="he-IL" b="1" dirty="0">
+              <a:latin typeface="Times New Roman" panose="02020603050405020304" pitchFamily="18" charset="0"/>
+              <a:cs typeface="Times New Roman" panose="02020603050405020304" pitchFamily="18" charset="0"/>
+            </a:endParaRPr>
+          </a:p>
+          <a:p>
+            <a:pPr marL="0" indent="0">
+              <a:buNone/>
+            </a:pPr>
+            <a:endParaRPr lang="en-US" b="1" dirty="0">
+              <a:latin typeface="Times New Roman" panose="02020603050405020304" pitchFamily="18" charset="0"/>
+              <a:cs typeface="Times New Roman" panose="02020603050405020304" pitchFamily="18" charset="0"/>
+            </a:endParaRPr>
+          </a:p>
+          <a:p>
+            <a:pPr marL="0" indent="0">
+              <a:buNone/>
+            </a:pPr>
+            <a:endParaRPr lang="he-IL" b="1" dirty="0">
+              <a:latin typeface="Times New Roman" panose="02020603050405020304" pitchFamily="18" charset="0"/>
+              <a:cs typeface="Times New Roman" panose="02020603050405020304" pitchFamily="18" charset="0"/>
+            </a:endParaRPr>
+          </a:p>
+          <a:p>
+            <a:pPr marL="0" indent="0">
+              <a:buNone/>
+            </a:pPr>
+            <a:r>
+              <a:rPr lang="en-US" b="1" dirty="0">
+                <a:latin typeface="Times New Roman" panose="02020603050405020304" pitchFamily="18" charset="0"/>
+                <a:cs typeface="Times New Roman" panose="02020603050405020304" pitchFamily="18" charset="0"/>
+              </a:rPr>
+              <a:t>Key Components – </a:t>
+            </a:r>
+            <a:r>
+              <a:rPr lang="en-US" dirty="0">
+                <a:latin typeface="Times New Roman" panose="02020603050405020304" pitchFamily="18" charset="0"/>
+                <a:cs typeface="Times New Roman" panose="02020603050405020304" pitchFamily="18" charset="0"/>
+              </a:rPr>
+              <a:t>Agent, Environment, State, Action, Reward, Policy</a:t>
+            </a:r>
+          </a:p>
+          <a:p>
+            <a:pPr marL="0" indent="0">
+              <a:buNone/>
+            </a:pPr>
+            <a:endParaRPr lang="en-US" dirty="0">
+              <a:latin typeface="Times New Roman" panose="02020603050405020304" pitchFamily="18" charset="0"/>
+              <a:cs typeface="Times New Roman" panose="02020603050405020304" pitchFamily="18" charset="0"/>
+            </a:endParaRPr>
+          </a:p>
+          <a:p>
+            <a:pPr marL="0" indent="0">
+              <a:buNone/>
+            </a:pPr>
+            <a:endParaRPr lang="en-US" dirty="0">
+              <a:latin typeface="Times New Roman" panose="02020603050405020304" pitchFamily="18" charset="0"/>
+              <a:cs typeface="Times New Roman" panose="02020603050405020304" pitchFamily="18" charset="0"/>
+            </a:endParaRPr>
+          </a:p>
+          <a:p>
+            <a:pPr marL="0" indent="0">
+              <a:buNone/>
+            </a:pPr>
+            <a:r>
+              <a:rPr lang="en-US" b="1" dirty="0">
+                <a:latin typeface="Times New Roman" panose="02020603050405020304" pitchFamily="18" charset="0"/>
+                <a:cs typeface="Times New Roman" panose="02020603050405020304" pitchFamily="18" charset="0"/>
+              </a:rPr>
+              <a:t>Application – </a:t>
+            </a:r>
+            <a:r>
+              <a:rPr lang="en-US" dirty="0">
+                <a:latin typeface="Times New Roman" panose="02020603050405020304" pitchFamily="18" charset="0"/>
+                <a:cs typeface="Times New Roman" panose="02020603050405020304" pitchFamily="18" charset="0"/>
+              </a:rPr>
+              <a:t>Game playing, robotics and autonomous systems</a:t>
+            </a:r>
+          </a:p>
+          <a:p>
+            <a:pPr marL="0" indent="0">
+              <a:buNone/>
+            </a:pPr>
+            <a:endParaRPr lang="en-US" dirty="0">
+              <a:latin typeface="Times New Roman" panose="02020603050405020304" pitchFamily="18" charset="0"/>
+              <a:cs typeface="Times New Roman" panose="02020603050405020304" pitchFamily="18" charset="0"/>
+            </a:endParaRPr>
+          </a:p>
+          <a:p>
+            <a:pPr marL="0" indent="0">
+              <a:buNone/>
+            </a:pPr>
+            <a:endParaRPr lang="LID4096" dirty="0">
+              <a:latin typeface="Times New Roman" panose="02020603050405020304" pitchFamily="18" charset="0"/>
+              <a:cs typeface="Times New Roman" panose="02020603050405020304" pitchFamily="18" charset="0"/>
+            </a:endParaRPr>
+          </a:p>
+        </p:txBody>
+      </p:sp>
+      <p:sp>
+        <p:nvSpPr>
+          <p:cNvPr id="4" name="Title 1">
+            <a:extLst>
+              <a:ext uri="{FF2B5EF4-FFF2-40B4-BE49-F238E27FC236}">
+                <a16:creationId xmlns:a16="http://schemas.microsoft.com/office/drawing/2014/main" id="{06DA16F8-FF8C-B96D-B9CA-F90F9D01900E}"/>
+              </a:ext>
+            </a:extLst>
+          </p:cNvPr>
+          <p:cNvSpPr>
+            <a:spLocks noGrp="1"/>
+          </p:cNvSpPr>
+          <p:nvPr>
+            <p:ph type="title"/>
+          </p:nvPr>
+        </p:nvSpPr>
+        <p:spPr>
+          <a:xfrm>
+            <a:off x="0" y="636638"/>
+            <a:ext cx="12192000" cy="614123"/>
+          </a:xfrm>
+        </p:spPr>
+        <p:txBody>
+          <a:bodyPr/>
+          <a:lstStyle/>
+          <a:p>
+            <a:pPr algn="ctr"/>
+            <a:r>
+              <a:rPr lang="en-US" cap="none" spc="100" dirty="0">
+                <a:latin typeface="Times New Roman" panose="02020603050405020304" pitchFamily="18" charset="0"/>
+                <a:ea typeface="Cambria" panose="02040503050406030204" pitchFamily="18" charset="0"/>
+                <a:cs typeface="Times New Roman" panose="02020603050405020304" pitchFamily="18" charset="0"/>
+              </a:rPr>
+              <a:t>Introduction to Reinforcement Learning</a:t>
+            </a:r>
+            <a:r>
+              <a:rPr lang="en-US" cap="none" spc="0" dirty="0">
+                <a:latin typeface="Cambria" panose="02040503050406030204" pitchFamily="18" charset="0"/>
+                <a:ea typeface="Cambria" panose="02040503050406030204" pitchFamily="18" charset="0"/>
+                <a:cs typeface="Times New Roman" panose="02020603050405020304" pitchFamily="18" charset="0"/>
+              </a:rPr>
+              <a:t> </a:t>
+            </a:r>
+            <a:endParaRPr lang="LID4096" cap="none" spc="0" dirty="0">
+              <a:latin typeface="Cambria" panose="02040503050406030204" pitchFamily="18" charset="0"/>
+              <a:ea typeface="Cambria" panose="02040503050406030204" pitchFamily="18" charset="0"/>
+              <a:cs typeface="Times New Roman" panose="02020603050405020304" pitchFamily="18" charset="0"/>
+            </a:endParaRPr>
+          </a:p>
+        </p:txBody>
+      </p:sp>
+      <p:pic>
+        <p:nvPicPr>
+          <p:cNvPr id="11" name="Graphic 10" descr="Inventory with solid fill">
+            <a:extLst>
+              <a:ext uri="{FF2B5EF4-FFF2-40B4-BE49-F238E27FC236}">
+                <a16:creationId xmlns:a16="http://schemas.microsoft.com/office/drawing/2014/main" id="{52DBE754-63A6-5D75-8732-290F77399228}"/>
+              </a:ext>
+            </a:extLst>
+          </p:cNvPr>
+          <p:cNvPicPr>
+            <a:picLocks noChangeAspect="1"/>
+          </p:cNvPicPr>
+          <p:nvPr/>
+        </p:nvPicPr>
+        <p:blipFill>
+          <a:blip r:embed="rId2">
+            <a:extLst>
+              <a:ext uri="{96DAC541-7B7A-43D3-8B79-37D633B846F1}">
+                <asvg:svgBlip xmlns:asvg="http://schemas.microsoft.com/office/drawing/2016/SVG/main" r:embed="rId3"/>
+              </a:ext>
+            </a:extLst>
+          </a:blip>
+          <a:stretch>
+            <a:fillRect/>
+          </a:stretch>
+        </p:blipFill>
+        <p:spPr>
+          <a:xfrm>
+            <a:off x="668986" y="3468328"/>
+            <a:ext cx="614126" cy="614126"/>
+          </a:xfrm>
+          <a:prstGeom prst="rect">
+            <a:avLst/>
+          </a:prstGeom>
+        </p:spPr>
+      </p:pic>
+      <p:pic>
+        <p:nvPicPr>
+          <p:cNvPr id="10" name="Graphic 9" descr="Robot with solid fill">
+            <a:extLst>
+              <a:ext uri="{FF2B5EF4-FFF2-40B4-BE49-F238E27FC236}">
+                <a16:creationId xmlns:a16="http://schemas.microsoft.com/office/drawing/2014/main" id="{57CA0F35-95D3-72B2-203D-96D8BB1C9717}"/>
+              </a:ext>
+            </a:extLst>
+          </p:cNvPr>
+          <p:cNvPicPr>
+            <a:picLocks noChangeAspect="1"/>
+          </p:cNvPicPr>
+          <p:nvPr/>
+        </p:nvPicPr>
+        <p:blipFill>
+          <a:blip r:embed="rId4">
+            <a:extLst>
+              <a:ext uri="{96DAC541-7B7A-43D3-8B79-37D633B846F1}">
+                <asvg:svgBlip xmlns:asvg="http://schemas.microsoft.com/office/drawing/2016/SVG/main" r:embed="rId5"/>
+              </a:ext>
+            </a:extLst>
+          </a:blip>
+          <a:stretch>
+            <a:fillRect/>
+          </a:stretch>
+        </p:blipFill>
+        <p:spPr>
+          <a:xfrm>
+            <a:off x="668986" y="4960577"/>
+            <a:ext cx="614126" cy="614126"/>
+          </a:xfrm>
+          <a:prstGeom prst="rect">
+            <a:avLst/>
+          </a:prstGeom>
+        </p:spPr>
+      </p:pic>
+      <p:pic>
+        <p:nvPicPr>
+          <p:cNvPr id="13" name="Graphic 12" descr="Artificial Intelligence with solid fill">
+            <a:extLst>
+              <a:ext uri="{FF2B5EF4-FFF2-40B4-BE49-F238E27FC236}">
+                <a16:creationId xmlns:a16="http://schemas.microsoft.com/office/drawing/2014/main" id="{8C7660D8-CD06-C984-20AB-93739A684727}"/>
+              </a:ext>
+            </a:extLst>
+          </p:cNvPr>
+          <p:cNvPicPr>
+            <a:picLocks noChangeAspect="1"/>
+          </p:cNvPicPr>
+          <p:nvPr/>
+        </p:nvPicPr>
+        <p:blipFill>
+          <a:blip r:embed="rId6">
+            <a:extLst>
+              <a:ext uri="{96DAC541-7B7A-43D3-8B79-37D633B846F1}">
+                <asvg:svgBlip xmlns:asvg="http://schemas.microsoft.com/office/drawing/2016/SVG/main" r:embed="rId7"/>
+              </a:ext>
+            </a:extLst>
+          </a:blip>
+          <a:stretch>
+            <a:fillRect/>
+          </a:stretch>
+        </p:blipFill>
+        <p:spPr>
+          <a:xfrm>
+            <a:off x="668986" y="1985911"/>
+            <a:ext cx="614126" cy="614126"/>
+          </a:xfrm>
+          <a:prstGeom prst="rect">
+            <a:avLst/>
+          </a:prstGeom>
+        </p:spPr>
+      </p:pic>
+    </p:spTree>
+    <p:extLst>
+      <p:ext uri="{BB962C8B-B14F-4D97-AF65-F5344CB8AC3E}">
+        <p14:creationId xmlns:p14="http://schemas.microsoft.com/office/powerpoint/2010/main" val="2794924398"/>
+      </p:ext>
+    </p:extLst>
+  </p:cSld>
+  <p:clrMapOvr>
+    <a:masterClrMapping/>
+  </p:clrMapOvr>
+</p:sld>
+</file>
+
+<file path=ppt/slides/slide7.xml><?xml version="1.0" encoding="utf-8"?>
+<p:sld xmlns:a="http://schemas.openxmlformats.org/drawingml/2006/main" xmlns:r="http://schemas.openxmlformats.org/officeDocument/2006/relationships" xmlns:p="http://schemas.openxmlformats.org/presentationml/2006/main">
+  <p:cSld>
+    <p:spTree>
+      <p:nvGrpSpPr>
+        <p:cNvPr id="1" name=""/>
+        <p:cNvGrpSpPr/>
+        <p:nvPr/>
+      </p:nvGrpSpPr>
+      <p:grpSpPr>
+        <a:xfrm>
+          <a:off x="0" y="0"/>
+          <a:ext cx="0" cy="0"/>
+          <a:chOff x="0" y="0"/>
+          <a:chExt cx="0" cy="0"/>
+        </a:xfrm>
+      </p:grpSpPr>
+      <mc:AlternateContent xmlns:mc="http://schemas.openxmlformats.org/markup-compatibility/2006">
+        <mc:Choice xmlns:a14="http://schemas.microsoft.com/office/drawing/2010/main" Requires="a14">
+          <p:sp>
+            <p:nvSpPr>
+              <p:cNvPr id="3" name="Content Placeholder 2">
+                <a:extLst>
+                  <a:ext uri="{FF2B5EF4-FFF2-40B4-BE49-F238E27FC236}">
+                    <a16:creationId xmlns:a16="http://schemas.microsoft.com/office/drawing/2014/main" id="{5288FB69-25E3-7F30-2B2F-BF35840B388C}"/>
+                  </a:ext>
+                </a:extLst>
+              </p:cNvPr>
+              <p:cNvSpPr>
+                <a:spLocks noGrp="1"/>
+              </p:cNvSpPr>
+              <p:nvPr>
+                <p:ph idx="1"/>
+              </p:nvPr>
+            </p:nvSpPr>
+            <p:spPr/>
+            <p:txBody>
+              <a:bodyPr/>
+              <a:lstStyle/>
+              <a:p>
+                <a:pPr marL="0" indent="0">
+                  <a:buNone/>
+                </a:pPr>
+                <a:r>
+                  <a:rPr lang="en-US" b="1" dirty="0">
+                    <a:latin typeface="Times New Roman" panose="02020603050405020304" pitchFamily="18" charset="0"/>
+                    <a:cs typeface="Times New Roman" panose="02020603050405020304" pitchFamily="18" charset="0"/>
+                  </a:rPr>
+                  <a:t>Concept – </a:t>
+                </a:r>
+                <a:r>
+                  <a:rPr lang="en-US" dirty="0">
+                    <a:latin typeface="Times New Roman" panose="02020603050405020304" pitchFamily="18" charset="0"/>
+                    <a:cs typeface="Times New Roman" panose="02020603050405020304" pitchFamily="18" charset="0"/>
+                  </a:rPr>
+                  <a:t>model free RL algorithm that learns the value for an action for a given state</a:t>
+                </a:r>
+              </a:p>
+              <a:p>
+                <a:pPr marL="0" indent="0">
+                  <a:buNone/>
+                </a:pPr>
+                <a:endParaRPr lang="en-US" dirty="0">
+                  <a:latin typeface="Times New Roman" panose="02020603050405020304" pitchFamily="18" charset="0"/>
+                  <a:cs typeface="Times New Roman" panose="02020603050405020304" pitchFamily="18" charset="0"/>
+                </a:endParaRPr>
+              </a:p>
+              <a:p>
+                <a:pPr marL="0" indent="0">
+                  <a:buNone/>
+                </a:pPr>
+                <a:endParaRPr lang="en-US" dirty="0">
+                  <a:latin typeface="Times New Roman" panose="02020603050405020304" pitchFamily="18" charset="0"/>
+                  <a:cs typeface="Times New Roman" panose="02020603050405020304" pitchFamily="18" charset="0"/>
+                </a:endParaRPr>
+              </a:p>
+              <a:p>
+                <a:pPr marL="0" indent="0">
+                  <a:buNone/>
+                </a:pPr>
+                <a:r>
+                  <a:rPr lang="en-US" b="1" dirty="0">
+                    <a:latin typeface="Times New Roman" panose="02020603050405020304" pitchFamily="18" charset="0"/>
+                    <a:cs typeface="Times New Roman" panose="02020603050405020304" pitchFamily="18" charset="0"/>
+                  </a:rPr>
+                  <a:t>Q_Value – </a:t>
+                </a:r>
+                <a14:m>
+                  <m:oMath xmlns:m="http://schemas.openxmlformats.org/officeDocument/2006/math">
+                    <m:r>
+                      <a:rPr lang="en-US" b="0" i="1" smtClean="0">
+                        <a:latin typeface="Cambria Math" panose="02040503050406030204" pitchFamily="18" charset="0"/>
+                        <a:cs typeface="Times New Roman" panose="02020603050405020304" pitchFamily="18" charset="0"/>
+                      </a:rPr>
+                      <m:t>𝑄</m:t>
+                    </m:r>
+                    <m:d>
+                      <m:dPr>
+                        <m:ctrlPr>
+                          <a:rPr lang="en-US" b="0" i="1" smtClean="0">
+                            <a:latin typeface="Cambria Math" panose="02040503050406030204" pitchFamily="18" charset="0"/>
+                            <a:cs typeface="Times New Roman" panose="02020603050405020304" pitchFamily="18" charset="0"/>
+                          </a:rPr>
+                        </m:ctrlPr>
+                      </m:dPr>
+                      <m:e>
+                        <m:r>
+                          <a:rPr lang="en-US" b="0" i="1" smtClean="0">
+                            <a:latin typeface="Cambria Math" panose="02040503050406030204" pitchFamily="18" charset="0"/>
+                            <a:cs typeface="Times New Roman" panose="02020603050405020304" pitchFamily="18" charset="0"/>
+                          </a:rPr>
+                          <m:t>𝑠</m:t>
+                        </m:r>
+                        <m:r>
+                          <a:rPr lang="en-US" b="0" i="1" smtClean="0">
+                            <a:latin typeface="Cambria Math" panose="02040503050406030204" pitchFamily="18" charset="0"/>
+                            <a:cs typeface="Times New Roman" panose="02020603050405020304" pitchFamily="18" charset="0"/>
+                          </a:rPr>
+                          <m:t>,</m:t>
+                        </m:r>
+                        <m:r>
+                          <a:rPr lang="en-US" b="0" i="1" smtClean="0">
+                            <a:latin typeface="Cambria Math" panose="02040503050406030204" pitchFamily="18" charset="0"/>
+                            <a:cs typeface="Times New Roman" panose="02020603050405020304" pitchFamily="18" charset="0"/>
+                          </a:rPr>
+                          <m:t>𝑎</m:t>
+                        </m:r>
+                      </m:e>
+                    </m:d>
+                    <m:r>
+                      <a:rPr lang="en-US" b="0" i="1" smtClean="0">
+                        <a:latin typeface="Cambria Math" panose="02040503050406030204" pitchFamily="18" charset="0"/>
+                        <a:cs typeface="Times New Roman" panose="02020603050405020304" pitchFamily="18" charset="0"/>
+                      </a:rPr>
+                      <m:t>←</m:t>
+                    </m:r>
+                    <m:r>
+                      <a:rPr lang="en-US" b="0" i="1" smtClean="0">
+                        <a:latin typeface="Cambria Math" panose="02040503050406030204" pitchFamily="18" charset="0"/>
+                        <a:cs typeface="Times New Roman" panose="02020603050405020304" pitchFamily="18" charset="0"/>
+                      </a:rPr>
+                      <m:t>𝑄</m:t>
+                    </m:r>
+                    <m:d>
+                      <m:dPr>
+                        <m:ctrlPr>
+                          <a:rPr lang="en-US" b="0" i="1" smtClean="0">
+                            <a:latin typeface="Cambria Math" panose="02040503050406030204" pitchFamily="18" charset="0"/>
+                            <a:cs typeface="Times New Roman" panose="02020603050405020304" pitchFamily="18" charset="0"/>
+                          </a:rPr>
+                        </m:ctrlPr>
+                      </m:dPr>
+                      <m:e>
+                        <m:r>
+                          <a:rPr lang="en-US" b="0" i="1" smtClean="0">
+                            <a:latin typeface="Cambria Math" panose="02040503050406030204" pitchFamily="18" charset="0"/>
+                            <a:cs typeface="Times New Roman" panose="02020603050405020304" pitchFamily="18" charset="0"/>
+                          </a:rPr>
+                          <m:t>𝑠</m:t>
+                        </m:r>
+                        <m:r>
+                          <a:rPr lang="en-US" b="0" i="1" smtClean="0">
+                            <a:latin typeface="Cambria Math" panose="02040503050406030204" pitchFamily="18" charset="0"/>
+                            <a:cs typeface="Times New Roman" panose="02020603050405020304" pitchFamily="18" charset="0"/>
+                          </a:rPr>
+                          <m:t>,</m:t>
+                        </m:r>
+                        <m:r>
+                          <a:rPr lang="en-US" b="0" i="1" smtClean="0">
+                            <a:latin typeface="Cambria Math" panose="02040503050406030204" pitchFamily="18" charset="0"/>
+                            <a:cs typeface="Times New Roman" panose="02020603050405020304" pitchFamily="18" charset="0"/>
+                          </a:rPr>
+                          <m:t>𝑎</m:t>
+                        </m:r>
+                      </m:e>
+                    </m:d>
+                    <m:r>
+                      <a:rPr lang="en-US" b="0" i="1" smtClean="0">
+                        <a:latin typeface="Cambria Math" panose="02040503050406030204" pitchFamily="18" charset="0"/>
+                        <a:cs typeface="Times New Roman" panose="02020603050405020304" pitchFamily="18" charset="0"/>
+                      </a:rPr>
+                      <m:t>+</m:t>
+                    </m:r>
+                    <m:r>
+                      <a:rPr lang="en-US" b="0" i="1" smtClean="0">
+                        <a:latin typeface="Cambria Math" panose="02040503050406030204" pitchFamily="18" charset="0"/>
+                        <a:cs typeface="Times New Roman" panose="02020603050405020304" pitchFamily="18" charset="0"/>
+                      </a:rPr>
+                      <m:t>𝛼</m:t>
+                    </m:r>
+                    <m:r>
+                      <a:rPr lang="en-US" b="0" i="1" smtClean="0">
+                        <a:latin typeface="Cambria Math" panose="02040503050406030204" pitchFamily="18" charset="0"/>
+                        <a:cs typeface="Times New Roman" panose="02020603050405020304" pitchFamily="18" charset="0"/>
+                      </a:rPr>
+                      <m:t>(</m:t>
+                    </m:r>
+                    <m:r>
+                      <a:rPr lang="en-US" b="0" i="1" smtClean="0">
+                        <a:latin typeface="Cambria Math" panose="02040503050406030204" pitchFamily="18" charset="0"/>
+                        <a:cs typeface="Times New Roman" panose="02020603050405020304" pitchFamily="18" charset="0"/>
+                      </a:rPr>
+                      <m:t>𝑟</m:t>
+                    </m:r>
+                    <m:r>
+                      <a:rPr lang="en-US" b="0" i="1" smtClean="0">
+                        <a:latin typeface="Cambria Math" panose="02040503050406030204" pitchFamily="18" charset="0"/>
+                        <a:cs typeface="Times New Roman" panose="02020603050405020304" pitchFamily="18" charset="0"/>
+                      </a:rPr>
+                      <m:t>+</m:t>
+                    </m:r>
+                    <m:r>
+                      <a:rPr lang="en-US" b="0" i="1" smtClean="0">
+                        <a:latin typeface="Cambria Math" panose="02040503050406030204" pitchFamily="18" charset="0"/>
+                        <a:cs typeface="Times New Roman" panose="02020603050405020304" pitchFamily="18" charset="0"/>
+                      </a:rPr>
+                      <m:t>𝛾</m:t>
+                    </m:r>
+                    <m:r>
+                      <a:rPr lang="en-US" b="0" i="1" smtClean="0">
+                        <a:latin typeface="Cambria Math" panose="02040503050406030204" pitchFamily="18" charset="0"/>
+                        <a:cs typeface="Times New Roman" panose="02020603050405020304" pitchFamily="18" charset="0"/>
+                      </a:rPr>
+                      <m:t>⋅</m:t>
+                    </m:r>
+                    <m:limLow>
+                      <m:limLowPr>
+                        <m:ctrlPr>
+                          <a:rPr lang="en-US" b="0" i="1" smtClean="0">
+                            <a:latin typeface="Cambria Math" panose="02040503050406030204" pitchFamily="18" charset="0"/>
+                            <a:cs typeface="Times New Roman" panose="02020603050405020304" pitchFamily="18" charset="0"/>
+                          </a:rPr>
+                        </m:ctrlPr>
+                      </m:limLowPr>
+                      <m:e>
+                        <m:r>
+                          <m:rPr>
+                            <m:sty m:val="p"/>
+                          </m:rPr>
+                          <a:rPr lang="en-US" b="0" i="0" smtClean="0">
+                            <a:latin typeface="Cambria Math" panose="02040503050406030204" pitchFamily="18" charset="0"/>
+                            <a:cs typeface="Times New Roman" panose="02020603050405020304" pitchFamily="18" charset="0"/>
+                          </a:rPr>
+                          <m:t>max</m:t>
+                        </m:r>
+                      </m:e>
+                      <m:lim>
+                        <m:sSup>
+                          <m:sSupPr>
+                            <m:ctrlPr>
+                              <a:rPr lang="en-US" b="0" i="1" smtClean="0">
+                                <a:latin typeface="Cambria Math" panose="02040503050406030204" pitchFamily="18" charset="0"/>
+                                <a:cs typeface="Times New Roman" panose="02020603050405020304" pitchFamily="18" charset="0"/>
+                              </a:rPr>
+                            </m:ctrlPr>
+                          </m:sSupPr>
+                          <m:e>
+                            <m:r>
+                              <a:rPr lang="en-US" b="0" i="1" smtClean="0">
+                                <a:latin typeface="Cambria Math" panose="02040503050406030204" pitchFamily="18" charset="0"/>
+                                <a:cs typeface="Times New Roman" panose="02020603050405020304" pitchFamily="18" charset="0"/>
+                              </a:rPr>
+                              <m:t>𝑎</m:t>
+                            </m:r>
+                          </m:e>
+                          <m:sup>
+                            <m:r>
+                              <a:rPr lang="en-US" b="0" i="1" smtClean="0">
+                                <a:latin typeface="Cambria Math" panose="02040503050406030204" pitchFamily="18" charset="0"/>
+                                <a:cs typeface="Times New Roman" panose="02020603050405020304" pitchFamily="18" charset="0"/>
+                              </a:rPr>
+                              <m:t>′</m:t>
+                            </m:r>
+                          </m:sup>
+                        </m:sSup>
+                      </m:lim>
+                    </m:limLow>
+                    <m:r>
+                      <a:rPr lang="en-US" b="0" i="1" smtClean="0">
+                        <a:latin typeface="Cambria Math" panose="02040503050406030204" pitchFamily="18" charset="0"/>
+                        <a:cs typeface="Times New Roman" panose="02020603050405020304" pitchFamily="18" charset="0"/>
+                      </a:rPr>
+                      <m:t>⁡(</m:t>
+                    </m:r>
+                    <m:r>
+                      <a:rPr lang="en-US" b="0" i="1" smtClean="0">
+                        <a:latin typeface="Cambria Math" panose="02040503050406030204" pitchFamily="18" charset="0"/>
+                        <a:cs typeface="Times New Roman" panose="02020603050405020304" pitchFamily="18" charset="0"/>
+                      </a:rPr>
+                      <m:t>𝑄</m:t>
+                    </m:r>
+                    <m:d>
+                      <m:dPr>
+                        <m:ctrlPr>
+                          <a:rPr lang="en-US" b="0" i="1" smtClean="0">
+                            <a:latin typeface="Cambria Math" panose="02040503050406030204" pitchFamily="18" charset="0"/>
+                            <a:cs typeface="Times New Roman" panose="02020603050405020304" pitchFamily="18" charset="0"/>
+                          </a:rPr>
+                        </m:ctrlPr>
+                      </m:dPr>
+                      <m:e>
+                        <m:sSup>
+                          <m:sSupPr>
+                            <m:ctrlPr>
+                              <a:rPr lang="en-US" b="0" i="1" smtClean="0">
+                                <a:latin typeface="Cambria Math" panose="02040503050406030204" pitchFamily="18" charset="0"/>
+                                <a:cs typeface="Times New Roman" panose="02020603050405020304" pitchFamily="18" charset="0"/>
+                              </a:rPr>
+                            </m:ctrlPr>
+                          </m:sSupPr>
+                          <m:e>
+                            <m:r>
+                              <a:rPr lang="en-US" b="0" i="1" smtClean="0">
+                                <a:latin typeface="Cambria Math" panose="02040503050406030204" pitchFamily="18" charset="0"/>
+                                <a:cs typeface="Times New Roman" panose="02020603050405020304" pitchFamily="18" charset="0"/>
+                              </a:rPr>
+                              <m:t>𝑠</m:t>
+                            </m:r>
+                          </m:e>
+                          <m:sup>
+                            <m:r>
+                              <a:rPr lang="en-US" b="0" i="1" smtClean="0">
+                                <a:latin typeface="Cambria Math" panose="02040503050406030204" pitchFamily="18" charset="0"/>
+                                <a:cs typeface="Times New Roman" panose="02020603050405020304" pitchFamily="18" charset="0"/>
+                              </a:rPr>
+                              <m:t>′</m:t>
+                            </m:r>
+                          </m:sup>
+                        </m:sSup>
+                        <m:r>
+                          <a:rPr lang="en-US" b="0" i="1" smtClean="0">
+                            <a:latin typeface="Cambria Math" panose="02040503050406030204" pitchFamily="18" charset="0"/>
+                            <a:cs typeface="Times New Roman" panose="02020603050405020304" pitchFamily="18" charset="0"/>
+                          </a:rPr>
+                          <m:t>,</m:t>
+                        </m:r>
+                        <m:sSup>
+                          <m:sSupPr>
+                            <m:ctrlPr>
+                              <a:rPr lang="en-US" b="0" i="1" smtClean="0">
+                                <a:latin typeface="Cambria Math" panose="02040503050406030204" pitchFamily="18" charset="0"/>
+                                <a:cs typeface="Times New Roman" panose="02020603050405020304" pitchFamily="18" charset="0"/>
+                              </a:rPr>
+                            </m:ctrlPr>
+                          </m:sSupPr>
+                          <m:e>
+                            <m:r>
+                              <a:rPr lang="en-US" b="0" i="1" smtClean="0">
+                                <a:latin typeface="Cambria Math" panose="02040503050406030204" pitchFamily="18" charset="0"/>
+                                <a:cs typeface="Times New Roman" panose="02020603050405020304" pitchFamily="18" charset="0"/>
+                              </a:rPr>
+                              <m:t>𝑎</m:t>
+                            </m:r>
+                          </m:e>
+                          <m:sup>
+                            <m:r>
+                              <a:rPr lang="en-US" b="0" i="1" smtClean="0">
+                                <a:latin typeface="Cambria Math" panose="02040503050406030204" pitchFamily="18" charset="0"/>
+                                <a:cs typeface="Times New Roman" panose="02020603050405020304" pitchFamily="18" charset="0"/>
+                              </a:rPr>
+                              <m:t>′</m:t>
+                            </m:r>
+                          </m:sup>
+                        </m:sSup>
+                        <m:r>
+                          <a:rPr lang="en-US" b="0" i="1" smtClean="0">
+                            <a:latin typeface="Cambria Math" panose="02040503050406030204" pitchFamily="18" charset="0"/>
+                            <a:cs typeface="Times New Roman" panose="02020603050405020304" pitchFamily="18" charset="0"/>
+                          </a:rPr>
+                          <m:t>)</m:t>
+                        </m:r>
+                      </m:e>
+                    </m:d>
+                    <m:r>
+                      <a:rPr lang="en-US" b="0" i="1" smtClean="0">
+                        <a:latin typeface="Cambria Math" panose="02040503050406030204" pitchFamily="18" charset="0"/>
+                        <a:cs typeface="Times New Roman" panose="02020603050405020304" pitchFamily="18" charset="0"/>
+                      </a:rPr>
+                      <m:t>−</m:t>
+                    </m:r>
+                    <m:r>
+                      <a:rPr lang="en-US" b="0" i="1" smtClean="0">
+                        <a:latin typeface="Cambria Math" panose="02040503050406030204" pitchFamily="18" charset="0"/>
+                        <a:cs typeface="Times New Roman" panose="02020603050405020304" pitchFamily="18" charset="0"/>
+                      </a:rPr>
+                      <m:t>𝑄</m:t>
+                    </m:r>
+                    <m:d>
+                      <m:dPr>
+                        <m:ctrlPr>
+                          <a:rPr lang="en-US" b="0" i="1" smtClean="0">
+                            <a:latin typeface="Cambria Math" panose="02040503050406030204" pitchFamily="18" charset="0"/>
+                            <a:cs typeface="Times New Roman" panose="02020603050405020304" pitchFamily="18" charset="0"/>
+                          </a:rPr>
+                        </m:ctrlPr>
+                      </m:dPr>
+                      <m:e>
+                        <m:r>
+                          <a:rPr lang="en-US" b="0" i="1" smtClean="0">
+                            <a:latin typeface="Cambria Math" panose="02040503050406030204" pitchFamily="18" charset="0"/>
+                            <a:cs typeface="Times New Roman" panose="02020603050405020304" pitchFamily="18" charset="0"/>
+                          </a:rPr>
+                          <m:t>𝑠</m:t>
+                        </m:r>
+                        <m:r>
+                          <a:rPr lang="en-US" b="0" i="1" smtClean="0">
+                            <a:latin typeface="Cambria Math" panose="02040503050406030204" pitchFamily="18" charset="0"/>
+                            <a:cs typeface="Times New Roman" panose="02020603050405020304" pitchFamily="18" charset="0"/>
+                          </a:rPr>
+                          <m:t>,</m:t>
+                        </m:r>
+                        <m:r>
+                          <a:rPr lang="en-US" b="0" i="1" smtClean="0">
+                            <a:latin typeface="Cambria Math" panose="02040503050406030204" pitchFamily="18" charset="0"/>
+                            <a:cs typeface="Times New Roman" panose="02020603050405020304" pitchFamily="18" charset="0"/>
+                          </a:rPr>
+                          <m:t>𝑎</m:t>
+                        </m:r>
+                      </m:e>
+                    </m:d>
+                    <m:r>
+                      <a:rPr lang="en-US" b="0" i="1" smtClean="0">
+                        <a:latin typeface="Cambria Math" panose="02040503050406030204" pitchFamily="18" charset="0"/>
+                        <a:cs typeface="Times New Roman" panose="02020603050405020304" pitchFamily="18" charset="0"/>
+                      </a:rPr>
+                      <m:t>)</m:t>
+                    </m:r>
+                  </m:oMath>
+                </a14:m>
+                <a:endParaRPr lang="en-US" dirty="0">
+                  <a:latin typeface="Times New Roman" panose="02020603050405020304" pitchFamily="18" charset="0"/>
+                  <a:cs typeface="Times New Roman" panose="02020603050405020304" pitchFamily="18" charset="0"/>
+                </a:endParaRPr>
+              </a:p>
+              <a:p>
+                <a:pPr marL="0" indent="0">
+                  <a:buNone/>
+                </a:pPr>
+                <a:endParaRPr lang="en-US" dirty="0">
+                  <a:latin typeface="Times New Roman" panose="02020603050405020304" pitchFamily="18" charset="0"/>
+                  <a:cs typeface="Times New Roman" panose="02020603050405020304" pitchFamily="18" charset="0"/>
+                </a:endParaRPr>
+              </a:p>
+              <a:p>
+                <a:pPr marL="0" indent="0">
+                  <a:buNone/>
+                </a:pPr>
+                <a:endParaRPr lang="en-US" dirty="0">
+                  <a:latin typeface="Times New Roman" panose="02020603050405020304" pitchFamily="18" charset="0"/>
+                  <a:cs typeface="Times New Roman" panose="02020603050405020304" pitchFamily="18" charset="0"/>
+                </a:endParaRPr>
+              </a:p>
+              <a:p>
+                <a:pPr marL="0" indent="0">
+                  <a:buNone/>
+                </a:pPr>
+                <a:r>
+                  <a:rPr lang="en-US" b="1" dirty="0">
+                    <a:latin typeface="Times New Roman" panose="02020603050405020304" pitchFamily="18" charset="0"/>
+                    <a:cs typeface="Times New Roman" panose="02020603050405020304" pitchFamily="18" charset="0"/>
+                  </a:rPr>
+                  <a:t>Exploration vs. Exploitation – </a:t>
+                </a:r>
+                <a:r>
+                  <a:rPr lang="en-US" dirty="0">
+                    <a:latin typeface="Times New Roman" panose="02020603050405020304" pitchFamily="18" charset="0"/>
+                    <a:cs typeface="Times New Roman" panose="02020603050405020304" pitchFamily="18" charset="0"/>
+                  </a:rPr>
+                  <a:t>Balance exploring new actions and exploiting known rewards</a:t>
+                </a:r>
+                <a:endParaRPr lang="LID4096" b="1" dirty="0">
+                  <a:latin typeface="Times New Roman" panose="02020603050405020304" pitchFamily="18" charset="0"/>
+                  <a:cs typeface="Times New Roman" panose="02020603050405020304" pitchFamily="18" charset="0"/>
+                </a:endParaRPr>
+              </a:p>
+            </p:txBody>
+          </p:sp>
+        </mc:Choice>
+        <mc:Fallback>
+          <p:sp>
+            <p:nvSpPr>
+              <p:cNvPr id="3" name="Content Placeholder 2">
+                <a:extLst>
+                  <a:ext uri="{FF2B5EF4-FFF2-40B4-BE49-F238E27FC236}">
+                    <a16:creationId xmlns:a16="http://schemas.microsoft.com/office/drawing/2014/main" id="{5288FB69-25E3-7F30-2B2F-BF35840B388C}"/>
+                  </a:ext>
+                </a:extLst>
+              </p:cNvPr>
+              <p:cNvSpPr>
+                <a:spLocks noGrp="1" noRot="1" noChangeAspect="1" noMove="1" noResize="1" noEditPoints="1" noAdjustHandles="1" noChangeArrowheads="1" noChangeShapeType="1" noTextEdit="1"/>
+              </p:cNvSpPr>
+              <p:nvPr>
+                <p:ph idx="1"/>
+              </p:nvPr>
+            </p:nvSpPr>
+            <p:spPr>
+              <a:blipFill>
+                <a:blip r:embed="rId2"/>
+                <a:stretch>
+                  <a:fillRect l="-1488" t="-1233"/>
+                </a:stretch>
+              </a:blipFill>
+            </p:spPr>
+            <p:txBody>
+              <a:bodyPr/>
+              <a:lstStyle/>
+              <a:p>
+                <a:r>
+                  <a:rPr lang="LID4096">
+                    <a:noFill/>
+                  </a:rPr>
+                  <a:t> </a:t>
+                </a:r>
+              </a:p>
+            </p:txBody>
+          </p:sp>
+        </mc:Fallback>
+      </mc:AlternateContent>
+      <p:sp>
+        <p:nvSpPr>
+          <p:cNvPr id="4" name="Title 1">
+            <a:extLst>
+              <a:ext uri="{FF2B5EF4-FFF2-40B4-BE49-F238E27FC236}">
+                <a16:creationId xmlns:a16="http://schemas.microsoft.com/office/drawing/2014/main" id="{AC0E4CD8-E346-923B-DBA5-70F3EC457004}"/>
+              </a:ext>
+            </a:extLst>
+          </p:cNvPr>
+          <p:cNvSpPr>
+            <a:spLocks noGrp="1"/>
+          </p:cNvSpPr>
+          <p:nvPr>
+            <p:ph type="title"/>
+          </p:nvPr>
+        </p:nvSpPr>
+        <p:spPr>
+          <a:xfrm>
+            <a:off x="0" y="636638"/>
+            <a:ext cx="12192000" cy="614123"/>
+          </a:xfrm>
+        </p:spPr>
+        <p:txBody>
+          <a:bodyPr/>
+          <a:lstStyle/>
+          <a:p>
+            <a:pPr algn="ctr"/>
+            <a:r>
+              <a:rPr lang="en-US" cap="none" spc="100" dirty="0">
+                <a:latin typeface="Times New Roman" panose="02020603050405020304" pitchFamily="18" charset="0"/>
+                <a:ea typeface="Cambria" panose="02040503050406030204" pitchFamily="18" charset="0"/>
+                <a:cs typeface="Times New Roman" panose="02020603050405020304" pitchFamily="18" charset="0"/>
+              </a:rPr>
+              <a:t>Understanding Q</a:t>
+            </a:r>
+            <a:r>
+              <a:rPr lang="he-IL" cap="none" spc="100" dirty="0">
+                <a:latin typeface="Times New Roman" panose="02020603050405020304" pitchFamily="18" charset="0"/>
+                <a:ea typeface="Cambria" panose="02040503050406030204" pitchFamily="18" charset="0"/>
+                <a:cs typeface="Times New Roman" panose="02020603050405020304" pitchFamily="18" charset="0"/>
+              </a:rPr>
+              <a:t>-</a:t>
+            </a:r>
+            <a:r>
+              <a:rPr lang="en-US" cap="none" spc="100" dirty="0">
+                <a:latin typeface="Times New Roman" panose="02020603050405020304" pitchFamily="18" charset="0"/>
+                <a:ea typeface="Cambria" panose="02040503050406030204" pitchFamily="18" charset="0"/>
+                <a:cs typeface="Times New Roman" panose="02020603050405020304" pitchFamily="18" charset="0"/>
+              </a:rPr>
+              <a:t>Learning</a:t>
+            </a:r>
+            <a:r>
+              <a:rPr lang="en-US" cap="none" spc="0" dirty="0">
+                <a:latin typeface="Cambria" panose="02040503050406030204" pitchFamily="18" charset="0"/>
+                <a:ea typeface="Cambria" panose="02040503050406030204" pitchFamily="18" charset="0"/>
+                <a:cs typeface="Times New Roman" panose="02020603050405020304" pitchFamily="18" charset="0"/>
+              </a:rPr>
+              <a:t> </a:t>
+            </a:r>
+            <a:endParaRPr lang="LID4096" cap="none" spc="0" dirty="0">
+              <a:latin typeface="Cambria" panose="02040503050406030204" pitchFamily="18" charset="0"/>
+              <a:ea typeface="Cambria" panose="02040503050406030204" pitchFamily="18" charset="0"/>
+              <a:cs typeface="Times New Roman" panose="02020603050405020304" pitchFamily="18" charset="0"/>
+            </a:endParaRPr>
+          </a:p>
+        </p:txBody>
+      </p:sp>
+    </p:spTree>
+    <p:extLst>
+      <p:ext uri="{BB962C8B-B14F-4D97-AF65-F5344CB8AC3E}">
+        <p14:creationId xmlns:p14="http://schemas.microsoft.com/office/powerpoint/2010/main" val="3951418646"/>
+      </p:ext>
+    </p:extLst>
+  </p:cSld>
+  <p:clrMapOvr>
+    <a:masterClrMapping/>
+  </p:clrMapOvr>
+</p:sld>
+</file>
+
+<file path=ppt/slides/slide8.xml><?xml version="1.0" encoding="utf-8"?>
+<p:sld xmlns:a="http://schemas.openxmlformats.org/drawingml/2006/main" xmlns:r="http://schemas.openxmlformats.org/officeDocument/2006/relationships" xmlns:p="http://schemas.openxmlformats.org/presentationml/2006/main">
+  <p:cSld>
+    <p:spTree>
+      <p:nvGrpSpPr>
+        <p:cNvPr id="1" name=""/>
+        <p:cNvGrpSpPr/>
+        <p:nvPr/>
+      </p:nvGrpSpPr>
+      <p:grpSpPr>
+        <a:xfrm>
+          <a:off x="0" y="0"/>
+          <a:ext cx="0" cy="0"/>
+          <a:chOff x="0" y="0"/>
+          <a:chExt cx="0" cy="0"/>
+        </a:xfrm>
+      </p:grpSpPr>
+      <p:sp>
+        <p:nvSpPr>
+          <p:cNvPr id="3" name="Content Placeholder 2">
+            <a:extLst>
+              <a:ext uri="{FF2B5EF4-FFF2-40B4-BE49-F238E27FC236}">
+                <a16:creationId xmlns:a16="http://schemas.microsoft.com/office/drawing/2014/main" id="{C6863F43-40D2-DF33-C901-4A6B8BA47D5C}"/>
+              </a:ext>
+            </a:extLst>
+          </p:cNvPr>
+          <p:cNvSpPr>
+            <a:spLocks noGrp="1"/>
+          </p:cNvSpPr>
+          <p:nvPr>
+            <p:ph idx="1"/>
+          </p:nvPr>
+        </p:nvSpPr>
+        <p:spPr/>
+        <p:txBody>
+          <a:bodyPr>
+            <a:normAutofit fontScale="92500" lnSpcReduction="10000"/>
+          </a:bodyPr>
+          <a:lstStyle/>
+          <a:p>
+            <a:pPr marL="0" indent="0">
+              <a:buNone/>
+            </a:pPr>
+            <a:r>
+              <a:rPr lang="en-US" b="1" dirty="0">
+                <a:latin typeface="Times New Roman" panose="02020603050405020304" pitchFamily="18" charset="0"/>
+                <a:cs typeface="Times New Roman" panose="02020603050405020304" pitchFamily="18" charset="0"/>
+              </a:rPr>
+              <a:t>Concept – </a:t>
+            </a:r>
+            <a:r>
+              <a:rPr lang="en-US" dirty="0">
+                <a:latin typeface="Times New Roman" panose="02020603050405020304" pitchFamily="18" charset="0"/>
+                <a:cs typeface="Times New Roman" panose="02020603050405020304" pitchFamily="18" charset="0"/>
+              </a:rPr>
+              <a:t>using NN to approximate the Q function</a:t>
+            </a:r>
+          </a:p>
+          <a:p>
+            <a:pPr marL="0" indent="0">
+              <a:buNone/>
+            </a:pPr>
+            <a:endParaRPr lang="en-US" dirty="0">
+              <a:latin typeface="Times New Roman" panose="02020603050405020304" pitchFamily="18" charset="0"/>
+              <a:cs typeface="Times New Roman" panose="02020603050405020304" pitchFamily="18" charset="0"/>
+            </a:endParaRPr>
+          </a:p>
+          <a:p>
+            <a:pPr marL="0" indent="0">
+              <a:buNone/>
+            </a:pPr>
+            <a:endParaRPr lang="en-US" dirty="0">
+              <a:latin typeface="Times New Roman" panose="02020603050405020304" pitchFamily="18" charset="0"/>
+              <a:cs typeface="Times New Roman" panose="02020603050405020304" pitchFamily="18" charset="0"/>
+            </a:endParaRPr>
+          </a:p>
+          <a:p>
+            <a:pPr marL="0" indent="0">
+              <a:buNone/>
+            </a:pPr>
+            <a:r>
+              <a:rPr lang="en-US" b="1" dirty="0">
+                <a:latin typeface="Times New Roman" panose="02020603050405020304" pitchFamily="18" charset="0"/>
+                <a:cs typeface="Times New Roman" panose="02020603050405020304" pitchFamily="18" charset="0"/>
+              </a:rPr>
+              <a:t>Scalability –</a:t>
+            </a:r>
+            <a:r>
+              <a:rPr lang="en-US" dirty="0">
+                <a:latin typeface="Times New Roman" panose="02020603050405020304" pitchFamily="18" charset="0"/>
+                <a:cs typeface="Times New Roman" panose="02020603050405020304" pitchFamily="18" charset="0"/>
+              </a:rPr>
+              <a:t>Avoiding large Q-table in case of high-dimensional states and complex environments</a:t>
+            </a:r>
+          </a:p>
+          <a:p>
+            <a:pPr marL="0" indent="0">
+              <a:buNone/>
+            </a:pPr>
+            <a:endParaRPr lang="en-US" dirty="0">
+              <a:latin typeface="Times New Roman" panose="02020603050405020304" pitchFamily="18" charset="0"/>
+              <a:cs typeface="Times New Roman" panose="02020603050405020304" pitchFamily="18" charset="0"/>
+            </a:endParaRPr>
+          </a:p>
+          <a:p>
+            <a:pPr marL="0" indent="0">
+              <a:buNone/>
+            </a:pPr>
+            <a:endParaRPr lang="en-US" dirty="0">
+              <a:latin typeface="Times New Roman" panose="02020603050405020304" pitchFamily="18" charset="0"/>
+              <a:cs typeface="Times New Roman" panose="02020603050405020304" pitchFamily="18" charset="0"/>
+            </a:endParaRPr>
+          </a:p>
+          <a:p>
+            <a:pPr marL="0" indent="0">
+              <a:buNone/>
+            </a:pPr>
+            <a:r>
+              <a:rPr lang="en-US" b="1" dirty="0">
+                <a:latin typeface="Times New Roman" panose="02020603050405020304" pitchFamily="18" charset="0"/>
+                <a:cs typeface="Times New Roman" panose="02020603050405020304" pitchFamily="18" charset="0"/>
+              </a:rPr>
+              <a:t>Stability – </a:t>
+            </a:r>
+            <a:r>
+              <a:rPr lang="en-US" dirty="0">
+                <a:latin typeface="Times New Roman" panose="02020603050405020304" pitchFamily="18" charset="0"/>
+                <a:cs typeface="Times New Roman" panose="02020603050405020304" pitchFamily="18" charset="0"/>
+              </a:rPr>
+              <a:t>Can lead to divergence with the slight change in hyperparameters and learning rates</a:t>
+            </a:r>
+          </a:p>
+          <a:p>
+            <a:pPr marL="0" indent="0">
+              <a:buNone/>
+            </a:pPr>
+            <a:r>
+              <a:rPr lang="en-US" dirty="0">
+                <a:latin typeface="Times New Roman" panose="02020603050405020304" pitchFamily="18" charset="0"/>
+                <a:cs typeface="Times New Roman" panose="02020603050405020304" pitchFamily="18" charset="0"/>
+              </a:rPr>
+              <a:t>Experience replay and target model</a:t>
+            </a:r>
+          </a:p>
+          <a:p>
+            <a:pPr marL="0" indent="0">
+              <a:buNone/>
+            </a:pPr>
+            <a:r>
+              <a:rPr lang="en-US" dirty="0">
+                <a:latin typeface="Times New Roman" panose="02020603050405020304" pitchFamily="18" charset="0"/>
+                <a:cs typeface="Times New Roman" panose="02020603050405020304" pitchFamily="18" charset="0"/>
+              </a:rPr>
+              <a:t> </a:t>
+            </a:r>
+            <a:endParaRPr lang="LID4096" dirty="0">
+              <a:latin typeface="Times New Roman" panose="02020603050405020304" pitchFamily="18" charset="0"/>
+              <a:cs typeface="Times New Roman" panose="02020603050405020304" pitchFamily="18" charset="0"/>
+            </a:endParaRPr>
+          </a:p>
+        </p:txBody>
+      </p:sp>
+      <p:sp>
+        <p:nvSpPr>
+          <p:cNvPr id="7" name="Title 1">
+            <a:extLst>
+              <a:ext uri="{FF2B5EF4-FFF2-40B4-BE49-F238E27FC236}">
+                <a16:creationId xmlns:a16="http://schemas.microsoft.com/office/drawing/2014/main" id="{671B295D-1E99-662D-E4A5-5984A3193CDC}"/>
+              </a:ext>
+            </a:extLst>
+          </p:cNvPr>
+          <p:cNvSpPr>
+            <a:spLocks noGrp="1"/>
+          </p:cNvSpPr>
+          <p:nvPr>
+            <p:ph type="title"/>
+          </p:nvPr>
+        </p:nvSpPr>
+        <p:spPr>
+          <a:xfrm>
+            <a:off x="0" y="636638"/>
+            <a:ext cx="12192000" cy="614123"/>
+          </a:xfrm>
+        </p:spPr>
+        <p:txBody>
+          <a:bodyPr/>
+          <a:lstStyle/>
+          <a:p>
+            <a:pPr algn="ctr"/>
+            <a:r>
+              <a:rPr lang="en-US" cap="none" spc="100" dirty="0">
+                <a:latin typeface="Times New Roman" panose="02020603050405020304" pitchFamily="18" charset="0"/>
+                <a:ea typeface="Cambria" panose="02040503050406030204" pitchFamily="18" charset="0"/>
+                <a:cs typeface="Times New Roman" panose="02020603050405020304" pitchFamily="18" charset="0"/>
+              </a:rPr>
+              <a:t>Deep Q-Learning (DQL)</a:t>
+            </a:r>
+            <a:endParaRPr lang="LID4096" cap="none" spc="0" dirty="0">
+              <a:latin typeface="Cambria" panose="02040503050406030204" pitchFamily="18" charset="0"/>
+              <a:ea typeface="Cambria" panose="02040503050406030204" pitchFamily="18" charset="0"/>
+              <a:cs typeface="Times New Roman" panose="02020603050405020304" pitchFamily="18" charset="0"/>
+            </a:endParaRPr>
+          </a:p>
+        </p:txBody>
+      </p:sp>
+    </p:spTree>
+    <p:extLst>
+      <p:ext uri="{BB962C8B-B14F-4D97-AF65-F5344CB8AC3E}">
+        <p14:creationId xmlns:p14="http://schemas.microsoft.com/office/powerpoint/2010/main" val="1560638069"/>
       </p:ext>
     </p:extLst>
   </p:cSld>

</xml_diff>

<commit_message>
adding presentation, comments, NN1_HOTCOLD, now running CNN_Simple l_61
</commit_message>
<xml_diff>
--- a/presentation.pptx
+++ b/presentation.pptx
@@ -5,7 +5,7 @@
     <p:sldMasterId id="2147483686" r:id="rId1"/>
   </p:sldMasterIdLst>
   <p:notesMasterIdLst>
-    <p:notesMasterId r:id="rId10"/>
+    <p:notesMasterId r:id="rId16"/>
   </p:notesMasterIdLst>
   <p:sldIdLst>
     <p:sldId id="256" r:id="rId2"/>
@@ -16,6 +16,12 @@
     <p:sldId id="261" r:id="rId7"/>
     <p:sldId id="262" r:id="rId8"/>
     <p:sldId id="263" r:id="rId9"/>
+    <p:sldId id="264" r:id="rId10"/>
+    <p:sldId id="265" r:id="rId11"/>
+    <p:sldId id="266" r:id="rId12"/>
+    <p:sldId id="267" r:id="rId13"/>
+    <p:sldId id="268" r:id="rId14"/>
+    <p:sldId id="269" r:id="rId15"/>
   </p:sldIdLst>
   <p:sldSz cx="12192000" cy="6858000"/>
   <p:notesSz cx="6858000" cy="9144000"/>
@@ -125,7 +131,7 @@
 <file path=ppt/revisionInfo.xml><?xml version="1.0" encoding="utf-8"?>
 <p1510:revInfo xmlns:a="http://schemas.openxmlformats.org/drawingml/2006/main" xmlns:r="http://schemas.openxmlformats.org/officeDocument/2006/relationships" xmlns:p1510="http://schemas.microsoft.com/office/powerpoint/2015/10/main">
   <p1510:revLst>
-    <p1510:client id="{C848D9A1-E4C3-4BC8-9DDE-B82935BDE34D}" v="212" dt="2024-08-30T16:06:28.827"/>
+    <p1510:client id="{C848D9A1-E4C3-4BC8-9DDE-B82935BDE34D}" v="228" dt="2024-08-31T12:45:21.847"/>
   </p1510:revLst>
 </p1510:revInfo>
 </file>
@@ -135,7 +141,7 @@
   <pc:docChgLst>
     <pc:chgData name="Erel Dekel" userId="5861eaf1660df668" providerId="LiveId" clId="{C848D9A1-E4C3-4BC8-9DDE-B82935BDE34D}"/>
     <pc:docChg chg="undo custSel addSld modSld addMainMaster delMainMaster">
-      <pc:chgData name="Erel Dekel" userId="5861eaf1660df668" providerId="LiveId" clId="{C848D9A1-E4C3-4BC8-9DDE-B82935BDE34D}" dt="2024-08-30T21:07:28.957" v="4791" actId="20577"/>
+      <pc:chgData name="Erel Dekel" userId="5861eaf1660df668" providerId="LiveId" clId="{C848D9A1-E4C3-4BC8-9DDE-B82935BDE34D}" dt="2024-08-31T12:45:36.331" v="6219" actId="313"/>
       <pc:docMkLst>
         <pc:docMk/>
       </pc:docMkLst>
@@ -965,7 +971,7 @@
         </pc:spChg>
       </pc:sldChg>
       <pc:sldChg chg="addSp delSp modSp new mod">
-        <pc:chgData name="Erel Dekel" userId="5861eaf1660df668" providerId="LiveId" clId="{C848D9A1-E4C3-4BC8-9DDE-B82935BDE34D}" dt="2024-08-30T21:07:28.957" v="4791" actId="20577"/>
+        <pc:chgData name="Erel Dekel" userId="5861eaf1660df668" providerId="LiveId" clId="{C848D9A1-E4C3-4BC8-9DDE-B82935BDE34D}" dt="2024-08-31T10:38:03.135" v="5348" actId="403"/>
         <pc:sldMkLst>
           <pc:docMk/>
           <pc:sldMk cId="1560638069" sldId="263"/>
@@ -979,7 +985,7 @@
           </ac:spMkLst>
         </pc:spChg>
         <pc:spChg chg="mod">
-          <ac:chgData name="Erel Dekel" userId="5861eaf1660df668" providerId="LiveId" clId="{C848D9A1-E4C3-4BC8-9DDE-B82935BDE34D}" dt="2024-08-30T21:07:28.957" v="4791" actId="20577"/>
+          <ac:chgData name="Erel Dekel" userId="5861eaf1660df668" providerId="LiveId" clId="{C848D9A1-E4C3-4BC8-9DDE-B82935BDE34D}" dt="2024-08-31T10:38:03.135" v="5348" actId="403"/>
           <ac:spMkLst>
             <pc:docMk/>
             <pc:sldMk cId="1560638069" sldId="263"/>
@@ -1008,6 +1014,296 @@
             <pc:docMk/>
             <pc:sldMk cId="1560638069" sldId="263"/>
             <ac:spMk id="7" creationId="{671B295D-1E99-662D-E4A5-5984A3193CDC}"/>
+          </ac:spMkLst>
+        </pc:spChg>
+      </pc:sldChg>
+      <pc:sldChg chg="addSp delSp modSp new mod">
+        <pc:chgData name="Erel Dekel" userId="5861eaf1660df668" providerId="LiveId" clId="{C848D9A1-E4C3-4BC8-9DDE-B82935BDE34D}" dt="2024-08-31T10:16:48.223" v="4928" actId="20577"/>
+        <pc:sldMkLst>
+          <pc:docMk/>
+          <pc:sldMk cId="522411142" sldId="264"/>
+        </pc:sldMkLst>
+        <pc:spChg chg="del">
+          <ac:chgData name="Erel Dekel" userId="5861eaf1660df668" providerId="LiveId" clId="{C848D9A1-E4C3-4BC8-9DDE-B82935BDE34D}" dt="2024-08-31T10:12:40.264" v="4793" actId="478"/>
+          <ac:spMkLst>
+            <pc:docMk/>
+            <pc:sldMk cId="522411142" sldId="264"/>
+            <ac:spMk id="2" creationId="{0F43E9B6-A769-EC03-A2DE-4616A66F7B57}"/>
+          </ac:spMkLst>
+        </pc:spChg>
+        <pc:spChg chg="del">
+          <ac:chgData name="Erel Dekel" userId="5861eaf1660df668" providerId="LiveId" clId="{C848D9A1-E4C3-4BC8-9DDE-B82935BDE34D}" dt="2024-08-31T10:12:49.845" v="4813" actId="478"/>
+          <ac:spMkLst>
+            <pc:docMk/>
+            <pc:sldMk cId="522411142" sldId="264"/>
+            <ac:spMk id="3" creationId="{F79E31CD-A120-8B9B-41AD-7E1BC21950D3}"/>
+          </ac:spMkLst>
+        </pc:spChg>
+        <pc:spChg chg="add mod">
+          <ac:chgData name="Erel Dekel" userId="5861eaf1660df668" providerId="LiveId" clId="{C848D9A1-E4C3-4BC8-9DDE-B82935BDE34D}" dt="2024-08-31T10:14:15.152" v="4853" actId="20577"/>
+          <ac:spMkLst>
+            <pc:docMk/>
+            <pc:sldMk cId="522411142" sldId="264"/>
+            <ac:spMk id="4" creationId="{DD32D97F-F745-3594-FC1C-B6D601A78D7D}"/>
+          </ac:spMkLst>
+        </pc:spChg>
+        <pc:spChg chg="add mod">
+          <ac:chgData name="Erel Dekel" userId="5861eaf1660df668" providerId="LiveId" clId="{C848D9A1-E4C3-4BC8-9DDE-B82935BDE34D}" dt="2024-08-31T10:16:48.223" v="4928" actId="20577"/>
+          <ac:spMkLst>
+            <pc:docMk/>
+            <pc:sldMk cId="522411142" sldId="264"/>
+            <ac:spMk id="5" creationId="{D6CE0CA9-073B-221A-B3BC-03D41FE4AAB7}"/>
+          </ac:spMkLst>
+        </pc:spChg>
+      </pc:sldChg>
+      <pc:sldChg chg="addSp delSp modSp new mod">
+        <pc:chgData name="Erel Dekel" userId="5861eaf1660df668" providerId="LiveId" clId="{C848D9A1-E4C3-4BC8-9DDE-B82935BDE34D}" dt="2024-08-31T10:19:03.608" v="5079" actId="20577"/>
+        <pc:sldMkLst>
+          <pc:docMk/>
+          <pc:sldMk cId="2363500313" sldId="265"/>
+        </pc:sldMkLst>
+        <pc:spChg chg="del">
+          <ac:chgData name="Erel Dekel" userId="5861eaf1660df668" providerId="LiveId" clId="{C848D9A1-E4C3-4BC8-9DDE-B82935BDE34D}" dt="2024-08-31T10:16:58.075" v="4930"/>
+          <ac:spMkLst>
+            <pc:docMk/>
+            <pc:sldMk cId="2363500313" sldId="265"/>
+            <ac:spMk id="2" creationId="{75A98222-77C6-4FE8-5E7A-983709E448F7}"/>
+          </ac:spMkLst>
+        </pc:spChg>
+        <pc:spChg chg="del mod">
+          <ac:chgData name="Erel Dekel" userId="5861eaf1660df668" providerId="LiveId" clId="{C848D9A1-E4C3-4BC8-9DDE-B82935BDE34D}" dt="2024-08-31T10:17:15.316" v="4940"/>
+          <ac:spMkLst>
+            <pc:docMk/>
+            <pc:sldMk cId="2363500313" sldId="265"/>
+            <ac:spMk id="3" creationId="{91814BBB-AD17-0517-5613-E00CF2D110AF}"/>
+          </ac:spMkLst>
+        </pc:spChg>
+        <pc:spChg chg="add del mod">
+          <ac:chgData name="Erel Dekel" userId="5861eaf1660df668" providerId="LiveId" clId="{C848D9A1-E4C3-4BC8-9DDE-B82935BDE34D}" dt="2024-08-31T10:16:59.921" v="4931" actId="478"/>
+          <ac:spMkLst>
+            <pc:docMk/>
+            <pc:sldMk cId="2363500313" sldId="265"/>
+            <ac:spMk id="4" creationId="{CD6FA048-9903-7852-0FAE-84378490AC00}"/>
+          </ac:spMkLst>
+        </pc:spChg>
+        <pc:spChg chg="add del mod">
+          <ac:chgData name="Erel Dekel" userId="5861eaf1660df668" providerId="LiveId" clId="{C848D9A1-E4C3-4BC8-9DDE-B82935BDE34D}" dt="2024-08-31T10:17:01.554" v="4932" actId="478"/>
+          <ac:spMkLst>
+            <pc:docMk/>
+            <pc:sldMk cId="2363500313" sldId="265"/>
+            <ac:spMk id="6" creationId="{0E679C5C-10E4-54D3-783B-84831AF60A9F}"/>
+          </ac:spMkLst>
+        </pc:spChg>
+        <pc:spChg chg="add mod">
+          <ac:chgData name="Erel Dekel" userId="5861eaf1660df668" providerId="LiveId" clId="{C848D9A1-E4C3-4BC8-9DDE-B82935BDE34D}" dt="2024-08-31T10:18:05.116" v="4950" actId="20577"/>
+          <ac:spMkLst>
+            <pc:docMk/>
+            <pc:sldMk cId="2363500313" sldId="265"/>
+            <ac:spMk id="7" creationId="{C8E7BE51-EB95-4233-47E6-26D7CC1863CC}"/>
+          </ac:spMkLst>
+        </pc:spChg>
+        <pc:spChg chg="add mod">
+          <ac:chgData name="Erel Dekel" userId="5861eaf1660df668" providerId="LiveId" clId="{C848D9A1-E4C3-4BC8-9DDE-B82935BDE34D}" dt="2024-08-31T10:17:19.806" v="4945" actId="20577"/>
+          <ac:spMkLst>
+            <pc:docMk/>
+            <pc:sldMk cId="2363500313" sldId="265"/>
+            <ac:spMk id="8" creationId="{EB76F6C3-C50B-E77E-DBA8-AED73AB62597}"/>
+          </ac:spMkLst>
+        </pc:spChg>
+        <pc:spChg chg="add mod">
+          <ac:chgData name="Erel Dekel" userId="5861eaf1660df668" providerId="LiveId" clId="{C848D9A1-E4C3-4BC8-9DDE-B82935BDE34D}" dt="2024-08-31T10:19:03.608" v="5079" actId="20577"/>
+          <ac:spMkLst>
+            <pc:docMk/>
+            <pc:sldMk cId="2363500313" sldId="265"/>
+            <ac:spMk id="9" creationId="{802B9479-F8BF-ACC1-31F6-827AE6E6C534}"/>
+          </ac:spMkLst>
+        </pc:spChg>
+      </pc:sldChg>
+      <pc:sldChg chg="addSp delSp modSp new mod">
+        <pc:chgData name="Erel Dekel" userId="5861eaf1660df668" providerId="LiveId" clId="{C848D9A1-E4C3-4BC8-9DDE-B82935BDE34D}" dt="2024-08-31T10:50:45.546" v="5655" actId="20577"/>
+        <pc:sldMkLst>
+          <pc:docMk/>
+          <pc:sldMk cId="1391134809" sldId="266"/>
+        </pc:sldMkLst>
+        <pc:spChg chg="del">
+          <ac:chgData name="Erel Dekel" userId="5861eaf1660df668" providerId="LiveId" clId="{C848D9A1-E4C3-4BC8-9DDE-B82935BDE34D}" dt="2024-08-31T10:18:40.875" v="4952" actId="478"/>
+          <ac:spMkLst>
+            <pc:docMk/>
+            <pc:sldMk cId="1391134809" sldId="266"/>
+            <ac:spMk id="2" creationId="{02B5B915-E80B-7F20-3060-14613347743A}"/>
+          </ac:spMkLst>
+        </pc:spChg>
+        <pc:spChg chg="del">
+          <ac:chgData name="Erel Dekel" userId="5861eaf1660df668" providerId="LiveId" clId="{C848D9A1-E4C3-4BC8-9DDE-B82935BDE34D}" dt="2024-08-31T10:19:10.288" v="5080" actId="478"/>
+          <ac:spMkLst>
+            <pc:docMk/>
+            <pc:sldMk cId="1391134809" sldId="266"/>
+            <ac:spMk id="3" creationId="{BCF3B299-1974-CE73-4525-4FD19B6089C4}"/>
+          </ac:spMkLst>
+        </pc:spChg>
+        <pc:spChg chg="add mod">
+          <ac:chgData name="Erel Dekel" userId="5861eaf1660df668" providerId="LiveId" clId="{C848D9A1-E4C3-4BC8-9DDE-B82935BDE34D}" dt="2024-08-31T10:18:43.252" v="4958" actId="20577"/>
+          <ac:spMkLst>
+            <pc:docMk/>
+            <pc:sldMk cId="1391134809" sldId="266"/>
+            <ac:spMk id="4" creationId="{76A60C79-0856-34D5-14AF-479F6BA94AB6}"/>
+          </ac:spMkLst>
+        </pc:spChg>
+        <pc:spChg chg="add mod">
+          <ac:chgData name="Erel Dekel" userId="5861eaf1660df668" providerId="LiveId" clId="{C848D9A1-E4C3-4BC8-9DDE-B82935BDE34D}" dt="2024-08-31T10:50:45.546" v="5655" actId="20577"/>
+          <ac:spMkLst>
+            <pc:docMk/>
+            <pc:sldMk cId="1391134809" sldId="266"/>
+            <ac:spMk id="5" creationId="{7CD991A2-D38C-77B0-A024-5691AA6BE282}"/>
+          </ac:spMkLst>
+        </pc:spChg>
+      </pc:sldChg>
+      <pc:sldChg chg="addSp delSp modSp new mod">
+        <pc:chgData name="Erel Dekel" userId="5861eaf1660df668" providerId="LiveId" clId="{C848D9A1-E4C3-4BC8-9DDE-B82935BDE34D}" dt="2024-08-31T10:57:17.971" v="5912" actId="20577"/>
+        <pc:sldMkLst>
+          <pc:docMk/>
+          <pc:sldMk cId="1334075768" sldId="267"/>
+        </pc:sldMkLst>
+        <pc:spChg chg="del">
+          <ac:chgData name="Erel Dekel" userId="5861eaf1660df668" providerId="LiveId" clId="{C848D9A1-E4C3-4BC8-9DDE-B82935BDE34D}" dt="2024-08-31T10:45:39.617" v="5613" actId="478"/>
+          <ac:spMkLst>
+            <pc:docMk/>
+            <pc:sldMk cId="1334075768" sldId="267"/>
+            <ac:spMk id="2" creationId="{25C23D0F-4641-EAD6-0F4F-0D3CD09B5612}"/>
+          </ac:spMkLst>
+        </pc:spChg>
+        <pc:spChg chg="del mod">
+          <ac:chgData name="Erel Dekel" userId="5861eaf1660df668" providerId="LiveId" clId="{C848D9A1-E4C3-4BC8-9DDE-B82935BDE34D}" dt="2024-08-31T10:51:00.502" v="5656" actId="478"/>
+          <ac:spMkLst>
+            <pc:docMk/>
+            <pc:sldMk cId="1334075768" sldId="267"/>
+            <ac:spMk id="3" creationId="{10A39756-CF11-EDEC-C6ED-60F94D7C80AF}"/>
+          </ac:spMkLst>
+        </pc:spChg>
+        <pc:spChg chg="add mod">
+          <ac:chgData name="Erel Dekel" userId="5861eaf1660df668" providerId="LiveId" clId="{C848D9A1-E4C3-4BC8-9DDE-B82935BDE34D}" dt="2024-08-31T10:47:04.819" v="5643" actId="20577"/>
+          <ac:spMkLst>
+            <pc:docMk/>
+            <pc:sldMk cId="1334075768" sldId="267"/>
+            <ac:spMk id="4" creationId="{BC293AFB-8F38-6A10-716F-B1CBB8C32FFB}"/>
+          </ac:spMkLst>
+        </pc:spChg>
+        <pc:spChg chg="add mod">
+          <ac:chgData name="Erel Dekel" userId="5861eaf1660df668" providerId="LiveId" clId="{C848D9A1-E4C3-4BC8-9DDE-B82935BDE34D}" dt="2024-08-31T10:57:17.971" v="5912" actId="20577"/>
+          <ac:spMkLst>
+            <pc:docMk/>
+            <pc:sldMk cId="1334075768" sldId="267"/>
+            <ac:spMk id="5" creationId="{2D9DADE7-2416-3012-AA53-CE3587117B51}"/>
+          </ac:spMkLst>
+        </pc:spChg>
+      </pc:sldChg>
+      <pc:sldChg chg="addSp delSp modSp new mod">
+        <pc:chgData name="Erel Dekel" userId="5861eaf1660df668" providerId="LiveId" clId="{C848D9A1-E4C3-4BC8-9DDE-B82935BDE34D}" dt="2024-08-31T11:41:36.712" v="6179" actId="26606"/>
+        <pc:sldMkLst>
+          <pc:docMk/>
+          <pc:sldMk cId="1049734255" sldId="268"/>
+        </pc:sldMkLst>
+        <pc:spChg chg="del">
+          <ac:chgData name="Erel Dekel" userId="5861eaf1660df668" providerId="LiveId" clId="{C848D9A1-E4C3-4BC8-9DDE-B82935BDE34D}" dt="2024-08-31T10:59:05.884" v="5914" actId="478"/>
+          <ac:spMkLst>
+            <pc:docMk/>
+            <pc:sldMk cId="1049734255" sldId="268"/>
+            <ac:spMk id="2" creationId="{AD77BE29-FCCC-763B-81CF-82A6E6A0338A}"/>
+          </ac:spMkLst>
+        </pc:spChg>
+        <pc:spChg chg="del mod">
+          <ac:chgData name="Erel Dekel" userId="5861eaf1660df668" providerId="LiveId" clId="{C848D9A1-E4C3-4BC8-9DDE-B82935BDE34D}" dt="2024-08-31T10:59:29.675" v="5929"/>
+          <ac:spMkLst>
+            <pc:docMk/>
+            <pc:sldMk cId="1049734255" sldId="268"/>
+            <ac:spMk id="3" creationId="{BB30AA37-3E67-B043-AC6E-7C614C1E5A8E}"/>
+          </ac:spMkLst>
+        </pc:spChg>
+        <pc:spChg chg="add mod">
+          <ac:chgData name="Erel Dekel" userId="5861eaf1660df668" providerId="LiveId" clId="{C848D9A1-E4C3-4BC8-9DDE-B82935BDE34D}" dt="2024-08-31T10:59:17.552" v="5927" actId="20577"/>
+          <ac:spMkLst>
+            <pc:docMk/>
+            <pc:sldMk cId="1049734255" sldId="268"/>
+            <ac:spMk id="4" creationId="{62768529-0D05-85F4-5A8E-DCA82F68F1D4}"/>
+          </ac:spMkLst>
+        </pc:spChg>
+        <pc:spChg chg="add del mod">
+          <ac:chgData name="Erel Dekel" userId="5861eaf1660df668" providerId="LiveId" clId="{C848D9A1-E4C3-4BC8-9DDE-B82935BDE34D}" dt="2024-08-31T11:41:36.712" v="6179" actId="26606"/>
+          <ac:spMkLst>
+            <pc:docMk/>
+            <pc:sldMk cId="1049734255" sldId="268"/>
+            <ac:spMk id="5" creationId="{362BEDC8-993B-8004-564A-7B09897671E2}"/>
+          </ac:spMkLst>
+        </pc:spChg>
+        <pc:spChg chg="add mod">
+          <ac:chgData name="Erel Dekel" userId="5861eaf1660df668" providerId="LiveId" clId="{C848D9A1-E4C3-4BC8-9DDE-B82935BDE34D}" dt="2024-08-31T11:01:03.181" v="6027"/>
+          <ac:spMkLst>
+            <pc:docMk/>
+            <pc:sldMk cId="1049734255" sldId="268"/>
+            <ac:spMk id="6" creationId="{7C0D3DB2-5BC4-298F-B807-D07FCB3C0F18}"/>
+          </ac:spMkLst>
+        </pc:spChg>
+        <pc:graphicFrameChg chg="add del">
+          <ac:chgData name="Erel Dekel" userId="5861eaf1660df668" providerId="LiveId" clId="{C848D9A1-E4C3-4BC8-9DDE-B82935BDE34D}" dt="2024-08-31T11:41:36.712" v="6179" actId="26606"/>
+          <ac:graphicFrameMkLst>
+            <pc:docMk/>
+            <pc:sldMk cId="1049734255" sldId="268"/>
+            <ac:graphicFrameMk id="16" creationId="{05DDC19F-EA80-D0F2-B8B5-9970AE4A9BDD}"/>
+          </ac:graphicFrameMkLst>
+        </pc:graphicFrameChg>
+        <pc:picChg chg="add del mod">
+          <ac:chgData name="Erel Dekel" userId="5861eaf1660df668" providerId="LiveId" clId="{C848D9A1-E4C3-4BC8-9DDE-B82935BDE34D}" dt="2024-08-31T11:17:01.347" v="6171" actId="478"/>
+          <ac:picMkLst>
+            <pc:docMk/>
+            <pc:sldMk cId="1049734255" sldId="268"/>
+            <ac:picMk id="8" creationId="{96C8CCEE-6A44-DAE5-6462-83A35DC8AED1}"/>
+          </ac:picMkLst>
+        </pc:picChg>
+        <pc:picChg chg="add del mod">
+          <ac:chgData name="Erel Dekel" userId="5861eaf1660df668" providerId="LiveId" clId="{C848D9A1-E4C3-4BC8-9DDE-B82935BDE34D}" dt="2024-08-31T11:19:21.040" v="6174" actId="478"/>
+          <ac:picMkLst>
+            <pc:docMk/>
+            <pc:sldMk cId="1049734255" sldId="268"/>
+            <ac:picMk id="10" creationId="{7375C841-F1CC-898B-BC49-3E91AF0FBEAF}"/>
+          </ac:picMkLst>
+        </pc:picChg>
+        <pc:picChg chg="add mod">
+          <ac:chgData name="Erel Dekel" userId="5861eaf1660df668" providerId="LiveId" clId="{C848D9A1-E4C3-4BC8-9DDE-B82935BDE34D}" dt="2024-08-31T11:17:09.547" v="6173" actId="1076"/>
+          <ac:picMkLst>
+            <pc:docMk/>
+            <pc:sldMk cId="1049734255" sldId="268"/>
+            <ac:picMk id="12" creationId="{6C468A5B-57D6-D209-21C7-F8C29E0C5F7C}"/>
+          </ac:picMkLst>
+        </pc:picChg>
+        <pc:picChg chg="add mod">
+          <ac:chgData name="Erel Dekel" userId="5861eaf1660df668" providerId="LiveId" clId="{C848D9A1-E4C3-4BC8-9DDE-B82935BDE34D}" dt="2024-08-31T11:19:26.047" v="6177" actId="1076"/>
+          <ac:picMkLst>
+            <pc:docMk/>
+            <pc:sldMk cId="1049734255" sldId="268"/>
+            <ac:picMk id="14" creationId="{9263152C-42C2-CFD9-943D-A4EC2882D015}"/>
+          </ac:picMkLst>
+        </pc:picChg>
+      </pc:sldChg>
+      <pc:sldChg chg="addSp delSp modSp new mod">
+        <pc:chgData name="Erel Dekel" userId="5861eaf1660df668" providerId="LiveId" clId="{C848D9A1-E4C3-4BC8-9DDE-B82935BDE34D}" dt="2024-08-31T12:45:36.331" v="6219" actId="313"/>
+        <pc:sldMkLst>
+          <pc:docMk/>
+          <pc:sldMk cId="1958898215" sldId="269"/>
+        </pc:sldMkLst>
+        <pc:spChg chg="del">
+          <ac:chgData name="Erel Dekel" userId="5861eaf1660df668" providerId="LiveId" clId="{C848D9A1-E4C3-4BC8-9DDE-B82935BDE34D}" dt="2024-08-31T12:45:15.445" v="6181" actId="478"/>
+          <ac:spMkLst>
+            <pc:docMk/>
+            <pc:sldMk cId="1958898215" sldId="269"/>
+            <ac:spMk id="2" creationId="{C5DF8E57-295E-47B0-38C1-970F9EE998A2}"/>
+          </ac:spMkLst>
+        </pc:spChg>
+        <pc:spChg chg="add mod">
+          <ac:chgData name="Erel Dekel" userId="5861eaf1660df668" providerId="LiveId" clId="{C848D9A1-E4C3-4BC8-9DDE-B82935BDE34D}" dt="2024-08-31T12:45:36.331" v="6219" actId="313"/>
+          <ac:spMkLst>
+            <pc:docMk/>
+            <pc:sldMk cId="1958898215" sldId="269"/>
+            <ac:spMk id="4" creationId="{7C2D623D-6EB8-EAEA-9DE3-917260328455}"/>
           </ac:spMkLst>
         </pc:spChg>
       </pc:sldChg>
@@ -1288,7 +1584,7 @@
           <a:p>
             <a:fld id="{E9661D1F-6117-4D45-B9D8-177F02A5000A}" type="datetimeFigureOut">
               <a:rPr lang="LID4096" smtClean="0"/>
-              <a:t>08/30/2024</a:t>
+              <a:t>08/31/2024</a:t>
             </a:fld>
             <a:endParaRPr lang="LID4096"/>
           </a:p>
@@ -1714,7 +2010,7 @@
           <a:p>
             <a:fld id="{655A5808-3B61-48CC-92EF-85AC2E0DFA56}" type="datetime2">
               <a:rPr lang="en-US" smtClean="0"/>
-              <a:t>Friday, August 30, 2024</a:t>
+              <a:t>Saturday, August 31, 2024</a:t>
             </a:fld>
             <a:endParaRPr lang="en-US"/>
           </a:p>
@@ -1912,7 +2208,7 @@
           <a:p>
             <a:fld id="{735E98AF-4574-4509-BF7A-519ACD5BF826}" type="datetime2">
               <a:rPr lang="en-US" smtClean="0"/>
-              <a:t>Friday, August 30, 2024</a:t>
+              <a:t>Saturday, August 31, 2024</a:t>
             </a:fld>
             <a:endParaRPr lang="en-US"/>
           </a:p>
@@ -2122,7 +2418,7 @@
           <a:p>
             <a:fld id="{93DD97D4-9636-490F-85D0-E926C2B6F3B1}" type="datetime2">
               <a:rPr lang="en-US" smtClean="0"/>
-              <a:t>Friday, August 30, 2024</a:t>
+              <a:t>Saturday, August 31, 2024</a:t>
             </a:fld>
             <a:endParaRPr lang="en-US"/>
           </a:p>
@@ -2321,7 +2617,7 @@
           <a:p>
             <a:fld id="{2F3AF3C6-0FD4-4939-991C-00DDE5C56815}" type="datetime2">
               <a:rPr lang="en-US" smtClean="0"/>
-              <a:t>Friday, August 30, 2024</a:t>
+              <a:t>Saturday, August 31, 2024</a:t>
             </a:fld>
             <a:endParaRPr lang="en-US"/>
           </a:p>
@@ -2602,7 +2898,7 @@
           <a:p>
             <a:fld id="{86807482-8128-47C6-A8DD-6452B0291CFF}" type="datetime2">
               <a:rPr lang="en-US" smtClean="0"/>
-              <a:t>Friday, August 30, 2024</a:t>
+              <a:t>Saturday, August 31, 2024</a:t>
             </a:fld>
             <a:endParaRPr lang="en-US"/>
           </a:p>
@@ -2870,7 +3166,7 @@
           <a:p>
             <a:fld id="{37903F25-275E-41DE-BE3B-EBF0DB49F9B1}" type="datetime2">
               <a:rPr lang="en-US" smtClean="0"/>
-              <a:t>Friday, August 30, 2024</a:t>
+              <a:t>Saturday, August 31, 2024</a:t>
             </a:fld>
             <a:endParaRPr lang="en-US"/>
           </a:p>
@@ -3251,7 +3547,7 @@
           <a:p>
             <a:fld id="{EE475572-4A44-4171-84AA-64D42C8050A6}" type="datetime2">
               <a:rPr lang="en-US" smtClean="0"/>
-              <a:t>Friday, August 30, 2024</a:t>
+              <a:t>Saturday, August 31, 2024</a:t>
             </a:fld>
             <a:endParaRPr lang="en-US"/>
           </a:p>
@@ -3421,7 +3717,7 @@
           <a:p>
             <a:fld id="{C4C1612E-528E-4FD5-9E9E-E15F1108F171}" type="datetime2">
               <a:rPr lang="en-US" smtClean="0"/>
-              <a:t>Friday, August 30, 2024</a:t>
+              <a:t>Saturday, August 31, 2024</a:t>
             </a:fld>
             <a:endParaRPr lang="en-US"/>
           </a:p>
@@ -3534,7 +3830,7 @@
           <a:p>
             <a:fld id="{D4F6D862-A06D-436F-A92E-EBAAD50B6E50}" type="datetime2">
               <a:rPr lang="en-US" smtClean="0"/>
-              <a:t>Friday, August 30, 2024</a:t>
+              <a:t>Saturday, August 31, 2024</a:t>
             </a:fld>
             <a:endParaRPr lang="en-US"/>
           </a:p>
@@ -3851,7 +4147,7 @@
           <a:p>
             <a:fld id="{B73E0B7D-2260-4809-8F0A-9E5F3E24F169}" type="datetime2">
               <a:rPr lang="en-US" smtClean="0"/>
-              <a:t>Friday, August 30, 2024</a:t>
+              <a:t>Saturday, August 31, 2024</a:t>
             </a:fld>
             <a:endParaRPr lang="en-US"/>
           </a:p>
@@ -4143,7 +4439,7 @@
           <a:p>
             <a:fld id="{3C8E4735-C637-46A3-94EB-AB3AC4188D2F}" type="datetime2">
               <a:rPr lang="en-US" smtClean="0"/>
-              <a:t>Friday, August 30, 2024</a:t>
+              <a:t>Saturday, August 31, 2024</a:t>
             </a:fld>
             <a:endParaRPr lang="en-US"/>
           </a:p>
@@ -4511,7 +4807,7 @@
             <a:fld id="{AE0C963C-C1DB-4AFD-9DDC-0691666BF49B}" type="datetime2">
               <a:rPr lang="en-US" smtClean="0"/>
               <a:pPr/>
-              <a:t>Friday, August 30, 2024</a:t>
+              <a:t>Saturday, August 31, 2024</a:t>
             </a:fld>
             <a:endParaRPr lang="en-US" cap="all" dirty="0"/>
           </a:p>
@@ -5442,7 +5738,7 @@
 </p:sld>
 </file>
 
-<file path=ppt/slides/slide2.xml><?xml version="1.0" encoding="utf-8"?>
+<file path=ppt/slides/slide10.xml><?xml version="1.0" encoding="utf-8"?>
 <p:sld xmlns:a="http://schemas.openxmlformats.org/drawingml/2006/main" xmlns:r="http://schemas.openxmlformats.org/officeDocument/2006/relationships" xmlns:p="http://schemas.openxmlformats.org/presentationml/2006/main">
   <p:cSld>
     <p:spTree>
@@ -5461,10 +5757,10 @@
       </p:grpSpPr>
       <p:sp>
         <p:nvSpPr>
-          <p:cNvPr id="2" name="Title 1">
-            <a:extLst>
-              <a:ext uri="{FF2B5EF4-FFF2-40B4-BE49-F238E27FC236}">
-                <a16:creationId xmlns:a16="http://schemas.microsoft.com/office/drawing/2014/main" id="{2774A749-E252-D00C-A5A3-EE68C4DF4563}"/>
+          <p:cNvPr id="7" name="Title 1">
+            <a:extLst>
+              <a:ext uri="{FF2B5EF4-FFF2-40B4-BE49-F238E27FC236}">
+                <a16:creationId xmlns:a16="http://schemas.microsoft.com/office/drawing/2014/main" id="{C8E7BE51-EB95-4233-47E6-26D7CC1863CC}"/>
               </a:ext>
             </a:extLst>
           </p:cNvPr>
@@ -5482,29 +5778,19 @@
           </a:xfrm>
         </p:spPr>
         <p:txBody>
-          <a:bodyPr>
-            <a:normAutofit/>
-          </a:bodyPr>
+          <a:bodyPr/>
           <a:lstStyle/>
           <a:p>
             <a:pPr algn="ctr"/>
             <a:r>
-              <a:rPr lang="en-US" sz="3200" cap="none" spc="100" dirty="0">
+              <a:rPr lang="en-US" cap="none" spc="100" dirty="0">
                 <a:latin typeface="Times New Roman" panose="02020603050405020304" pitchFamily="18" charset="0"/>
                 <a:ea typeface="Cambria" panose="02040503050406030204" pitchFamily="18" charset="0"/>
                 <a:cs typeface="Times New Roman" panose="02020603050405020304" pitchFamily="18" charset="0"/>
               </a:rPr>
-              <a:t>Introduction to Formal Verification</a:t>
-            </a:r>
-            <a:r>
-              <a:rPr lang="en-US" sz="3200" cap="none" spc="0" dirty="0">
-                <a:latin typeface="Cambria" panose="02040503050406030204" pitchFamily="18" charset="0"/>
-                <a:ea typeface="Cambria" panose="02040503050406030204" pitchFamily="18" charset="0"/>
-                <a:cs typeface="Times New Roman" panose="02020603050405020304" pitchFamily="18" charset="0"/>
-              </a:rPr>
-              <a:t> </a:t>
-            </a:r>
-            <a:endParaRPr lang="LID4096" sz="3200" cap="none" spc="0" dirty="0">
+              <a:t>Code – The Model</a:t>
+            </a:r>
+            <a:endParaRPr lang="LID4096" cap="none" spc="0" dirty="0">
               <a:latin typeface="Cambria" panose="02040503050406030204" pitchFamily="18" charset="0"/>
               <a:ea typeface="Cambria" panose="02040503050406030204" pitchFamily="18" charset="0"/>
               <a:cs typeface="Times New Roman" panose="02020603050405020304" pitchFamily="18" charset="0"/>
@@ -5514,220 +5800,10 @@
       </p:sp>
       <p:sp>
         <p:nvSpPr>
-          <p:cNvPr id="10" name="Content Placeholder 9">
-            <a:extLst>
-              <a:ext uri="{FF2B5EF4-FFF2-40B4-BE49-F238E27FC236}">
-                <a16:creationId xmlns:a16="http://schemas.microsoft.com/office/drawing/2014/main" id="{9456B888-8AEC-ECCD-B6F9-E50AC1304A45}"/>
-              </a:ext>
-            </a:extLst>
-          </p:cNvPr>
-          <p:cNvSpPr>
-            <a:spLocks noGrp="1"/>
-          </p:cNvSpPr>
-          <p:nvPr>
-            <p:ph sz="half" idx="1"/>
-          </p:nvPr>
-        </p:nvSpPr>
-        <p:spPr>
-          <a:xfrm>
-            <a:off x="1062872" y="1804219"/>
-            <a:ext cx="4846320" cy="3959352"/>
-          </a:xfrm>
-        </p:spPr>
-        <p:txBody>
-          <a:bodyPr/>
-          <a:lstStyle/>
-          <a:p>
-            <a:pPr marL="0" indent="0">
-              <a:buNone/>
-            </a:pPr>
-            <a:endParaRPr lang="en-US" dirty="0"/>
-          </a:p>
-          <a:p>
-            <a:pPr marL="0" indent="0">
-              <a:buNone/>
-            </a:pPr>
-            <a:endParaRPr lang="en-US" dirty="0"/>
-          </a:p>
-          <a:p>
-            <a:pPr marL="0" indent="0" algn="ctr">
-              <a:buNone/>
-            </a:pPr>
-            <a:r>
-              <a:rPr lang="en-US" dirty="0">
-                <a:latin typeface="Times New Roman" panose="02020603050405020304" pitchFamily="18" charset="0"/>
-                <a:cs typeface="Times New Roman" panose="02020603050405020304" pitchFamily="18" charset="0"/>
-              </a:rPr>
-              <a:t>Crucial for ensuring the correctness of systems especially in safety-critical applications</a:t>
-            </a:r>
-          </a:p>
-        </p:txBody>
-      </p:sp>
-      <p:sp>
-        <p:nvSpPr>
-          <p:cNvPr id="11" name="Content Placeholder 10">
-            <a:extLst>
-              <a:ext uri="{FF2B5EF4-FFF2-40B4-BE49-F238E27FC236}">
-                <a16:creationId xmlns:a16="http://schemas.microsoft.com/office/drawing/2014/main" id="{56A4C752-074A-576A-AB00-E0C524E68A04}"/>
-              </a:ext>
-            </a:extLst>
-          </p:cNvPr>
-          <p:cNvSpPr>
-            <a:spLocks noGrp="1"/>
-          </p:cNvSpPr>
-          <p:nvPr>
-            <p:ph sz="half" idx="2"/>
-          </p:nvPr>
-        </p:nvSpPr>
-        <p:spPr>
-          <a:xfrm>
-            <a:off x="6243480" y="1804219"/>
-            <a:ext cx="4846320" cy="3959351"/>
-          </a:xfrm>
-        </p:spPr>
-        <p:txBody>
-          <a:bodyPr/>
-          <a:lstStyle/>
-          <a:p>
-            <a:pPr marL="0" indent="0">
-              <a:buNone/>
-            </a:pPr>
-            <a:endParaRPr lang="en-US" dirty="0"/>
-          </a:p>
-          <a:p>
-            <a:pPr marL="0" indent="0" algn="ctr">
-              <a:buNone/>
-            </a:pPr>
-            <a:endParaRPr lang="en-US" dirty="0"/>
-          </a:p>
-          <a:p>
-            <a:pPr marL="0" indent="0" algn="ctr">
-              <a:buNone/>
-            </a:pPr>
-            <a:r>
-              <a:rPr lang="en-US" dirty="0">
-                <a:latin typeface="Times New Roman" panose="02020603050405020304" pitchFamily="18" charset="0"/>
-                <a:cs typeface="Times New Roman" panose="02020603050405020304" pitchFamily="18" charset="0"/>
-              </a:rPr>
-              <a:t>Two main types:                                        Model Checking and Theorem Proving       each use different approach to verify system properties </a:t>
-            </a:r>
-          </a:p>
-          <a:p>
-            <a:pPr marL="0" indent="0" algn="ctr">
-              <a:buNone/>
-            </a:pPr>
-            <a:endParaRPr lang="LID4096" dirty="0"/>
-          </a:p>
-        </p:txBody>
-      </p:sp>
-      <p:pic>
-        <p:nvPicPr>
-          <p:cNvPr id="19" name="Graphic 18" descr="Badge Tick1 with solid fill">
-            <a:extLst>
-              <a:ext uri="{FF2B5EF4-FFF2-40B4-BE49-F238E27FC236}">
-                <a16:creationId xmlns:a16="http://schemas.microsoft.com/office/drawing/2014/main" id="{F09D2522-99F4-6C18-190D-DD37091CA516}"/>
-              </a:ext>
-            </a:extLst>
-          </p:cNvPr>
-          <p:cNvPicPr>
-            <a:picLocks noChangeAspect="1"/>
-          </p:cNvPicPr>
-          <p:nvPr/>
-        </p:nvPicPr>
-        <p:blipFill>
-          <a:blip r:embed="rId2">
-            <a:extLst>
-              <a:ext uri="{96DAC541-7B7A-43D3-8B79-37D633B846F1}">
-                <asvg:svgBlip xmlns:asvg="http://schemas.microsoft.com/office/drawing/2016/SVG/main" r:embed="rId3"/>
-              </a:ext>
-            </a:extLst>
-          </a:blip>
-          <a:stretch>
-            <a:fillRect/>
-          </a:stretch>
-        </p:blipFill>
-        <p:spPr>
-          <a:xfrm>
-            <a:off x="3202125" y="2145888"/>
-            <a:ext cx="567813" cy="567813"/>
-          </a:xfrm>
-          <a:prstGeom prst="rect">
-            <a:avLst/>
-          </a:prstGeom>
-        </p:spPr>
-      </p:pic>
-      <p:pic>
-        <p:nvPicPr>
-          <p:cNvPr id="29" name="Graphic 28" descr="Toggle with solid fill">
-            <a:extLst>
-              <a:ext uri="{FF2B5EF4-FFF2-40B4-BE49-F238E27FC236}">
-                <a16:creationId xmlns:a16="http://schemas.microsoft.com/office/drawing/2014/main" id="{6A590B00-4F60-99E2-5724-FCC9D92EF79A}"/>
-              </a:ext>
-            </a:extLst>
-          </p:cNvPr>
-          <p:cNvPicPr>
-            <a:picLocks noChangeAspect="1"/>
-          </p:cNvPicPr>
-          <p:nvPr/>
-        </p:nvPicPr>
-        <p:blipFill>
-          <a:blip r:embed="rId4">
-            <a:extLst>
-              <a:ext uri="{96DAC541-7B7A-43D3-8B79-37D633B846F1}">
-                <asvg:svgBlip xmlns:asvg="http://schemas.microsoft.com/office/drawing/2016/SVG/main" r:embed="rId5"/>
-              </a:ext>
-            </a:extLst>
-          </a:blip>
-          <a:stretch>
-            <a:fillRect/>
-          </a:stretch>
-        </p:blipFill>
-        <p:spPr>
-          <a:xfrm>
-            <a:off x="8359578" y="2122734"/>
-            <a:ext cx="614123" cy="614123"/>
-          </a:xfrm>
-          <a:prstGeom prst="rect">
-            <a:avLst/>
-          </a:prstGeom>
-        </p:spPr>
-      </p:pic>
-    </p:spTree>
-    <p:extLst>
-      <p:ext uri="{BB962C8B-B14F-4D97-AF65-F5344CB8AC3E}">
-        <p14:creationId xmlns:p14="http://schemas.microsoft.com/office/powerpoint/2010/main" val="3156109269"/>
-      </p:ext>
-    </p:extLst>
-  </p:cSld>
-  <p:clrMapOvr>
-    <a:masterClrMapping/>
-  </p:clrMapOvr>
-</p:sld>
-</file>
-
-<file path=ppt/slides/slide3.xml><?xml version="1.0" encoding="utf-8"?>
-<p:sld xmlns:a="http://schemas.openxmlformats.org/drawingml/2006/main" xmlns:r="http://schemas.openxmlformats.org/officeDocument/2006/relationships" xmlns:p="http://schemas.openxmlformats.org/presentationml/2006/main">
-  <p:cSld>
-    <p:spTree>
-      <p:nvGrpSpPr>
-        <p:cNvPr id="1" name=""/>
-        <p:cNvGrpSpPr/>
-        <p:nvPr/>
-      </p:nvGrpSpPr>
-      <p:grpSpPr>
-        <a:xfrm>
-          <a:off x="0" y="0"/>
-          <a:ext cx="0" cy="0"/>
-          <a:chOff x="0" y="0"/>
-          <a:chExt cx="0" cy="0"/>
-        </a:xfrm>
-      </p:grpSpPr>
-      <p:sp>
-        <p:nvSpPr>
-          <p:cNvPr id="6" name="Content Placeholder 5">
-            <a:extLst>
-              <a:ext uri="{FF2B5EF4-FFF2-40B4-BE49-F238E27FC236}">
-                <a16:creationId xmlns:a16="http://schemas.microsoft.com/office/drawing/2014/main" id="{949A30F3-44FE-0999-615A-C4F100ED3EC7}"/>
+          <p:cNvPr id="8" name="Content Placeholder 2">
+            <a:extLst>
+              <a:ext uri="{FF2B5EF4-FFF2-40B4-BE49-F238E27FC236}">
+                <a16:creationId xmlns:a16="http://schemas.microsoft.com/office/drawing/2014/main" id="{EB76F6C3-C50B-E77E-DBA8-AED73AB62597}"/>
               </a:ext>
             </a:extLst>
           </p:cNvPr>
@@ -5740,92 +5816,61 @@
         </p:nvSpPr>
         <p:spPr>
           <a:xfrm>
-            <a:off x="1371600" y="1793453"/>
-            <a:ext cx="10241280" cy="3959352"/>
+            <a:off x="1371600" y="2112963"/>
+            <a:ext cx="10240963" cy="3959225"/>
           </a:xfrm>
         </p:spPr>
         <p:txBody>
-          <a:bodyPr/>
+          <a:bodyPr>
+            <a:normAutofit/>
+          </a:bodyPr>
           <a:lstStyle/>
           <a:p>
             <a:pPr marL="0" indent="0">
               <a:buNone/>
             </a:pPr>
-            <a:r>
-              <a:rPr lang="en-US" b="1" dirty="0">
-                <a:latin typeface="Times New Roman" panose="02020603050405020304" pitchFamily="18" charset="0"/>
-                <a:cs typeface="Times New Roman" panose="02020603050405020304" pitchFamily="18" charset="0"/>
-              </a:rPr>
-              <a:t>Specification – </a:t>
-            </a:r>
+            <a:endParaRPr lang="en-US" dirty="0">
+              <a:latin typeface="Times New Roman" panose="02020603050405020304" pitchFamily="18" charset="0"/>
+              <a:cs typeface="Times New Roman" panose="02020603050405020304" pitchFamily="18" charset="0"/>
+            </a:endParaRPr>
+          </a:p>
+          <a:p>
+            <a:pPr marL="0" indent="0">
+              <a:buNone/>
+            </a:pPr>
+            <a:endParaRPr lang="en-US" dirty="0">
+              <a:latin typeface="Times New Roman" panose="02020603050405020304" pitchFamily="18" charset="0"/>
+              <a:cs typeface="Times New Roman" panose="02020603050405020304" pitchFamily="18" charset="0"/>
+            </a:endParaRPr>
+          </a:p>
+          <a:p>
+            <a:pPr marL="0" indent="0">
+              <a:buNone/>
+            </a:pPr>
+            <a:endParaRPr lang="en-US" dirty="0">
+              <a:latin typeface="Times New Roman" panose="02020603050405020304" pitchFamily="18" charset="0"/>
+              <a:cs typeface="Times New Roman" panose="02020603050405020304" pitchFamily="18" charset="0"/>
+            </a:endParaRPr>
+          </a:p>
+          <a:p>
+            <a:pPr marL="0" indent="0">
+              <a:buNone/>
+            </a:pPr>
+            <a:endParaRPr lang="en-US" dirty="0">
+              <a:latin typeface="Times New Roman" panose="02020603050405020304" pitchFamily="18" charset="0"/>
+              <a:cs typeface="Times New Roman" panose="02020603050405020304" pitchFamily="18" charset="0"/>
+            </a:endParaRPr>
+          </a:p>
+          <a:p>
+            <a:pPr marL="0" indent="0">
+              <a:buNone/>
+            </a:pPr>
             <a:r>
               <a:rPr lang="en-US" dirty="0">
                 <a:latin typeface="Times New Roman" panose="02020603050405020304" pitchFamily="18" charset="0"/>
                 <a:cs typeface="Times New Roman" panose="02020603050405020304" pitchFamily="18" charset="0"/>
               </a:rPr>
-              <a:t>Formal description of desired system behavior</a:t>
-            </a:r>
-          </a:p>
-          <a:p>
-            <a:endParaRPr lang="en-US" dirty="0">
-              <a:latin typeface="Times New Roman" panose="02020603050405020304" pitchFamily="18" charset="0"/>
-              <a:cs typeface="Times New Roman" panose="02020603050405020304" pitchFamily="18" charset="0"/>
-            </a:endParaRPr>
-          </a:p>
-          <a:p>
-            <a:endParaRPr lang="en-US" dirty="0">
-              <a:latin typeface="Times New Roman" panose="02020603050405020304" pitchFamily="18" charset="0"/>
-              <a:cs typeface="Times New Roman" panose="02020603050405020304" pitchFamily="18" charset="0"/>
-            </a:endParaRPr>
-          </a:p>
-          <a:p>
-            <a:pPr marL="0" indent="0">
-              <a:buNone/>
-            </a:pPr>
-            <a:r>
-              <a:rPr lang="en-US" b="1" dirty="0">
-                <a:latin typeface="Times New Roman" panose="02020603050405020304" pitchFamily="18" charset="0"/>
-                <a:cs typeface="Times New Roman" panose="02020603050405020304" pitchFamily="18" charset="0"/>
-              </a:rPr>
-              <a:t>Model – </a:t>
-            </a:r>
-            <a:r>
-              <a:rPr lang="en-US" dirty="0">
-                <a:latin typeface="Times New Roman" panose="02020603050405020304" pitchFamily="18" charset="0"/>
-                <a:cs typeface="Times New Roman" panose="02020603050405020304" pitchFamily="18" charset="0"/>
-              </a:rPr>
-              <a:t>Mathematical representation of the system. states and transitions</a:t>
-            </a:r>
-          </a:p>
-          <a:p>
-            <a:endParaRPr lang="en-US" dirty="0">
-              <a:latin typeface="Times New Roman" panose="02020603050405020304" pitchFamily="18" charset="0"/>
-              <a:cs typeface="Times New Roman" panose="02020603050405020304" pitchFamily="18" charset="0"/>
-            </a:endParaRPr>
-          </a:p>
-          <a:p>
-            <a:endParaRPr lang="en-US" dirty="0">
-              <a:latin typeface="Times New Roman" panose="02020603050405020304" pitchFamily="18" charset="0"/>
-              <a:cs typeface="Times New Roman" panose="02020603050405020304" pitchFamily="18" charset="0"/>
-            </a:endParaRPr>
-          </a:p>
-          <a:p>
-            <a:pPr marL="0" indent="0">
-              <a:buNone/>
-            </a:pPr>
-            <a:r>
-              <a:rPr lang="en-US" b="1" dirty="0">
-                <a:latin typeface="Times New Roman" panose="02020603050405020304" pitchFamily="18" charset="0"/>
-                <a:cs typeface="Times New Roman" panose="02020603050405020304" pitchFamily="18" charset="0"/>
-              </a:rPr>
-              <a:t>Properties – </a:t>
-            </a:r>
-            <a:r>
-              <a:rPr lang="en-US" dirty="0">
-                <a:latin typeface="Times New Roman" panose="02020603050405020304" pitchFamily="18" charset="0"/>
-                <a:cs typeface="Times New Roman" panose="02020603050405020304" pitchFamily="18" charset="0"/>
-              </a:rPr>
-              <a:t>Specific claims or assertions about particular aspects of the system. Fairness, Liveness and Safety</a:t>
+              <a:t> </a:t>
             </a:r>
             <a:endParaRPr lang="LID4096" dirty="0">
               <a:latin typeface="Times New Roman" panose="02020603050405020304" pitchFamily="18" charset="0"/>
@@ -5836,193 +5881,10 @@
       </p:sp>
       <p:sp>
         <p:nvSpPr>
-          <p:cNvPr id="11" name="Title 1">
-            <a:extLst>
-              <a:ext uri="{FF2B5EF4-FFF2-40B4-BE49-F238E27FC236}">
-                <a16:creationId xmlns:a16="http://schemas.microsoft.com/office/drawing/2014/main" id="{0076F699-6989-5E39-ADF0-C2A778B060B3}"/>
-              </a:ext>
-            </a:extLst>
-          </p:cNvPr>
-          <p:cNvSpPr>
-            <a:spLocks noGrp="1"/>
-          </p:cNvSpPr>
-          <p:nvPr>
-            <p:ph type="title"/>
-          </p:nvPr>
-        </p:nvSpPr>
-        <p:spPr>
-          <a:xfrm>
-            <a:off x="0" y="636638"/>
-            <a:ext cx="12192000" cy="614123"/>
-          </a:xfrm>
-        </p:spPr>
-        <p:txBody>
-          <a:bodyPr>
-            <a:normAutofit/>
-          </a:bodyPr>
-          <a:lstStyle/>
-          <a:p>
-            <a:pPr algn="ctr"/>
-            <a:r>
-              <a:rPr lang="en-US" sz="3200" cap="none" spc="100" dirty="0">
-                <a:latin typeface="Times New Roman" panose="02020603050405020304" pitchFamily="18" charset="0"/>
-                <a:ea typeface="Cambria" panose="02040503050406030204" pitchFamily="18" charset="0"/>
-                <a:cs typeface="Times New Roman" panose="02020603050405020304" pitchFamily="18" charset="0"/>
-              </a:rPr>
-              <a:t>Key Concepts in Formal Verification</a:t>
-            </a:r>
-            <a:endParaRPr lang="LID4096" sz="3200" cap="none" spc="0" dirty="0">
-              <a:latin typeface="Cambria" panose="02040503050406030204" pitchFamily="18" charset="0"/>
-              <a:ea typeface="Cambria" panose="02040503050406030204" pitchFamily="18" charset="0"/>
-              <a:cs typeface="Times New Roman" panose="02020603050405020304" pitchFamily="18" charset="0"/>
-            </a:endParaRPr>
-          </a:p>
-        </p:txBody>
-      </p:sp>
-      <p:pic>
-        <p:nvPicPr>
-          <p:cNvPr id="19" name="Graphic 18" descr="Settings with solid fill">
-            <a:extLst>
-              <a:ext uri="{FF2B5EF4-FFF2-40B4-BE49-F238E27FC236}">
-                <a16:creationId xmlns:a16="http://schemas.microsoft.com/office/drawing/2014/main" id="{7E7A054B-C096-5A8E-AC33-AC793BF1B165}"/>
-              </a:ext>
-            </a:extLst>
-          </p:cNvPr>
-          <p:cNvPicPr>
-            <a:picLocks noChangeAspect="1"/>
-          </p:cNvPicPr>
-          <p:nvPr/>
-        </p:nvPicPr>
-        <p:blipFill>
-          <a:blip r:embed="rId2">
-            <a:extLst>
-              <a:ext uri="{96DAC541-7B7A-43D3-8B79-37D633B846F1}">
-                <asvg:svgBlip xmlns:asvg="http://schemas.microsoft.com/office/drawing/2016/SVG/main" r:embed="rId3"/>
-              </a:ext>
-            </a:extLst>
-          </a:blip>
-          <a:stretch>
-            <a:fillRect/>
-          </a:stretch>
-        </p:blipFill>
-        <p:spPr>
-          <a:xfrm>
-            <a:off x="668985" y="4790768"/>
-            <a:ext cx="614124" cy="614124"/>
-          </a:xfrm>
-          <a:prstGeom prst="rect">
-            <a:avLst/>
-          </a:prstGeom>
-        </p:spPr>
-      </p:pic>
-      <p:pic>
-        <p:nvPicPr>
-          <p:cNvPr id="21" name="Graphic 20" descr="Clipboard Mixed with solid fill">
-            <a:extLst>
-              <a:ext uri="{FF2B5EF4-FFF2-40B4-BE49-F238E27FC236}">
-                <a16:creationId xmlns:a16="http://schemas.microsoft.com/office/drawing/2014/main" id="{C7AD57B2-3202-737E-6C49-83D6388DD5CA}"/>
-              </a:ext>
-            </a:extLst>
-          </p:cNvPr>
-          <p:cNvPicPr>
-            <a:picLocks noChangeAspect="1"/>
-          </p:cNvPicPr>
-          <p:nvPr/>
-        </p:nvPicPr>
-        <p:blipFill>
-          <a:blip r:embed="rId4">
-            <a:extLst>
-              <a:ext uri="{96DAC541-7B7A-43D3-8B79-37D633B846F1}">
-                <asvg:svgBlip xmlns:asvg="http://schemas.microsoft.com/office/drawing/2016/SVG/main" r:embed="rId5"/>
-              </a:ext>
-            </a:extLst>
-          </a:blip>
-          <a:stretch>
-            <a:fillRect/>
-          </a:stretch>
-        </p:blipFill>
-        <p:spPr>
-          <a:xfrm>
-            <a:off x="668986" y="1674731"/>
-            <a:ext cx="614123" cy="614123"/>
-          </a:xfrm>
-          <a:prstGeom prst="rect">
-            <a:avLst/>
-          </a:prstGeom>
-        </p:spPr>
-      </p:pic>
-      <p:pic>
-        <p:nvPicPr>
-          <p:cNvPr id="25" name="Graphic 24" descr="Decision chart with solid fill">
-            <a:extLst>
-              <a:ext uri="{FF2B5EF4-FFF2-40B4-BE49-F238E27FC236}">
-                <a16:creationId xmlns:a16="http://schemas.microsoft.com/office/drawing/2014/main" id="{53EBD31D-FE66-F93D-BBBB-BE49AD461CF9}"/>
-              </a:ext>
-            </a:extLst>
-          </p:cNvPr>
-          <p:cNvPicPr>
-            <a:picLocks noChangeAspect="1"/>
-          </p:cNvPicPr>
-          <p:nvPr/>
-        </p:nvPicPr>
-        <p:blipFill>
-          <a:blip r:embed="rId6">
-            <a:extLst>
-              <a:ext uri="{96DAC541-7B7A-43D3-8B79-37D633B846F1}">
-                <asvg:svgBlip xmlns:asvg="http://schemas.microsoft.com/office/drawing/2016/SVG/main" r:embed="rId7"/>
-              </a:ext>
-            </a:extLst>
-          </a:blip>
-          <a:stretch>
-            <a:fillRect/>
-          </a:stretch>
-        </p:blipFill>
-        <p:spPr>
-          <a:xfrm>
-            <a:off x="668985" y="3121937"/>
-            <a:ext cx="614125" cy="614125"/>
-          </a:xfrm>
-          <a:prstGeom prst="rect">
-            <a:avLst/>
-          </a:prstGeom>
-        </p:spPr>
-      </p:pic>
-    </p:spTree>
-    <p:extLst>
-      <p:ext uri="{BB962C8B-B14F-4D97-AF65-F5344CB8AC3E}">
-        <p14:creationId xmlns:p14="http://schemas.microsoft.com/office/powerpoint/2010/main" val="1620585352"/>
-      </p:ext>
-    </p:extLst>
-  </p:cSld>
-  <p:clrMapOvr>
-    <a:masterClrMapping/>
-  </p:clrMapOvr>
-</p:sld>
-</file>
-
-<file path=ppt/slides/slide4.xml><?xml version="1.0" encoding="utf-8"?>
-<p:sld xmlns:a="http://schemas.openxmlformats.org/drawingml/2006/main" xmlns:r="http://schemas.openxmlformats.org/officeDocument/2006/relationships" xmlns:p="http://schemas.openxmlformats.org/presentationml/2006/main">
-  <p:cSld>
-    <p:spTree>
-      <p:nvGrpSpPr>
-        <p:cNvPr id="1" name=""/>
-        <p:cNvGrpSpPr/>
-        <p:nvPr/>
-      </p:nvGrpSpPr>
-      <p:grpSpPr>
-        <a:xfrm>
-          <a:off x="0" y="0"/>
-          <a:ext cx="0" cy="0"/>
-          <a:chOff x="0" y="0"/>
-          <a:chExt cx="0" cy="0"/>
-        </a:xfrm>
-      </p:grpSpPr>
-      <p:sp>
-        <p:nvSpPr>
-          <p:cNvPr id="4" name="Title 1">
-            <a:extLst>
-              <a:ext uri="{FF2B5EF4-FFF2-40B4-BE49-F238E27FC236}">
-                <a16:creationId xmlns:a16="http://schemas.microsoft.com/office/drawing/2014/main" id="{0493E63A-5EB2-B3B1-D041-58FF7583EA80}"/>
+          <p:cNvPr id="9" name="Content Placeholder 2">
+            <a:extLst>
+              <a:ext uri="{FF2B5EF4-FFF2-40B4-BE49-F238E27FC236}">
+                <a16:creationId xmlns:a16="http://schemas.microsoft.com/office/drawing/2014/main" id="{802B9479-F8BF-ACC1-31F6-827AE6E6C534}"/>
               </a:ext>
             </a:extLst>
           </p:cNvPr>
@@ -6033,104 +5895,7 @@
         </p:nvSpPr>
         <p:spPr>
           <a:xfrm>
-            <a:off x="0" y="636638"/>
-            <a:ext cx="12192000" cy="614123"/>
-          </a:xfrm>
-          <a:prstGeom prst="rect">
-            <a:avLst/>
-          </a:prstGeom>
-        </p:spPr>
-        <p:txBody>
-          <a:bodyPr vert="horz" lIns="0" tIns="0" rIns="0" bIns="0" rtlCol="0" anchor="b">
-            <a:normAutofit/>
-          </a:bodyPr>
-          <a:lstStyle>
-            <a:lvl1pPr algn="l" defTabSz="914400" rtl="0" eaLnBrk="1" latinLnBrk="0" hangingPunct="1">
-              <a:lnSpc>
-                <a:spcPct val="100000"/>
-              </a:lnSpc>
-              <a:spcBef>
-                <a:spcPct val="0"/>
-              </a:spcBef>
-              <a:buNone/>
-              <a:defRPr sz="3600" b="1" i="0" kern="1200" cap="all" spc="700" baseline="0">
-                <a:solidFill>
-                  <a:schemeClr val="tx1"/>
-                </a:solidFill>
-                <a:latin typeface="+mj-lt"/>
-                <a:ea typeface="+mj-ea"/>
-                <a:cs typeface="+mj-cs"/>
-              </a:defRPr>
-            </a:lvl1pPr>
-          </a:lstStyle>
-          <a:p>
-            <a:pPr algn="ctr"/>
-            <a:r>
-              <a:rPr lang="en-US" sz="3200" cap="none" spc="100" dirty="0">
-                <a:latin typeface="Times New Roman" panose="02020603050405020304" pitchFamily="18" charset="0"/>
-                <a:ea typeface="Cambria" panose="02040503050406030204" pitchFamily="18" charset="0"/>
-                <a:cs typeface="Times New Roman" panose="02020603050405020304" pitchFamily="18" charset="0"/>
-              </a:rPr>
-              <a:t>Challenges in Formal Verification of Neural Networks</a:t>
-            </a:r>
-            <a:endParaRPr lang="LID4096" sz="3200" cap="none" spc="0" dirty="0">
-              <a:latin typeface="Cambria" panose="02040503050406030204" pitchFamily="18" charset="0"/>
-              <a:ea typeface="Cambria" panose="02040503050406030204" pitchFamily="18" charset="0"/>
-              <a:cs typeface="Times New Roman" panose="02020603050405020304" pitchFamily="18" charset="0"/>
-            </a:endParaRPr>
-          </a:p>
-        </p:txBody>
-      </p:sp>
-      <p:sp>
-        <p:nvSpPr>
-          <p:cNvPr id="6" name="Content Placeholder 2">
-            <a:extLst>
-              <a:ext uri="{FF2B5EF4-FFF2-40B4-BE49-F238E27FC236}">
-                <a16:creationId xmlns:a16="http://schemas.microsoft.com/office/drawing/2014/main" id="{EBD9DEE8-0D4D-F110-C67B-C3C31F3C73DF}"/>
-              </a:ext>
-            </a:extLst>
-          </p:cNvPr>
-          <p:cNvSpPr>
-            <a:spLocks noGrp="1"/>
-          </p:cNvSpPr>
-          <p:nvPr>
-            <p:ph idx="1"/>
-          </p:nvPr>
-        </p:nvSpPr>
-        <p:spPr>
-          <a:xfrm>
             <a:off x="1371600" y="2112264"/>
-            <a:ext cx="10241280" cy="3959352"/>
-          </a:xfrm>
-        </p:spPr>
-        <p:txBody>
-          <a:bodyPr/>
-          <a:lstStyle/>
-          <a:p>
-            <a:endParaRPr lang="he-IL" dirty="0"/>
-          </a:p>
-          <a:p>
-            <a:endParaRPr lang="LID4096" dirty="0"/>
-          </a:p>
-        </p:txBody>
-      </p:sp>
-      <p:sp>
-        <p:nvSpPr>
-          <p:cNvPr id="7" name="Content Placeholder 5">
-            <a:extLst>
-              <a:ext uri="{FF2B5EF4-FFF2-40B4-BE49-F238E27FC236}">
-                <a16:creationId xmlns:a16="http://schemas.microsoft.com/office/drawing/2014/main" id="{CCCE1DB7-AAAA-88FA-9E54-3D4115CD1586}"/>
-              </a:ext>
-            </a:extLst>
-          </p:cNvPr>
-          <p:cNvSpPr txBox="1">
-            <a:spLocks/>
-          </p:cNvSpPr>
-          <p:nvPr/>
-        </p:nvSpPr>
-        <p:spPr>
-          <a:xfrm>
-            <a:off x="1371600" y="1793453"/>
             <a:ext cx="10241280" cy="3959352"/>
           </a:xfrm>
           <a:prstGeom prst="rect">
@@ -6307,98 +6072,43 @@
           </a:lstStyle>
           <a:p>
             <a:pPr marL="0" indent="0">
+              <a:buFont typeface="Arial" panose="020B0604020202020204" pitchFamily="34" charset="0"/>
               <a:buNone/>
             </a:pPr>
             <a:r>
-              <a:rPr lang="en-US" b="1" dirty="0">
+              <a:rPr lang="en-US" dirty="0" err="1">
                 <a:latin typeface="Times New Roman" panose="02020603050405020304" pitchFamily="18" charset="0"/>
                 <a:cs typeface="Times New Roman" panose="02020603050405020304" pitchFamily="18" charset="0"/>
               </a:rPr>
-              <a:t>Scalability –</a:t>
-            </a:r>
-            <a:r>
-              <a:rPr lang="he-IL" b="1" dirty="0">
+              <a:t>kcsdlkvmsdklvmsdl</a:t>
+            </a:r>
+            <a:endParaRPr lang="en-US" dirty="0">
+              <a:latin typeface="Times New Roman" panose="02020603050405020304" pitchFamily="18" charset="0"/>
+              <a:cs typeface="Times New Roman" panose="02020603050405020304" pitchFamily="18" charset="0"/>
+            </a:endParaRPr>
+          </a:p>
+          <a:p>
+            <a:pPr marL="0" indent="0">
+              <a:buFont typeface="Arial" panose="020B0604020202020204" pitchFamily="34" charset="0"/>
+              <a:buNone/>
+            </a:pPr>
+            <a:endParaRPr lang="en-US" dirty="0">
+              <a:latin typeface="Times New Roman" panose="02020603050405020304" pitchFamily="18" charset="0"/>
+              <a:cs typeface="Times New Roman" panose="02020603050405020304" pitchFamily="18" charset="0"/>
+            </a:endParaRPr>
+          </a:p>
+          <a:p>
+            <a:pPr marL="0" indent="0">
+              <a:buFont typeface="Arial" panose="020B0604020202020204" pitchFamily="34" charset="0"/>
+              <a:buNone/>
+            </a:pPr>
+            <a:r>
+              <a:rPr lang="en-US" dirty="0">
                 <a:latin typeface="Times New Roman" panose="02020603050405020304" pitchFamily="18" charset="0"/>
                 <a:cs typeface="Times New Roman" panose="02020603050405020304" pitchFamily="18" charset="0"/>
               </a:rPr>
               <a:t> </a:t>
             </a:r>
-            <a:r>
-              <a:rPr lang="en-US" dirty="0">
-                <a:latin typeface="Times New Roman" panose="02020603050405020304" pitchFamily="18" charset="0"/>
-                <a:cs typeface="Times New Roman" panose="02020603050405020304" pitchFamily="18" charset="0"/>
-              </a:rPr>
-              <a:t>large number of parameters and complex architectures</a:t>
-            </a:r>
-          </a:p>
-          <a:p>
-            <a:endParaRPr lang="he-IL" dirty="0">
-              <a:latin typeface="Times New Roman" panose="02020603050405020304" pitchFamily="18" charset="0"/>
-              <a:cs typeface="Times New Roman" panose="02020603050405020304" pitchFamily="18" charset="0"/>
-            </a:endParaRPr>
-          </a:p>
-          <a:p>
-            <a:endParaRPr lang="en-US" dirty="0">
-              <a:latin typeface="Times New Roman" panose="02020603050405020304" pitchFamily="18" charset="0"/>
-              <a:cs typeface="Times New Roman" panose="02020603050405020304" pitchFamily="18" charset="0"/>
-            </a:endParaRPr>
-          </a:p>
-          <a:p>
-            <a:pPr marL="0" indent="0">
-              <a:buNone/>
-            </a:pPr>
-            <a:r>
-              <a:rPr lang="en-US" b="1" dirty="0">
-                <a:latin typeface="Times New Roman" panose="02020603050405020304" pitchFamily="18" charset="0"/>
-                <a:cs typeface="Times New Roman" panose="02020603050405020304" pitchFamily="18" charset="0"/>
-              </a:rPr>
-              <a:t>Non-linearities –</a:t>
-            </a:r>
-            <a:r>
-              <a:rPr lang="he-IL" b="1" dirty="0">
-                <a:latin typeface="Times New Roman" panose="02020603050405020304" pitchFamily="18" charset="0"/>
-                <a:cs typeface="Times New Roman" panose="02020603050405020304" pitchFamily="18" charset="0"/>
-              </a:rPr>
-              <a:t> </a:t>
-            </a:r>
-            <a:r>
-              <a:rPr lang="en-US" dirty="0">
-                <a:latin typeface="Times New Roman" panose="02020603050405020304" pitchFamily="18" charset="0"/>
-                <a:cs typeface="Times New Roman" panose="02020603050405020304" pitchFamily="18" charset="0"/>
-              </a:rPr>
-              <a:t>activation functions complicates the verification </a:t>
-            </a:r>
-          </a:p>
-          <a:p>
-            <a:endParaRPr lang="he-IL" dirty="0">
-              <a:latin typeface="Times New Roman" panose="02020603050405020304" pitchFamily="18" charset="0"/>
-              <a:cs typeface="Times New Roman" panose="02020603050405020304" pitchFamily="18" charset="0"/>
-            </a:endParaRPr>
-          </a:p>
-          <a:p>
-            <a:endParaRPr lang="en-US" dirty="0">
-              <a:latin typeface="Times New Roman" panose="02020603050405020304" pitchFamily="18" charset="0"/>
-              <a:cs typeface="Times New Roman" panose="02020603050405020304" pitchFamily="18" charset="0"/>
-            </a:endParaRPr>
-          </a:p>
-          <a:p>
-            <a:pPr marL="0" indent="0">
-              <a:buNone/>
-            </a:pPr>
-            <a:r>
-              <a:rPr lang="en-US" b="1" dirty="0">
-                <a:latin typeface="Times New Roman" panose="02020603050405020304" pitchFamily="18" charset="0"/>
-                <a:cs typeface="Times New Roman" panose="02020603050405020304" pitchFamily="18" charset="0"/>
-              </a:rPr>
-              <a:t>Robustness Verification – </a:t>
-            </a:r>
-            <a:r>
-              <a:rPr lang="en-US" dirty="0">
-                <a:latin typeface="Times New Roman" panose="02020603050405020304" pitchFamily="18" charset="0"/>
-                <a:cs typeface="Times New Roman" panose="02020603050405020304" pitchFamily="18" charset="0"/>
-              </a:rPr>
-              <a:t>Ensuring NN are robust against adversarial attack</a:t>
-            </a:r>
             <a:endParaRPr lang="LID4096" dirty="0">
               <a:latin typeface="Times New Roman" panose="02020603050405020304" pitchFamily="18" charset="0"/>
               <a:cs typeface="Times New Roman" panose="02020603050405020304" pitchFamily="18" charset="0"/>
@@ -6406,118 +6116,10 @@
           </a:p>
         </p:txBody>
       </p:sp>
-      <p:pic>
-        <p:nvPicPr>
-          <p:cNvPr id="22" name="Graphic 21" descr="Periodic Graph with solid fill">
-            <a:extLst>
-              <a:ext uri="{FF2B5EF4-FFF2-40B4-BE49-F238E27FC236}">
-                <a16:creationId xmlns:a16="http://schemas.microsoft.com/office/drawing/2014/main" id="{25E35949-452C-FCDA-0447-CA79C0C31396}"/>
-              </a:ext>
-            </a:extLst>
-          </p:cNvPr>
-          <p:cNvPicPr>
-            <a:picLocks noChangeAspect="1"/>
-          </p:cNvPicPr>
-          <p:nvPr/>
-        </p:nvPicPr>
-        <p:blipFill>
-          <a:blip r:embed="rId2">
-            <a:extLst>
-              <a:ext uri="{96DAC541-7B7A-43D3-8B79-37D633B846F1}">
-                <asvg:svgBlip xmlns:asvg="http://schemas.microsoft.com/office/drawing/2016/SVG/main" r:embed="rId3"/>
-              </a:ext>
-            </a:extLst>
-          </a:blip>
-          <a:stretch>
-            <a:fillRect/>
-          </a:stretch>
-        </p:blipFill>
-        <p:spPr>
-          <a:xfrm>
-            <a:off x="727979" y="3141602"/>
-            <a:ext cx="614123" cy="614123"/>
-          </a:xfrm>
-          <a:prstGeom prst="rect">
-            <a:avLst/>
-          </a:prstGeom>
-        </p:spPr>
-      </p:pic>
-      <p:pic>
-        <p:nvPicPr>
-          <p:cNvPr id="11" name="Graphic 10" descr="Stopwatch 66% with solid fill">
-            <a:extLst>
-              <a:ext uri="{FF2B5EF4-FFF2-40B4-BE49-F238E27FC236}">
-                <a16:creationId xmlns:a16="http://schemas.microsoft.com/office/drawing/2014/main" id="{0F9AD281-957C-C851-EDA7-E04BA24ED508}"/>
-              </a:ext>
-            </a:extLst>
-          </p:cNvPr>
-          <p:cNvPicPr>
-            <a:picLocks noChangeAspect="1"/>
-          </p:cNvPicPr>
-          <p:nvPr/>
-        </p:nvPicPr>
-        <p:blipFill>
-          <a:blip r:embed="rId4">
-            <a:extLst>
-              <a:ext uri="{96DAC541-7B7A-43D3-8B79-37D633B846F1}">
-                <asvg:svgBlip xmlns:asvg="http://schemas.microsoft.com/office/drawing/2016/SVG/main" r:embed="rId5"/>
-              </a:ext>
-            </a:extLst>
-          </a:blip>
-          <a:stretch>
-            <a:fillRect/>
-          </a:stretch>
-        </p:blipFill>
-        <p:spPr>
-          <a:xfrm>
-            <a:off x="727980" y="1675469"/>
-            <a:ext cx="614123" cy="614123"/>
-          </a:xfrm>
-          <a:prstGeom prst="rect">
-            <a:avLst/>
-          </a:prstGeom>
-        </p:spPr>
-      </p:pic>
-      <p:pic>
-        <p:nvPicPr>
-          <p:cNvPr id="13" name="Graphic 12" descr="Lock with solid fill">
-            <a:extLst>
-              <a:ext uri="{FF2B5EF4-FFF2-40B4-BE49-F238E27FC236}">
-                <a16:creationId xmlns:a16="http://schemas.microsoft.com/office/drawing/2014/main" id="{BD7EAD20-6D3B-1213-024B-B9B8D262CFB4}"/>
-              </a:ext>
-            </a:extLst>
-          </p:cNvPr>
-          <p:cNvPicPr>
-            <a:picLocks noChangeAspect="1"/>
-          </p:cNvPicPr>
-          <p:nvPr/>
-        </p:nvPicPr>
-        <p:blipFill>
-          <a:blip r:embed="rId6">
-            <a:extLst>
-              <a:ext uri="{96DAC541-7B7A-43D3-8B79-37D633B846F1}">
-                <asvg:svgBlip xmlns:asvg="http://schemas.microsoft.com/office/drawing/2016/SVG/main" r:embed="rId7"/>
-              </a:ext>
-            </a:extLst>
-          </a:blip>
-          <a:stretch>
-            <a:fillRect/>
-          </a:stretch>
-        </p:blipFill>
-        <p:spPr>
-          <a:xfrm>
-            <a:off x="727979" y="4637231"/>
-            <a:ext cx="614124" cy="614124"/>
-          </a:xfrm>
-          <a:prstGeom prst="rect">
-            <a:avLst/>
-          </a:prstGeom>
-        </p:spPr>
-      </p:pic>
     </p:spTree>
     <p:extLst>
       <p:ext uri="{BB962C8B-B14F-4D97-AF65-F5344CB8AC3E}">
-        <p14:creationId xmlns:p14="http://schemas.microsoft.com/office/powerpoint/2010/main" val="2551144604"/>
+        <p14:creationId xmlns:p14="http://schemas.microsoft.com/office/powerpoint/2010/main" val="2363500313"/>
       </p:ext>
     </p:extLst>
   </p:cSld>
@@ -6527,7 +6129,7 @@
 </p:sld>
 </file>
 
-<file path=ppt/slides/slide5.xml><?xml version="1.0" encoding="utf-8"?>
+<file path=ppt/slides/slide11.xml><?xml version="1.0" encoding="utf-8"?>
 <p:sld xmlns:a="http://schemas.openxmlformats.org/drawingml/2006/main" xmlns:r="http://schemas.openxmlformats.org/officeDocument/2006/relationships" xmlns:p="http://schemas.openxmlformats.org/presentationml/2006/main">
   <p:cSld>
     <p:spTree>
@@ -6549,7 +6151,1285 @@
           <p:cNvPr id="4" name="Title 1">
             <a:extLst>
               <a:ext uri="{FF2B5EF4-FFF2-40B4-BE49-F238E27FC236}">
-                <a16:creationId xmlns:a16="http://schemas.microsoft.com/office/drawing/2014/main" id="{9F6A0F8F-A975-8428-A8B2-B42F6EE8FEE9}"/>
+                <a16:creationId xmlns:a16="http://schemas.microsoft.com/office/drawing/2014/main" id="{76A60C79-0856-34D5-14AF-479F6BA94AB6}"/>
+              </a:ext>
+            </a:extLst>
+          </p:cNvPr>
+          <p:cNvSpPr>
+            <a:spLocks noGrp="1"/>
+          </p:cNvSpPr>
+          <p:nvPr>
+            <p:ph type="title"/>
+          </p:nvPr>
+        </p:nvSpPr>
+        <p:spPr>
+          <a:xfrm>
+            <a:off x="0" y="636638"/>
+            <a:ext cx="12192000" cy="614123"/>
+          </a:xfrm>
+        </p:spPr>
+        <p:txBody>
+          <a:bodyPr/>
+          <a:lstStyle/>
+          <a:p>
+            <a:pPr algn="ctr"/>
+            <a:r>
+              <a:rPr lang="en-US" cap="none" spc="100" dirty="0">
+                <a:latin typeface="Times New Roman" panose="02020603050405020304" pitchFamily="18" charset="0"/>
+                <a:ea typeface="Cambria" panose="02040503050406030204" pitchFamily="18" charset="0"/>
+                <a:cs typeface="Times New Roman" panose="02020603050405020304" pitchFamily="18" charset="0"/>
+              </a:rPr>
+              <a:t>Code – The Agent</a:t>
+            </a:r>
+            <a:endParaRPr lang="LID4096" cap="none" spc="0" dirty="0">
+              <a:latin typeface="Cambria" panose="02040503050406030204" pitchFamily="18" charset="0"/>
+              <a:ea typeface="Cambria" panose="02040503050406030204" pitchFamily="18" charset="0"/>
+              <a:cs typeface="Times New Roman" panose="02020603050405020304" pitchFamily="18" charset="0"/>
+            </a:endParaRPr>
+          </a:p>
+        </p:txBody>
+      </p:sp>
+      <p:sp>
+        <p:nvSpPr>
+          <p:cNvPr id="5" name="Content Placeholder 2">
+            <a:extLst>
+              <a:ext uri="{FF2B5EF4-FFF2-40B4-BE49-F238E27FC236}">
+                <a16:creationId xmlns:a16="http://schemas.microsoft.com/office/drawing/2014/main" id="{7CD991A2-D38C-77B0-A024-5691AA6BE282}"/>
+              </a:ext>
+            </a:extLst>
+          </p:cNvPr>
+          <p:cNvSpPr>
+            <a:spLocks noGrp="1"/>
+          </p:cNvSpPr>
+          <p:nvPr>
+            <p:ph idx="1"/>
+          </p:nvPr>
+        </p:nvSpPr>
+        <p:spPr>
+          <a:xfrm>
+            <a:off x="1371600" y="2112264"/>
+            <a:ext cx="10241280" cy="3959352"/>
+          </a:xfrm>
+        </p:spPr>
+        <p:txBody>
+          <a:bodyPr>
+            <a:normAutofit/>
+          </a:bodyPr>
+          <a:lstStyle/>
+          <a:p>
+            <a:pPr marL="0" indent="0">
+              <a:buNone/>
+            </a:pPr>
+            <a:r>
+              <a:rPr lang="en-US" b="1" dirty="0">
+                <a:latin typeface="Times New Roman" panose="02020603050405020304" pitchFamily="18" charset="0"/>
+                <a:cs typeface="Times New Roman" panose="02020603050405020304" pitchFamily="18" charset="0"/>
+              </a:rPr>
+              <a:t>Learning – </a:t>
+            </a:r>
+            <a:r>
+              <a:rPr lang="en-US" dirty="0">
+                <a:latin typeface="Times New Roman" panose="02020603050405020304" pitchFamily="18" charset="0"/>
+                <a:cs typeface="Times New Roman" panose="02020603050405020304" pitchFamily="18" charset="0"/>
+              </a:rPr>
+              <a:t>Use previous steps to adjust model parameters</a:t>
+            </a:r>
+            <a:endParaRPr lang="en-US" b="1" dirty="0">
+              <a:latin typeface="Times New Roman" panose="02020603050405020304" pitchFamily="18" charset="0"/>
+              <a:cs typeface="Times New Roman" panose="02020603050405020304" pitchFamily="18" charset="0"/>
+            </a:endParaRPr>
+          </a:p>
+          <a:p>
+            <a:pPr marL="0" indent="0">
+              <a:buNone/>
+            </a:pPr>
+            <a:endParaRPr lang="en-US" b="1" dirty="0">
+              <a:latin typeface="Times New Roman" panose="02020603050405020304" pitchFamily="18" charset="0"/>
+              <a:cs typeface="Times New Roman" panose="02020603050405020304" pitchFamily="18" charset="0"/>
+            </a:endParaRPr>
+          </a:p>
+          <a:p>
+            <a:pPr marL="0" indent="0">
+              <a:buNone/>
+            </a:pPr>
+            <a:r>
+              <a:rPr lang="en-US" b="1" dirty="0">
+                <a:latin typeface="Times New Roman" panose="02020603050405020304" pitchFamily="18" charset="0"/>
+                <a:cs typeface="Times New Roman" panose="02020603050405020304" pitchFamily="18" charset="0"/>
+              </a:rPr>
+              <a:t>Stability – </a:t>
+            </a:r>
+            <a:r>
+              <a:rPr lang="en-US" dirty="0">
+                <a:latin typeface="Times New Roman" panose="02020603050405020304" pitchFamily="18" charset="0"/>
+                <a:cs typeface="Times New Roman" panose="02020603050405020304" pitchFamily="18" charset="0"/>
+              </a:rPr>
+              <a:t>Using target model and Prioritized replay to speedup the convergence</a:t>
+            </a:r>
+          </a:p>
+          <a:p>
+            <a:pPr marL="0" indent="0">
+              <a:buNone/>
+            </a:pPr>
+            <a:endParaRPr lang="en-US" b="1" dirty="0">
+              <a:latin typeface="Times New Roman" panose="02020603050405020304" pitchFamily="18" charset="0"/>
+              <a:cs typeface="Times New Roman" panose="02020603050405020304" pitchFamily="18" charset="0"/>
+            </a:endParaRPr>
+          </a:p>
+          <a:p>
+            <a:pPr marL="0" indent="0">
+              <a:buNone/>
+            </a:pPr>
+            <a:r>
+              <a:rPr lang="en-US" b="1" dirty="0">
+                <a:latin typeface="Times New Roman" panose="02020603050405020304" pitchFamily="18" charset="0"/>
+                <a:cs typeface="Times New Roman" panose="02020603050405020304" pitchFamily="18" charset="0"/>
+              </a:rPr>
+              <a:t>Exploration – </a:t>
+            </a:r>
+            <a:r>
+              <a:rPr lang="en-US" dirty="0">
+                <a:latin typeface="Times New Roman" panose="02020603050405020304" pitchFamily="18" charset="0"/>
+                <a:cs typeface="Times New Roman" panose="02020603050405020304" pitchFamily="18" charset="0"/>
+              </a:rPr>
+              <a:t>Decay slowly the exploration steps</a:t>
+            </a:r>
+            <a:endParaRPr lang="en-US" b="1" dirty="0">
+              <a:latin typeface="Times New Roman" panose="02020603050405020304" pitchFamily="18" charset="0"/>
+              <a:cs typeface="Times New Roman" panose="02020603050405020304" pitchFamily="18" charset="0"/>
+            </a:endParaRPr>
+          </a:p>
+          <a:p>
+            <a:pPr marL="0" indent="0">
+              <a:buNone/>
+            </a:pPr>
+            <a:endParaRPr lang="en-US" b="1" dirty="0">
+              <a:latin typeface="Times New Roman" panose="02020603050405020304" pitchFamily="18" charset="0"/>
+              <a:cs typeface="Times New Roman" panose="02020603050405020304" pitchFamily="18" charset="0"/>
+            </a:endParaRPr>
+          </a:p>
+          <a:p>
+            <a:pPr marL="0" indent="0">
+              <a:buNone/>
+            </a:pPr>
+            <a:r>
+              <a:rPr lang="en-US" b="1" dirty="0">
+                <a:latin typeface="Times New Roman" panose="02020603050405020304" pitchFamily="18" charset="0"/>
+                <a:cs typeface="Times New Roman" panose="02020603050405020304" pitchFamily="18" charset="0"/>
+              </a:rPr>
+              <a:t>ONNX – </a:t>
+            </a:r>
+            <a:r>
+              <a:rPr lang="en-US" dirty="0">
+                <a:latin typeface="Times New Roman" panose="02020603050405020304" pitchFamily="18" charset="0"/>
+                <a:cs typeface="Times New Roman" panose="02020603050405020304" pitchFamily="18" charset="0"/>
+              </a:rPr>
+              <a:t>Export model to ONNX format</a:t>
+            </a:r>
+            <a:endParaRPr lang="LID4096" dirty="0">
+              <a:latin typeface="Times New Roman" panose="02020603050405020304" pitchFamily="18" charset="0"/>
+              <a:cs typeface="Times New Roman" panose="02020603050405020304" pitchFamily="18" charset="0"/>
+            </a:endParaRPr>
+          </a:p>
+        </p:txBody>
+      </p:sp>
+    </p:spTree>
+    <p:extLst>
+      <p:ext uri="{BB962C8B-B14F-4D97-AF65-F5344CB8AC3E}">
+        <p14:creationId xmlns:p14="http://schemas.microsoft.com/office/powerpoint/2010/main" val="1391134809"/>
+      </p:ext>
+    </p:extLst>
+  </p:cSld>
+  <p:clrMapOvr>
+    <a:masterClrMapping/>
+  </p:clrMapOvr>
+</p:sld>
+</file>
+
+<file path=ppt/slides/slide12.xml><?xml version="1.0" encoding="utf-8"?>
+<p:sld xmlns:a="http://schemas.openxmlformats.org/drawingml/2006/main" xmlns:r="http://schemas.openxmlformats.org/officeDocument/2006/relationships" xmlns:p="http://schemas.openxmlformats.org/presentationml/2006/main">
+  <p:cSld>
+    <p:spTree>
+      <p:nvGrpSpPr>
+        <p:cNvPr id="1" name=""/>
+        <p:cNvGrpSpPr/>
+        <p:nvPr/>
+      </p:nvGrpSpPr>
+      <p:grpSpPr>
+        <a:xfrm>
+          <a:off x="0" y="0"/>
+          <a:ext cx="0" cy="0"/>
+          <a:chOff x="0" y="0"/>
+          <a:chExt cx="0" cy="0"/>
+        </a:xfrm>
+      </p:grpSpPr>
+      <p:sp>
+        <p:nvSpPr>
+          <p:cNvPr id="4" name="Title 1">
+            <a:extLst>
+              <a:ext uri="{FF2B5EF4-FFF2-40B4-BE49-F238E27FC236}">
+                <a16:creationId xmlns:a16="http://schemas.microsoft.com/office/drawing/2014/main" id="{BC293AFB-8F38-6A10-716F-B1CBB8C32FFB}"/>
+              </a:ext>
+            </a:extLst>
+          </p:cNvPr>
+          <p:cNvSpPr>
+            <a:spLocks noGrp="1"/>
+          </p:cNvSpPr>
+          <p:nvPr>
+            <p:ph type="title"/>
+          </p:nvPr>
+        </p:nvSpPr>
+        <p:spPr>
+          <a:xfrm>
+            <a:off x="0" y="636638"/>
+            <a:ext cx="12192000" cy="614123"/>
+          </a:xfrm>
+        </p:spPr>
+        <p:txBody>
+          <a:bodyPr/>
+          <a:lstStyle/>
+          <a:p>
+            <a:pPr algn="ctr"/>
+            <a:r>
+              <a:rPr lang="en-US" cap="none" spc="100" dirty="0">
+                <a:latin typeface="Times New Roman" panose="02020603050405020304" pitchFamily="18" charset="0"/>
+                <a:ea typeface="Cambria" panose="02040503050406030204" pitchFamily="18" charset="0"/>
+                <a:cs typeface="Times New Roman" panose="02020603050405020304" pitchFamily="18" charset="0"/>
+              </a:rPr>
+              <a:t>Code – The Reward System</a:t>
+            </a:r>
+            <a:endParaRPr lang="LID4096" cap="none" spc="0" dirty="0">
+              <a:latin typeface="Cambria" panose="02040503050406030204" pitchFamily="18" charset="0"/>
+              <a:ea typeface="Cambria" panose="02040503050406030204" pitchFamily="18" charset="0"/>
+              <a:cs typeface="Times New Roman" panose="02020603050405020304" pitchFamily="18" charset="0"/>
+            </a:endParaRPr>
+          </a:p>
+        </p:txBody>
+      </p:sp>
+      <p:sp>
+        <p:nvSpPr>
+          <p:cNvPr id="5" name="Content Placeholder 2">
+            <a:extLst>
+              <a:ext uri="{FF2B5EF4-FFF2-40B4-BE49-F238E27FC236}">
+                <a16:creationId xmlns:a16="http://schemas.microsoft.com/office/drawing/2014/main" id="{2D9DADE7-2416-3012-AA53-CE3587117B51}"/>
+              </a:ext>
+            </a:extLst>
+          </p:cNvPr>
+          <p:cNvSpPr>
+            <a:spLocks noGrp="1"/>
+          </p:cNvSpPr>
+          <p:nvPr>
+            <p:ph idx="1"/>
+          </p:nvPr>
+        </p:nvSpPr>
+        <p:spPr>
+          <a:xfrm>
+            <a:off x="1371600" y="2112264"/>
+            <a:ext cx="10241280" cy="3959352"/>
+          </a:xfrm>
+        </p:spPr>
+        <p:txBody>
+          <a:bodyPr>
+            <a:normAutofit/>
+          </a:bodyPr>
+          <a:lstStyle/>
+          <a:p>
+            <a:pPr marL="0" indent="0">
+              <a:buNone/>
+            </a:pPr>
+            <a:r>
+              <a:rPr lang="en-US" sz="2200" b="1" dirty="0">
+                <a:latin typeface="Times New Roman" panose="02020603050405020304" pitchFamily="18" charset="0"/>
+                <a:cs typeface="Times New Roman" panose="02020603050405020304" pitchFamily="18" charset="0"/>
+              </a:rPr>
+              <a:t>Simple – </a:t>
+            </a:r>
+            <a:r>
+              <a:rPr lang="en-US" sz="2200" dirty="0">
+                <a:latin typeface="Times New Roman" panose="02020603050405020304" pitchFamily="18" charset="0"/>
+                <a:cs typeface="Times New Roman" panose="02020603050405020304" pitchFamily="18" charset="0"/>
+              </a:rPr>
+              <a:t>Evaluate transition by “done”, “waste” and “move” rewards</a:t>
+            </a:r>
+          </a:p>
+          <a:p>
+            <a:pPr marL="0" indent="0">
+              <a:buNone/>
+            </a:pPr>
+            <a:endParaRPr lang="en-US" dirty="0">
+              <a:latin typeface="Times New Roman" panose="02020603050405020304" pitchFamily="18" charset="0"/>
+              <a:cs typeface="Times New Roman" panose="02020603050405020304" pitchFamily="18" charset="0"/>
+            </a:endParaRPr>
+          </a:p>
+          <a:p>
+            <a:pPr marL="0" indent="0">
+              <a:buNone/>
+            </a:pPr>
+            <a:endParaRPr lang="en-US" dirty="0">
+              <a:latin typeface="Times New Roman" panose="02020603050405020304" pitchFamily="18" charset="0"/>
+              <a:cs typeface="Times New Roman" panose="02020603050405020304" pitchFamily="18" charset="0"/>
+            </a:endParaRPr>
+          </a:p>
+          <a:p>
+            <a:pPr marL="0" indent="0">
+              <a:buNone/>
+            </a:pPr>
+            <a:r>
+              <a:rPr lang="en-US" sz="2200" b="1" dirty="0">
+                <a:latin typeface="Times New Roman" panose="02020603050405020304" pitchFamily="18" charset="0"/>
+                <a:cs typeface="Times New Roman" panose="02020603050405020304" pitchFamily="18" charset="0"/>
+              </a:rPr>
+              <a:t>HotCold – </a:t>
+            </a:r>
+            <a:r>
+              <a:rPr lang="en-US" sz="2200" dirty="0">
+                <a:latin typeface="Times New Roman" panose="02020603050405020304" pitchFamily="18" charset="0"/>
+                <a:cs typeface="Times New Roman" panose="02020603050405020304" pitchFamily="18" charset="0"/>
+              </a:rPr>
+              <a:t>Evaluate states before and after and give same positive/negative rewards based on the evaluations</a:t>
+            </a:r>
+          </a:p>
+          <a:p>
+            <a:pPr marL="0" indent="0">
+              <a:buNone/>
+            </a:pPr>
+            <a:r>
+              <a:rPr lang="en-US" dirty="0">
+                <a:latin typeface="Times New Roman" panose="02020603050405020304" pitchFamily="18" charset="0"/>
+                <a:cs typeface="Times New Roman" panose="02020603050405020304" pitchFamily="18" charset="0"/>
+              </a:rPr>
+              <a:t> </a:t>
+            </a:r>
+            <a:endParaRPr lang="LID4096" dirty="0">
+              <a:latin typeface="Times New Roman" panose="02020603050405020304" pitchFamily="18" charset="0"/>
+              <a:cs typeface="Times New Roman" panose="02020603050405020304" pitchFamily="18" charset="0"/>
+            </a:endParaRPr>
+          </a:p>
+        </p:txBody>
+      </p:sp>
+    </p:spTree>
+    <p:extLst>
+      <p:ext uri="{BB962C8B-B14F-4D97-AF65-F5344CB8AC3E}">
+        <p14:creationId xmlns:p14="http://schemas.microsoft.com/office/powerpoint/2010/main" val="1334075768"/>
+      </p:ext>
+    </p:extLst>
+  </p:cSld>
+  <p:clrMapOvr>
+    <a:masterClrMapping/>
+  </p:clrMapOvr>
+</p:sld>
+</file>
+
+<file path=ppt/slides/slide13.xml><?xml version="1.0" encoding="utf-8"?>
+<p:sld xmlns:a="http://schemas.openxmlformats.org/drawingml/2006/main" xmlns:r="http://schemas.openxmlformats.org/officeDocument/2006/relationships" xmlns:p="http://schemas.openxmlformats.org/presentationml/2006/main">
+  <p:cSld>
+    <p:spTree>
+      <p:nvGrpSpPr>
+        <p:cNvPr id="1" name=""/>
+        <p:cNvGrpSpPr/>
+        <p:nvPr/>
+      </p:nvGrpSpPr>
+      <p:grpSpPr>
+        <a:xfrm>
+          <a:off x="0" y="0"/>
+          <a:ext cx="0" cy="0"/>
+          <a:chOff x="0" y="0"/>
+          <a:chExt cx="0" cy="0"/>
+        </a:xfrm>
+      </p:grpSpPr>
+      <p:sp>
+        <p:nvSpPr>
+          <p:cNvPr id="4" name="Title 1">
+            <a:extLst>
+              <a:ext uri="{FF2B5EF4-FFF2-40B4-BE49-F238E27FC236}">
+                <a16:creationId xmlns:a16="http://schemas.microsoft.com/office/drawing/2014/main" id="{62768529-0D05-85F4-5A8E-DCA82F68F1D4}"/>
+              </a:ext>
+            </a:extLst>
+          </p:cNvPr>
+          <p:cNvSpPr>
+            <a:spLocks noGrp="1"/>
+          </p:cNvSpPr>
+          <p:nvPr>
+            <p:ph type="title"/>
+          </p:nvPr>
+        </p:nvSpPr>
+        <p:spPr>
+          <a:xfrm>
+            <a:off x="0" y="636638"/>
+            <a:ext cx="12192000" cy="614123"/>
+          </a:xfrm>
+        </p:spPr>
+        <p:txBody>
+          <a:bodyPr/>
+          <a:lstStyle/>
+          <a:p>
+            <a:pPr algn="ctr"/>
+            <a:r>
+              <a:rPr lang="en-US" cap="none" spc="100" dirty="0">
+                <a:latin typeface="Times New Roman" panose="02020603050405020304" pitchFamily="18" charset="0"/>
+                <a:ea typeface="Cambria" panose="02040503050406030204" pitchFamily="18" charset="0"/>
+                <a:cs typeface="Times New Roman" panose="02020603050405020304" pitchFamily="18" charset="0"/>
+              </a:rPr>
+              <a:t>Code – The Verification</a:t>
+            </a:r>
+            <a:endParaRPr lang="LID4096" cap="none" spc="0" dirty="0">
+              <a:latin typeface="Cambria" panose="02040503050406030204" pitchFamily="18" charset="0"/>
+              <a:ea typeface="Cambria" panose="02040503050406030204" pitchFamily="18" charset="0"/>
+              <a:cs typeface="Times New Roman" panose="02020603050405020304" pitchFamily="18" charset="0"/>
+            </a:endParaRPr>
+          </a:p>
+        </p:txBody>
+      </p:sp>
+      <p:sp>
+        <p:nvSpPr>
+          <p:cNvPr id="5" name="Content Placeholder 2">
+            <a:extLst>
+              <a:ext uri="{FF2B5EF4-FFF2-40B4-BE49-F238E27FC236}">
+                <a16:creationId xmlns:a16="http://schemas.microsoft.com/office/drawing/2014/main" id="{362BEDC8-993B-8004-564A-7B09897671E2}"/>
+              </a:ext>
+            </a:extLst>
+          </p:cNvPr>
+          <p:cNvSpPr>
+            <a:spLocks noGrp="1"/>
+          </p:cNvSpPr>
+          <p:nvPr>
+            <p:ph idx="1"/>
+          </p:nvPr>
+        </p:nvSpPr>
+        <p:spPr>
+          <a:xfrm>
+            <a:off x="1371600" y="2112963"/>
+            <a:ext cx="10240963" cy="3959225"/>
+          </a:xfrm>
+        </p:spPr>
+        <p:txBody>
+          <a:bodyPr>
+            <a:normAutofit/>
+          </a:bodyPr>
+          <a:lstStyle/>
+          <a:p>
+            <a:pPr marL="0" indent="0">
+              <a:buNone/>
+            </a:pPr>
+            <a:r>
+              <a:rPr lang="en-US" sz="2200" b="1" dirty="0">
+                <a:latin typeface="Times New Roman" panose="02020603050405020304" pitchFamily="18" charset="0"/>
+                <a:cs typeface="Times New Roman" panose="02020603050405020304" pitchFamily="18" charset="0"/>
+              </a:rPr>
+              <a:t>Marabou – </a:t>
+            </a:r>
+            <a:r>
+              <a:rPr lang="en-US" sz="2200" dirty="0">
+                <a:latin typeface="Times New Roman" panose="02020603050405020304" pitchFamily="18" charset="0"/>
+                <a:cs typeface="Times New Roman" panose="02020603050405020304" pitchFamily="18" charset="0"/>
+              </a:rPr>
+              <a:t>Unsuccessful reading ONNX format NN</a:t>
+            </a:r>
+            <a:endParaRPr lang="en-US" dirty="0">
+              <a:latin typeface="Times New Roman" panose="02020603050405020304" pitchFamily="18" charset="0"/>
+              <a:cs typeface="Times New Roman" panose="02020603050405020304" pitchFamily="18" charset="0"/>
+            </a:endParaRPr>
+          </a:p>
+          <a:p>
+            <a:pPr marL="0" indent="0">
+              <a:buNone/>
+            </a:pPr>
+            <a:endParaRPr lang="en-US" dirty="0">
+              <a:latin typeface="Times New Roman" panose="02020603050405020304" pitchFamily="18" charset="0"/>
+              <a:cs typeface="Times New Roman" panose="02020603050405020304" pitchFamily="18" charset="0"/>
+            </a:endParaRPr>
+          </a:p>
+          <a:p>
+            <a:pPr marL="0" indent="0">
+              <a:buNone/>
+            </a:pPr>
+            <a:r>
+              <a:rPr lang="en-US" dirty="0">
+                <a:latin typeface="Times New Roman" panose="02020603050405020304" pitchFamily="18" charset="0"/>
+                <a:cs typeface="Times New Roman" panose="02020603050405020304" pitchFamily="18" charset="0"/>
+              </a:rPr>
+              <a:t> </a:t>
+            </a:r>
+            <a:r>
+              <a:rPr lang="en-US" b="1" dirty="0">
+                <a:latin typeface="Times New Roman" panose="02020603050405020304" pitchFamily="18" charset="0"/>
+                <a:cs typeface="Times New Roman" panose="02020603050405020304" pitchFamily="18" charset="0"/>
+              </a:rPr>
+              <a:t>Loop detection – </a:t>
+            </a:r>
+            <a:r>
+              <a:rPr lang="en-US" dirty="0">
+                <a:latin typeface="Times New Roman" panose="02020603050405020304" pitchFamily="18" charset="0"/>
+                <a:cs typeface="Times New Roman" panose="02020603050405020304" pitchFamily="18" charset="0"/>
+              </a:rPr>
+              <a:t>Verification by changing previous moves rewards when detecting loops</a:t>
+            </a:r>
+            <a:r>
+              <a:rPr lang="en-US" b="1" dirty="0">
+                <a:latin typeface="Times New Roman" panose="02020603050405020304" pitchFamily="18" charset="0"/>
+                <a:cs typeface="Times New Roman" panose="02020603050405020304" pitchFamily="18" charset="0"/>
+              </a:rPr>
+              <a:t> </a:t>
+            </a:r>
+            <a:endParaRPr lang="LID4096" dirty="0">
+              <a:latin typeface="Times New Roman" panose="02020603050405020304" pitchFamily="18" charset="0"/>
+              <a:cs typeface="Times New Roman" panose="02020603050405020304" pitchFamily="18" charset="0"/>
+            </a:endParaRPr>
+          </a:p>
+        </p:txBody>
+      </p:sp>
+      <p:pic>
+        <p:nvPicPr>
+          <p:cNvPr id="12" name="Picture 11">
+            <a:extLst>
+              <a:ext uri="{FF2B5EF4-FFF2-40B4-BE49-F238E27FC236}">
+                <a16:creationId xmlns:a16="http://schemas.microsoft.com/office/drawing/2014/main" id="{6C468A5B-57D6-D209-21C7-F8C29E0C5F7C}"/>
+              </a:ext>
+            </a:extLst>
+          </p:cNvPr>
+          <p:cNvPicPr>
+            <a:picLocks noChangeAspect="1"/>
+          </p:cNvPicPr>
+          <p:nvPr/>
+        </p:nvPicPr>
+        <p:blipFill>
+          <a:blip r:embed="rId2"/>
+          <a:stretch>
+            <a:fillRect/>
+          </a:stretch>
+        </p:blipFill>
+        <p:spPr>
+          <a:xfrm>
+            <a:off x="1371600" y="3932501"/>
+            <a:ext cx="3734321" cy="1352739"/>
+          </a:xfrm>
+          <a:prstGeom prst="rect">
+            <a:avLst/>
+          </a:prstGeom>
+        </p:spPr>
+      </p:pic>
+      <p:pic>
+        <p:nvPicPr>
+          <p:cNvPr id="14" name="Picture 13">
+            <a:extLst>
+              <a:ext uri="{FF2B5EF4-FFF2-40B4-BE49-F238E27FC236}">
+                <a16:creationId xmlns:a16="http://schemas.microsoft.com/office/drawing/2014/main" id="{9263152C-42C2-CFD9-943D-A4EC2882D015}"/>
+              </a:ext>
+            </a:extLst>
+          </p:cNvPr>
+          <p:cNvPicPr>
+            <a:picLocks noChangeAspect="1"/>
+          </p:cNvPicPr>
+          <p:nvPr/>
+        </p:nvPicPr>
+        <p:blipFill>
+          <a:blip r:embed="rId3"/>
+          <a:stretch>
+            <a:fillRect/>
+          </a:stretch>
+        </p:blipFill>
+        <p:spPr>
+          <a:xfrm>
+            <a:off x="5259221" y="3932501"/>
+            <a:ext cx="6058746" cy="714475"/>
+          </a:xfrm>
+          <a:prstGeom prst="rect">
+            <a:avLst/>
+          </a:prstGeom>
+        </p:spPr>
+      </p:pic>
+    </p:spTree>
+    <p:extLst>
+      <p:ext uri="{BB962C8B-B14F-4D97-AF65-F5344CB8AC3E}">
+        <p14:creationId xmlns:p14="http://schemas.microsoft.com/office/powerpoint/2010/main" val="1049734255"/>
+      </p:ext>
+    </p:extLst>
+  </p:cSld>
+  <p:clrMapOvr>
+    <a:masterClrMapping/>
+  </p:clrMapOvr>
+</p:sld>
+</file>
+
+<file path=ppt/slides/slide14.xml><?xml version="1.0" encoding="utf-8"?>
+<p:sld xmlns:a="http://schemas.openxmlformats.org/drawingml/2006/main" xmlns:r="http://schemas.openxmlformats.org/officeDocument/2006/relationships" xmlns:p="http://schemas.openxmlformats.org/presentationml/2006/main">
+  <p:cSld>
+    <p:spTree>
+      <p:nvGrpSpPr>
+        <p:cNvPr id="1" name=""/>
+        <p:cNvGrpSpPr/>
+        <p:nvPr/>
+      </p:nvGrpSpPr>
+      <p:grpSpPr>
+        <a:xfrm>
+          <a:off x="0" y="0"/>
+          <a:ext cx="0" cy="0"/>
+          <a:chOff x="0" y="0"/>
+          <a:chExt cx="0" cy="0"/>
+        </a:xfrm>
+      </p:grpSpPr>
+      <p:sp>
+        <p:nvSpPr>
+          <p:cNvPr id="3" name="Content Placeholder 2">
+            <a:extLst>
+              <a:ext uri="{FF2B5EF4-FFF2-40B4-BE49-F238E27FC236}">
+                <a16:creationId xmlns:a16="http://schemas.microsoft.com/office/drawing/2014/main" id="{2849230B-28A0-6A35-69D4-C0CAC54FC3FC}"/>
+              </a:ext>
+            </a:extLst>
+          </p:cNvPr>
+          <p:cNvSpPr>
+            <a:spLocks noGrp="1"/>
+          </p:cNvSpPr>
+          <p:nvPr>
+            <p:ph idx="1"/>
+          </p:nvPr>
+        </p:nvSpPr>
+        <p:spPr/>
+        <p:txBody>
+          <a:bodyPr/>
+          <a:lstStyle/>
+          <a:p>
+            <a:endParaRPr lang="LID4096" dirty="0"/>
+          </a:p>
+        </p:txBody>
+      </p:sp>
+      <p:sp>
+        <p:nvSpPr>
+          <p:cNvPr id="4" name="Title 1">
+            <a:extLst>
+              <a:ext uri="{FF2B5EF4-FFF2-40B4-BE49-F238E27FC236}">
+                <a16:creationId xmlns:a16="http://schemas.microsoft.com/office/drawing/2014/main" id="{7C2D623D-6EB8-EAEA-9DE3-917260328455}"/>
+              </a:ext>
+            </a:extLst>
+          </p:cNvPr>
+          <p:cNvSpPr>
+            <a:spLocks noGrp="1"/>
+          </p:cNvSpPr>
+          <p:nvPr>
+            <p:ph type="title"/>
+          </p:nvPr>
+        </p:nvSpPr>
+        <p:spPr>
+          <a:xfrm>
+            <a:off x="0" y="636638"/>
+            <a:ext cx="12192000" cy="614123"/>
+          </a:xfrm>
+        </p:spPr>
+        <p:txBody>
+          <a:bodyPr/>
+          <a:lstStyle/>
+          <a:p>
+            <a:pPr algn="ctr"/>
+            <a:r>
+              <a:rPr lang="en-US" cap="none" spc="100" dirty="0">
+                <a:latin typeface="Times New Roman" panose="02020603050405020304" pitchFamily="18" charset="0"/>
+                <a:ea typeface="Cambria" panose="02040503050406030204" pitchFamily="18" charset="0"/>
+                <a:cs typeface="Times New Roman" panose="02020603050405020304" pitchFamily="18" charset="0"/>
+              </a:rPr>
+              <a:t>Results and Conclusion</a:t>
+            </a:r>
+            <a:endParaRPr lang="LID4096" cap="none" spc="0" dirty="0">
+              <a:latin typeface="Cambria" panose="02040503050406030204" pitchFamily="18" charset="0"/>
+              <a:ea typeface="Cambria" panose="02040503050406030204" pitchFamily="18" charset="0"/>
+              <a:cs typeface="Times New Roman" panose="02020603050405020304" pitchFamily="18" charset="0"/>
+            </a:endParaRPr>
+          </a:p>
+        </p:txBody>
+      </p:sp>
+    </p:spTree>
+    <p:extLst>
+      <p:ext uri="{BB962C8B-B14F-4D97-AF65-F5344CB8AC3E}">
+        <p14:creationId xmlns:p14="http://schemas.microsoft.com/office/powerpoint/2010/main" val="1958898215"/>
+      </p:ext>
+    </p:extLst>
+  </p:cSld>
+  <p:clrMapOvr>
+    <a:masterClrMapping/>
+  </p:clrMapOvr>
+</p:sld>
+</file>
+
+<file path=ppt/slides/slide2.xml><?xml version="1.0" encoding="utf-8"?>
+<p:sld xmlns:a="http://schemas.openxmlformats.org/drawingml/2006/main" xmlns:r="http://schemas.openxmlformats.org/officeDocument/2006/relationships" xmlns:p="http://schemas.openxmlformats.org/presentationml/2006/main">
+  <p:cSld>
+    <p:spTree>
+      <p:nvGrpSpPr>
+        <p:cNvPr id="1" name=""/>
+        <p:cNvGrpSpPr/>
+        <p:nvPr/>
+      </p:nvGrpSpPr>
+      <p:grpSpPr>
+        <a:xfrm>
+          <a:off x="0" y="0"/>
+          <a:ext cx="0" cy="0"/>
+          <a:chOff x="0" y="0"/>
+          <a:chExt cx="0" cy="0"/>
+        </a:xfrm>
+      </p:grpSpPr>
+      <p:sp>
+        <p:nvSpPr>
+          <p:cNvPr id="2" name="Title 1">
+            <a:extLst>
+              <a:ext uri="{FF2B5EF4-FFF2-40B4-BE49-F238E27FC236}">
+                <a16:creationId xmlns:a16="http://schemas.microsoft.com/office/drawing/2014/main" id="{2774A749-E252-D00C-A5A3-EE68C4DF4563}"/>
+              </a:ext>
+            </a:extLst>
+          </p:cNvPr>
+          <p:cNvSpPr>
+            <a:spLocks noGrp="1"/>
+          </p:cNvSpPr>
+          <p:nvPr>
+            <p:ph type="title"/>
+          </p:nvPr>
+        </p:nvSpPr>
+        <p:spPr>
+          <a:xfrm>
+            <a:off x="0" y="636638"/>
+            <a:ext cx="12192000" cy="614123"/>
+          </a:xfrm>
+        </p:spPr>
+        <p:txBody>
+          <a:bodyPr>
+            <a:normAutofit/>
+          </a:bodyPr>
+          <a:lstStyle/>
+          <a:p>
+            <a:pPr algn="ctr"/>
+            <a:r>
+              <a:rPr lang="en-US" sz="3200" cap="none" spc="100" dirty="0">
+                <a:latin typeface="Times New Roman" panose="02020603050405020304" pitchFamily="18" charset="0"/>
+                <a:ea typeface="Cambria" panose="02040503050406030204" pitchFamily="18" charset="0"/>
+                <a:cs typeface="Times New Roman" panose="02020603050405020304" pitchFamily="18" charset="0"/>
+              </a:rPr>
+              <a:t>Introduction to Formal Verification</a:t>
+            </a:r>
+            <a:r>
+              <a:rPr lang="en-US" sz="3200" cap="none" spc="0" dirty="0">
+                <a:latin typeface="Cambria" panose="02040503050406030204" pitchFamily="18" charset="0"/>
+                <a:ea typeface="Cambria" panose="02040503050406030204" pitchFamily="18" charset="0"/>
+                <a:cs typeface="Times New Roman" panose="02020603050405020304" pitchFamily="18" charset="0"/>
+              </a:rPr>
+              <a:t> </a:t>
+            </a:r>
+            <a:endParaRPr lang="LID4096" sz="3200" cap="none" spc="0" dirty="0">
+              <a:latin typeface="Cambria" panose="02040503050406030204" pitchFamily="18" charset="0"/>
+              <a:ea typeface="Cambria" panose="02040503050406030204" pitchFamily="18" charset="0"/>
+              <a:cs typeface="Times New Roman" panose="02020603050405020304" pitchFamily="18" charset="0"/>
+            </a:endParaRPr>
+          </a:p>
+        </p:txBody>
+      </p:sp>
+      <p:sp>
+        <p:nvSpPr>
+          <p:cNvPr id="10" name="Content Placeholder 9">
+            <a:extLst>
+              <a:ext uri="{FF2B5EF4-FFF2-40B4-BE49-F238E27FC236}">
+                <a16:creationId xmlns:a16="http://schemas.microsoft.com/office/drawing/2014/main" id="{9456B888-8AEC-ECCD-B6F9-E50AC1304A45}"/>
+              </a:ext>
+            </a:extLst>
+          </p:cNvPr>
+          <p:cNvSpPr>
+            <a:spLocks noGrp="1"/>
+          </p:cNvSpPr>
+          <p:nvPr>
+            <p:ph sz="half" idx="1"/>
+          </p:nvPr>
+        </p:nvSpPr>
+        <p:spPr>
+          <a:xfrm>
+            <a:off x="1062872" y="1804219"/>
+            <a:ext cx="4846320" cy="3959352"/>
+          </a:xfrm>
+        </p:spPr>
+        <p:txBody>
+          <a:bodyPr/>
+          <a:lstStyle/>
+          <a:p>
+            <a:pPr marL="0" indent="0">
+              <a:buNone/>
+            </a:pPr>
+            <a:endParaRPr lang="en-US" dirty="0"/>
+          </a:p>
+          <a:p>
+            <a:pPr marL="0" indent="0">
+              <a:buNone/>
+            </a:pPr>
+            <a:endParaRPr lang="en-US" dirty="0"/>
+          </a:p>
+          <a:p>
+            <a:pPr marL="0" indent="0" algn="ctr">
+              <a:buNone/>
+            </a:pPr>
+            <a:r>
+              <a:rPr lang="en-US" dirty="0">
+                <a:latin typeface="Times New Roman" panose="02020603050405020304" pitchFamily="18" charset="0"/>
+                <a:cs typeface="Times New Roman" panose="02020603050405020304" pitchFamily="18" charset="0"/>
+              </a:rPr>
+              <a:t>Crucial for ensuring the correctness of systems especially in safety-critical applications</a:t>
+            </a:r>
+          </a:p>
+        </p:txBody>
+      </p:sp>
+      <p:sp>
+        <p:nvSpPr>
+          <p:cNvPr id="11" name="Content Placeholder 10">
+            <a:extLst>
+              <a:ext uri="{FF2B5EF4-FFF2-40B4-BE49-F238E27FC236}">
+                <a16:creationId xmlns:a16="http://schemas.microsoft.com/office/drawing/2014/main" id="{56A4C752-074A-576A-AB00-E0C524E68A04}"/>
+              </a:ext>
+            </a:extLst>
+          </p:cNvPr>
+          <p:cNvSpPr>
+            <a:spLocks noGrp="1"/>
+          </p:cNvSpPr>
+          <p:nvPr>
+            <p:ph sz="half" idx="2"/>
+          </p:nvPr>
+        </p:nvSpPr>
+        <p:spPr>
+          <a:xfrm>
+            <a:off x="6243480" y="1804219"/>
+            <a:ext cx="4846320" cy="3959351"/>
+          </a:xfrm>
+        </p:spPr>
+        <p:txBody>
+          <a:bodyPr/>
+          <a:lstStyle/>
+          <a:p>
+            <a:pPr marL="0" indent="0">
+              <a:buNone/>
+            </a:pPr>
+            <a:endParaRPr lang="en-US" dirty="0"/>
+          </a:p>
+          <a:p>
+            <a:pPr marL="0" indent="0" algn="ctr">
+              <a:buNone/>
+            </a:pPr>
+            <a:endParaRPr lang="en-US" dirty="0"/>
+          </a:p>
+          <a:p>
+            <a:pPr marL="0" indent="0" algn="ctr">
+              <a:buNone/>
+            </a:pPr>
+            <a:r>
+              <a:rPr lang="en-US" dirty="0">
+                <a:latin typeface="Times New Roman" panose="02020603050405020304" pitchFamily="18" charset="0"/>
+                <a:cs typeface="Times New Roman" panose="02020603050405020304" pitchFamily="18" charset="0"/>
+              </a:rPr>
+              <a:t>Two main types:                                        Model Checking and Theorem Proving       each use different approach to verify system properties </a:t>
+            </a:r>
+          </a:p>
+          <a:p>
+            <a:pPr marL="0" indent="0" algn="ctr">
+              <a:buNone/>
+            </a:pPr>
+            <a:endParaRPr lang="LID4096" dirty="0"/>
+          </a:p>
+        </p:txBody>
+      </p:sp>
+      <p:pic>
+        <p:nvPicPr>
+          <p:cNvPr id="19" name="Graphic 18" descr="Badge Tick1 with solid fill">
+            <a:extLst>
+              <a:ext uri="{FF2B5EF4-FFF2-40B4-BE49-F238E27FC236}">
+                <a16:creationId xmlns:a16="http://schemas.microsoft.com/office/drawing/2014/main" id="{F09D2522-99F4-6C18-190D-DD37091CA516}"/>
+              </a:ext>
+            </a:extLst>
+          </p:cNvPr>
+          <p:cNvPicPr>
+            <a:picLocks noChangeAspect="1"/>
+          </p:cNvPicPr>
+          <p:nvPr/>
+        </p:nvPicPr>
+        <p:blipFill>
+          <a:blip r:embed="rId2">
+            <a:extLst>
+              <a:ext uri="{96DAC541-7B7A-43D3-8B79-37D633B846F1}">
+                <asvg:svgBlip xmlns:asvg="http://schemas.microsoft.com/office/drawing/2016/SVG/main" r:embed="rId3"/>
+              </a:ext>
+            </a:extLst>
+          </a:blip>
+          <a:stretch>
+            <a:fillRect/>
+          </a:stretch>
+        </p:blipFill>
+        <p:spPr>
+          <a:xfrm>
+            <a:off x="3202125" y="2145888"/>
+            <a:ext cx="567813" cy="567813"/>
+          </a:xfrm>
+          <a:prstGeom prst="rect">
+            <a:avLst/>
+          </a:prstGeom>
+        </p:spPr>
+      </p:pic>
+      <p:pic>
+        <p:nvPicPr>
+          <p:cNvPr id="29" name="Graphic 28" descr="Toggle with solid fill">
+            <a:extLst>
+              <a:ext uri="{FF2B5EF4-FFF2-40B4-BE49-F238E27FC236}">
+                <a16:creationId xmlns:a16="http://schemas.microsoft.com/office/drawing/2014/main" id="{6A590B00-4F60-99E2-5724-FCC9D92EF79A}"/>
+              </a:ext>
+            </a:extLst>
+          </p:cNvPr>
+          <p:cNvPicPr>
+            <a:picLocks noChangeAspect="1"/>
+          </p:cNvPicPr>
+          <p:nvPr/>
+        </p:nvPicPr>
+        <p:blipFill>
+          <a:blip r:embed="rId4">
+            <a:extLst>
+              <a:ext uri="{96DAC541-7B7A-43D3-8B79-37D633B846F1}">
+                <asvg:svgBlip xmlns:asvg="http://schemas.microsoft.com/office/drawing/2016/SVG/main" r:embed="rId5"/>
+              </a:ext>
+            </a:extLst>
+          </a:blip>
+          <a:stretch>
+            <a:fillRect/>
+          </a:stretch>
+        </p:blipFill>
+        <p:spPr>
+          <a:xfrm>
+            <a:off x="8359578" y="2122734"/>
+            <a:ext cx="614123" cy="614123"/>
+          </a:xfrm>
+          <a:prstGeom prst="rect">
+            <a:avLst/>
+          </a:prstGeom>
+        </p:spPr>
+      </p:pic>
+    </p:spTree>
+    <p:extLst>
+      <p:ext uri="{BB962C8B-B14F-4D97-AF65-F5344CB8AC3E}">
+        <p14:creationId xmlns:p14="http://schemas.microsoft.com/office/powerpoint/2010/main" val="3156109269"/>
+      </p:ext>
+    </p:extLst>
+  </p:cSld>
+  <p:clrMapOvr>
+    <a:masterClrMapping/>
+  </p:clrMapOvr>
+</p:sld>
+</file>
+
+<file path=ppt/slides/slide3.xml><?xml version="1.0" encoding="utf-8"?>
+<p:sld xmlns:a="http://schemas.openxmlformats.org/drawingml/2006/main" xmlns:r="http://schemas.openxmlformats.org/officeDocument/2006/relationships" xmlns:p="http://schemas.openxmlformats.org/presentationml/2006/main">
+  <p:cSld>
+    <p:spTree>
+      <p:nvGrpSpPr>
+        <p:cNvPr id="1" name=""/>
+        <p:cNvGrpSpPr/>
+        <p:nvPr/>
+      </p:nvGrpSpPr>
+      <p:grpSpPr>
+        <a:xfrm>
+          <a:off x="0" y="0"/>
+          <a:ext cx="0" cy="0"/>
+          <a:chOff x="0" y="0"/>
+          <a:chExt cx="0" cy="0"/>
+        </a:xfrm>
+      </p:grpSpPr>
+      <p:sp>
+        <p:nvSpPr>
+          <p:cNvPr id="6" name="Content Placeholder 5">
+            <a:extLst>
+              <a:ext uri="{FF2B5EF4-FFF2-40B4-BE49-F238E27FC236}">
+                <a16:creationId xmlns:a16="http://schemas.microsoft.com/office/drawing/2014/main" id="{949A30F3-44FE-0999-615A-C4F100ED3EC7}"/>
+              </a:ext>
+            </a:extLst>
+          </p:cNvPr>
+          <p:cNvSpPr>
+            <a:spLocks noGrp="1"/>
+          </p:cNvSpPr>
+          <p:nvPr>
+            <p:ph idx="1"/>
+          </p:nvPr>
+        </p:nvSpPr>
+        <p:spPr>
+          <a:xfrm>
+            <a:off x="1371600" y="1793453"/>
+            <a:ext cx="10241280" cy="3959352"/>
+          </a:xfrm>
+        </p:spPr>
+        <p:txBody>
+          <a:bodyPr/>
+          <a:lstStyle/>
+          <a:p>
+            <a:pPr marL="0" indent="0">
+              <a:buNone/>
+            </a:pPr>
+            <a:r>
+              <a:rPr lang="en-US" b="1" dirty="0">
+                <a:latin typeface="Times New Roman" panose="02020603050405020304" pitchFamily="18" charset="0"/>
+                <a:cs typeface="Times New Roman" panose="02020603050405020304" pitchFamily="18" charset="0"/>
+              </a:rPr>
+              <a:t>Specification – </a:t>
+            </a:r>
+            <a:r>
+              <a:rPr lang="en-US" dirty="0">
+                <a:latin typeface="Times New Roman" panose="02020603050405020304" pitchFamily="18" charset="0"/>
+                <a:cs typeface="Times New Roman" panose="02020603050405020304" pitchFamily="18" charset="0"/>
+              </a:rPr>
+              <a:t>Formal description of desired system behavior</a:t>
+            </a:r>
+          </a:p>
+          <a:p>
+            <a:endParaRPr lang="en-US" dirty="0">
+              <a:latin typeface="Times New Roman" panose="02020603050405020304" pitchFamily="18" charset="0"/>
+              <a:cs typeface="Times New Roman" panose="02020603050405020304" pitchFamily="18" charset="0"/>
+            </a:endParaRPr>
+          </a:p>
+          <a:p>
+            <a:endParaRPr lang="en-US" dirty="0">
+              <a:latin typeface="Times New Roman" panose="02020603050405020304" pitchFamily="18" charset="0"/>
+              <a:cs typeface="Times New Roman" panose="02020603050405020304" pitchFamily="18" charset="0"/>
+            </a:endParaRPr>
+          </a:p>
+          <a:p>
+            <a:pPr marL="0" indent="0">
+              <a:buNone/>
+            </a:pPr>
+            <a:r>
+              <a:rPr lang="en-US" b="1" dirty="0">
+                <a:latin typeface="Times New Roman" panose="02020603050405020304" pitchFamily="18" charset="0"/>
+                <a:cs typeface="Times New Roman" panose="02020603050405020304" pitchFamily="18" charset="0"/>
+              </a:rPr>
+              <a:t>Model – </a:t>
+            </a:r>
+            <a:r>
+              <a:rPr lang="en-US" dirty="0">
+                <a:latin typeface="Times New Roman" panose="02020603050405020304" pitchFamily="18" charset="0"/>
+                <a:cs typeface="Times New Roman" panose="02020603050405020304" pitchFamily="18" charset="0"/>
+              </a:rPr>
+              <a:t>Mathematical representation of the system. states and transitions</a:t>
+            </a:r>
+          </a:p>
+          <a:p>
+            <a:endParaRPr lang="en-US" dirty="0">
+              <a:latin typeface="Times New Roman" panose="02020603050405020304" pitchFamily="18" charset="0"/>
+              <a:cs typeface="Times New Roman" panose="02020603050405020304" pitchFamily="18" charset="0"/>
+            </a:endParaRPr>
+          </a:p>
+          <a:p>
+            <a:endParaRPr lang="en-US" dirty="0">
+              <a:latin typeface="Times New Roman" panose="02020603050405020304" pitchFamily="18" charset="0"/>
+              <a:cs typeface="Times New Roman" panose="02020603050405020304" pitchFamily="18" charset="0"/>
+            </a:endParaRPr>
+          </a:p>
+          <a:p>
+            <a:pPr marL="0" indent="0">
+              <a:buNone/>
+            </a:pPr>
+            <a:r>
+              <a:rPr lang="en-US" b="1" dirty="0">
+                <a:latin typeface="Times New Roman" panose="02020603050405020304" pitchFamily="18" charset="0"/>
+                <a:cs typeface="Times New Roman" panose="02020603050405020304" pitchFamily="18" charset="0"/>
+              </a:rPr>
+              <a:t>Properties – </a:t>
+            </a:r>
+            <a:r>
+              <a:rPr lang="en-US" dirty="0">
+                <a:latin typeface="Times New Roman" panose="02020603050405020304" pitchFamily="18" charset="0"/>
+                <a:cs typeface="Times New Roman" panose="02020603050405020304" pitchFamily="18" charset="0"/>
+              </a:rPr>
+              <a:t>Specific claims or assertions about particular aspects of the system. Fairness, Liveness and Safety</a:t>
+            </a:r>
+            <a:endParaRPr lang="LID4096" dirty="0">
+              <a:latin typeface="Times New Roman" panose="02020603050405020304" pitchFamily="18" charset="0"/>
+              <a:cs typeface="Times New Roman" panose="02020603050405020304" pitchFamily="18" charset="0"/>
+            </a:endParaRPr>
+          </a:p>
+        </p:txBody>
+      </p:sp>
+      <p:sp>
+        <p:nvSpPr>
+          <p:cNvPr id="11" name="Title 1">
+            <a:extLst>
+              <a:ext uri="{FF2B5EF4-FFF2-40B4-BE49-F238E27FC236}">
+                <a16:creationId xmlns:a16="http://schemas.microsoft.com/office/drawing/2014/main" id="{0076F699-6989-5E39-ADF0-C2A778B060B3}"/>
+              </a:ext>
+            </a:extLst>
+          </p:cNvPr>
+          <p:cNvSpPr>
+            <a:spLocks noGrp="1"/>
+          </p:cNvSpPr>
+          <p:nvPr>
+            <p:ph type="title"/>
+          </p:nvPr>
+        </p:nvSpPr>
+        <p:spPr>
+          <a:xfrm>
+            <a:off x="0" y="636638"/>
+            <a:ext cx="12192000" cy="614123"/>
+          </a:xfrm>
+        </p:spPr>
+        <p:txBody>
+          <a:bodyPr>
+            <a:normAutofit/>
+          </a:bodyPr>
+          <a:lstStyle/>
+          <a:p>
+            <a:pPr algn="ctr"/>
+            <a:r>
+              <a:rPr lang="en-US" sz="3200" cap="none" spc="100" dirty="0">
+                <a:latin typeface="Times New Roman" panose="02020603050405020304" pitchFamily="18" charset="0"/>
+                <a:ea typeface="Cambria" panose="02040503050406030204" pitchFamily="18" charset="0"/>
+                <a:cs typeface="Times New Roman" panose="02020603050405020304" pitchFamily="18" charset="0"/>
+              </a:rPr>
+              <a:t>Key Concepts in Formal Verification</a:t>
+            </a:r>
+            <a:endParaRPr lang="LID4096" sz="3200" cap="none" spc="0" dirty="0">
+              <a:latin typeface="Cambria" panose="02040503050406030204" pitchFamily="18" charset="0"/>
+              <a:ea typeface="Cambria" panose="02040503050406030204" pitchFamily="18" charset="0"/>
+              <a:cs typeface="Times New Roman" panose="02020603050405020304" pitchFamily="18" charset="0"/>
+            </a:endParaRPr>
+          </a:p>
+        </p:txBody>
+      </p:sp>
+      <p:pic>
+        <p:nvPicPr>
+          <p:cNvPr id="19" name="Graphic 18" descr="Settings with solid fill">
+            <a:extLst>
+              <a:ext uri="{FF2B5EF4-FFF2-40B4-BE49-F238E27FC236}">
+                <a16:creationId xmlns:a16="http://schemas.microsoft.com/office/drawing/2014/main" id="{7E7A054B-C096-5A8E-AC33-AC793BF1B165}"/>
+              </a:ext>
+            </a:extLst>
+          </p:cNvPr>
+          <p:cNvPicPr>
+            <a:picLocks noChangeAspect="1"/>
+          </p:cNvPicPr>
+          <p:nvPr/>
+        </p:nvPicPr>
+        <p:blipFill>
+          <a:blip r:embed="rId2">
+            <a:extLst>
+              <a:ext uri="{96DAC541-7B7A-43D3-8B79-37D633B846F1}">
+                <asvg:svgBlip xmlns:asvg="http://schemas.microsoft.com/office/drawing/2016/SVG/main" r:embed="rId3"/>
+              </a:ext>
+            </a:extLst>
+          </a:blip>
+          <a:stretch>
+            <a:fillRect/>
+          </a:stretch>
+        </p:blipFill>
+        <p:spPr>
+          <a:xfrm>
+            <a:off x="668985" y="4790768"/>
+            <a:ext cx="614124" cy="614124"/>
+          </a:xfrm>
+          <a:prstGeom prst="rect">
+            <a:avLst/>
+          </a:prstGeom>
+        </p:spPr>
+      </p:pic>
+      <p:pic>
+        <p:nvPicPr>
+          <p:cNvPr id="21" name="Graphic 20" descr="Clipboard Mixed with solid fill">
+            <a:extLst>
+              <a:ext uri="{FF2B5EF4-FFF2-40B4-BE49-F238E27FC236}">
+                <a16:creationId xmlns:a16="http://schemas.microsoft.com/office/drawing/2014/main" id="{C7AD57B2-3202-737E-6C49-83D6388DD5CA}"/>
+              </a:ext>
+            </a:extLst>
+          </p:cNvPr>
+          <p:cNvPicPr>
+            <a:picLocks noChangeAspect="1"/>
+          </p:cNvPicPr>
+          <p:nvPr/>
+        </p:nvPicPr>
+        <p:blipFill>
+          <a:blip r:embed="rId4">
+            <a:extLst>
+              <a:ext uri="{96DAC541-7B7A-43D3-8B79-37D633B846F1}">
+                <asvg:svgBlip xmlns:asvg="http://schemas.microsoft.com/office/drawing/2016/SVG/main" r:embed="rId5"/>
+              </a:ext>
+            </a:extLst>
+          </a:blip>
+          <a:stretch>
+            <a:fillRect/>
+          </a:stretch>
+        </p:blipFill>
+        <p:spPr>
+          <a:xfrm>
+            <a:off x="668986" y="1674731"/>
+            <a:ext cx="614123" cy="614123"/>
+          </a:xfrm>
+          <a:prstGeom prst="rect">
+            <a:avLst/>
+          </a:prstGeom>
+        </p:spPr>
+      </p:pic>
+      <p:pic>
+        <p:nvPicPr>
+          <p:cNvPr id="25" name="Graphic 24" descr="Decision chart with solid fill">
+            <a:extLst>
+              <a:ext uri="{FF2B5EF4-FFF2-40B4-BE49-F238E27FC236}">
+                <a16:creationId xmlns:a16="http://schemas.microsoft.com/office/drawing/2014/main" id="{53EBD31D-FE66-F93D-BBBB-BE49AD461CF9}"/>
+              </a:ext>
+            </a:extLst>
+          </p:cNvPr>
+          <p:cNvPicPr>
+            <a:picLocks noChangeAspect="1"/>
+          </p:cNvPicPr>
+          <p:nvPr/>
+        </p:nvPicPr>
+        <p:blipFill>
+          <a:blip r:embed="rId6">
+            <a:extLst>
+              <a:ext uri="{96DAC541-7B7A-43D3-8B79-37D633B846F1}">
+                <asvg:svgBlip xmlns:asvg="http://schemas.microsoft.com/office/drawing/2016/SVG/main" r:embed="rId7"/>
+              </a:ext>
+            </a:extLst>
+          </a:blip>
+          <a:stretch>
+            <a:fillRect/>
+          </a:stretch>
+        </p:blipFill>
+        <p:spPr>
+          <a:xfrm>
+            <a:off x="668985" y="3121937"/>
+            <a:ext cx="614125" cy="614125"/>
+          </a:xfrm>
+          <a:prstGeom prst="rect">
+            <a:avLst/>
+          </a:prstGeom>
+        </p:spPr>
+      </p:pic>
+    </p:spTree>
+    <p:extLst>
+      <p:ext uri="{BB962C8B-B14F-4D97-AF65-F5344CB8AC3E}">
+        <p14:creationId xmlns:p14="http://schemas.microsoft.com/office/powerpoint/2010/main" val="1620585352"/>
+      </p:ext>
+    </p:extLst>
+  </p:cSld>
+  <p:clrMapOvr>
+    <a:masterClrMapping/>
+  </p:clrMapOvr>
+</p:sld>
+</file>
+
+<file path=ppt/slides/slide4.xml><?xml version="1.0" encoding="utf-8"?>
+<p:sld xmlns:a="http://schemas.openxmlformats.org/drawingml/2006/main" xmlns:r="http://schemas.openxmlformats.org/officeDocument/2006/relationships" xmlns:p="http://schemas.openxmlformats.org/presentationml/2006/main">
+  <p:cSld>
+    <p:spTree>
+      <p:nvGrpSpPr>
+        <p:cNvPr id="1" name=""/>
+        <p:cNvGrpSpPr/>
+        <p:nvPr/>
+      </p:nvGrpSpPr>
+      <p:grpSpPr>
+        <a:xfrm>
+          <a:off x="0" y="0"/>
+          <a:ext cx="0" cy="0"/>
+          <a:chOff x="0" y="0"/>
+          <a:chExt cx="0" cy="0"/>
+        </a:xfrm>
+      </p:grpSpPr>
+      <p:sp>
+        <p:nvSpPr>
+          <p:cNvPr id="4" name="Title 1">
+            <a:extLst>
+              <a:ext uri="{FF2B5EF4-FFF2-40B4-BE49-F238E27FC236}">
+                <a16:creationId xmlns:a16="http://schemas.microsoft.com/office/drawing/2014/main" id="{0493E63A-5EB2-B3B1-D041-58FF7583EA80}"/>
               </a:ext>
             </a:extLst>
           </p:cNvPr>
@@ -6598,10 +7478,10 @@
                 <a:ea typeface="Cambria" panose="02040503050406030204" pitchFamily="18" charset="0"/>
                 <a:cs typeface="Times New Roman" panose="02020603050405020304" pitchFamily="18" charset="0"/>
               </a:rPr>
-              <a:t>Maraboupy: Python Interface for Neural Network Verification</a:t>
-            </a:r>
-            <a:endParaRPr lang="LID4096" sz="3200" cap="none" spc="100" dirty="0">
-              <a:latin typeface="Times New Roman" panose="02020603050405020304" pitchFamily="18" charset="0"/>
+              <a:t>Challenges in Formal Verification of Neural Networks</a:t>
+            </a:r>
+            <a:endParaRPr lang="LID4096" sz="3200" cap="none" spc="0" dirty="0">
+              <a:latin typeface="Cambria" panose="02040503050406030204" pitchFamily="18" charset="0"/>
               <a:ea typeface="Cambria" panose="02040503050406030204" pitchFamily="18" charset="0"/>
               <a:cs typeface="Times New Roman" panose="02020603050405020304" pitchFamily="18" charset="0"/>
             </a:endParaRPr>
@@ -6610,10 +7490,43 @@
       </p:sp>
       <p:sp>
         <p:nvSpPr>
-          <p:cNvPr id="5" name="Content Placeholder 5">
-            <a:extLst>
-              <a:ext uri="{FF2B5EF4-FFF2-40B4-BE49-F238E27FC236}">
-                <a16:creationId xmlns:a16="http://schemas.microsoft.com/office/drawing/2014/main" id="{5958648E-A2CC-6831-7C02-271DF1AA57B5}"/>
+          <p:cNvPr id="6" name="Content Placeholder 2">
+            <a:extLst>
+              <a:ext uri="{FF2B5EF4-FFF2-40B4-BE49-F238E27FC236}">
+                <a16:creationId xmlns:a16="http://schemas.microsoft.com/office/drawing/2014/main" id="{EBD9DEE8-0D4D-F110-C67B-C3C31F3C73DF}"/>
+              </a:ext>
+            </a:extLst>
+          </p:cNvPr>
+          <p:cNvSpPr>
+            <a:spLocks noGrp="1"/>
+          </p:cNvSpPr>
+          <p:nvPr>
+            <p:ph idx="1"/>
+          </p:nvPr>
+        </p:nvSpPr>
+        <p:spPr>
+          <a:xfrm>
+            <a:off x="1371600" y="2112264"/>
+            <a:ext cx="10241280" cy="3959352"/>
+          </a:xfrm>
+        </p:spPr>
+        <p:txBody>
+          <a:bodyPr/>
+          <a:lstStyle/>
+          <a:p>
+            <a:endParaRPr lang="he-IL" dirty="0"/>
+          </a:p>
+          <a:p>
+            <a:endParaRPr lang="LID4096" dirty="0"/>
+          </a:p>
+        </p:txBody>
+      </p:sp>
+      <p:sp>
+        <p:nvSpPr>
+          <p:cNvPr id="7" name="Content Placeholder 5">
+            <a:extLst>
+              <a:ext uri="{FF2B5EF4-FFF2-40B4-BE49-F238E27FC236}">
+                <a16:creationId xmlns:a16="http://schemas.microsoft.com/office/drawing/2014/main" id="{CCCE1DB7-AAAA-88FA-9E54-3D4115CD1586}"/>
               </a:ext>
             </a:extLst>
           </p:cNvPr>
@@ -6808,6 +7721,500 @@
                 <a:latin typeface="Times New Roman" panose="02020603050405020304" pitchFamily="18" charset="0"/>
                 <a:cs typeface="Times New Roman" panose="02020603050405020304" pitchFamily="18" charset="0"/>
               </a:rPr>
+              <a:t>Scalability –</a:t>
+            </a:r>
+            <a:r>
+              <a:rPr lang="he-IL" b="1" dirty="0">
+                <a:latin typeface="Times New Roman" panose="02020603050405020304" pitchFamily="18" charset="0"/>
+                <a:cs typeface="Times New Roman" panose="02020603050405020304" pitchFamily="18" charset="0"/>
+              </a:rPr>
+              <a:t> </a:t>
+            </a:r>
+            <a:r>
+              <a:rPr lang="en-US" dirty="0">
+                <a:latin typeface="Times New Roman" panose="02020603050405020304" pitchFamily="18" charset="0"/>
+                <a:cs typeface="Times New Roman" panose="02020603050405020304" pitchFamily="18" charset="0"/>
+              </a:rPr>
+              <a:t>large number of parameters and complex architectures</a:t>
+            </a:r>
+          </a:p>
+          <a:p>
+            <a:endParaRPr lang="he-IL" dirty="0">
+              <a:latin typeface="Times New Roman" panose="02020603050405020304" pitchFamily="18" charset="0"/>
+              <a:cs typeface="Times New Roman" panose="02020603050405020304" pitchFamily="18" charset="0"/>
+            </a:endParaRPr>
+          </a:p>
+          <a:p>
+            <a:endParaRPr lang="en-US" dirty="0">
+              <a:latin typeface="Times New Roman" panose="02020603050405020304" pitchFamily="18" charset="0"/>
+              <a:cs typeface="Times New Roman" panose="02020603050405020304" pitchFamily="18" charset="0"/>
+            </a:endParaRPr>
+          </a:p>
+          <a:p>
+            <a:pPr marL="0" indent="0">
+              <a:buNone/>
+            </a:pPr>
+            <a:r>
+              <a:rPr lang="en-US" b="1" dirty="0">
+                <a:latin typeface="Times New Roman" panose="02020603050405020304" pitchFamily="18" charset="0"/>
+                <a:cs typeface="Times New Roman" panose="02020603050405020304" pitchFamily="18" charset="0"/>
+              </a:rPr>
+              <a:t>Non-linearities –</a:t>
+            </a:r>
+            <a:r>
+              <a:rPr lang="he-IL" b="1" dirty="0">
+                <a:latin typeface="Times New Roman" panose="02020603050405020304" pitchFamily="18" charset="0"/>
+                <a:cs typeface="Times New Roman" panose="02020603050405020304" pitchFamily="18" charset="0"/>
+              </a:rPr>
+              <a:t> </a:t>
+            </a:r>
+            <a:r>
+              <a:rPr lang="en-US" dirty="0">
+                <a:latin typeface="Times New Roman" panose="02020603050405020304" pitchFamily="18" charset="0"/>
+                <a:cs typeface="Times New Roman" panose="02020603050405020304" pitchFamily="18" charset="0"/>
+              </a:rPr>
+              <a:t>activation functions complicates the verification </a:t>
+            </a:r>
+          </a:p>
+          <a:p>
+            <a:endParaRPr lang="he-IL" dirty="0">
+              <a:latin typeface="Times New Roman" panose="02020603050405020304" pitchFamily="18" charset="0"/>
+              <a:cs typeface="Times New Roman" panose="02020603050405020304" pitchFamily="18" charset="0"/>
+            </a:endParaRPr>
+          </a:p>
+          <a:p>
+            <a:endParaRPr lang="en-US" dirty="0">
+              <a:latin typeface="Times New Roman" panose="02020603050405020304" pitchFamily="18" charset="0"/>
+              <a:cs typeface="Times New Roman" panose="02020603050405020304" pitchFamily="18" charset="0"/>
+            </a:endParaRPr>
+          </a:p>
+          <a:p>
+            <a:pPr marL="0" indent="0">
+              <a:buNone/>
+            </a:pPr>
+            <a:r>
+              <a:rPr lang="en-US" b="1" dirty="0">
+                <a:latin typeface="Times New Roman" panose="02020603050405020304" pitchFamily="18" charset="0"/>
+                <a:cs typeface="Times New Roman" panose="02020603050405020304" pitchFamily="18" charset="0"/>
+              </a:rPr>
+              <a:t>Robustness Verification – </a:t>
+            </a:r>
+            <a:r>
+              <a:rPr lang="en-US" dirty="0">
+                <a:latin typeface="Times New Roman" panose="02020603050405020304" pitchFamily="18" charset="0"/>
+                <a:cs typeface="Times New Roman" panose="02020603050405020304" pitchFamily="18" charset="0"/>
+              </a:rPr>
+              <a:t>Ensuring NN are robust against adversarial attack</a:t>
+            </a:r>
+            <a:endParaRPr lang="LID4096" dirty="0">
+              <a:latin typeface="Times New Roman" panose="02020603050405020304" pitchFamily="18" charset="0"/>
+              <a:cs typeface="Times New Roman" panose="02020603050405020304" pitchFamily="18" charset="0"/>
+            </a:endParaRPr>
+          </a:p>
+        </p:txBody>
+      </p:sp>
+      <p:pic>
+        <p:nvPicPr>
+          <p:cNvPr id="22" name="Graphic 21" descr="Periodic Graph with solid fill">
+            <a:extLst>
+              <a:ext uri="{FF2B5EF4-FFF2-40B4-BE49-F238E27FC236}">
+                <a16:creationId xmlns:a16="http://schemas.microsoft.com/office/drawing/2014/main" id="{25E35949-452C-FCDA-0447-CA79C0C31396}"/>
+              </a:ext>
+            </a:extLst>
+          </p:cNvPr>
+          <p:cNvPicPr>
+            <a:picLocks noChangeAspect="1"/>
+          </p:cNvPicPr>
+          <p:nvPr/>
+        </p:nvPicPr>
+        <p:blipFill>
+          <a:blip r:embed="rId2">
+            <a:extLst>
+              <a:ext uri="{96DAC541-7B7A-43D3-8B79-37D633B846F1}">
+                <asvg:svgBlip xmlns:asvg="http://schemas.microsoft.com/office/drawing/2016/SVG/main" r:embed="rId3"/>
+              </a:ext>
+            </a:extLst>
+          </a:blip>
+          <a:stretch>
+            <a:fillRect/>
+          </a:stretch>
+        </p:blipFill>
+        <p:spPr>
+          <a:xfrm>
+            <a:off x="727979" y="3141602"/>
+            <a:ext cx="614123" cy="614123"/>
+          </a:xfrm>
+          <a:prstGeom prst="rect">
+            <a:avLst/>
+          </a:prstGeom>
+        </p:spPr>
+      </p:pic>
+      <p:pic>
+        <p:nvPicPr>
+          <p:cNvPr id="11" name="Graphic 10" descr="Stopwatch 66% with solid fill">
+            <a:extLst>
+              <a:ext uri="{FF2B5EF4-FFF2-40B4-BE49-F238E27FC236}">
+                <a16:creationId xmlns:a16="http://schemas.microsoft.com/office/drawing/2014/main" id="{0F9AD281-957C-C851-EDA7-E04BA24ED508}"/>
+              </a:ext>
+            </a:extLst>
+          </p:cNvPr>
+          <p:cNvPicPr>
+            <a:picLocks noChangeAspect="1"/>
+          </p:cNvPicPr>
+          <p:nvPr/>
+        </p:nvPicPr>
+        <p:blipFill>
+          <a:blip r:embed="rId4">
+            <a:extLst>
+              <a:ext uri="{96DAC541-7B7A-43D3-8B79-37D633B846F1}">
+                <asvg:svgBlip xmlns:asvg="http://schemas.microsoft.com/office/drawing/2016/SVG/main" r:embed="rId5"/>
+              </a:ext>
+            </a:extLst>
+          </a:blip>
+          <a:stretch>
+            <a:fillRect/>
+          </a:stretch>
+        </p:blipFill>
+        <p:spPr>
+          <a:xfrm>
+            <a:off x="727980" y="1675469"/>
+            <a:ext cx="614123" cy="614123"/>
+          </a:xfrm>
+          <a:prstGeom prst="rect">
+            <a:avLst/>
+          </a:prstGeom>
+        </p:spPr>
+      </p:pic>
+      <p:pic>
+        <p:nvPicPr>
+          <p:cNvPr id="13" name="Graphic 12" descr="Lock with solid fill">
+            <a:extLst>
+              <a:ext uri="{FF2B5EF4-FFF2-40B4-BE49-F238E27FC236}">
+                <a16:creationId xmlns:a16="http://schemas.microsoft.com/office/drawing/2014/main" id="{BD7EAD20-6D3B-1213-024B-B9B8D262CFB4}"/>
+              </a:ext>
+            </a:extLst>
+          </p:cNvPr>
+          <p:cNvPicPr>
+            <a:picLocks noChangeAspect="1"/>
+          </p:cNvPicPr>
+          <p:nvPr/>
+        </p:nvPicPr>
+        <p:blipFill>
+          <a:blip r:embed="rId6">
+            <a:extLst>
+              <a:ext uri="{96DAC541-7B7A-43D3-8B79-37D633B846F1}">
+                <asvg:svgBlip xmlns:asvg="http://schemas.microsoft.com/office/drawing/2016/SVG/main" r:embed="rId7"/>
+              </a:ext>
+            </a:extLst>
+          </a:blip>
+          <a:stretch>
+            <a:fillRect/>
+          </a:stretch>
+        </p:blipFill>
+        <p:spPr>
+          <a:xfrm>
+            <a:off x="727979" y="4637231"/>
+            <a:ext cx="614124" cy="614124"/>
+          </a:xfrm>
+          <a:prstGeom prst="rect">
+            <a:avLst/>
+          </a:prstGeom>
+        </p:spPr>
+      </p:pic>
+    </p:spTree>
+    <p:extLst>
+      <p:ext uri="{BB962C8B-B14F-4D97-AF65-F5344CB8AC3E}">
+        <p14:creationId xmlns:p14="http://schemas.microsoft.com/office/powerpoint/2010/main" val="2551144604"/>
+      </p:ext>
+    </p:extLst>
+  </p:cSld>
+  <p:clrMapOvr>
+    <a:masterClrMapping/>
+  </p:clrMapOvr>
+</p:sld>
+</file>
+
+<file path=ppt/slides/slide5.xml><?xml version="1.0" encoding="utf-8"?>
+<p:sld xmlns:a="http://schemas.openxmlformats.org/drawingml/2006/main" xmlns:r="http://schemas.openxmlformats.org/officeDocument/2006/relationships" xmlns:p="http://schemas.openxmlformats.org/presentationml/2006/main">
+  <p:cSld>
+    <p:spTree>
+      <p:nvGrpSpPr>
+        <p:cNvPr id="1" name=""/>
+        <p:cNvGrpSpPr/>
+        <p:nvPr/>
+      </p:nvGrpSpPr>
+      <p:grpSpPr>
+        <a:xfrm>
+          <a:off x="0" y="0"/>
+          <a:ext cx="0" cy="0"/>
+          <a:chOff x="0" y="0"/>
+          <a:chExt cx="0" cy="0"/>
+        </a:xfrm>
+      </p:grpSpPr>
+      <p:sp>
+        <p:nvSpPr>
+          <p:cNvPr id="4" name="Title 1">
+            <a:extLst>
+              <a:ext uri="{FF2B5EF4-FFF2-40B4-BE49-F238E27FC236}">
+                <a16:creationId xmlns:a16="http://schemas.microsoft.com/office/drawing/2014/main" id="{9F6A0F8F-A975-8428-A8B2-B42F6EE8FEE9}"/>
+              </a:ext>
+            </a:extLst>
+          </p:cNvPr>
+          <p:cNvSpPr txBox="1">
+            <a:spLocks/>
+          </p:cNvSpPr>
+          <p:nvPr/>
+        </p:nvSpPr>
+        <p:spPr>
+          <a:xfrm>
+            <a:off x="0" y="636638"/>
+            <a:ext cx="12192000" cy="614123"/>
+          </a:xfrm>
+          <a:prstGeom prst="rect">
+            <a:avLst/>
+          </a:prstGeom>
+        </p:spPr>
+        <p:txBody>
+          <a:bodyPr vert="horz" lIns="0" tIns="0" rIns="0" bIns="0" rtlCol="0" anchor="b">
+            <a:normAutofit/>
+          </a:bodyPr>
+          <a:lstStyle>
+            <a:lvl1pPr algn="l" defTabSz="914400" rtl="0" eaLnBrk="1" latinLnBrk="0" hangingPunct="1">
+              <a:lnSpc>
+                <a:spcPct val="100000"/>
+              </a:lnSpc>
+              <a:spcBef>
+                <a:spcPct val="0"/>
+              </a:spcBef>
+              <a:buNone/>
+              <a:defRPr sz="3600" b="1" i="0" kern="1200" cap="all" spc="700" baseline="0">
+                <a:solidFill>
+                  <a:schemeClr val="tx1"/>
+                </a:solidFill>
+                <a:latin typeface="+mj-lt"/>
+                <a:ea typeface="+mj-ea"/>
+                <a:cs typeface="+mj-cs"/>
+              </a:defRPr>
+            </a:lvl1pPr>
+          </a:lstStyle>
+          <a:p>
+            <a:pPr algn="ctr"/>
+            <a:r>
+              <a:rPr lang="en-US" sz="3200" cap="none" spc="100" dirty="0">
+                <a:latin typeface="Times New Roman" panose="02020603050405020304" pitchFamily="18" charset="0"/>
+                <a:ea typeface="Cambria" panose="02040503050406030204" pitchFamily="18" charset="0"/>
+                <a:cs typeface="Times New Roman" panose="02020603050405020304" pitchFamily="18" charset="0"/>
+              </a:rPr>
+              <a:t>Maraboupy: Python Interface for Neural Network Verification</a:t>
+            </a:r>
+            <a:endParaRPr lang="LID4096" sz="3200" cap="none" spc="100" dirty="0">
+              <a:latin typeface="Times New Roman" panose="02020603050405020304" pitchFamily="18" charset="0"/>
+              <a:ea typeface="Cambria" panose="02040503050406030204" pitchFamily="18" charset="0"/>
+              <a:cs typeface="Times New Roman" panose="02020603050405020304" pitchFamily="18" charset="0"/>
+            </a:endParaRPr>
+          </a:p>
+        </p:txBody>
+      </p:sp>
+      <p:sp>
+        <p:nvSpPr>
+          <p:cNvPr id="5" name="Content Placeholder 5">
+            <a:extLst>
+              <a:ext uri="{FF2B5EF4-FFF2-40B4-BE49-F238E27FC236}">
+                <a16:creationId xmlns:a16="http://schemas.microsoft.com/office/drawing/2014/main" id="{5958648E-A2CC-6831-7C02-271DF1AA57B5}"/>
+              </a:ext>
+            </a:extLst>
+          </p:cNvPr>
+          <p:cNvSpPr txBox="1">
+            <a:spLocks/>
+          </p:cNvSpPr>
+          <p:nvPr/>
+        </p:nvSpPr>
+        <p:spPr>
+          <a:xfrm>
+            <a:off x="1371600" y="1793453"/>
+            <a:ext cx="10241280" cy="3959352"/>
+          </a:xfrm>
+          <a:prstGeom prst="rect">
+            <a:avLst/>
+          </a:prstGeom>
+        </p:spPr>
+        <p:txBody>
+          <a:bodyPr vert="horz" lIns="0" tIns="0" rIns="0" bIns="0" rtlCol="0">
+            <a:normAutofit/>
+          </a:bodyPr>
+          <a:lstStyle>
+            <a:lvl1pPr marL="228600" indent="-228600" algn="l" defTabSz="914400" rtl="0" eaLnBrk="1" latinLnBrk="0" hangingPunct="1">
+              <a:lnSpc>
+                <a:spcPct val="120000"/>
+              </a:lnSpc>
+              <a:spcBef>
+                <a:spcPts val="1000"/>
+              </a:spcBef>
+              <a:buFont typeface="Arial" panose="020B0604020202020204" pitchFamily="34" charset="0"/>
+              <a:buChar char="•"/>
+              <a:defRPr sz="2000" kern="1200">
+                <a:solidFill>
+                  <a:schemeClr val="tx1"/>
+                </a:solidFill>
+                <a:latin typeface="+mn-lt"/>
+                <a:ea typeface="+mn-ea"/>
+                <a:cs typeface="+mn-cs"/>
+              </a:defRPr>
+            </a:lvl1pPr>
+            <a:lvl2pPr marL="685800" indent="-228600" algn="l" defTabSz="914400" rtl="0" eaLnBrk="1" latinLnBrk="0" hangingPunct="1">
+              <a:lnSpc>
+                <a:spcPct val="120000"/>
+              </a:lnSpc>
+              <a:spcBef>
+                <a:spcPts val="500"/>
+              </a:spcBef>
+              <a:buFont typeface="Arial" panose="020B0604020202020204" pitchFamily="34" charset="0"/>
+              <a:buChar char="•"/>
+              <a:defRPr sz="2000" kern="1200">
+                <a:solidFill>
+                  <a:schemeClr val="tx1"/>
+                </a:solidFill>
+                <a:latin typeface="+mn-lt"/>
+                <a:ea typeface="+mn-ea"/>
+                <a:cs typeface="+mn-cs"/>
+              </a:defRPr>
+            </a:lvl2pPr>
+            <a:lvl3pPr marL="1143000" indent="-228600" algn="l" defTabSz="914400" rtl="0" eaLnBrk="1" latinLnBrk="0" hangingPunct="1">
+              <a:lnSpc>
+                <a:spcPct val="120000"/>
+              </a:lnSpc>
+              <a:spcBef>
+                <a:spcPts val="500"/>
+              </a:spcBef>
+              <a:buFont typeface="Arial" panose="020B0604020202020204" pitchFamily="34" charset="0"/>
+              <a:buChar char="•"/>
+              <a:defRPr sz="1800" kern="1200">
+                <a:solidFill>
+                  <a:schemeClr val="tx1"/>
+                </a:solidFill>
+                <a:latin typeface="+mn-lt"/>
+                <a:ea typeface="+mn-ea"/>
+                <a:cs typeface="+mn-cs"/>
+              </a:defRPr>
+            </a:lvl3pPr>
+            <a:lvl4pPr marL="1600200" indent="-228600" algn="l" defTabSz="914400" rtl="0" eaLnBrk="1" latinLnBrk="0" hangingPunct="1">
+              <a:lnSpc>
+                <a:spcPct val="120000"/>
+              </a:lnSpc>
+              <a:spcBef>
+                <a:spcPts val="500"/>
+              </a:spcBef>
+              <a:buFont typeface="Arial" panose="020B0604020202020204" pitchFamily="34" charset="0"/>
+              <a:buChar char="•"/>
+              <a:defRPr sz="1600" kern="1200">
+                <a:solidFill>
+                  <a:schemeClr val="tx1"/>
+                </a:solidFill>
+                <a:latin typeface="+mn-lt"/>
+                <a:ea typeface="+mn-ea"/>
+                <a:cs typeface="+mn-cs"/>
+              </a:defRPr>
+            </a:lvl4pPr>
+            <a:lvl5pPr marL="2057400" indent="-228600" algn="l" defTabSz="914400" rtl="0" eaLnBrk="1" latinLnBrk="0" hangingPunct="1">
+              <a:lnSpc>
+                <a:spcPct val="120000"/>
+              </a:lnSpc>
+              <a:spcBef>
+                <a:spcPts val="500"/>
+              </a:spcBef>
+              <a:buFont typeface="Arial" panose="020B0604020202020204" pitchFamily="34" charset="0"/>
+              <a:buChar char="•"/>
+              <a:defRPr sz="1600" kern="1200">
+                <a:solidFill>
+                  <a:schemeClr val="tx1"/>
+                </a:solidFill>
+                <a:latin typeface="+mn-lt"/>
+                <a:ea typeface="+mn-ea"/>
+                <a:cs typeface="+mn-cs"/>
+              </a:defRPr>
+            </a:lvl5pPr>
+            <a:lvl6pPr marL="2514600" indent="-228600" algn="l" defTabSz="914400" rtl="0" eaLnBrk="1" latinLnBrk="0" hangingPunct="1">
+              <a:lnSpc>
+                <a:spcPct val="90000"/>
+              </a:lnSpc>
+              <a:spcBef>
+                <a:spcPts val="500"/>
+              </a:spcBef>
+              <a:buFont typeface="Arial" panose="020B0604020202020204" pitchFamily="34" charset="0"/>
+              <a:buChar char="•"/>
+              <a:defRPr sz="1800" kern="1200">
+                <a:solidFill>
+                  <a:schemeClr val="tx1"/>
+                </a:solidFill>
+                <a:latin typeface="+mn-lt"/>
+                <a:ea typeface="+mn-ea"/>
+                <a:cs typeface="+mn-cs"/>
+              </a:defRPr>
+            </a:lvl6pPr>
+            <a:lvl7pPr marL="2971800" indent="-228600" algn="l" defTabSz="914400" rtl="0" eaLnBrk="1" latinLnBrk="0" hangingPunct="1">
+              <a:lnSpc>
+                <a:spcPct val="90000"/>
+              </a:lnSpc>
+              <a:spcBef>
+                <a:spcPts val="500"/>
+              </a:spcBef>
+              <a:buFont typeface="Arial" panose="020B0604020202020204" pitchFamily="34" charset="0"/>
+              <a:buChar char="•"/>
+              <a:defRPr sz="1800" kern="1200">
+                <a:solidFill>
+                  <a:schemeClr val="tx1"/>
+                </a:solidFill>
+                <a:latin typeface="+mn-lt"/>
+                <a:ea typeface="+mn-ea"/>
+                <a:cs typeface="+mn-cs"/>
+              </a:defRPr>
+            </a:lvl7pPr>
+            <a:lvl8pPr marL="3429000" indent="-228600" algn="l" defTabSz="914400" rtl="0" eaLnBrk="1" latinLnBrk="0" hangingPunct="1">
+              <a:lnSpc>
+                <a:spcPct val="90000"/>
+              </a:lnSpc>
+              <a:spcBef>
+                <a:spcPts val="500"/>
+              </a:spcBef>
+              <a:buFont typeface="Arial" panose="020B0604020202020204" pitchFamily="34" charset="0"/>
+              <a:buChar char="•"/>
+              <a:defRPr sz="1800" kern="1200">
+                <a:solidFill>
+                  <a:schemeClr val="tx1"/>
+                </a:solidFill>
+                <a:latin typeface="+mn-lt"/>
+                <a:ea typeface="+mn-ea"/>
+                <a:cs typeface="+mn-cs"/>
+              </a:defRPr>
+            </a:lvl8pPr>
+            <a:lvl9pPr marL="3886200" indent="-228600" algn="l" defTabSz="914400" rtl="0" eaLnBrk="1" latinLnBrk="0" hangingPunct="1">
+              <a:lnSpc>
+                <a:spcPct val="90000"/>
+              </a:lnSpc>
+              <a:spcBef>
+                <a:spcPts val="500"/>
+              </a:spcBef>
+              <a:buFont typeface="Arial" panose="020B0604020202020204" pitchFamily="34" charset="0"/>
+              <a:buChar char="•"/>
+              <a:defRPr sz="1800" kern="1200">
+                <a:solidFill>
+                  <a:schemeClr val="tx1"/>
+                </a:solidFill>
+                <a:latin typeface="+mn-lt"/>
+                <a:ea typeface="+mn-ea"/>
+                <a:cs typeface="+mn-cs"/>
+              </a:defRPr>
+            </a:lvl9pPr>
+          </a:lstStyle>
+          <a:p>
+            <a:pPr marL="0" indent="0">
+              <a:buNone/>
+            </a:pPr>
+            <a:r>
+              <a:rPr lang="en-US" b="1" dirty="0">
+                <a:latin typeface="Times New Roman" panose="02020603050405020304" pitchFamily="18" charset="0"/>
+                <a:cs typeface="Times New Roman" panose="02020603050405020304" pitchFamily="18" charset="0"/>
+              </a:rPr>
               <a:t>Key Features –</a:t>
             </a:r>
             <a:r>
@@ -7363,8 +8770,8 @@
           <a:chExt cx="0" cy="0"/>
         </a:xfrm>
       </p:grpSpPr>
-      <mc:AlternateContent xmlns:mc="http://schemas.openxmlformats.org/markup-compatibility/2006">
-        <mc:Choice xmlns:a14="http://schemas.microsoft.com/office/drawing/2010/main" Requires="a14">
+      <mc:AlternateContent xmlns:mc="http://schemas.openxmlformats.org/markup-compatibility/2006" xmlns:a14="http://schemas.microsoft.com/office/drawing/2010/main">
+        <mc:Choice Requires="a14">
           <p:sp>
             <p:nvSpPr>
               <p:cNvPr id="3" name="Content Placeholder 2">
@@ -7824,7 +9231,7 @@
             </p:txBody>
           </p:sp>
         </mc:Choice>
-        <mc:Fallback>
+        <mc:Fallback xmlns="">
           <p:sp>
             <p:nvSpPr>
               <p:cNvPr id="3" name="Content Placeholder 2">
@@ -7988,14 +9395,14 @@
               <a:buNone/>
             </a:pPr>
             <a:r>
-              <a:rPr lang="en-US" b="1" dirty="0">
+              <a:rPr lang="en-US" sz="2200" b="1" dirty="0">
                 <a:latin typeface="Times New Roman" panose="02020603050405020304" pitchFamily="18" charset="0"/>
                 <a:cs typeface="Times New Roman" panose="02020603050405020304" pitchFamily="18" charset="0"/>
               </a:rPr>
               <a:t>Concept – </a:t>
             </a:r>
             <a:r>
-              <a:rPr lang="en-US" dirty="0">
+              <a:rPr lang="en-US" sz="2200" dirty="0">
                 <a:latin typeface="Times New Roman" panose="02020603050405020304" pitchFamily="18" charset="0"/>
                 <a:cs typeface="Times New Roman" panose="02020603050405020304" pitchFamily="18" charset="0"/>
               </a:rPr>
@@ -8025,14 +9432,14 @@
               <a:buNone/>
             </a:pPr>
             <a:r>
-              <a:rPr lang="en-US" b="1" dirty="0">
+              <a:rPr lang="en-US" sz="2200" b="1" dirty="0">
                 <a:latin typeface="Times New Roman" panose="02020603050405020304" pitchFamily="18" charset="0"/>
                 <a:cs typeface="Times New Roman" panose="02020603050405020304" pitchFamily="18" charset="0"/>
               </a:rPr>
               <a:t>Scalability –</a:t>
             </a:r>
             <a:r>
-              <a:rPr lang="en-US" dirty="0">
+              <a:rPr lang="en-US" sz="2200" dirty="0">
                 <a:latin typeface="Times New Roman" panose="02020603050405020304" pitchFamily="18" charset="0"/>
                 <a:cs typeface="Times New Roman" panose="02020603050405020304" pitchFamily="18" charset="0"/>
               </a:rPr>
@@ -8062,14 +9469,14 @@
               <a:buNone/>
             </a:pPr>
             <a:r>
-              <a:rPr lang="en-US" b="1" dirty="0">
+              <a:rPr lang="en-US" sz="2200" b="1" dirty="0">
                 <a:latin typeface="Times New Roman" panose="02020603050405020304" pitchFamily="18" charset="0"/>
                 <a:cs typeface="Times New Roman" panose="02020603050405020304" pitchFamily="18" charset="0"/>
               </a:rPr>
               <a:t>Stability – </a:t>
             </a:r>
             <a:r>
-              <a:rPr lang="en-US" dirty="0">
+              <a:rPr lang="en-US" sz="2200" dirty="0">
                 <a:latin typeface="Times New Roman" panose="02020603050405020304" pitchFamily="18" charset="0"/>
                 <a:cs typeface="Times New Roman" panose="02020603050405020304" pitchFamily="18" charset="0"/>
               </a:rPr>
@@ -8081,7 +9488,7 @@
               <a:buNone/>
             </a:pPr>
             <a:r>
-              <a:rPr lang="en-US" dirty="0">
+              <a:rPr lang="en-US" sz="2200" dirty="0">
                 <a:latin typeface="Times New Roman" panose="02020603050405020304" pitchFamily="18" charset="0"/>
                 <a:cs typeface="Times New Roman" panose="02020603050405020304" pitchFamily="18" charset="0"/>
               </a:rPr>
@@ -8153,6 +9560,149 @@
     <p:extLst>
       <p:ext uri="{BB962C8B-B14F-4D97-AF65-F5344CB8AC3E}">
         <p14:creationId xmlns:p14="http://schemas.microsoft.com/office/powerpoint/2010/main" val="1560638069"/>
+      </p:ext>
+    </p:extLst>
+  </p:cSld>
+  <p:clrMapOvr>
+    <a:masterClrMapping/>
+  </p:clrMapOvr>
+</p:sld>
+</file>
+
+<file path=ppt/slides/slide9.xml><?xml version="1.0" encoding="utf-8"?>
+<p:sld xmlns:a="http://schemas.openxmlformats.org/drawingml/2006/main" xmlns:r="http://schemas.openxmlformats.org/officeDocument/2006/relationships" xmlns:p="http://schemas.openxmlformats.org/presentationml/2006/main">
+  <p:cSld>
+    <p:spTree>
+      <p:nvGrpSpPr>
+        <p:cNvPr id="1" name=""/>
+        <p:cNvGrpSpPr/>
+        <p:nvPr/>
+      </p:nvGrpSpPr>
+      <p:grpSpPr>
+        <a:xfrm>
+          <a:off x="0" y="0"/>
+          <a:ext cx="0" cy="0"/>
+          <a:chOff x="0" y="0"/>
+          <a:chExt cx="0" cy="0"/>
+        </a:xfrm>
+      </p:grpSpPr>
+      <p:sp>
+        <p:nvSpPr>
+          <p:cNvPr id="4" name="Title 1">
+            <a:extLst>
+              <a:ext uri="{FF2B5EF4-FFF2-40B4-BE49-F238E27FC236}">
+                <a16:creationId xmlns:a16="http://schemas.microsoft.com/office/drawing/2014/main" id="{DD32D97F-F745-3594-FC1C-B6D601A78D7D}"/>
+              </a:ext>
+            </a:extLst>
+          </p:cNvPr>
+          <p:cNvSpPr>
+            <a:spLocks noGrp="1"/>
+          </p:cNvSpPr>
+          <p:nvPr>
+            <p:ph type="title"/>
+          </p:nvPr>
+        </p:nvSpPr>
+        <p:spPr>
+          <a:xfrm>
+            <a:off x="0" y="636638"/>
+            <a:ext cx="12192000" cy="614123"/>
+          </a:xfrm>
+        </p:spPr>
+        <p:txBody>
+          <a:bodyPr/>
+          <a:lstStyle/>
+          <a:p>
+            <a:pPr algn="ctr"/>
+            <a:r>
+              <a:rPr lang="en-US" cap="none" spc="100" dirty="0">
+                <a:latin typeface="Times New Roman" panose="02020603050405020304" pitchFamily="18" charset="0"/>
+                <a:ea typeface="Cambria" panose="02040503050406030204" pitchFamily="18" charset="0"/>
+                <a:cs typeface="Times New Roman" panose="02020603050405020304" pitchFamily="18" charset="0"/>
+              </a:rPr>
+              <a:t>Code – The Sokoban Game</a:t>
+            </a:r>
+            <a:endParaRPr lang="LID4096" cap="none" spc="0" dirty="0">
+              <a:latin typeface="Cambria" panose="02040503050406030204" pitchFamily="18" charset="0"/>
+              <a:ea typeface="Cambria" panose="02040503050406030204" pitchFamily="18" charset="0"/>
+              <a:cs typeface="Times New Roman" panose="02020603050405020304" pitchFamily="18" charset="0"/>
+            </a:endParaRPr>
+          </a:p>
+        </p:txBody>
+      </p:sp>
+      <p:sp>
+        <p:nvSpPr>
+          <p:cNvPr id="5" name="Content Placeholder 2">
+            <a:extLst>
+              <a:ext uri="{FF2B5EF4-FFF2-40B4-BE49-F238E27FC236}">
+                <a16:creationId xmlns:a16="http://schemas.microsoft.com/office/drawing/2014/main" id="{D6CE0CA9-073B-221A-B3BC-03D41FE4AAB7}"/>
+              </a:ext>
+            </a:extLst>
+          </p:cNvPr>
+          <p:cNvSpPr>
+            <a:spLocks noGrp="1"/>
+          </p:cNvSpPr>
+          <p:nvPr>
+            <p:ph idx="1"/>
+          </p:nvPr>
+        </p:nvSpPr>
+        <p:spPr>
+          <a:xfrm>
+            <a:off x="1371600" y="2112264"/>
+            <a:ext cx="10241280" cy="3959352"/>
+          </a:xfrm>
+        </p:spPr>
+        <p:txBody>
+          <a:bodyPr>
+            <a:normAutofit/>
+          </a:bodyPr>
+          <a:lstStyle/>
+          <a:p>
+            <a:pPr marL="0" indent="0">
+              <a:buNone/>
+            </a:pPr>
+            <a:r>
+              <a:rPr lang="en-US" dirty="0" err="1">
+                <a:latin typeface="Times New Roman" panose="02020603050405020304" pitchFamily="18" charset="0"/>
+                <a:cs typeface="Times New Roman" panose="02020603050405020304" pitchFamily="18" charset="0"/>
+              </a:rPr>
+              <a:t>skcmaslkcmdaklcmadlkcmdalkcmdpkck</a:t>
+            </a:r>
+            <a:endParaRPr lang="en-US" dirty="0">
+              <a:latin typeface="Times New Roman" panose="02020603050405020304" pitchFamily="18" charset="0"/>
+              <a:cs typeface="Times New Roman" panose="02020603050405020304" pitchFamily="18" charset="0"/>
+            </a:endParaRPr>
+          </a:p>
+          <a:p>
+            <a:pPr marL="0" indent="0">
+              <a:buNone/>
+            </a:pPr>
+            <a:endParaRPr lang="en-US" dirty="0">
+              <a:latin typeface="Times New Roman" panose="02020603050405020304" pitchFamily="18" charset="0"/>
+              <a:cs typeface="Times New Roman" panose="02020603050405020304" pitchFamily="18" charset="0"/>
+            </a:endParaRPr>
+          </a:p>
+          <a:p>
+            <a:pPr marL="0" indent="0">
+              <a:buNone/>
+            </a:pPr>
+            <a:r>
+              <a:rPr lang="en-US" dirty="0">
+                <a:latin typeface="Times New Roman" panose="02020603050405020304" pitchFamily="18" charset="0"/>
+                <a:cs typeface="Times New Roman" panose="02020603050405020304" pitchFamily="18" charset="0"/>
+              </a:rPr>
+              <a:t> </a:t>
+            </a:r>
+            <a:endParaRPr lang="LID4096" dirty="0">
+              <a:latin typeface="Times New Roman" panose="02020603050405020304" pitchFamily="18" charset="0"/>
+              <a:cs typeface="Times New Roman" panose="02020603050405020304" pitchFamily="18" charset="0"/>
+            </a:endParaRPr>
+          </a:p>
+        </p:txBody>
+      </p:sp>
+    </p:spTree>
+    <p:extLst>
+      <p:ext uri="{BB962C8B-B14F-4D97-AF65-F5344CB8AC3E}">
+        <p14:creationId xmlns:p14="http://schemas.microsoft.com/office/powerpoint/2010/main" val="522411142"/>
       </p:ext>
     </p:extLst>
   </p:cSld>

</xml_diff>

<commit_message>
adding CNN, simple test. option for GPU
</commit_message>
<xml_diff>
--- a/presentation.pptx
+++ b/presentation.pptx
@@ -131,7 +131,7 @@
 <file path=ppt/revisionInfo.xml><?xml version="1.0" encoding="utf-8"?>
 <p1510:revInfo xmlns:a="http://schemas.openxmlformats.org/drawingml/2006/main" xmlns:r="http://schemas.openxmlformats.org/officeDocument/2006/relationships" xmlns:p1510="http://schemas.microsoft.com/office/powerpoint/2015/10/main">
   <p1510:revLst>
-    <p1510:client id="{C848D9A1-E4C3-4BC8-9DDE-B82935BDE34D}" v="228" dt="2024-08-31T12:45:21.847"/>
+    <p1510:client id="{C848D9A1-E4C3-4BC8-9DDE-B82935BDE34D}" v="230" dt="2024-09-01T09:31:48.308"/>
   </p1510:revLst>
 </p1510:revInfo>
 </file>
@@ -141,7 +141,7 @@
   <pc:docChgLst>
     <pc:chgData name="Erel Dekel" userId="5861eaf1660df668" providerId="LiveId" clId="{C848D9A1-E4C3-4BC8-9DDE-B82935BDE34D}"/>
     <pc:docChg chg="undo custSel addSld modSld addMainMaster delMainMaster">
-      <pc:chgData name="Erel Dekel" userId="5861eaf1660df668" providerId="LiveId" clId="{C848D9A1-E4C3-4BC8-9DDE-B82935BDE34D}" dt="2024-08-31T12:45:36.331" v="6219" actId="313"/>
+      <pc:chgData name="Erel Dekel" userId="5861eaf1660df668" providerId="LiveId" clId="{C848D9A1-E4C3-4BC8-9DDE-B82935BDE34D}" dt="2024-09-01T09:31:57.687" v="6424" actId="1076"/>
       <pc:docMkLst>
         <pc:docMk/>
       </pc:docMkLst>
@@ -1018,7 +1018,7 @@
         </pc:spChg>
       </pc:sldChg>
       <pc:sldChg chg="addSp delSp modSp new mod">
-        <pc:chgData name="Erel Dekel" userId="5861eaf1660df668" providerId="LiveId" clId="{C848D9A1-E4C3-4BC8-9DDE-B82935BDE34D}" dt="2024-08-31T10:16:48.223" v="4928" actId="20577"/>
+        <pc:chgData name="Erel Dekel" userId="5861eaf1660df668" providerId="LiveId" clId="{C848D9A1-E4C3-4BC8-9DDE-B82935BDE34D}" dt="2024-09-01T09:31:57.687" v="6424" actId="1076"/>
         <pc:sldMkLst>
           <pc:docMk/>
           <pc:sldMk cId="522411142" sldId="264"/>
@@ -1048,20 +1048,36 @@
           </ac:spMkLst>
         </pc:spChg>
         <pc:spChg chg="add mod">
-          <ac:chgData name="Erel Dekel" userId="5861eaf1660df668" providerId="LiveId" clId="{C848D9A1-E4C3-4BC8-9DDE-B82935BDE34D}" dt="2024-08-31T10:16:48.223" v="4928" actId="20577"/>
+          <ac:chgData name="Erel Dekel" userId="5861eaf1660df668" providerId="LiveId" clId="{C848D9A1-E4C3-4BC8-9DDE-B82935BDE34D}" dt="2024-09-01T09:29:25.043" v="6420" actId="20577"/>
           <ac:spMkLst>
             <pc:docMk/>
             <pc:sldMk cId="522411142" sldId="264"/>
             <ac:spMk id="5" creationId="{D6CE0CA9-073B-221A-B3BC-03D41FE4AAB7}"/>
           </ac:spMkLst>
         </pc:spChg>
+        <pc:picChg chg="add mod">
+          <ac:chgData name="Erel Dekel" userId="5861eaf1660df668" providerId="LiveId" clId="{C848D9A1-E4C3-4BC8-9DDE-B82935BDE34D}" dt="2024-09-01T09:31:57.687" v="6424" actId="1076"/>
+          <ac:picMkLst>
+            <pc:docMk/>
+            <pc:sldMk cId="522411142" sldId="264"/>
+            <ac:picMk id="3" creationId="{B121DC97-9BD2-A4AB-89BB-8F01E1ABB157}"/>
+          </ac:picMkLst>
+        </pc:picChg>
       </pc:sldChg>
       <pc:sldChg chg="addSp delSp modSp new mod">
-        <pc:chgData name="Erel Dekel" userId="5861eaf1660df668" providerId="LiveId" clId="{C848D9A1-E4C3-4BC8-9DDE-B82935BDE34D}" dt="2024-08-31T10:19:03.608" v="5079" actId="20577"/>
+        <pc:chgData name="Erel Dekel" userId="5861eaf1660df668" providerId="LiveId" clId="{C848D9A1-E4C3-4BC8-9DDE-B82935BDE34D}" dt="2024-09-01T09:29:20.747" v="6419"/>
         <pc:sldMkLst>
           <pc:docMk/>
           <pc:sldMk cId="2363500313" sldId="265"/>
         </pc:sldMkLst>
+        <pc:spChg chg="add mod">
+          <ac:chgData name="Erel Dekel" userId="5861eaf1660df668" providerId="LiveId" clId="{C848D9A1-E4C3-4BC8-9DDE-B82935BDE34D}" dt="2024-09-01T09:29:20.747" v="6419"/>
+          <ac:spMkLst>
+            <pc:docMk/>
+            <pc:sldMk cId="2363500313" sldId="265"/>
+            <ac:spMk id="2" creationId="{5C4F1770-6561-950B-3491-C16A909479B4}"/>
+          </ac:spMkLst>
+        </pc:spChg>
         <pc:spChg chg="del">
           <ac:chgData name="Erel Dekel" userId="5861eaf1660df668" providerId="LiveId" clId="{C848D9A1-E4C3-4BC8-9DDE-B82935BDE34D}" dt="2024-08-31T10:16:58.075" v="4930"/>
           <ac:spMkLst>
@@ -1110,8 +1126,8 @@
             <ac:spMk id="8" creationId="{EB76F6C3-C50B-E77E-DBA8-AED73AB62597}"/>
           </ac:spMkLst>
         </pc:spChg>
-        <pc:spChg chg="add mod">
-          <ac:chgData name="Erel Dekel" userId="5861eaf1660df668" providerId="LiveId" clId="{C848D9A1-E4C3-4BC8-9DDE-B82935BDE34D}" dt="2024-08-31T10:19:03.608" v="5079" actId="20577"/>
+        <pc:spChg chg="add del mod">
+          <ac:chgData name="Erel Dekel" userId="5861eaf1660df668" providerId="LiveId" clId="{C848D9A1-E4C3-4BC8-9DDE-B82935BDE34D}" dt="2024-09-01T09:29:20.310" v="6418" actId="478"/>
           <ac:spMkLst>
             <pc:docMk/>
             <pc:sldMk cId="2363500313" sldId="265"/>
@@ -1584,7 +1600,7 @@
           <a:p>
             <a:fld id="{E9661D1F-6117-4D45-B9D8-177F02A5000A}" type="datetimeFigureOut">
               <a:rPr lang="LID4096" smtClean="0"/>
-              <a:t>08/31/2024</a:t>
+              <a:t>09/01/2024</a:t>
             </a:fld>
             <a:endParaRPr lang="LID4096"/>
           </a:p>
@@ -2010,7 +2026,7 @@
           <a:p>
             <a:fld id="{655A5808-3B61-48CC-92EF-85AC2E0DFA56}" type="datetime2">
               <a:rPr lang="en-US" smtClean="0"/>
-              <a:t>Saturday, August 31, 2024</a:t>
+              <a:t>Sunday, September 1, 2024</a:t>
             </a:fld>
             <a:endParaRPr lang="en-US"/>
           </a:p>
@@ -2208,7 +2224,7 @@
           <a:p>
             <a:fld id="{735E98AF-4574-4509-BF7A-519ACD5BF826}" type="datetime2">
               <a:rPr lang="en-US" smtClean="0"/>
-              <a:t>Saturday, August 31, 2024</a:t>
+              <a:t>Sunday, September 1, 2024</a:t>
             </a:fld>
             <a:endParaRPr lang="en-US"/>
           </a:p>
@@ -2418,7 +2434,7 @@
           <a:p>
             <a:fld id="{93DD97D4-9636-490F-85D0-E926C2B6F3B1}" type="datetime2">
               <a:rPr lang="en-US" smtClean="0"/>
-              <a:t>Saturday, August 31, 2024</a:t>
+              <a:t>Sunday, September 1, 2024</a:t>
             </a:fld>
             <a:endParaRPr lang="en-US"/>
           </a:p>
@@ -2617,7 +2633,7 @@
           <a:p>
             <a:fld id="{2F3AF3C6-0FD4-4939-991C-00DDE5C56815}" type="datetime2">
               <a:rPr lang="en-US" smtClean="0"/>
-              <a:t>Saturday, August 31, 2024</a:t>
+              <a:t>Sunday, September 1, 2024</a:t>
             </a:fld>
             <a:endParaRPr lang="en-US"/>
           </a:p>
@@ -2898,7 +2914,7 @@
           <a:p>
             <a:fld id="{86807482-8128-47C6-A8DD-6452B0291CFF}" type="datetime2">
               <a:rPr lang="en-US" smtClean="0"/>
-              <a:t>Saturday, August 31, 2024</a:t>
+              <a:t>Sunday, September 1, 2024</a:t>
             </a:fld>
             <a:endParaRPr lang="en-US"/>
           </a:p>
@@ -3166,7 +3182,7 @@
           <a:p>
             <a:fld id="{37903F25-275E-41DE-BE3B-EBF0DB49F9B1}" type="datetime2">
               <a:rPr lang="en-US" smtClean="0"/>
-              <a:t>Saturday, August 31, 2024</a:t>
+              <a:t>Sunday, September 1, 2024</a:t>
             </a:fld>
             <a:endParaRPr lang="en-US"/>
           </a:p>
@@ -3547,7 +3563,7 @@
           <a:p>
             <a:fld id="{EE475572-4A44-4171-84AA-64D42C8050A6}" type="datetime2">
               <a:rPr lang="en-US" smtClean="0"/>
-              <a:t>Saturday, August 31, 2024</a:t>
+              <a:t>Sunday, September 1, 2024</a:t>
             </a:fld>
             <a:endParaRPr lang="en-US"/>
           </a:p>
@@ -3717,7 +3733,7 @@
           <a:p>
             <a:fld id="{C4C1612E-528E-4FD5-9E9E-E15F1108F171}" type="datetime2">
               <a:rPr lang="en-US" smtClean="0"/>
-              <a:t>Saturday, August 31, 2024</a:t>
+              <a:t>Sunday, September 1, 2024</a:t>
             </a:fld>
             <a:endParaRPr lang="en-US"/>
           </a:p>
@@ -3830,7 +3846,7 @@
           <a:p>
             <a:fld id="{D4F6D862-A06D-436F-A92E-EBAAD50B6E50}" type="datetime2">
               <a:rPr lang="en-US" smtClean="0"/>
-              <a:t>Saturday, August 31, 2024</a:t>
+              <a:t>Sunday, September 1, 2024</a:t>
             </a:fld>
             <a:endParaRPr lang="en-US"/>
           </a:p>
@@ -4147,7 +4163,7 @@
           <a:p>
             <a:fld id="{B73E0B7D-2260-4809-8F0A-9E5F3E24F169}" type="datetime2">
               <a:rPr lang="en-US" smtClean="0"/>
-              <a:t>Saturday, August 31, 2024</a:t>
+              <a:t>Sunday, September 1, 2024</a:t>
             </a:fld>
             <a:endParaRPr lang="en-US"/>
           </a:p>
@@ -4439,7 +4455,7 @@
           <a:p>
             <a:fld id="{3C8E4735-C637-46A3-94EB-AB3AC4188D2F}" type="datetime2">
               <a:rPr lang="en-US" smtClean="0"/>
-              <a:t>Saturday, August 31, 2024</a:t>
+              <a:t>Sunday, September 1, 2024</a:t>
             </a:fld>
             <a:endParaRPr lang="en-US"/>
           </a:p>
@@ -4807,7 +4823,7 @@
             <a:fld id="{AE0C963C-C1DB-4AFD-9DDC-0691666BF49B}" type="datetime2">
               <a:rPr lang="en-US" smtClean="0"/>
               <a:pPr/>
-              <a:t>Saturday, August 31, 2024</a:t>
+              <a:t>Sunday, September 1, 2024</a:t>
             </a:fld>
             <a:endParaRPr lang="en-US" cap="all" dirty="0"/>
           </a:p>
@@ -5881,10 +5897,10 @@
       </p:sp>
       <p:sp>
         <p:nvSpPr>
-          <p:cNvPr id="9" name="Content Placeholder 2">
-            <a:extLst>
-              <a:ext uri="{FF2B5EF4-FFF2-40B4-BE49-F238E27FC236}">
-                <a16:creationId xmlns:a16="http://schemas.microsoft.com/office/drawing/2014/main" id="{802B9479-F8BF-ACC1-31F6-827AE6E6C534}"/>
+          <p:cNvPr id="2" name="Content Placeholder 2">
+            <a:extLst>
+              <a:ext uri="{FF2B5EF4-FFF2-40B4-BE49-F238E27FC236}">
+                <a16:creationId xmlns:a16="http://schemas.microsoft.com/office/drawing/2014/main" id="{5C4F1770-6561-950B-3491-C16A909479B4}"/>
               </a:ext>
             </a:extLst>
           </p:cNvPr>
@@ -6076,13 +6092,26 @@
               <a:buNone/>
             </a:pPr>
             <a:r>
-              <a:rPr lang="en-US" dirty="0" err="1">
+              <a:rPr lang="en-US" b="1">
                 <a:latin typeface="Times New Roman" panose="02020603050405020304" pitchFamily="18" charset="0"/>
                 <a:cs typeface="Times New Roman" panose="02020603050405020304" pitchFamily="18" charset="0"/>
               </a:rPr>
-              <a:t>kcsdlkvmsdklvmsdl</a:t>
-            </a:r>
-            <a:endParaRPr lang="en-US" dirty="0">
+              <a:t>Simple – </a:t>
+            </a:r>
+            <a:r>
+              <a:rPr lang="en-US">
+                <a:latin typeface="Times New Roman" panose="02020603050405020304" pitchFamily="18" charset="0"/>
+                <a:cs typeface="Times New Roman" panose="02020603050405020304" pitchFamily="18" charset="0"/>
+              </a:rPr>
+              <a:t>One FC hidden layer with ReLU activation function</a:t>
+            </a:r>
+          </a:p>
+          <a:p>
+            <a:pPr marL="0" indent="0">
+              <a:buFont typeface="Arial" panose="020B0604020202020204" pitchFamily="34" charset="0"/>
+              <a:buNone/>
+            </a:pPr>
+            <a:endParaRPr lang="en-US" b="1">
               <a:latin typeface="Times New Roman" panose="02020603050405020304" pitchFamily="18" charset="0"/>
               <a:cs typeface="Times New Roman" panose="02020603050405020304" pitchFamily="18" charset="0"/>
             </a:endParaRPr>
@@ -6092,7 +6121,7 @@
               <a:buFont typeface="Arial" panose="020B0604020202020204" pitchFamily="34" charset="0"/>
               <a:buNone/>
             </a:pPr>
-            <a:endParaRPr lang="en-US" dirty="0">
+            <a:endParaRPr lang="en-US" b="1">
               <a:latin typeface="Times New Roman" panose="02020603050405020304" pitchFamily="18" charset="0"/>
               <a:cs typeface="Times New Roman" panose="02020603050405020304" pitchFamily="18" charset="0"/>
             </a:endParaRPr>
@@ -6103,7 +6132,41 @@
               <a:buNone/>
             </a:pPr>
             <a:r>
-              <a:rPr lang="en-US" dirty="0">
+              <a:rPr lang="en-US" b="1">
+                <a:latin typeface="Times New Roman" panose="02020603050405020304" pitchFamily="18" charset="0"/>
+                <a:cs typeface="Times New Roman" panose="02020603050405020304" pitchFamily="18" charset="0"/>
+              </a:rPr>
+              <a:t>CNN – </a:t>
+            </a:r>
+            <a:r>
+              <a:rPr lang="en-US">
+                <a:latin typeface="Times New Roman" panose="02020603050405020304" pitchFamily="18" charset="0"/>
+                <a:cs typeface="Times New Roman" panose="02020603050405020304" pitchFamily="18" charset="0"/>
+              </a:rPr>
+              <a:t>One Convolutional and Pooling layer before one FC hidden layer with ReLU</a:t>
+            </a:r>
+            <a:endParaRPr lang="en-US" b="1">
+              <a:latin typeface="Times New Roman" panose="02020603050405020304" pitchFamily="18" charset="0"/>
+              <a:cs typeface="Times New Roman" panose="02020603050405020304" pitchFamily="18" charset="0"/>
+            </a:endParaRPr>
+          </a:p>
+          <a:p>
+            <a:pPr marL="0" indent="0">
+              <a:buFont typeface="Arial" panose="020B0604020202020204" pitchFamily="34" charset="0"/>
+              <a:buNone/>
+            </a:pPr>
+            <a:endParaRPr lang="en-US">
+              <a:latin typeface="Times New Roman" panose="02020603050405020304" pitchFamily="18" charset="0"/>
+              <a:cs typeface="Times New Roman" panose="02020603050405020304" pitchFamily="18" charset="0"/>
+            </a:endParaRPr>
+          </a:p>
+          <a:p>
+            <a:pPr marL="0" indent="0">
+              <a:buFont typeface="Arial" panose="020B0604020202020204" pitchFamily="34" charset="0"/>
+              <a:buNone/>
+            </a:pPr>
+            <a:r>
+              <a:rPr lang="en-US">
                 <a:latin typeface="Times New Roman" panose="02020603050405020304" pitchFamily="18" charset="0"/>
                 <a:cs typeface="Times New Roman" panose="02020603050405020304" pitchFamily="18" charset="0"/>
               </a:rPr>
@@ -9660,22 +9723,6 @@
             <a:pPr marL="0" indent="0">
               <a:buNone/>
             </a:pPr>
-            <a:r>
-              <a:rPr lang="en-US" dirty="0" err="1">
-                <a:latin typeface="Times New Roman" panose="02020603050405020304" pitchFamily="18" charset="0"/>
-                <a:cs typeface="Times New Roman" panose="02020603050405020304" pitchFamily="18" charset="0"/>
-              </a:rPr>
-              <a:t>skcmaslkcmdaklcmadlkcmdalkcmdpkck</a:t>
-            </a:r>
-            <a:endParaRPr lang="en-US" dirty="0">
-              <a:latin typeface="Times New Roman" panose="02020603050405020304" pitchFamily="18" charset="0"/>
-              <a:cs typeface="Times New Roman" panose="02020603050405020304" pitchFamily="18" charset="0"/>
-            </a:endParaRPr>
-          </a:p>
-          <a:p>
-            <a:pPr marL="0" indent="0">
-              <a:buNone/>
-            </a:pPr>
             <a:endParaRPr lang="en-US" dirty="0">
               <a:latin typeface="Times New Roman" panose="02020603050405020304" pitchFamily="18" charset="0"/>
               <a:cs typeface="Times New Roman" panose="02020603050405020304" pitchFamily="18" charset="0"/>
@@ -9699,6 +9746,42 @@
           </a:p>
         </p:txBody>
       </p:sp>
+      <p:pic>
+        <p:nvPicPr>
+          <p:cNvPr id="3" name="Picture 2" descr="A screenshot of a game&#10;&#10;Description automatically generated">
+            <a:extLst>
+              <a:ext uri="{FF2B5EF4-FFF2-40B4-BE49-F238E27FC236}">
+                <a16:creationId xmlns:a16="http://schemas.microsoft.com/office/drawing/2014/main" id="{B121DC97-9BD2-A4AB-89BB-8F01E1ABB157}"/>
+              </a:ext>
+            </a:extLst>
+          </p:cNvPr>
+          <p:cNvPicPr>
+            <a:picLocks noChangeAspect="1"/>
+          </p:cNvPicPr>
+          <p:nvPr/>
+        </p:nvPicPr>
+        <p:blipFill>
+          <a:blip r:embed="rId2">
+            <a:extLst>
+              <a:ext uri="{28A0092B-C50C-407E-A947-70E740481C1C}">
+                <a14:useLocalDpi xmlns:a14="http://schemas.microsoft.com/office/drawing/2010/main" val="0"/>
+              </a:ext>
+            </a:extLst>
+          </a:blip>
+          <a:stretch>
+            <a:fillRect/>
+          </a:stretch>
+        </p:blipFill>
+        <p:spPr>
+          <a:xfrm>
+            <a:off x="9799163" y="636638"/>
+            <a:ext cx="1813717" cy="2110923"/>
+          </a:xfrm>
+          <a:prstGeom prst="rect">
+            <a:avLst/>
+          </a:prstGeom>
+        </p:spPr>
+      </p:pic>
     </p:spTree>
     <p:extLst>
       <p:ext uri="{BB962C8B-B14F-4D97-AF65-F5344CB8AC3E}">

</xml_diff>

<commit_message>
adding agent and reward gen comments
</commit_message>
<xml_diff>
--- a/presentation.pptx
+++ b/presentation.pptx
@@ -141,7 +141,7 @@
   <pc:docChgLst>
     <pc:chgData name="Erel Dekel" userId="5861eaf1660df668" providerId="LiveId" clId="{C848D9A1-E4C3-4BC8-9DDE-B82935BDE34D}"/>
     <pc:docChg chg="undo custSel addSld modSld addMainMaster delMainMaster">
-      <pc:chgData name="Erel Dekel" userId="5861eaf1660df668" providerId="LiveId" clId="{C848D9A1-E4C3-4BC8-9DDE-B82935BDE34D}" dt="2024-09-01T09:31:57.687" v="6424" actId="1076"/>
+      <pc:chgData name="Erel Dekel" userId="5861eaf1660df668" providerId="LiveId" clId="{C848D9A1-E4C3-4BC8-9DDE-B82935BDE34D}" dt="2024-09-02T09:27:42.954" v="6427" actId="478"/>
       <pc:docMkLst>
         <pc:docMk/>
       </pc:docMkLst>
@@ -861,7 +861,7 @@
         </pc:picChg>
       </pc:sldChg>
       <pc:sldChg chg="addSp delSp modSp new mod">
-        <pc:chgData name="Erel Dekel" userId="5861eaf1660df668" providerId="LiveId" clId="{C848D9A1-E4C3-4BC8-9DDE-B82935BDE34D}" dt="2024-08-30T16:02:49.779" v="4270" actId="313"/>
+        <pc:chgData name="Erel Dekel" userId="5861eaf1660df668" providerId="LiveId" clId="{C848D9A1-E4C3-4BC8-9DDE-B82935BDE34D}" dt="2024-09-02T09:27:42.954" v="6427" actId="478"/>
         <pc:sldMkLst>
           <pc:docMk/>
           <pc:sldMk cId="2794924398" sldId="261"/>
@@ -914,24 +914,24 @@
             <ac:picMk id="8" creationId="{178B7E73-3DB3-DC94-FFBB-12EB639C96E6}"/>
           </ac:picMkLst>
         </pc:picChg>
-        <pc:picChg chg="add mod">
-          <ac:chgData name="Erel Dekel" userId="5861eaf1660df668" providerId="LiveId" clId="{C848D9A1-E4C3-4BC8-9DDE-B82935BDE34D}" dt="2024-08-30T15:20:05.597" v="3832" actId="1036"/>
+        <pc:picChg chg="add del mod">
+          <ac:chgData name="Erel Dekel" userId="5861eaf1660df668" providerId="LiveId" clId="{C848D9A1-E4C3-4BC8-9DDE-B82935BDE34D}" dt="2024-09-02T09:27:42.954" v="6427" actId="478"/>
           <ac:picMkLst>
             <pc:docMk/>
             <pc:sldMk cId="2794924398" sldId="261"/>
             <ac:picMk id="10" creationId="{57CA0F35-95D3-72B2-203D-96D8BB1C9717}"/>
           </ac:picMkLst>
         </pc:picChg>
-        <pc:picChg chg="add mod">
-          <ac:chgData name="Erel Dekel" userId="5861eaf1660df668" providerId="LiveId" clId="{C848D9A1-E4C3-4BC8-9DDE-B82935BDE34D}" dt="2024-08-30T15:21:15.715" v="3842" actId="1036"/>
+        <pc:picChg chg="add del mod">
+          <ac:chgData name="Erel Dekel" userId="5861eaf1660df668" providerId="LiveId" clId="{C848D9A1-E4C3-4BC8-9DDE-B82935BDE34D}" dt="2024-09-02T09:27:42.152" v="6426" actId="478"/>
           <ac:picMkLst>
             <pc:docMk/>
             <pc:sldMk cId="2794924398" sldId="261"/>
             <ac:picMk id="11" creationId="{52DBE754-63A6-5D75-8732-290F77399228}"/>
           </ac:picMkLst>
         </pc:picChg>
-        <pc:picChg chg="add mod">
-          <ac:chgData name="Erel Dekel" userId="5861eaf1660df668" providerId="LiveId" clId="{C848D9A1-E4C3-4BC8-9DDE-B82935BDE34D}" dt="2024-08-30T15:21:12.638" v="3841" actId="1036"/>
+        <pc:picChg chg="add del mod">
+          <ac:chgData name="Erel Dekel" userId="5861eaf1660df668" providerId="LiveId" clId="{C848D9A1-E4C3-4BC8-9DDE-B82935BDE34D}" dt="2024-09-02T09:27:41.678" v="6425" actId="478"/>
           <ac:picMkLst>
             <pc:docMk/>
             <pc:sldMk cId="2794924398" sldId="261"/>
@@ -1600,7 +1600,7 @@
           <a:p>
             <a:fld id="{E9661D1F-6117-4D45-B9D8-177F02A5000A}" type="datetimeFigureOut">
               <a:rPr lang="LID4096" smtClean="0"/>
-              <a:t>09/01/2024</a:t>
+              <a:t>09/02/2024</a:t>
             </a:fld>
             <a:endParaRPr lang="LID4096"/>
           </a:p>
@@ -2026,7 +2026,7 @@
           <a:p>
             <a:fld id="{655A5808-3B61-48CC-92EF-85AC2E0DFA56}" type="datetime2">
               <a:rPr lang="en-US" smtClean="0"/>
-              <a:t>Sunday, September 1, 2024</a:t>
+              <a:t>Monday, September 2, 2024</a:t>
             </a:fld>
             <a:endParaRPr lang="en-US"/>
           </a:p>
@@ -2224,7 +2224,7 @@
           <a:p>
             <a:fld id="{735E98AF-4574-4509-BF7A-519ACD5BF826}" type="datetime2">
               <a:rPr lang="en-US" smtClean="0"/>
-              <a:t>Sunday, September 1, 2024</a:t>
+              <a:t>Monday, September 2, 2024</a:t>
             </a:fld>
             <a:endParaRPr lang="en-US"/>
           </a:p>
@@ -2434,7 +2434,7 @@
           <a:p>
             <a:fld id="{93DD97D4-9636-490F-85D0-E926C2B6F3B1}" type="datetime2">
               <a:rPr lang="en-US" smtClean="0"/>
-              <a:t>Sunday, September 1, 2024</a:t>
+              <a:t>Monday, September 2, 2024</a:t>
             </a:fld>
             <a:endParaRPr lang="en-US"/>
           </a:p>
@@ -2633,7 +2633,7 @@
           <a:p>
             <a:fld id="{2F3AF3C6-0FD4-4939-991C-00DDE5C56815}" type="datetime2">
               <a:rPr lang="en-US" smtClean="0"/>
-              <a:t>Sunday, September 1, 2024</a:t>
+              <a:t>Monday, September 2, 2024</a:t>
             </a:fld>
             <a:endParaRPr lang="en-US"/>
           </a:p>
@@ -2914,7 +2914,7 @@
           <a:p>
             <a:fld id="{86807482-8128-47C6-A8DD-6452B0291CFF}" type="datetime2">
               <a:rPr lang="en-US" smtClean="0"/>
-              <a:t>Sunday, September 1, 2024</a:t>
+              <a:t>Monday, September 2, 2024</a:t>
             </a:fld>
             <a:endParaRPr lang="en-US"/>
           </a:p>
@@ -3182,7 +3182,7 @@
           <a:p>
             <a:fld id="{37903F25-275E-41DE-BE3B-EBF0DB49F9B1}" type="datetime2">
               <a:rPr lang="en-US" smtClean="0"/>
-              <a:t>Sunday, September 1, 2024</a:t>
+              <a:t>Monday, September 2, 2024</a:t>
             </a:fld>
             <a:endParaRPr lang="en-US"/>
           </a:p>
@@ -3563,7 +3563,7 @@
           <a:p>
             <a:fld id="{EE475572-4A44-4171-84AA-64D42C8050A6}" type="datetime2">
               <a:rPr lang="en-US" smtClean="0"/>
-              <a:t>Sunday, September 1, 2024</a:t>
+              <a:t>Monday, September 2, 2024</a:t>
             </a:fld>
             <a:endParaRPr lang="en-US"/>
           </a:p>
@@ -3733,7 +3733,7 @@
           <a:p>
             <a:fld id="{C4C1612E-528E-4FD5-9E9E-E15F1108F171}" type="datetime2">
               <a:rPr lang="en-US" smtClean="0"/>
-              <a:t>Sunday, September 1, 2024</a:t>
+              <a:t>Monday, September 2, 2024</a:t>
             </a:fld>
             <a:endParaRPr lang="en-US"/>
           </a:p>
@@ -3846,7 +3846,7 @@
           <a:p>
             <a:fld id="{D4F6D862-A06D-436F-A92E-EBAAD50B6E50}" type="datetime2">
               <a:rPr lang="en-US" smtClean="0"/>
-              <a:t>Sunday, September 1, 2024</a:t>
+              <a:t>Monday, September 2, 2024</a:t>
             </a:fld>
             <a:endParaRPr lang="en-US"/>
           </a:p>
@@ -4163,7 +4163,7 @@
           <a:p>
             <a:fld id="{B73E0B7D-2260-4809-8F0A-9E5F3E24F169}" type="datetime2">
               <a:rPr lang="en-US" smtClean="0"/>
-              <a:t>Sunday, September 1, 2024</a:t>
+              <a:t>Monday, September 2, 2024</a:t>
             </a:fld>
             <a:endParaRPr lang="en-US"/>
           </a:p>
@@ -4455,7 +4455,7 @@
           <a:p>
             <a:fld id="{3C8E4735-C637-46A3-94EB-AB3AC4188D2F}" type="datetime2">
               <a:rPr lang="en-US" smtClean="0"/>
-              <a:t>Sunday, September 1, 2024</a:t>
+              <a:t>Monday, September 2, 2024</a:t>
             </a:fld>
             <a:endParaRPr lang="en-US"/>
           </a:p>
@@ -4823,7 +4823,7 @@
             <a:fld id="{AE0C963C-C1DB-4AFD-9DDC-0691666BF49B}" type="datetime2">
               <a:rPr lang="en-US" smtClean="0"/>
               <a:pPr/>
-              <a:t>Sunday, September 1, 2024</a:t>
+              <a:t>Monday, September 2, 2024</a:t>
             </a:fld>
             <a:endParaRPr lang="en-US" cap="all" dirty="0"/>
           </a:p>
@@ -8695,114 +8695,6 @@
           </a:p>
         </p:txBody>
       </p:sp>
-      <p:pic>
-        <p:nvPicPr>
-          <p:cNvPr id="11" name="Graphic 10" descr="Inventory with solid fill">
-            <a:extLst>
-              <a:ext uri="{FF2B5EF4-FFF2-40B4-BE49-F238E27FC236}">
-                <a16:creationId xmlns:a16="http://schemas.microsoft.com/office/drawing/2014/main" id="{52DBE754-63A6-5D75-8732-290F77399228}"/>
-              </a:ext>
-            </a:extLst>
-          </p:cNvPr>
-          <p:cNvPicPr>
-            <a:picLocks noChangeAspect="1"/>
-          </p:cNvPicPr>
-          <p:nvPr/>
-        </p:nvPicPr>
-        <p:blipFill>
-          <a:blip r:embed="rId2">
-            <a:extLst>
-              <a:ext uri="{96DAC541-7B7A-43D3-8B79-37D633B846F1}">
-                <asvg:svgBlip xmlns:asvg="http://schemas.microsoft.com/office/drawing/2016/SVG/main" r:embed="rId3"/>
-              </a:ext>
-            </a:extLst>
-          </a:blip>
-          <a:stretch>
-            <a:fillRect/>
-          </a:stretch>
-        </p:blipFill>
-        <p:spPr>
-          <a:xfrm>
-            <a:off x="668986" y="3468328"/>
-            <a:ext cx="614126" cy="614126"/>
-          </a:xfrm>
-          <a:prstGeom prst="rect">
-            <a:avLst/>
-          </a:prstGeom>
-        </p:spPr>
-      </p:pic>
-      <p:pic>
-        <p:nvPicPr>
-          <p:cNvPr id="10" name="Graphic 9" descr="Robot with solid fill">
-            <a:extLst>
-              <a:ext uri="{FF2B5EF4-FFF2-40B4-BE49-F238E27FC236}">
-                <a16:creationId xmlns:a16="http://schemas.microsoft.com/office/drawing/2014/main" id="{57CA0F35-95D3-72B2-203D-96D8BB1C9717}"/>
-              </a:ext>
-            </a:extLst>
-          </p:cNvPr>
-          <p:cNvPicPr>
-            <a:picLocks noChangeAspect="1"/>
-          </p:cNvPicPr>
-          <p:nvPr/>
-        </p:nvPicPr>
-        <p:blipFill>
-          <a:blip r:embed="rId4">
-            <a:extLst>
-              <a:ext uri="{96DAC541-7B7A-43D3-8B79-37D633B846F1}">
-                <asvg:svgBlip xmlns:asvg="http://schemas.microsoft.com/office/drawing/2016/SVG/main" r:embed="rId5"/>
-              </a:ext>
-            </a:extLst>
-          </a:blip>
-          <a:stretch>
-            <a:fillRect/>
-          </a:stretch>
-        </p:blipFill>
-        <p:spPr>
-          <a:xfrm>
-            <a:off x="668986" y="4960577"/>
-            <a:ext cx="614126" cy="614126"/>
-          </a:xfrm>
-          <a:prstGeom prst="rect">
-            <a:avLst/>
-          </a:prstGeom>
-        </p:spPr>
-      </p:pic>
-      <p:pic>
-        <p:nvPicPr>
-          <p:cNvPr id="13" name="Graphic 12" descr="Artificial Intelligence with solid fill">
-            <a:extLst>
-              <a:ext uri="{FF2B5EF4-FFF2-40B4-BE49-F238E27FC236}">
-                <a16:creationId xmlns:a16="http://schemas.microsoft.com/office/drawing/2014/main" id="{8C7660D8-CD06-C984-20AB-93739A684727}"/>
-              </a:ext>
-            </a:extLst>
-          </p:cNvPr>
-          <p:cNvPicPr>
-            <a:picLocks noChangeAspect="1"/>
-          </p:cNvPicPr>
-          <p:nvPr/>
-        </p:nvPicPr>
-        <p:blipFill>
-          <a:blip r:embed="rId6">
-            <a:extLst>
-              <a:ext uri="{96DAC541-7B7A-43D3-8B79-37D633B846F1}">
-                <asvg:svgBlip xmlns:asvg="http://schemas.microsoft.com/office/drawing/2016/SVG/main" r:embed="rId7"/>
-              </a:ext>
-            </a:extLst>
-          </a:blip>
-          <a:stretch>
-            <a:fillRect/>
-          </a:stretch>
-        </p:blipFill>
-        <p:spPr>
-          <a:xfrm>
-            <a:off x="668986" y="1985911"/>
-            <a:ext cx="614126" cy="614126"/>
-          </a:xfrm>
-          <a:prstGeom prst="rect">
-            <a:avLst/>
-          </a:prstGeom>
-        </p:spPr>
-      </p:pic>
     </p:spTree>
     <p:extLst>
       <p:ext uri="{BB962C8B-B14F-4D97-AF65-F5344CB8AC3E}">

</xml_diff>

<commit_message>
run CNN HOTCOLD no loops 61
</commit_message>
<xml_diff>
--- a/presentation.pptx
+++ b/presentation.pptx
@@ -131,7 +131,7 @@
 <file path=ppt/revisionInfo.xml><?xml version="1.0" encoding="utf-8"?>
 <p1510:revInfo xmlns:a="http://schemas.openxmlformats.org/drawingml/2006/main" xmlns:r="http://schemas.openxmlformats.org/officeDocument/2006/relationships" xmlns:p1510="http://schemas.microsoft.com/office/powerpoint/2015/10/main">
   <p1510:revLst>
-    <p1510:client id="{C848D9A1-E4C3-4BC8-9DDE-B82935BDE34D}" v="230" dt="2024-09-01T09:31:48.308"/>
+    <p1510:client id="{C848D9A1-E4C3-4BC8-9DDE-B82935BDE34D}" v="231" dt="2024-09-02T09:59:18.723"/>
   </p1510:revLst>
 </p1510:revInfo>
 </file>
@@ -141,7 +141,7 @@
   <pc:docChgLst>
     <pc:chgData name="Erel Dekel" userId="5861eaf1660df668" providerId="LiveId" clId="{C848D9A1-E4C3-4BC8-9DDE-B82935BDE34D}"/>
     <pc:docChg chg="undo custSel addSld modSld addMainMaster delMainMaster">
-      <pc:chgData name="Erel Dekel" userId="5861eaf1660df668" providerId="LiveId" clId="{C848D9A1-E4C3-4BC8-9DDE-B82935BDE34D}" dt="2024-09-02T09:27:42.954" v="6427" actId="478"/>
+      <pc:chgData name="Erel Dekel" userId="5861eaf1660df668" providerId="LiveId" clId="{C848D9A1-E4C3-4BC8-9DDE-B82935BDE34D}" dt="2024-09-02T10:29:16.154" v="6711" actId="20577"/>
       <pc:docMkLst>
         <pc:docMk/>
       </pc:docMkLst>
@@ -1018,11 +1018,19 @@
         </pc:spChg>
       </pc:sldChg>
       <pc:sldChg chg="addSp delSp modSp new mod">
-        <pc:chgData name="Erel Dekel" userId="5861eaf1660df668" providerId="LiveId" clId="{C848D9A1-E4C3-4BC8-9DDE-B82935BDE34D}" dt="2024-09-01T09:31:57.687" v="6424" actId="1076"/>
+        <pc:chgData name="Erel Dekel" userId="5861eaf1660df668" providerId="LiveId" clId="{C848D9A1-E4C3-4BC8-9DDE-B82935BDE34D}" dt="2024-09-02T10:29:16.154" v="6711" actId="20577"/>
         <pc:sldMkLst>
           <pc:docMk/>
           <pc:sldMk cId="522411142" sldId="264"/>
         </pc:sldMkLst>
+        <pc:spChg chg="add mod">
+          <ac:chgData name="Erel Dekel" userId="5861eaf1660df668" providerId="LiveId" clId="{C848D9A1-E4C3-4BC8-9DDE-B82935BDE34D}" dt="2024-09-02T10:29:16.154" v="6711" actId="20577"/>
+          <ac:spMkLst>
+            <pc:docMk/>
+            <pc:sldMk cId="522411142" sldId="264"/>
+            <ac:spMk id="2" creationId="{0858BD44-9D83-A563-C57C-7EF90DD5BC50}"/>
+          </ac:spMkLst>
+        </pc:spChg>
         <pc:spChg chg="del">
           <ac:chgData name="Erel Dekel" userId="5861eaf1660df668" providerId="LiveId" clId="{C848D9A1-E4C3-4BC8-9DDE-B82935BDE34D}" dt="2024-08-31T10:12:40.264" v="4793" actId="478"/>
           <ac:spMkLst>
@@ -1047,12 +1055,20 @@
             <ac:spMk id="4" creationId="{DD32D97F-F745-3594-FC1C-B6D601A78D7D}"/>
           </ac:spMkLst>
         </pc:spChg>
-        <pc:spChg chg="add mod">
-          <ac:chgData name="Erel Dekel" userId="5861eaf1660df668" providerId="LiveId" clId="{C848D9A1-E4C3-4BC8-9DDE-B82935BDE34D}" dt="2024-09-01T09:29:25.043" v="6420" actId="20577"/>
+        <pc:spChg chg="add del mod">
+          <ac:chgData name="Erel Dekel" userId="5861eaf1660df668" providerId="LiveId" clId="{C848D9A1-E4C3-4BC8-9DDE-B82935BDE34D}" dt="2024-09-02T10:29:08.450" v="6707" actId="478"/>
           <ac:spMkLst>
             <pc:docMk/>
             <pc:sldMk cId="522411142" sldId="264"/>
             <ac:spMk id="5" creationId="{D6CE0CA9-073B-221A-B3BC-03D41FE4AAB7}"/>
+          </ac:spMkLst>
+        </pc:spChg>
+        <pc:spChg chg="add del mod">
+          <ac:chgData name="Erel Dekel" userId="5861eaf1660df668" providerId="LiveId" clId="{C848D9A1-E4C3-4BC8-9DDE-B82935BDE34D}" dt="2024-09-02T10:29:09.810" v="6708" actId="478"/>
+          <ac:spMkLst>
+            <pc:docMk/>
+            <pc:sldMk cId="522411142" sldId="264"/>
+            <ac:spMk id="7" creationId="{06258C25-22F1-DFE6-A0B7-4177C254EAB4}"/>
           </ac:spMkLst>
         </pc:spChg>
         <pc:picChg chg="add mod">
@@ -9584,60 +9600,6 @@
           </a:p>
         </p:txBody>
       </p:sp>
-      <p:sp>
-        <p:nvSpPr>
-          <p:cNvPr id="5" name="Content Placeholder 2">
-            <a:extLst>
-              <a:ext uri="{FF2B5EF4-FFF2-40B4-BE49-F238E27FC236}">
-                <a16:creationId xmlns:a16="http://schemas.microsoft.com/office/drawing/2014/main" id="{D6CE0CA9-073B-221A-B3BC-03D41FE4AAB7}"/>
-              </a:ext>
-            </a:extLst>
-          </p:cNvPr>
-          <p:cNvSpPr>
-            <a:spLocks noGrp="1"/>
-          </p:cNvSpPr>
-          <p:nvPr>
-            <p:ph idx="1"/>
-          </p:nvPr>
-        </p:nvSpPr>
-        <p:spPr>
-          <a:xfrm>
-            <a:off x="1371600" y="2112264"/>
-            <a:ext cx="10241280" cy="3959352"/>
-          </a:xfrm>
-        </p:spPr>
-        <p:txBody>
-          <a:bodyPr>
-            <a:normAutofit/>
-          </a:bodyPr>
-          <a:lstStyle/>
-          <a:p>
-            <a:pPr marL="0" indent="0">
-              <a:buNone/>
-            </a:pPr>
-            <a:endParaRPr lang="en-US" dirty="0">
-              <a:latin typeface="Times New Roman" panose="02020603050405020304" pitchFamily="18" charset="0"/>
-              <a:cs typeface="Times New Roman" panose="02020603050405020304" pitchFamily="18" charset="0"/>
-            </a:endParaRPr>
-          </a:p>
-          <a:p>
-            <a:pPr marL="0" indent="0">
-              <a:buNone/>
-            </a:pPr>
-            <a:r>
-              <a:rPr lang="en-US" dirty="0">
-                <a:latin typeface="Times New Roman" panose="02020603050405020304" pitchFamily="18" charset="0"/>
-                <a:cs typeface="Times New Roman" panose="02020603050405020304" pitchFamily="18" charset="0"/>
-              </a:rPr>
-              <a:t> </a:t>
-            </a:r>
-            <a:endParaRPr lang="LID4096" dirty="0">
-              <a:latin typeface="Times New Roman" panose="02020603050405020304" pitchFamily="18" charset="0"/>
-              <a:cs typeface="Times New Roman" panose="02020603050405020304" pitchFamily="18" charset="0"/>
-            </a:endParaRPr>
-          </a:p>
-        </p:txBody>
-      </p:sp>
       <p:pic>
         <p:nvPicPr>
           <p:cNvPr id="3" name="Picture 2" descr="A screenshot of a game&#10;&#10;Description automatically generated">
@@ -9674,6 +9636,253 @@
           </a:prstGeom>
         </p:spPr>
       </p:pic>
+      <p:sp>
+        <p:nvSpPr>
+          <p:cNvPr id="2" name="Content Placeholder 2">
+            <a:extLst>
+              <a:ext uri="{FF2B5EF4-FFF2-40B4-BE49-F238E27FC236}">
+                <a16:creationId xmlns:a16="http://schemas.microsoft.com/office/drawing/2014/main" id="{0858BD44-9D83-A563-C57C-7EF90DD5BC50}"/>
+              </a:ext>
+            </a:extLst>
+          </p:cNvPr>
+          <p:cNvSpPr txBox="1">
+            <a:spLocks/>
+          </p:cNvSpPr>
+          <p:nvPr/>
+        </p:nvSpPr>
+        <p:spPr>
+          <a:xfrm>
+            <a:off x="1524000" y="2264664"/>
+            <a:ext cx="10241280" cy="3959352"/>
+          </a:xfrm>
+          <a:prstGeom prst="rect">
+            <a:avLst/>
+          </a:prstGeom>
+        </p:spPr>
+        <p:txBody>
+          <a:bodyPr vert="horz" lIns="0" tIns="0" rIns="0" bIns="0" rtlCol="0">
+            <a:normAutofit/>
+          </a:bodyPr>
+          <a:lstStyle>
+            <a:lvl1pPr marL="228600" indent="-228600" algn="l" defTabSz="914400" rtl="0" eaLnBrk="1" latinLnBrk="0" hangingPunct="1">
+              <a:lnSpc>
+                <a:spcPct val="120000"/>
+              </a:lnSpc>
+              <a:spcBef>
+                <a:spcPts val="1000"/>
+              </a:spcBef>
+              <a:buFont typeface="Arial" panose="020B0604020202020204" pitchFamily="34" charset="0"/>
+              <a:buChar char="•"/>
+              <a:defRPr sz="2000" kern="1200">
+                <a:solidFill>
+                  <a:schemeClr val="tx1"/>
+                </a:solidFill>
+                <a:latin typeface="+mn-lt"/>
+                <a:ea typeface="+mn-ea"/>
+                <a:cs typeface="+mn-cs"/>
+              </a:defRPr>
+            </a:lvl1pPr>
+            <a:lvl2pPr marL="685800" indent="-228600" algn="l" defTabSz="914400" rtl="0" eaLnBrk="1" latinLnBrk="0" hangingPunct="1">
+              <a:lnSpc>
+                <a:spcPct val="120000"/>
+              </a:lnSpc>
+              <a:spcBef>
+                <a:spcPts val="500"/>
+              </a:spcBef>
+              <a:buFont typeface="Arial" panose="020B0604020202020204" pitchFamily="34" charset="0"/>
+              <a:buChar char="•"/>
+              <a:defRPr sz="2000" kern="1200">
+                <a:solidFill>
+                  <a:schemeClr val="tx1"/>
+                </a:solidFill>
+                <a:latin typeface="+mn-lt"/>
+                <a:ea typeface="+mn-ea"/>
+                <a:cs typeface="+mn-cs"/>
+              </a:defRPr>
+            </a:lvl2pPr>
+            <a:lvl3pPr marL="1143000" indent="-228600" algn="l" defTabSz="914400" rtl="0" eaLnBrk="1" latinLnBrk="0" hangingPunct="1">
+              <a:lnSpc>
+                <a:spcPct val="120000"/>
+              </a:lnSpc>
+              <a:spcBef>
+                <a:spcPts val="500"/>
+              </a:spcBef>
+              <a:buFont typeface="Arial" panose="020B0604020202020204" pitchFamily="34" charset="0"/>
+              <a:buChar char="•"/>
+              <a:defRPr sz="1800" kern="1200">
+                <a:solidFill>
+                  <a:schemeClr val="tx1"/>
+                </a:solidFill>
+                <a:latin typeface="+mn-lt"/>
+                <a:ea typeface="+mn-ea"/>
+                <a:cs typeface="+mn-cs"/>
+              </a:defRPr>
+            </a:lvl3pPr>
+            <a:lvl4pPr marL="1600200" indent="-228600" algn="l" defTabSz="914400" rtl="0" eaLnBrk="1" latinLnBrk="0" hangingPunct="1">
+              <a:lnSpc>
+                <a:spcPct val="120000"/>
+              </a:lnSpc>
+              <a:spcBef>
+                <a:spcPts val="500"/>
+              </a:spcBef>
+              <a:buFont typeface="Arial" panose="020B0604020202020204" pitchFamily="34" charset="0"/>
+              <a:buChar char="•"/>
+              <a:defRPr sz="1600" kern="1200">
+                <a:solidFill>
+                  <a:schemeClr val="tx1"/>
+                </a:solidFill>
+                <a:latin typeface="+mn-lt"/>
+                <a:ea typeface="+mn-ea"/>
+                <a:cs typeface="+mn-cs"/>
+              </a:defRPr>
+            </a:lvl4pPr>
+            <a:lvl5pPr marL="2057400" indent="-228600" algn="l" defTabSz="914400" rtl="0" eaLnBrk="1" latinLnBrk="0" hangingPunct="1">
+              <a:lnSpc>
+                <a:spcPct val="120000"/>
+              </a:lnSpc>
+              <a:spcBef>
+                <a:spcPts val="500"/>
+              </a:spcBef>
+              <a:buFont typeface="Arial" panose="020B0604020202020204" pitchFamily="34" charset="0"/>
+              <a:buChar char="•"/>
+              <a:defRPr sz="1600" kern="1200">
+                <a:solidFill>
+                  <a:schemeClr val="tx1"/>
+                </a:solidFill>
+                <a:latin typeface="+mn-lt"/>
+                <a:ea typeface="+mn-ea"/>
+                <a:cs typeface="+mn-cs"/>
+              </a:defRPr>
+            </a:lvl5pPr>
+            <a:lvl6pPr marL="2514600" indent="-228600" algn="l" defTabSz="914400" rtl="0" eaLnBrk="1" latinLnBrk="0" hangingPunct="1">
+              <a:lnSpc>
+                <a:spcPct val="90000"/>
+              </a:lnSpc>
+              <a:spcBef>
+                <a:spcPts val="500"/>
+              </a:spcBef>
+              <a:buFont typeface="Arial" panose="020B0604020202020204" pitchFamily="34" charset="0"/>
+              <a:buChar char="•"/>
+              <a:defRPr sz="1800" kern="1200">
+                <a:solidFill>
+                  <a:schemeClr val="tx1"/>
+                </a:solidFill>
+                <a:latin typeface="+mn-lt"/>
+                <a:ea typeface="+mn-ea"/>
+                <a:cs typeface="+mn-cs"/>
+              </a:defRPr>
+            </a:lvl6pPr>
+            <a:lvl7pPr marL="2971800" indent="-228600" algn="l" defTabSz="914400" rtl="0" eaLnBrk="1" latinLnBrk="0" hangingPunct="1">
+              <a:lnSpc>
+                <a:spcPct val="90000"/>
+              </a:lnSpc>
+              <a:spcBef>
+                <a:spcPts val="500"/>
+              </a:spcBef>
+              <a:buFont typeface="Arial" panose="020B0604020202020204" pitchFamily="34" charset="0"/>
+              <a:buChar char="•"/>
+              <a:defRPr sz="1800" kern="1200">
+                <a:solidFill>
+                  <a:schemeClr val="tx1"/>
+                </a:solidFill>
+                <a:latin typeface="+mn-lt"/>
+                <a:ea typeface="+mn-ea"/>
+                <a:cs typeface="+mn-cs"/>
+              </a:defRPr>
+            </a:lvl7pPr>
+            <a:lvl8pPr marL="3429000" indent="-228600" algn="l" defTabSz="914400" rtl="0" eaLnBrk="1" latinLnBrk="0" hangingPunct="1">
+              <a:lnSpc>
+                <a:spcPct val="90000"/>
+              </a:lnSpc>
+              <a:spcBef>
+                <a:spcPts val="500"/>
+              </a:spcBef>
+              <a:buFont typeface="Arial" panose="020B0604020202020204" pitchFamily="34" charset="0"/>
+              <a:buChar char="•"/>
+              <a:defRPr sz="1800" kern="1200">
+                <a:solidFill>
+                  <a:schemeClr val="tx1"/>
+                </a:solidFill>
+                <a:latin typeface="+mn-lt"/>
+                <a:ea typeface="+mn-ea"/>
+                <a:cs typeface="+mn-cs"/>
+              </a:defRPr>
+            </a:lvl8pPr>
+            <a:lvl9pPr marL="3886200" indent="-228600" algn="l" defTabSz="914400" rtl="0" eaLnBrk="1" latinLnBrk="0" hangingPunct="1">
+              <a:lnSpc>
+                <a:spcPct val="90000"/>
+              </a:lnSpc>
+              <a:spcBef>
+                <a:spcPts val="500"/>
+              </a:spcBef>
+              <a:buFont typeface="Arial" panose="020B0604020202020204" pitchFamily="34" charset="0"/>
+              <a:buChar char="•"/>
+              <a:defRPr sz="1800" kern="1200">
+                <a:solidFill>
+                  <a:schemeClr val="tx1"/>
+                </a:solidFill>
+                <a:latin typeface="+mn-lt"/>
+                <a:ea typeface="+mn-ea"/>
+                <a:cs typeface="+mn-cs"/>
+              </a:defRPr>
+            </a:lvl9pPr>
+          </a:lstStyle>
+          <a:p>
+            <a:pPr marL="0" indent="0">
+              <a:buFont typeface="Arial" panose="020B0604020202020204" pitchFamily="34" charset="0"/>
+              <a:buNone/>
+            </a:pPr>
+            <a:r>
+              <a:rPr lang="en-US" sz="2200" b="1" dirty="0">
+                <a:latin typeface="Times New Roman" panose="02020603050405020304" pitchFamily="18" charset="0"/>
+                <a:cs typeface="Times New Roman" panose="02020603050405020304" pitchFamily="18" charset="0"/>
+              </a:rPr>
+              <a:t>Objective – </a:t>
+            </a:r>
+            <a:r>
+              <a:rPr lang="en-US" sz="2200" dirty="0">
+                <a:latin typeface="Times New Roman" panose="02020603050405020304" pitchFamily="18" charset="0"/>
+                <a:cs typeface="Times New Roman" panose="02020603050405020304" pitchFamily="18" charset="0"/>
+              </a:rPr>
+              <a:t>Move all boxes to targets</a:t>
+            </a:r>
+          </a:p>
+          <a:p>
+            <a:pPr marL="0" indent="0">
+              <a:buFont typeface="Arial" panose="020B0604020202020204" pitchFamily="34" charset="0"/>
+              <a:buNone/>
+            </a:pPr>
+            <a:endParaRPr lang="en-US" dirty="0">
+              <a:latin typeface="Times New Roman" panose="02020603050405020304" pitchFamily="18" charset="0"/>
+              <a:cs typeface="Times New Roman" panose="02020603050405020304" pitchFamily="18" charset="0"/>
+            </a:endParaRPr>
+          </a:p>
+          <a:p>
+            <a:pPr marL="0" indent="0">
+              <a:buFont typeface="Arial" panose="020B0604020202020204" pitchFamily="34" charset="0"/>
+              <a:buNone/>
+            </a:pPr>
+            <a:r>
+              <a:rPr lang="en-US" sz="2200" b="1" dirty="0">
+                <a:latin typeface="Times New Roman" panose="02020603050405020304" pitchFamily="18" charset="0"/>
+                <a:cs typeface="Times New Roman" panose="02020603050405020304" pitchFamily="18" charset="0"/>
+              </a:rPr>
+              <a:t>Implementation – </a:t>
+            </a:r>
+            <a:r>
+              <a:rPr lang="en-US" sz="2200" dirty="0">
+                <a:latin typeface="Times New Roman" panose="02020603050405020304" pitchFamily="18" charset="0"/>
+                <a:cs typeface="Times New Roman" panose="02020603050405020304" pitchFamily="18" charset="0"/>
+              </a:rPr>
+              <a:t>More controlling on the level generation, graphics, and state processing</a:t>
+            </a:r>
+            <a:endParaRPr lang="en-US" dirty="0">
+              <a:latin typeface="Times New Roman" panose="02020603050405020304" pitchFamily="18" charset="0"/>
+              <a:cs typeface="Times New Roman" panose="02020603050405020304" pitchFamily="18" charset="0"/>
+            </a:endParaRPr>
+          </a:p>
+        </p:txBody>
+      </p:sp>
     </p:spTree>
     <p:extLst>
       <p:ext uri="{BB962C8B-B14F-4D97-AF65-F5344CB8AC3E}">

</xml_diff>

<commit_message>
run CNN hotcold loops 61, temp computer
</commit_message>
<xml_diff>
--- a/presentation.pptx
+++ b/presentation.pptx
@@ -131,7 +131,7 @@
 <file path=ppt/revisionInfo.xml><?xml version="1.0" encoding="utf-8"?>
 <p1510:revInfo xmlns:a="http://schemas.openxmlformats.org/drawingml/2006/main" xmlns:r="http://schemas.openxmlformats.org/officeDocument/2006/relationships" xmlns:p1510="http://schemas.microsoft.com/office/powerpoint/2015/10/main">
   <p1510:revLst>
-    <p1510:client id="{C848D9A1-E4C3-4BC8-9DDE-B82935BDE34D}" v="231" dt="2024-09-02T09:59:18.723"/>
+    <p1510:client id="{C848D9A1-E4C3-4BC8-9DDE-B82935BDE34D}" v="233" dt="2024-09-02T11:44:43.861"/>
   </p1510:revLst>
 </p1510:revInfo>
 </file>
@@ -141,7 +141,7 @@
   <pc:docChgLst>
     <pc:chgData name="Erel Dekel" userId="5861eaf1660df668" providerId="LiveId" clId="{C848D9A1-E4C3-4BC8-9DDE-B82935BDE34D}"/>
     <pc:docChg chg="undo custSel addSld modSld addMainMaster delMainMaster">
-      <pc:chgData name="Erel Dekel" userId="5861eaf1660df668" providerId="LiveId" clId="{C848D9A1-E4C3-4BC8-9DDE-B82935BDE34D}" dt="2024-09-02T10:29:16.154" v="6711" actId="20577"/>
+      <pc:chgData name="Erel Dekel" userId="5861eaf1660df668" providerId="LiveId" clId="{C848D9A1-E4C3-4BC8-9DDE-B82935BDE34D}" dt="2024-09-02T11:51:30.844" v="6882" actId="207"/>
       <pc:docMkLst>
         <pc:docMk/>
       </pc:docMkLst>
@@ -552,7 +552,7 @@
         </pc:picChg>
       </pc:sldChg>
       <pc:sldChg chg="addSp delSp modSp new mod modClrScheme chgLayout">
-        <pc:chgData name="Erel Dekel" userId="5861eaf1660df668" providerId="LiveId" clId="{C848D9A1-E4C3-4BC8-9DDE-B82935BDE34D}" dt="2024-08-30T15:18:58.362" v="3805" actId="1076"/>
+        <pc:chgData name="Erel Dekel" userId="5861eaf1660df668" providerId="LiveId" clId="{C848D9A1-E4C3-4BC8-9DDE-B82935BDE34D}" dt="2024-09-02T11:51:30.844" v="6882" actId="207"/>
         <pc:sldMkLst>
           <pc:docMk/>
           <pc:sldMk cId="1620585352" sldId="258"/>
@@ -590,7 +590,7 @@
           </ac:spMkLst>
         </pc:spChg>
         <pc:spChg chg="add mod ord">
-          <ac:chgData name="Erel Dekel" userId="5861eaf1660df668" providerId="LiveId" clId="{C848D9A1-E4C3-4BC8-9DDE-B82935BDE34D}" dt="2024-08-30T15:18:51.618" v="3803" actId="20577"/>
+          <ac:chgData name="Erel Dekel" userId="5861eaf1660df668" providerId="LiveId" clId="{C848D9A1-E4C3-4BC8-9DDE-B82935BDE34D}" dt="2024-09-02T11:51:30.844" v="6882" actId="207"/>
           <ac:spMkLst>
             <pc:docMk/>
             <pc:sldMk cId="1620585352" sldId="258"/>
@@ -971,7 +971,7 @@
         </pc:spChg>
       </pc:sldChg>
       <pc:sldChg chg="addSp delSp modSp new mod">
-        <pc:chgData name="Erel Dekel" userId="5861eaf1660df668" providerId="LiveId" clId="{C848D9A1-E4C3-4BC8-9DDE-B82935BDE34D}" dt="2024-08-31T10:38:03.135" v="5348" actId="403"/>
+        <pc:chgData name="Erel Dekel" userId="5861eaf1660df668" providerId="LiveId" clId="{C848D9A1-E4C3-4BC8-9DDE-B82935BDE34D}" dt="2024-09-02T11:51:00.254" v="6879" actId="27636"/>
         <pc:sldMkLst>
           <pc:docMk/>
           <pc:sldMk cId="1560638069" sldId="263"/>
@@ -985,7 +985,7 @@
           </ac:spMkLst>
         </pc:spChg>
         <pc:spChg chg="mod">
-          <ac:chgData name="Erel Dekel" userId="5861eaf1660df668" providerId="LiveId" clId="{C848D9A1-E4C3-4BC8-9DDE-B82935BDE34D}" dt="2024-08-31T10:38:03.135" v="5348" actId="403"/>
+          <ac:chgData name="Erel Dekel" userId="5861eaf1660df668" providerId="LiveId" clId="{C848D9A1-E4C3-4BC8-9DDE-B82935BDE34D}" dt="2024-09-02T11:51:00.254" v="6879" actId="27636"/>
           <ac:spMkLst>
             <pc:docMk/>
             <pc:sldMk cId="1560638069" sldId="263"/>
@@ -1018,13 +1018,13 @@
         </pc:spChg>
       </pc:sldChg>
       <pc:sldChg chg="addSp delSp modSp new mod">
-        <pc:chgData name="Erel Dekel" userId="5861eaf1660df668" providerId="LiveId" clId="{C848D9A1-E4C3-4BC8-9DDE-B82935BDE34D}" dt="2024-09-02T10:29:16.154" v="6711" actId="20577"/>
+        <pc:chgData name="Erel Dekel" userId="5861eaf1660df668" providerId="LiveId" clId="{C848D9A1-E4C3-4BC8-9DDE-B82935BDE34D}" dt="2024-09-02T11:45:18.724" v="6824" actId="20577"/>
         <pc:sldMkLst>
           <pc:docMk/>
           <pc:sldMk cId="522411142" sldId="264"/>
         </pc:sldMkLst>
-        <pc:spChg chg="add mod">
-          <ac:chgData name="Erel Dekel" userId="5861eaf1660df668" providerId="LiveId" clId="{C848D9A1-E4C3-4BC8-9DDE-B82935BDE34D}" dt="2024-09-02T10:29:16.154" v="6711" actId="20577"/>
+        <pc:spChg chg="add del mod">
+          <ac:chgData name="Erel Dekel" userId="5861eaf1660df668" providerId="LiveId" clId="{C848D9A1-E4C3-4BC8-9DDE-B82935BDE34D}" dt="2024-09-02T11:44:48.125" v="6811" actId="478"/>
           <ac:spMkLst>
             <pc:docMk/>
             <pc:sldMk cId="522411142" sldId="264"/>
@@ -1061,6 +1061,14 @@
             <pc:docMk/>
             <pc:sldMk cId="522411142" sldId="264"/>
             <ac:spMk id="5" creationId="{D6CE0CA9-073B-221A-B3BC-03D41FE4AAB7}"/>
+          </ac:spMkLst>
+        </pc:spChg>
+        <pc:spChg chg="add mod">
+          <ac:chgData name="Erel Dekel" userId="5861eaf1660df668" providerId="LiveId" clId="{C848D9A1-E4C3-4BC8-9DDE-B82935BDE34D}" dt="2024-09-02T11:45:18.724" v="6824" actId="20577"/>
+          <ac:spMkLst>
+            <pc:docMk/>
+            <pc:sldMk cId="522411142" sldId="264"/>
+            <ac:spMk id="5" creationId="{EF0B0A28-98DB-29DB-20DC-A89C55ECE356}"/>
           </ac:spMkLst>
         </pc:spChg>
         <pc:spChg chg="add del mod">
@@ -1191,7 +1199,7 @@
         </pc:spChg>
       </pc:sldChg>
       <pc:sldChg chg="addSp delSp modSp new mod">
-        <pc:chgData name="Erel Dekel" userId="5861eaf1660df668" providerId="LiveId" clId="{C848D9A1-E4C3-4BC8-9DDE-B82935BDE34D}" dt="2024-08-31T10:57:17.971" v="5912" actId="20577"/>
+        <pc:chgData name="Erel Dekel" userId="5861eaf1660df668" providerId="LiveId" clId="{C848D9A1-E4C3-4BC8-9DDE-B82935BDE34D}" dt="2024-09-02T11:50:43.996" v="6877" actId="108"/>
         <pc:sldMkLst>
           <pc:docMk/>
           <pc:sldMk cId="1334075768" sldId="267"/>
@@ -1221,7 +1229,7 @@
           </ac:spMkLst>
         </pc:spChg>
         <pc:spChg chg="add mod">
-          <ac:chgData name="Erel Dekel" userId="5861eaf1660df668" providerId="LiveId" clId="{C848D9A1-E4C3-4BC8-9DDE-B82935BDE34D}" dt="2024-08-31T10:57:17.971" v="5912" actId="20577"/>
+          <ac:chgData name="Erel Dekel" userId="5861eaf1660df668" providerId="LiveId" clId="{C848D9A1-E4C3-4BC8-9DDE-B82935BDE34D}" dt="2024-09-02T11:50:43.996" v="6877" actId="108"/>
           <ac:spMkLst>
             <pc:docMk/>
             <pc:sldMk cId="1334075768" sldId="267"/>
@@ -1317,7 +1325,7 @@
         </pc:picChg>
       </pc:sldChg>
       <pc:sldChg chg="addSp delSp modSp new mod">
-        <pc:chgData name="Erel Dekel" userId="5861eaf1660df668" providerId="LiveId" clId="{C848D9A1-E4C3-4BC8-9DDE-B82935BDE34D}" dt="2024-08-31T12:45:36.331" v="6219" actId="313"/>
+        <pc:chgData name="Erel Dekel" userId="5861eaf1660df668" providerId="LiveId" clId="{C848D9A1-E4C3-4BC8-9DDE-B82935BDE34D}" dt="2024-09-02T11:46:20.479" v="6850" actId="20577"/>
         <pc:sldMkLst>
           <pc:docMk/>
           <pc:sldMk cId="1958898215" sldId="269"/>
@@ -1330,6 +1338,14 @@
             <ac:spMk id="2" creationId="{C5DF8E57-295E-47B0-38C1-970F9EE998A2}"/>
           </ac:spMkLst>
         </pc:spChg>
+        <pc:spChg chg="del mod">
+          <ac:chgData name="Erel Dekel" userId="5861eaf1660df668" providerId="LiveId" clId="{C848D9A1-E4C3-4BC8-9DDE-B82935BDE34D}" dt="2024-09-02T11:29:44.993" v="6713" actId="22"/>
+          <ac:spMkLst>
+            <pc:docMk/>
+            <pc:sldMk cId="1958898215" sldId="269"/>
+            <ac:spMk id="3" creationId="{2849230B-28A0-6A35-69D4-C0CAC54FC3FC}"/>
+          </ac:spMkLst>
+        </pc:spChg>
         <pc:spChg chg="add mod">
           <ac:chgData name="Erel Dekel" userId="5861eaf1660df668" providerId="LiveId" clId="{C848D9A1-E4C3-4BC8-9DDE-B82935BDE34D}" dt="2024-08-31T12:45:36.331" v="6219" actId="313"/>
           <ac:spMkLst>
@@ -1338,6 +1354,30 @@
             <ac:spMk id="4" creationId="{7C2D623D-6EB8-EAEA-9DE3-917260328455}"/>
           </ac:spMkLst>
         </pc:spChg>
+        <pc:spChg chg="add mod">
+          <ac:chgData name="Erel Dekel" userId="5861eaf1660df668" providerId="LiveId" clId="{C848D9A1-E4C3-4BC8-9DDE-B82935BDE34D}" dt="2024-09-02T11:46:20.479" v="6850" actId="20577"/>
+          <ac:spMkLst>
+            <pc:docMk/>
+            <pc:sldMk cId="1958898215" sldId="269"/>
+            <ac:spMk id="8" creationId="{95D5B459-423C-A769-3AFE-DF4F27C3DEC4}"/>
+          </ac:spMkLst>
+        </pc:spChg>
+        <pc:picChg chg="add mod ord">
+          <ac:chgData name="Erel Dekel" userId="5861eaf1660df668" providerId="LiveId" clId="{C848D9A1-E4C3-4BC8-9DDE-B82935BDE34D}" dt="2024-09-02T11:30:49.099" v="6719" actId="1076"/>
+          <ac:picMkLst>
+            <pc:docMk/>
+            <pc:sldMk cId="1958898215" sldId="269"/>
+            <ac:picMk id="5" creationId="{D7A9D2B3-042D-4B9C-5D46-55DFADAC2F9E}"/>
+          </ac:picMkLst>
+        </pc:picChg>
+        <pc:picChg chg="add mod">
+          <ac:chgData name="Erel Dekel" userId="5861eaf1660df668" providerId="LiveId" clId="{C848D9A1-E4C3-4BC8-9DDE-B82935BDE34D}" dt="2024-09-02T11:30:52.595" v="6720" actId="1076"/>
+          <ac:picMkLst>
+            <pc:docMk/>
+            <pc:sldMk cId="1958898215" sldId="269"/>
+            <ac:picMk id="7" creationId="{EB689A9F-0C2A-5DB2-5A79-2FC587D4A58C}"/>
+          </ac:picMkLst>
+        </pc:picChg>
       </pc:sldChg>
       <pc:sldMasterChg chg="del delSldLayout">
         <pc:chgData name="Erel Dekel" userId="5861eaf1660df668" providerId="LiveId" clId="{C848D9A1-E4C3-4BC8-9DDE-B82935BDE34D}" dt="2024-08-28T14:14:14.037" v="1" actId="26606"/>
@@ -1882,6 +1922,90 @@
     </a:lvl9pPr>
   </p:notesStyle>
 </p:notesMaster>
+</file>
+
+<file path=ppt/notesSlides/notesSlide1.xml><?xml version="1.0" encoding="utf-8"?>
+<p:notes xmlns:a="http://schemas.openxmlformats.org/drawingml/2006/main" xmlns:r="http://schemas.openxmlformats.org/officeDocument/2006/relationships" xmlns:p="http://schemas.openxmlformats.org/presentationml/2006/main">
+  <p:cSld>
+    <p:spTree>
+      <p:nvGrpSpPr>
+        <p:cNvPr id="1" name=""/>
+        <p:cNvGrpSpPr/>
+        <p:nvPr/>
+      </p:nvGrpSpPr>
+      <p:grpSpPr>
+        <a:xfrm>
+          <a:off x="0" y="0"/>
+          <a:ext cx="0" cy="0"/>
+          <a:chOff x="0" y="0"/>
+          <a:chExt cx="0" cy="0"/>
+        </a:xfrm>
+      </p:grpSpPr>
+      <p:sp>
+        <p:nvSpPr>
+          <p:cNvPr id="2" name="Slide Image Placeholder 1"/>
+          <p:cNvSpPr>
+            <a:spLocks noGrp="1" noRot="1" noChangeAspect="1"/>
+          </p:cNvSpPr>
+          <p:nvPr>
+            <p:ph type="sldImg"/>
+          </p:nvPr>
+        </p:nvSpPr>
+        <p:spPr/>
+      </p:sp>
+      <p:sp>
+        <p:nvSpPr>
+          <p:cNvPr id="3" name="Notes Placeholder 2"/>
+          <p:cNvSpPr>
+            <a:spLocks noGrp="1"/>
+          </p:cNvSpPr>
+          <p:nvPr>
+            <p:ph type="body" idx="1"/>
+          </p:nvPr>
+        </p:nvSpPr>
+        <p:spPr/>
+        <p:txBody>
+          <a:bodyPr/>
+          <a:lstStyle/>
+          <a:p>
+            <a:endParaRPr lang="LID4096" dirty="0"/>
+          </a:p>
+        </p:txBody>
+      </p:sp>
+      <p:sp>
+        <p:nvSpPr>
+          <p:cNvPr id="4" name="Slide Number Placeholder 3"/>
+          <p:cNvSpPr>
+            <a:spLocks noGrp="1"/>
+          </p:cNvSpPr>
+          <p:nvPr>
+            <p:ph type="sldNum" sz="quarter" idx="5"/>
+          </p:nvPr>
+        </p:nvSpPr>
+        <p:spPr/>
+        <p:txBody>
+          <a:bodyPr/>
+          <a:lstStyle/>
+          <a:p>
+            <a:fld id="{B4C8D7C7-44F9-4CE1-8D53-05F02B41E6EA}" type="slidenum">
+              <a:rPr lang="LID4096" smtClean="0"/>
+              <a:t>14</a:t>
+            </a:fld>
+            <a:endParaRPr lang="LID4096"/>
+          </a:p>
+        </p:txBody>
+      </p:sp>
+    </p:spTree>
+    <p:extLst>
+      <p:ext uri="{BB962C8B-B14F-4D97-AF65-F5344CB8AC3E}">
+        <p14:creationId xmlns:p14="http://schemas.microsoft.com/office/powerpoint/2010/main" val="3210548319"/>
+      </p:ext>
+    </p:extLst>
+  </p:cSld>
+  <p:clrMapOvr>
+    <a:masterClrMapping/>
+  </p:clrMapOvr>
+</p:notes>
 </file>
 
 <file path=ppt/slideLayouts/slideLayout1.xml><?xml version="1.0" encoding="utf-8"?>
@@ -6108,14 +6232,14 @@
               <a:buNone/>
             </a:pPr>
             <a:r>
-              <a:rPr lang="en-US" b="1">
+              <a:rPr lang="en-US" b="1" dirty="0">
                 <a:latin typeface="Times New Roman" panose="02020603050405020304" pitchFamily="18" charset="0"/>
                 <a:cs typeface="Times New Roman" panose="02020603050405020304" pitchFamily="18" charset="0"/>
               </a:rPr>
               <a:t>Simple – </a:t>
             </a:r>
             <a:r>
-              <a:rPr lang="en-US">
+              <a:rPr lang="en-US" dirty="0">
                 <a:latin typeface="Times New Roman" panose="02020603050405020304" pitchFamily="18" charset="0"/>
                 <a:cs typeface="Times New Roman" panose="02020603050405020304" pitchFamily="18" charset="0"/>
               </a:rPr>
@@ -6127,7 +6251,7 @@
               <a:buFont typeface="Arial" panose="020B0604020202020204" pitchFamily="34" charset="0"/>
               <a:buNone/>
             </a:pPr>
-            <a:endParaRPr lang="en-US" b="1">
+            <a:endParaRPr lang="en-US" b="1" dirty="0">
               <a:latin typeface="Times New Roman" panose="02020603050405020304" pitchFamily="18" charset="0"/>
               <a:cs typeface="Times New Roman" panose="02020603050405020304" pitchFamily="18" charset="0"/>
             </a:endParaRPr>
@@ -6137,7 +6261,7 @@
               <a:buFont typeface="Arial" panose="020B0604020202020204" pitchFamily="34" charset="0"/>
               <a:buNone/>
             </a:pPr>
-            <a:endParaRPr lang="en-US" b="1">
+            <a:endParaRPr lang="en-US" b="1" dirty="0">
               <a:latin typeface="Times New Roman" panose="02020603050405020304" pitchFamily="18" charset="0"/>
               <a:cs typeface="Times New Roman" panose="02020603050405020304" pitchFamily="18" charset="0"/>
             </a:endParaRPr>
@@ -6148,20 +6272,20 @@
               <a:buNone/>
             </a:pPr>
             <a:r>
-              <a:rPr lang="en-US" b="1">
+              <a:rPr lang="en-US" b="1" dirty="0">
                 <a:latin typeface="Times New Roman" panose="02020603050405020304" pitchFamily="18" charset="0"/>
                 <a:cs typeface="Times New Roman" panose="02020603050405020304" pitchFamily="18" charset="0"/>
               </a:rPr>
               <a:t>CNN – </a:t>
             </a:r>
             <a:r>
-              <a:rPr lang="en-US">
+              <a:rPr lang="en-US" dirty="0">
                 <a:latin typeface="Times New Roman" panose="02020603050405020304" pitchFamily="18" charset="0"/>
                 <a:cs typeface="Times New Roman" panose="02020603050405020304" pitchFamily="18" charset="0"/>
               </a:rPr>
               <a:t>One Convolutional and Pooling layer before one FC hidden layer with ReLU</a:t>
             </a:r>
-            <a:endParaRPr lang="en-US" b="1">
+            <a:endParaRPr lang="en-US" b="1" dirty="0">
               <a:latin typeface="Times New Roman" panose="02020603050405020304" pitchFamily="18" charset="0"/>
               <a:cs typeface="Times New Roman" panose="02020603050405020304" pitchFamily="18" charset="0"/>
             </a:endParaRPr>
@@ -6171,7 +6295,7 @@
               <a:buFont typeface="Arial" panose="020B0604020202020204" pitchFamily="34" charset="0"/>
               <a:buNone/>
             </a:pPr>
-            <a:endParaRPr lang="en-US">
+            <a:endParaRPr lang="en-US" dirty="0">
               <a:latin typeface="Times New Roman" panose="02020603050405020304" pitchFamily="18" charset="0"/>
               <a:cs typeface="Times New Roman" panose="02020603050405020304" pitchFamily="18" charset="0"/>
             </a:endParaRPr>
@@ -6182,7 +6306,7 @@
               <a:buNone/>
             </a:pPr>
             <a:r>
-              <a:rPr lang="en-US">
+              <a:rPr lang="en-US" dirty="0">
                 <a:latin typeface="Times New Roman" panose="02020603050405020304" pitchFamily="18" charset="0"/>
                 <a:cs typeface="Times New Roman" panose="02020603050405020304" pitchFamily="18" charset="0"/>
               </a:rPr>
@@ -6554,32 +6678,27 @@
               <a:buNone/>
             </a:pPr>
             <a:r>
+              <a:rPr lang="en-US" sz="2200" b="1" dirty="0" err="1">
+                <a:latin typeface="Times New Roman" panose="02020603050405020304" pitchFamily="18" charset="0"/>
+                <a:cs typeface="Times New Roman" panose="02020603050405020304" pitchFamily="18" charset="0"/>
+              </a:rPr>
+              <a:t>HotCold</a:t>
+            </a:r>
+            <a:r>
               <a:rPr lang="en-US" sz="2200" b="1" dirty="0">
                 <a:latin typeface="Times New Roman" panose="02020603050405020304" pitchFamily="18" charset="0"/>
                 <a:cs typeface="Times New Roman" panose="02020603050405020304" pitchFamily="18" charset="0"/>
               </a:rPr>
-              <a:t>HotCold – </a:t>
+              <a:t> – </a:t>
             </a:r>
             <a:r>
               <a:rPr lang="en-US" sz="2200" dirty="0">
                 <a:latin typeface="Times New Roman" panose="02020603050405020304" pitchFamily="18" charset="0"/>
                 <a:cs typeface="Times New Roman" panose="02020603050405020304" pitchFamily="18" charset="0"/>
               </a:rPr>
-              <a:t>Evaluate states before and after and give same positive/negative rewards based on the evaluations</a:t>
-            </a:r>
-          </a:p>
-          <a:p>
-            <a:pPr marL="0" indent="0">
-              <a:buNone/>
-            </a:pPr>
-            <a:r>
-              <a:rPr lang="en-US" dirty="0">
-                <a:latin typeface="Times New Roman" panose="02020603050405020304" pitchFamily="18" charset="0"/>
-                <a:cs typeface="Times New Roman" panose="02020603050405020304" pitchFamily="18" charset="0"/>
-              </a:rPr>
-              <a:t> </a:t>
-            </a:r>
-            <a:endParaRPr lang="LID4096" dirty="0">
+              <a:t>Rewards based on state improvement: positive if better, negative if worse </a:t>
+            </a:r>
+            <a:endParaRPr lang="LID4096" sz="2200" dirty="0">
               <a:latin typeface="Times New Roman" panose="02020603050405020304" pitchFamily="18" charset="0"/>
               <a:cs typeface="Times New Roman" panose="02020603050405020304" pitchFamily="18" charset="0"/>
             </a:endParaRPr>
@@ -6847,31 +6966,35 @@
           <a:chExt cx="0" cy="0"/>
         </a:xfrm>
       </p:grpSpPr>
-      <p:sp>
-        <p:nvSpPr>
-          <p:cNvPr id="3" name="Content Placeholder 2">
-            <a:extLst>
-              <a:ext uri="{FF2B5EF4-FFF2-40B4-BE49-F238E27FC236}">
-                <a16:creationId xmlns:a16="http://schemas.microsoft.com/office/drawing/2014/main" id="{2849230B-28A0-6A35-69D4-C0CAC54FC3FC}"/>
-              </a:ext>
-            </a:extLst>
-          </p:cNvPr>
-          <p:cNvSpPr>
-            <a:spLocks noGrp="1"/>
-          </p:cNvSpPr>
+      <p:pic>
+        <p:nvPicPr>
+          <p:cNvPr id="5" name="Content Placeholder 4">
+            <a:extLst>
+              <a:ext uri="{FF2B5EF4-FFF2-40B4-BE49-F238E27FC236}">
+                <a16:creationId xmlns:a16="http://schemas.microsoft.com/office/drawing/2014/main" id="{D7A9D2B3-042D-4B9C-5D46-55DFADAC2F9E}"/>
+              </a:ext>
+            </a:extLst>
+          </p:cNvPr>
+          <p:cNvPicPr>
+            <a:picLocks noGrp="1" noChangeAspect="1"/>
+          </p:cNvPicPr>
           <p:nvPr>
             <p:ph idx="1"/>
           </p:nvPr>
-        </p:nvSpPr>
-        <p:spPr/>
-        <p:txBody>
-          <a:bodyPr/>
-          <a:lstStyle/>
-          <a:p>
-            <a:endParaRPr lang="LID4096" dirty="0"/>
-          </a:p>
-        </p:txBody>
-      </p:sp>
+        </p:nvPicPr>
+        <p:blipFill>
+          <a:blip r:embed="rId3"/>
+          <a:stretch>
+            <a:fillRect/>
+          </a:stretch>
+        </p:blipFill>
+        <p:spPr>
+          <a:xfrm>
+            <a:off x="6096000" y="1241235"/>
+            <a:ext cx="5944430" cy="2876951"/>
+          </a:xfrm>
+        </p:spPr>
+      </p:pic>
       <p:sp>
         <p:nvSpPr>
           <p:cNvPr id="4" name="Title 1">
@@ -6910,6 +7033,299 @@
             <a:endParaRPr lang="LID4096" cap="none" spc="0" dirty="0">
               <a:latin typeface="Cambria" panose="02040503050406030204" pitchFamily="18" charset="0"/>
               <a:ea typeface="Cambria" panose="02040503050406030204" pitchFamily="18" charset="0"/>
+              <a:cs typeface="Times New Roman" panose="02020603050405020304" pitchFamily="18" charset="0"/>
+            </a:endParaRPr>
+          </a:p>
+        </p:txBody>
+      </p:sp>
+      <p:pic>
+        <p:nvPicPr>
+          <p:cNvPr id="7" name="Picture 6">
+            <a:extLst>
+              <a:ext uri="{FF2B5EF4-FFF2-40B4-BE49-F238E27FC236}">
+                <a16:creationId xmlns:a16="http://schemas.microsoft.com/office/drawing/2014/main" id="{EB689A9F-0C2A-5DB2-5A79-2FC587D4A58C}"/>
+              </a:ext>
+            </a:extLst>
+          </p:cNvPr>
+          <p:cNvPicPr>
+            <a:picLocks noChangeAspect="1"/>
+          </p:cNvPicPr>
+          <p:nvPr/>
+        </p:nvPicPr>
+        <p:blipFill>
+          <a:blip r:embed="rId4"/>
+          <a:stretch>
+            <a:fillRect/>
+          </a:stretch>
+        </p:blipFill>
+        <p:spPr>
+          <a:xfrm>
+            <a:off x="142044" y="1250761"/>
+            <a:ext cx="5953956" cy="2867425"/>
+          </a:xfrm>
+          <a:prstGeom prst="rect">
+            <a:avLst/>
+          </a:prstGeom>
+        </p:spPr>
+      </p:pic>
+      <p:sp>
+        <p:nvSpPr>
+          <p:cNvPr id="8" name="Content Placeholder 2">
+            <a:extLst>
+              <a:ext uri="{FF2B5EF4-FFF2-40B4-BE49-F238E27FC236}">
+                <a16:creationId xmlns:a16="http://schemas.microsoft.com/office/drawing/2014/main" id="{95D5B459-423C-A769-3AFE-DF4F27C3DEC4}"/>
+              </a:ext>
+            </a:extLst>
+          </p:cNvPr>
+          <p:cNvSpPr txBox="1">
+            <a:spLocks/>
+          </p:cNvSpPr>
+          <p:nvPr/>
+        </p:nvSpPr>
+        <p:spPr>
+          <a:xfrm>
+            <a:off x="975518" y="2374547"/>
+            <a:ext cx="10240963" cy="3959225"/>
+          </a:xfrm>
+          <a:prstGeom prst="rect">
+            <a:avLst/>
+          </a:prstGeom>
+        </p:spPr>
+        <p:txBody>
+          <a:bodyPr vert="horz" lIns="0" tIns="0" rIns="0" bIns="0" rtlCol="0">
+            <a:normAutofit/>
+          </a:bodyPr>
+          <a:lstStyle>
+            <a:lvl1pPr marL="228600" indent="-228600" algn="l" defTabSz="914400" rtl="0" eaLnBrk="1" latinLnBrk="0" hangingPunct="1">
+              <a:lnSpc>
+                <a:spcPct val="120000"/>
+              </a:lnSpc>
+              <a:spcBef>
+                <a:spcPts val="1000"/>
+              </a:spcBef>
+              <a:buFont typeface="Arial" panose="020B0604020202020204" pitchFamily="34" charset="0"/>
+              <a:buChar char="•"/>
+              <a:defRPr sz="2000" kern="1200">
+                <a:solidFill>
+                  <a:schemeClr val="tx1"/>
+                </a:solidFill>
+                <a:latin typeface="+mn-lt"/>
+                <a:ea typeface="+mn-ea"/>
+                <a:cs typeface="+mn-cs"/>
+              </a:defRPr>
+            </a:lvl1pPr>
+            <a:lvl2pPr marL="685800" indent="-228600" algn="l" defTabSz="914400" rtl="0" eaLnBrk="1" latinLnBrk="0" hangingPunct="1">
+              <a:lnSpc>
+                <a:spcPct val="120000"/>
+              </a:lnSpc>
+              <a:spcBef>
+                <a:spcPts val="500"/>
+              </a:spcBef>
+              <a:buFont typeface="Arial" panose="020B0604020202020204" pitchFamily="34" charset="0"/>
+              <a:buChar char="•"/>
+              <a:defRPr sz="2000" kern="1200">
+                <a:solidFill>
+                  <a:schemeClr val="tx1"/>
+                </a:solidFill>
+                <a:latin typeface="+mn-lt"/>
+                <a:ea typeface="+mn-ea"/>
+                <a:cs typeface="+mn-cs"/>
+              </a:defRPr>
+            </a:lvl2pPr>
+            <a:lvl3pPr marL="1143000" indent="-228600" algn="l" defTabSz="914400" rtl="0" eaLnBrk="1" latinLnBrk="0" hangingPunct="1">
+              <a:lnSpc>
+                <a:spcPct val="120000"/>
+              </a:lnSpc>
+              <a:spcBef>
+                <a:spcPts val="500"/>
+              </a:spcBef>
+              <a:buFont typeface="Arial" panose="020B0604020202020204" pitchFamily="34" charset="0"/>
+              <a:buChar char="•"/>
+              <a:defRPr sz="1800" kern="1200">
+                <a:solidFill>
+                  <a:schemeClr val="tx1"/>
+                </a:solidFill>
+                <a:latin typeface="+mn-lt"/>
+                <a:ea typeface="+mn-ea"/>
+                <a:cs typeface="+mn-cs"/>
+              </a:defRPr>
+            </a:lvl3pPr>
+            <a:lvl4pPr marL="1600200" indent="-228600" algn="l" defTabSz="914400" rtl="0" eaLnBrk="1" latinLnBrk="0" hangingPunct="1">
+              <a:lnSpc>
+                <a:spcPct val="120000"/>
+              </a:lnSpc>
+              <a:spcBef>
+                <a:spcPts val="500"/>
+              </a:spcBef>
+              <a:buFont typeface="Arial" panose="020B0604020202020204" pitchFamily="34" charset="0"/>
+              <a:buChar char="•"/>
+              <a:defRPr sz="1600" kern="1200">
+                <a:solidFill>
+                  <a:schemeClr val="tx1"/>
+                </a:solidFill>
+                <a:latin typeface="+mn-lt"/>
+                <a:ea typeface="+mn-ea"/>
+                <a:cs typeface="+mn-cs"/>
+              </a:defRPr>
+            </a:lvl4pPr>
+            <a:lvl5pPr marL="2057400" indent="-228600" algn="l" defTabSz="914400" rtl="0" eaLnBrk="1" latinLnBrk="0" hangingPunct="1">
+              <a:lnSpc>
+                <a:spcPct val="120000"/>
+              </a:lnSpc>
+              <a:spcBef>
+                <a:spcPts val="500"/>
+              </a:spcBef>
+              <a:buFont typeface="Arial" panose="020B0604020202020204" pitchFamily="34" charset="0"/>
+              <a:buChar char="•"/>
+              <a:defRPr sz="1600" kern="1200">
+                <a:solidFill>
+                  <a:schemeClr val="tx1"/>
+                </a:solidFill>
+                <a:latin typeface="+mn-lt"/>
+                <a:ea typeface="+mn-ea"/>
+                <a:cs typeface="+mn-cs"/>
+              </a:defRPr>
+            </a:lvl5pPr>
+            <a:lvl6pPr marL="2514600" indent="-228600" algn="l" defTabSz="914400" rtl="0" eaLnBrk="1" latinLnBrk="0" hangingPunct="1">
+              <a:lnSpc>
+                <a:spcPct val="90000"/>
+              </a:lnSpc>
+              <a:spcBef>
+                <a:spcPts val="500"/>
+              </a:spcBef>
+              <a:buFont typeface="Arial" panose="020B0604020202020204" pitchFamily="34" charset="0"/>
+              <a:buChar char="•"/>
+              <a:defRPr sz="1800" kern="1200">
+                <a:solidFill>
+                  <a:schemeClr val="tx1"/>
+                </a:solidFill>
+                <a:latin typeface="+mn-lt"/>
+                <a:ea typeface="+mn-ea"/>
+                <a:cs typeface="+mn-cs"/>
+              </a:defRPr>
+            </a:lvl6pPr>
+            <a:lvl7pPr marL="2971800" indent="-228600" algn="l" defTabSz="914400" rtl="0" eaLnBrk="1" latinLnBrk="0" hangingPunct="1">
+              <a:lnSpc>
+                <a:spcPct val="90000"/>
+              </a:lnSpc>
+              <a:spcBef>
+                <a:spcPts val="500"/>
+              </a:spcBef>
+              <a:buFont typeface="Arial" panose="020B0604020202020204" pitchFamily="34" charset="0"/>
+              <a:buChar char="•"/>
+              <a:defRPr sz="1800" kern="1200">
+                <a:solidFill>
+                  <a:schemeClr val="tx1"/>
+                </a:solidFill>
+                <a:latin typeface="+mn-lt"/>
+                <a:ea typeface="+mn-ea"/>
+                <a:cs typeface="+mn-cs"/>
+              </a:defRPr>
+            </a:lvl7pPr>
+            <a:lvl8pPr marL="3429000" indent="-228600" algn="l" defTabSz="914400" rtl="0" eaLnBrk="1" latinLnBrk="0" hangingPunct="1">
+              <a:lnSpc>
+                <a:spcPct val="90000"/>
+              </a:lnSpc>
+              <a:spcBef>
+                <a:spcPts val="500"/>
+              </a:spcBef>
+              <a:buFont typeface="Arial" panose="020B0604020202020204" pitchFamily="34" charset="0"/>
+              <a:buChar char="•"/>
+              <a:defRPr sz="1800" kern="1200">
+                <a:solidFill>
+                  <a:schemeClr val="tx1"/>
+                </a:solidFill>
+                <a:latin typeface="+mn-lt"/>
+                <a:ea typeface="+mn-ea"/>
+                <a:cs typeface="+mn-cs"/>
+              </a:defRPr>
+            </a:lvl8pPr>
+            <a:lvl9pPr marL="3886200" indent="-228600" algn="l" defTabSz="914400" rtl="0" eaLnBrk="1" latinLnBrk="0" hangingPunct="1">
+              <a:lnSpc>
+                <a:spcPct val="90000"/>
+              </a:lnSpc>
+              <a:spcBef>
+                <a:spcPts val="500"/>
+              </a:spcBef>
+              <a:buFont typeface="Arial" panose="020B0604020202020204" pitchFamily="34" charset="0"/>
+              <a:buChar char="•"/>
+              <a:defRPr sz="1800" kern="1200">
+                <a:solidFill>
+                  <a:schemeClr val="tx1"/>
+                </a:solidFill>
+                <a:latin typeface="+mn-lt"/>
+                <a:ea typeface="+mn-ea"/>
+                <a:cs typeface="+mn-cs"/>
+              </a:defRPr>
+            </a:lvl9pPr>
+          </a:lstStyle>
+          <a:p>
+            <a:pPr marL="0" indent="0">
+              <a:buFont typeface="Arial" panose="020B0604020202020204" pitchFamily="34" charset="0"/>
+              <a:buNone/>
+            </a:pPr>
+            <a:endParaRPr lang="en-US" b="1" dirty="0">
+              <a:latin typeface="Times New Roman" panose="02020603050405020304" pitchFamily="18" charset="0"/>
+              <a:cs typeface="Times New Roman" panose="02020603050405020304" pitchFamily="18" charset="0"/>
+            </a:endParaRPr>
+          </a:p>
+          <a:p>
+            <a:pPr marL="0" indent="0">
+              <a:buFont typeface="Arial" panose="020B0604020202020204" pitchFamily="34" charset="0"/>
+              <a:buNone/>
+            </a:pPr>
+            <a:endParaRPr lang="en-US" b="1" dirty="0">
+              <a:latin typeface="Times New Roman" panose="02020603050405020304" pitchFamily="18" charset="0"/>
+              <a:cs typeface="Times New Roman" panose="02020603050405020304" pitchFamily="18" charset="0"/>
+            </a:endParaRPr>
+          </a:p>
+          <a:p>
+            <a:pPr marL="0" indent="0">
+              <a:buFont typeface="Arial" panose="020B0604020202020204" pitchFamily="34" charset="0"/>
+              <a:buNone/>
+            </a:pPr>
+            <a:endParaRPr lang="en-US" b="1" dirty="0">
+              <a:latin typeface="Times New Roman" panose="02020603050405020304" pitchFamily="18" charset="0"/>
+              <a:cs typeface="Times New Roman" panose="02020603050405020304" pitchFamily="18" charset="0"/>
+            </a:endParaRPr>
+          </a:p>
+          <a:p>
+            <a:pPr marL="0" indent="0">
+              <a:buFont typeface="Arial" panose="020B0604020202020204" pitchFamily="34" charset="0"/>
+              <a:buNone/>
+            </a:pPr>
+            <a:endParaRPr lang="en-US" b="1" dirty="0">
+              <a:latin typeface="Times New Roman" panose="02020603050405020304" pitchFamily="18" charset="0"/>
+              <a:cs typeface="Times New Roman" panose="02020603050405020304" pitchFamily="18" charset="0"/>
+            </a:endParaRPr>
+          </a:p>
+          <a:p>
+            <a:pPr marL="0" indent="0" algn="ctr">
+              <a:buFont typeface="Arial" panose="020B0604020202020204" pitchFamily="34" charset="0"/>
+              <a:buNone/>
+            </a:pPr>
+            <a:r>
+              <a:rPr lang="en-US" dirty="0">
+                <a:latin typeface="Times New Roman" panose="02020603050405020304" pitchFamily="18" charset="0"/>
+                <a:cs typeface="Times New Roman" panose="02020603050405020304" pitchFamily="18" charset="0"/>
+              </a:rPr>
+              <a:t>The verification result faster convergence</a:t>
+            </a:r>
+          </a:p>
+          <a:p>
+            <a:pPr marL="0" indent="0" algn="ctr">
+              <a:buFont typeface="Arial" panose="020B0604020202020204" pitchFamily="34" charset="0"/>
+              <a:buNone/>
+            </a:pPr>
+            <a:r>
+              <a:rPr lang="en-US" b="1" dirty="0">
+                <a:latin typeface="Times New Roman" panose="02020603050405020304" pitchFamily="18" charset="0"/>
+                <a:cs typeface="Times New Roman" panose="02020603050405020304" pitchFamily="18" charset="0"/>
+              </a:rPr>
+              <a:t> </a:t>
+            </a:r>
+            <a:endParaRPr lang="LID4096" dirty="0">
+              <a:latin typeface="Times New Roman" panose="02020603050405020304" pitchFamily="18" charset="0"/>
               <a:cs typeface="Times New Roman" panose="02020603050405020304" pitchFamily="18" charset="0"/>
             </a:endParaRPr>
           </a:p>
@@ -7280,7 +7696,17 @@
                 <a:latin typeface="Times New Roman" panose="02020603050405020304" pitchFamily="18" charset="0"/>
                 <a:cs typeface="Times New Roman" panose="02020603050405020304" pitchFamily="18" charset="0"/>
               </a:rPr>
-              <a:t>Mathematical representation of the system. states and transitions</a:t>
+              <a:t>Mathematical representation of the system</a:t>
+            </a:r>
+            <a:r>
+              <a:rPr lang="en-US" dirty="0">
+                <a:solidFill>
+                  <a:srgbClr val="FF0000"/>
+                </a:solidFill>
+                <a:latin typeface="Times New Roman" panose="02020603050405020304" pitchFamily="18" charset="0"/>
+                <a:cs typeface="Times New Roman" panose="02020603050405020304" pitchFamily="18" charset="0"/>
+              </a:rPr>
+              <a:t>. states and transitions</a:t>
             </a:r>
           </a:p>
           <a:p>
@@ -7311,9 +7737,22 @@
                 <a:latin typeface="Times New Roman" panose="02020603050405020304" pitchFamily="18" charset="0"/>
                 <a:cs typeface="Times New Roman" panose="02020603050405020304" pitchFamily="18" charset="0"/>
               </a:rPr>
-              <a:t>Specific claims or assertions about particular aspects of the system. Fairness, Liveness and Safety</a:t>
+              <a:t>Specific claims or assertions about particular aspects of the system</a:t>
+            </a:r>
+            <a:r>
+              <a:rPr lang="en-US" dirty="0">
+                <a:solidFill>
+                  <a:srgbClr val="FF0000"/>
+                </a:solidFill>
+                <a:latin typeface="Times New Roman" panose="02020603050405020304" pitchFamily="18" charset="0"/>
+                <a:cs typeface="Times New Roman" panose="02020603050405020304" pitchFamily="18" charset="0"/>
+              </a:rPr>
+              <a:t>. Fairness, Liveness and Safety</a:t>
             </a:r>
             <a:endParaRPr lang="LID4096" dirty="0">
+              <a:solidFill>
+                <a:srgbClr val="FF0000"/>
+              </a:solidFill>
               <a:latin typeface="Times New Roman" panose="02020603050405020304" pitchFamily="18" charset="0"/>
               <a:cs typeface="Times New Roman" panose="02020603050405020304" pitchFamily="18" charset="0"/>
             </a:endParaRPr>
@@ -9358,7 +9797,7 @@
         <p:spPr/>
         <p:txBody>
           <a:bodyPr>
-            <a:normAutofit fontScale="92500" lnSpcReduction="10000"/>
+            <a:normAutofit fontScale="92500"/>
           </a:bodyPr>
           <a:lstStyle/>
           <a:p>
@@ -9452,18 +9891,6 @@
                 <a:cs typeface="Times New Roman" panose="02020603050405020304" pitchFamily="18" charset="0"/>
               </a:rPr>
               <a:t>Can lead to divergence with the slight change in hyperparameters and learning rates</a:t>
-            </a:r>
-          </a:p>
-          <a:p>
-            <a:pPr marL="0" indent="0">
-              <a:buNone/>
-            </a:pPr>
-            <a:r>
-              <a:rPr lang="en-US" sz="2200" dirty="0">
-                <a:latin typeface="Times New Roman" panose="02020603050405020304" pitchFamily="18" charset="0"/>
-                <a:cs typeface="Times New Roman" panose="02020603050405020304" pitchFamily="18" charset="0"/>
-              </a:rPr>
-              <a:t>Experience replay and target model</a:t>
             </a:r>
           </a:p>
           <a:p>
@@ -9638,10 +10065,10 @@
       </p:pic>
       <p:sp>
         <p:nvSpPr>
-          <p:cNvPr id="2" name="Content Placeholder 2">
-            <a:extLst>
-              <a:ext uri="{FF2B5EF4-FFF2-40B4-BE49-F238E27FC236}">
-                <a16:creationId xmlns:a16="http://schemas.microsoft.com/office/drawing/2014/main" id="{0858BD44-9D83-A563-C57C-7EF90DD5BC50}"/>
+          <p:cNvPr id="5" name="Content Placeholder 2">
+            <a:extLst>
+              <a:ext uri="{FF2B5EF4-FFF2-40B4-BE49-F238E27FC236}">
+                <a16:creationId xmlns:a16="http://schemas.microsoft.com/office/drawing/2014/main" id="{EF0B0A28-98DB-29DB-20DC-A89C55ECE356}"/>
               </a:ext>
             </a:extLst>
           </p:cNvPr>
@@ -9652,7 +10079,7 @@
         </p:nvSpPr>
         <p:spPr>
           <a:xfrm>
-            <a:off x="1524000" y="2264664"/>
+            <a:off x="1371600" y="2112264"/>
             <a:ext cx="10241280" cy="3959352"/>
           </a:xfrm>
           <a:prstGeom prst="rect">
@@ -9833,14 +10260,14 @@
               <a:buNone/>
             </a:pPr>
             <a:r>
-              <a:rPr lang="en-US" sz="2200" b="1" dirty="0">
+              <a:rPr lang="en-US" b="1" dirty="0">
                 <a:latin typeface="Times New Roman" panose="02020603050405020304" pitchFamily="18" charset="0"/>
                 <a:cs typeface="Times New Roman" panose="02020603050405020304" pitchFamily="18" charset="0"/>
               </a:rPr>
               <a:t>Objective – </a:t>
             </a:r>
             <a:r>
-              <a:rPr lang="en-US" sz="2200" dirty="0">
+              <a:rPr lang="en-US" dirty="0">
                 <a:latin typeface="Times New Roman" panose="02020603050405020304" pitchFamily="18" charset="0"/>
                 <a:cs typeface="Times New Roman" panose="02020603050405020304" pitchFamily="18" charset="0"/>
               </a:rPr>
@@ -9862,21 +10289,31 @@
               <a:buFont typeface="Arial" panose="020B0604020202020204" pitchFamily="34" charset="0"/>
               <a:buNone/>
             </a:pPr>
-            <a:r>
-              <a:rPr lang="en-US" sz="2200" b="1" dirty="0">
+            <a:endParaRPr lang="en-US" dirty="0">
+              <a:latin typeface="Times New Roman" panose="02020603050405020304" pitchFamily="18" charset="0"/>
+              <a:cs typeface="Times New Roman" panose="02020603050405020304" pitchFamily="18" charset="0"/>
+            </a:endParaRPr>
+          </a:p>
+          <a:p>
+            <a:pPr marL="0" indent="0">
+              <a:buFont typeface="Arial" panose="020B0604020202020204" pitchFamily="34" charset="0"/>
+              <a:buNone/>
+            </a:pPr>
+            <a:r>
+              <a:rPr lang="en-US" b="1" dirty="0">
                 <a:latin typeface="Times New Roman" panose="02020603050405020304" pitchFamily="18" charset="0"/>
                 <a:cs typeface="Times New Roman" panose="02020603050405020304" pitchFamily="18" charset="0"/>
               </a:rPr>
               <a:t>Implementation – </a:t>
             </a:r>
             <a:r>
-              <a:rPr lang="en-US" sz="2200" dirty="0">
+              <a:rPr lang="en-US" dirty="0">
                 <a:latin typeface="Times New Roman" panose="02020603050405020304" pitchFamily="18" charset="0"/>
                 <a:cs typeface="Times New Roman" panose="02020603050405020304" pitchFamily="18" charset="0"/>
               </a:rPr>
               <a:t>More controlling on the level generation, graphics, and state processing</a:t>
             </a:r>
-            <a:endParaRPr lang="en-US" dirty="0">
+            <a:endParaRPr lang="LID4096" dirty="0">
               <a:latin typeface="Times New Roman" panose="02020603050405020304" pitchFamily="18" charset="0"/>
               <a:cs typeface="Times New Roman" panose="02020603050405020304" pitchFamily="18" charset="0"/>
             </a:endParaRPr>

</xml_diff>

<commit_message>
result for level65 and final draft of presentation
</commit_message>
<xml_diff>
--- a/presentation.pptx
+++ b/presentation.pptx
@@ -20,19 +20,23 @@
     <p:sldId id="268" r:id="rId14"/>
     <p:sldId id="269" r:id="rId15"/>
     <p:sldId id="270" r:id="rId16"/>
-    <p:sldId id="271" r:id="rId17"/>
-    <p:sldId id="272" r:id="rId18"/>
+    <p:sldId id="272" r:id="rId17"/>
+    <p:sldId id="271" r:id="rId18"/>
   </p:sldIdLst>
   <p:sldSz cx="18288000" cy="10287000"/>
   <p:notesSz cx="6858000" cy="9144000"/>
   <p:embeddedFontLst>
     <p:embeddedFont>
-      <p:font typeface="Inter" panose="020B0604020202020204" charset="0"/>
+      <p:font typeface="Cambria Math" panose="02040503050406030204" pitchFamily="18" charset="0"/>
       <p:regular r:id="rId19"/>
     </p:embeddedFont>
     <p:embeddedFont>
+      <p:font typeface="Inter" panose="020B0604020202020204" charset="0"/>
+      <p:regular r:id="rId20"/>
+    </p:embeddedFont>
+    <p:embeddedFont>
       <p:font typeface="Inter Bold" panose="020B0604020202020204" charset="0"/>
-      <p:regular r:id="rId20"/>
+      <p:regular r:id="rId21"/>
     </p:embeddedFont>
   </p:embeddedFontLst>
   <p:defaultTextStyle>
@@ -152,7 +156,7 @@
 <file path=ppt/revisionInfo.xml><?xml version="1.0" encoding="utf-8"?>
 <p1510:revInfo xmlns:a="http://schemas.openxmlformats.org/drawingml/2006/main" xmlns:r="http://schemas.openxmlformats.org/officeDocument/2006/relationships" xmlns:p1510="http://schemas.microsoft.com/office/powerpoint/2015/10/main">
   <p1510:revLst>
-    <p1510:client id="{292242E5-B2D7-4335-BEED-477FAADB17EC}" v="2" dt="2024-09-10T00:25:50.392"/>
+    <p1510:client id="{292242E5-B2D7-4335-BEED-477FAADB17EC}" v="28" dt="2024-09-14T17:13:48.008"/>
   </p1510:revLst>
 </p1510:revInfo>
 </file>
@@ -161,11 +165,50 @@
 <pc:chgInfo xmlns:a="http://schemas.openxmlformats.org/drawingml/2006/main" xmlns:r="http://schemas.openxmlformats.org/officeDocument/2006/relationships" xmlns:ac="http://schemas.microsoft.com/office/drawing/2013/main/command" xmlns:pc="http://schemas.microsoft.com/office/powerpoint/2013/main/command">
   <pc:docChgLst>
     <pc:chgData name="Erel Dekel" userId="5861eaf1660df668" providerId="LiveId" clId="{292242E5-B2D7-4335-BEED-477FAADB17EC}"/>
-    <pc:docChg chg="undo custSel modSld">
-      <pc:chgData name="Erel Dekel" userId="5861eaf1660df668" providerId="LiveId" clId="{292242E5-B2D7-4335-BEED-477FAADB17EC}" dt="2024-09-10T00:38:09.884" v="38" actId="1076"/>
+    <pc:docChg chg="undo custSel modSld sldOrd">
+      <pc:chgData name="Erel Dekel" userId="5861eaf1660df668" providerId="LiveId" clId="{292242E5-B2D7-4335-BEED-477FAADB17EC}" dt="2024-09-14T17:13:48.008" v="72"/>
       <pc:docMkLst>
         <pc:docMk/>
       </pc:docMkLst>
+      <pc:sldChg chg="modSp mod">
+        <pc:chgData name="Erel Dekel" userId="5861eaf1660df668" providerId="LiveId" clId="{292242E5-B2D7-4335-BEED-477FAADB17EC}" dt="2024-09-14T10:32:34.561" v="43" actId="1076"/>
+        <pc:sldMkLst>
+          <pc:docMk/>
+          <pc:sldMk cId="0" sldId="258"/>
+        </pc:sldMkLst>
+        <pc:spChg chg="mod">
+          <ac:chgData name="Erel Dekel" userId="5861eaf1660df668" providerId="LiveId" clId="{292242E5-B2D7-4335-BEED-477FAADB17EC}" dt="2024-09-14T10:32:24.170" v="42" actId="1076"/>
+          <ac:spMkLst>
+            <pc:docMk/>
+            <pc:sldMk cId="0" sldId="258"/>
+            <ac:spMk id="15" creationId="{00000000-0000-0000-0000-000000000000}"/>
+          </ac:spMkLst>
+        </pc:spChg>
+        <pc:spChg chg="mod">
+          <ac:chgData name="Erel Dekel" userId="5861eaf1660df668" providerId="LiveId" clId="{292242E5-B2D7-4335-BEED-477FAADB17EC}" dt="2024-09-14T10:32:34.561" v="43" actId="1076"/>
+          <ac:spMkLst>
+            <pc:docMk/>
+            <pc:sldMk cId="0" sldId="258"/>
+            <ac:spMk id="17" creationId="{00000000-0000-0000-0000-000000000000}"/>
+          </ac:spMkLst>
+        </pc:spChg>
+        <pc:grpChg chg="mod">
+          <ac:chgData name="Erel Dekel" userId="5861eaf1660df668" providerId="LiveId" clId="{292242E5-B2D7-4335-BEED-477FAADB17EC}" dt="2024-09-14T10:32:11.143" v="40" actId="1076"/>
+          <ac:grpSpMkLst>
+            <pc:docMk/>
+            <pc:sldMk cId="0" sldId="258"/>
+            <ac:grpSpMk id="6" creationId="{00000000-0000-0000-0000-000000000000}"/>
+          </ac:grpSpMkLst>
+        </pc:grpChg>
+        <pc:grpChg chg="mod">
+          <ac:chgData name="Erel Dekel" userId="5861eaf1660df668" providerId="LiveId" clId="{292242E5-B2D7-4335-BEED-477FAADB17EC}" dt="2024-09-14T10:31:53.042" v="39" actId="1076"/>
+          <ac:grpSpMkLst>
+            <pc:docMk/>
+            <pc:sldMk cId="0" sldId="258"/>
+            <ac:grpSpMk id="9" creationId="{00000000-0000-0000-0000-000000000000}"/>
+          </ac:grpSpMkLst>
+        </pc:grpChg>
+      </pc:sldChg>
       <pc:sldChg chg="addSp modSp mod">
         <pc:chgData name="Erel Dekel" userId="5861eaf1660df668" providerId="LiveId" clId="{292242E5-B2D7-4335-BEED-477FAADB17EC}" dt="2024-09-10T00:27:13.863" v="11" actId="1076"/>
         <pc:sldMkLst>
@@ -189,6 +232,28 @@
           </ac:picMkLst>
         </pc:picChg>
       </pc:sldChg>
+      <pc:sldChg chg="modAnim">
+        <pc:chgData name="Erel Dekel" userId="5861eaf1660df668" providerId="LiveId" clId="{292242E5-B2D7-4335-BEED-477FAADB17EC}" dt="2024-09-14T17:13:48.008" v="72"/>
+        <pc:sldMkLst>
+          <pc:docMk/>
+          <pc:sldMk cId="0" sldId="266"/>
+        </pc:sldMkLst>
+      </pc:sldChg>
+      <pc:sldChg chg="modSp mod">
+        <pc:chgData name="Erel Dekel" userId="5861eaf1660df668" providerId="LiveId" clId="{292242E5-B2D7-4335-BEED-477FAADB17EC}" dt="2024-09-14T12:54:26.713" v="68" actId="20577"/>
+        <pc:sldMkLst>
+          <pc:docMk/>
+          <pc:sldMk cId="0" sldId="267"/>
+        </pc:sldMkLst>
+        <pc:spChg chg="mod">
+          <ac:chgData name="Erel Dekel" userId="5861eaf1660df668" providerId="LiveId" clId="{292242E5-B2D7-4335-BEED-477FAADB17EC}" dt="2024-09-14T12:54:26.713" v="68" actId="20577"/>
+          <ac:spMkLst>
+            <pc:docMk/>
+            <pc:sldMk cId="0" sldId="267"/>
+            <ac:spMk id="6" creationId="{00000000-0000-0000-0000-000000000000}"/>
+          </ac:spMkLst>
+        </pc:spChg>
+      </pc:sldChg>
       <pc:sldChg chg="addSp modSp mod">
         <pc:chgData name="Erel Dekel" userId="5861eaf1660df668" providerId="LiveId" clId="{292242E5-B2D7-4335-BEED-477FAADB17EC}" dt="2024-09-10T00:38:09.884" v="38" actId="1076"/>
         <pc:sldMkLst>
@@ -204,8 +269,8 @@
           </ac:picMkLst>
         </pc:picChg>
       </pc:sldChg>
-      <pc:sldChg chg="addSp modSp mod">
-        <pc:chgData name="Erel Dekel" userId="5861eaf1660df668" providerId="LiveId" clId="{292242E5-B2D7-4335-BEED-477FAADB17EC}" dt="2024-09-10T00:36:33.552" v="28" actId="1076"/>
+      <pc:sldChg chg="addSp modSp mod ord">
+        <pc:chgData name="Erel Dekel" userId="5861eaf1660df668" providerId="LiveId" clId="{292242E5-B2D7-4335-BEED-477FAADB17EC}" dt="2024-09-14T15:20:45.387" v="70"/>
         <pc:sldMkLst>
           <pc:docMk/>
           <pc:sldMk cId="0" sldId="271"/>
@@ -419,7 +484,7 @@
             <a:fld id="{1D8BD707-D9CF-40AE-B4C6-C98DA3205C09}" type="datetimeFigureOut">
               <a:rPr lang="en-US" smtClean="0"/>
               <a:pPr/>
-              <a:t>9/10/2024</a:t>
+              <a:t>9/14/2024</a:t>
             </a:fld>
             <a:endParaRPr lang="en-US"/>
           </a:p>
@@ -584,7 +649,7 @@
             <a:fld id="{1D8BD707-D9CF-40AE-B4C6-C98DA3205C09}" type="datetimeFigureOut">
               <a:rPr lang="en-US" smtClean="0"/>
               <a:pPr/>
-              <a:t>9/10/2024</a:t>
+              <a:t>9/14/2024</a:t>
             </a:fld>
             <a:endParaRPr lang="en-US"/>
           </a:p>
@@ -759,7 +824,7 @@
             <a:fld id="{1D8BD707-D9CF-40AE-B4C6-C98DA3205C09}" type="datetimeFigureOut">
               <a:rPr lang="en-US" smtClean="0"/>
               <a:pPr/>
-              <a:t>9/10/2024</a:t>
+              <a:t>9/14/2024</a:t>
             </a:fld>
             <a:endParaRPr lang="en-US"/>
           </a:p>
@@ -924,7 +989,7 @@
             <a:fld id="{1D8BD707-D9CF-40AE-B4C6-C98DA3205C09}" type="datetimeFigureOut">
               <a:rPr lang="en-US" smtClean="0"/>
               <a:pPr/>
-              <a:t>9/10/2024</a:t>
+              <a:t>9/14/2024</a:t>
             </a:fld>
             <a:endParaRPr lang="en-US"/>
           </a:p>
@@ -1166,7 +1231,7 @@
             <a:fld id="{1D8BD707-D9CF-40AE-B4C6-C98DA3205C09}" type="datetimeFigureOut">
               <a:rPr lang="en-US" smtClean="0"/>
               <a:pPr/>
-              <a:t>9/10/2024</a:t>
+              <a:t>9/14/2024</a:t>
             </a:fld>
             <a:endParaRPr lang="en-US"/>
           </a:p>
@@ -1448,7 +1513,7 @@
             <a:fld id="{1D8BD707-D9CF-40AE-B4C6-C98DA3205C09}" type="datetimeFigureOut">
               <a:rPr lang="en-US" smtClean="0"/>
               <a:pPr/>
-              <a:t>9/10/2024</a:t>
+              <a:t>9/14/2024</a:t>
             </a:fld>
             <a:endParaRPr lang="en-US"/>
           </a:p>
@@ -1864,7 +1929,7 @@
             <a:fld id="{1D8BD707-D9CF-40AE-B4C6-C98DA3205C09}" type="datetimeFigureOut">
               <a:rPr lang="en-US" smtClean="0"/>
               <a:pPr/>
-              <a:t>9/10/2024</a:t>
+              <a:t>9/14/2024</a:t>
             </a:fld>
             <a:endParaRPr lang="en-US"/>
           </a:p>
@@ -1978,7 +2043,7 @@
             <a:fld id="{1D8BD707-D9CF-40AE-B4C6-C98DA3205C09}" type="datetimeFigureOut">
               <a:rPr lang="en-US" smtClean="0"/>
               <a:pPr/>
-              <a:t>9/10/2024</a:t>
+              <a:t>9/14/2024</a:t>
             </a:fld>
             <a:endParaRPr lang="en-US"/>
           </a:p>
@@ -2070,7 +2135,7 @@
             <a:fld id="{1D8BD707-D9CF-40AE-B4C6-C98DA3205C09}" type="datetimeFigureOut">
               <a:rPr lang="en-US" smtClean="0"/>
               <a:pPr/>
-              <a:t>9/10/2024</a:t>
+              <a:t>9/14/2024</a:t>
             </a:fld>
             <a:endParaRPr lang="en-US"/>
           </a:p>
@@ -2342,7 +2407,7 @@
             <a:fld id="{1D8BD707-D9CF-40AE-B4C6-C98DA3205C09}" type="datetimeFigureOut">
               <a:rPr lang="en-US" smtClean="0"/>
               <a:pPr/>
-              <a:t>9/10/2024</a:t>
+              <a:t>9/14/2024</a:t>
             </a:fld>
             <a:endParaRPr lang="en-US"/>
           </a:p>
@@ -2591,7 +2656,7 @@
             <a:fld id="{1D8BD707-D9CF-40AE-B4C6-C98DA3205C09}" type="datetimeFigureOut">
               <a:rPr lang="en-US" smtClean="0"/>
               <a:pPr/>
-              <a:t>9/10/2024</a:t>
+              <a:t>9/14/2024</a:t>
             </a:fld>
             <a:endParaRPr lang="en-US"/>
           </a:p>
@@ -2799,7 +2864,7 @@
             <a:fld id="{1D8BD707-D9CF-40AE-B4C6-C98DA3205C09}" type="datetimeFigureOut">
               <a:rPr lang="en-US" smtClean="0"/>
               <a:pPr/>
-              <a:t>9/10/2024</a:t>
+              <a:t>9/14/2024</a:t>
             </a:fld>
             <a:endParaRPr lang="en-US"/>
           </a:p>
@@ -3868,9 +3933,67 @@
       <p:par>
         <p:cTn id="1" dur="indefinite" restart="never" nodeType="tmRoot">
           <p:childTnLst>
+            <p:seq concurrent="1" nextAc="seek">
+              <p:cTn id="2" dur="indefinite" nodeType="mainSeq">
+                <p:childTnLst>
+                  <p:par>
+                    <p:cTn id="3" fill="hold">
+                      <p:stCondLst>
+                        <p:cond delay="indefinite"/>
+                        <p:cond evt="onBegin" delay="0">
+                          <p:tn val="2"/>
+                        </p:cond>
+                      </p:stCondLst>
+                      <p:childTnLst>
+                        <p:par>
+                          <p:cTn id="4" fill="hold">
+                            <p:stCondLst>
+                              <p:cond delay="0"/>
+                            </p:stCondLst>
+                            <p:childTnLst>
+                              <p:par>
+                                <p:cTn id="5" presetID="1" presetClass="mediacall" presetSubtype="0" fill="hold" nodeType="afterEffect">
+                                  <p:stCondLst>
+                                    <p:cond delay="0"/>
+                                  </p:stCondLst>
+                                  <p:childTnLst>
+                                    <p:cmd type="call" cmd="playFrom(0.0)">
+                                      <p:cBhvr>
+                                        <p:cTn id="6" dur="8600" fill="hold"/>
+                                        <p:tgtEl>
+                                          <p:spTgt spid="2"/>
+                                        </p:tgtEl>
+                                      </p:cBhvr>
+                                    </p:cmd>
+                                  </p:childTnLst>
+                                </p:cTn>
+                              </p:par>
+                            </p:childTnLst>
+                          </p:cTn>
+                        </p:par>
+                      </p:childTnLst>
+                    </p:cTn>
+                  </p:par>
+                </p:childTnLst>
+              </p:cTn>
+              <p:prevCondLst>
+                <p:cond evt="onPrev" delay="0">
+                  <p:tgtEl>
+                    <p:sldTgt/>
+                  </p:tgtEl>
+                </p:cond>
+              </p:prevCondLst>
+              <p:nextCondLst>
+                <p:cond evt="onNext" delay="0">
+                  <p:tgtEl>
+                    <p:sldTgt/>
+                  </p:tgtEl>
+                </p:cond>
+              </p:nextCondLst>
+            </p:seq>
             <p:video>
               <p:cMediaNode vol="0">
-                <p:cTn id="2" fill="hold" display="0">
+                <p:cTn id="7" repeatCount="indefinite" fill="hold" display="0">
                   <p:stCondLst>
                     <p:cond delay="indefinite"/>
                   </p:stCondLst>
@@ -3880,6 +4003,64 @@
                 </p:tgtEl>
               </p:cMediaNode>
             </p:video>
+            <p:seq concurrent="1" nextAc="seek">
+              <p:cTn id="8" restart="whenNotActive" fill="hold" evtFilter="cancelBubble" nodeType="interactiveSeq">
+                <p:stCondLst>
+                  <p:cond evt="onClick" delay="0">
+                    <p:tgtEl>
+                      <p:spTgt spid="2"/>
+                    </p:tgtEl>
+                  </p:cond>
+                </p:stCondLst>
+                <p:endSync evt="end" delay="0">
+                  <p:rtn val="all"/>
+                </p:endSync>
+                <p:childTnLst>
+                  <p:par>
+                    <p:cTn id="9" fill="hold">
+                      <p:stCondLst>
+                        <p:cond delay="0"/>
+                      </p:stCondLst>
+                      <p:childTnLst>
+                        <p:par>
+                          <p:cTn id="10" fill="hold">
+                            <p:stCondLst>
+                              <p:cond delay="0"/>
+                            </p:stCondLst>
+                            <p:childTnLst>
+                              <p:par>
+                                <p:cTn id="11" presetID="2" presetClass="mediacall" presetSubtype="0" fill="hold" nodeType="clickEffect">
+                                  <p:stCondLst>
+                                    <p:cond delay="0"/>
+                                  </p:stCondLst>
+                                  <p:childTnLst>
+                                    <p:cmd type="call" cmd="togglePause">
+                                      <p:cBhvr>
+                                        <p:cTn id="12" dur="1" fill="hold"/>
+                                        <p:tgtEl>
+                                          <p:spTgt spid="2"/>
+                                        </p:tgtEl>
+                                      </p:cBhvr>
+                                    </p:cmd>
+                                  </p:childTnLst>
+                                </p:cTn>
+                              </p:par>
+                            </p:childTnLst>
+                          </p:cTn>
+                        </p:par>
+                      </p:childTnLst>
+                    </p:cTn>
+                  </p:par>
+                </p:childTnLst>
+              </p:cTn>
+              <p:nextCondLst>
+                <p:cond evt="onClick" delay="0">
+                  <p:tgtEl>
+                    <p:spTgt spid="2"/>
+                  </p:tgtEl>
+                </p:cond>
+              </p:nextCondLst>
+            </p:seq>
           </p:childTnLst>
         </p:cTn>
       </p:par>
@@ -4058,59 +4239,165 @@
             </a:p>
           </p:txBody>
         </p:sp>
-        <p:sp>
-          <p:nvSpPr>
-            <p:cNvPr id="6" name="TextBox 6"/>
-            <p:cNvSpPr txBox="1"/>
-            <p:nvPr/>
-          </p:nvSpPr>
-          <p:spPr>
-            <a:xfrm>
-              <a:off x="0" y="2418292"/>
-              <a:ext cx="11252225" cy="1292648"/>
-            </a:xfrm>
-            <a:prstGeom prst="rect">
-              <a:avLst/>
-            </a:prstGeom>
-          </p:spPr>
-          <p:txBody>
-            <a:bodyPr lIns="0" tIns="0" rIns="0" bIns="0" rtlCol="0" anchor="t">
-              <a:spAutoFit/>
-            </a:bodyPr>
-            <a:lstStyle/>
-            <a:p>
-              <a:pPr algn="l">
-                <a:lnSpc>
-                  <a:spcPts val="3919"/>
-                </a:lnSpc>
-              </a:pPr>
-              <a:r>
-                <a:rPr lang="en-US" sz="2799" b="1">
-                  <a:solidFill>
-                    <a:srgbClr val="9988FF"/>
-                  </a:solidFill>
-                  <a:latin typeface="Inter Bold"/>
-                  <a:ea typeface="Inter Bold"/>
-                  <a:cs typeface="Inter Bold"/>
-                  <a:sym typeface="Inter Bold"/>
-                </a:rPr>
-                <a:t>Exploration vs. Exploitation:</a:t>
-              </a:r>
-              <a:r>
-                <a:rPr lang="en-US" sz="2799">
-                  <a:solidFill>
-                    <a:srgbClr val="292828"/>
-                  </a:solidFill>
-                  <a:latin typeface="Inter"/>
-                  <a:ea typeface="Inter"/>
-                  <a:cs typeface="Inter"/>
-                  <a:sym typeface="Inter"/>
-                </a:rPr>
-                <a:t> Balance using $$ method</a:t>
-              </a:r>
-            </a:p>
-          </p:txBody>
-        </p:sp>
+        <mc:AlternateContent xmlns:mc="http://schemas.openxmlformats.org/markup-compatibility/2006" xmlns:a14="http://schemas.microsoft.com/office/drawing/2010/main">
+          <mc:Choice Requires="a14">
+            <p:sp>
+              <p:nvSpPr>
+                <p:cNvPr id="6" name="TextBox 6"/>
+                <p:cNvSpPr txBox="1"/>
+                <p:nvPr/>
+              </p:nvSpPr>
+              <p:spPr>
+                <a:xfrm>
+                  <a:off x="0" y="2418292"/>
+                  <a:ext cx="11252225" cy="1292648"/>
+                </a:xfrm>
+                <a:prstGeom prst="rect">
+                  <a:avLst/>
+                </a:prstGeom>
+              </p:spPr>
+              <p:txBody>
+                <a:bodyPr lIns="0" tIns="0" rIns="0" bIns="0" rtlCol="0" anchor="t">
+                  <a:spAutoFit/>
+                </a:bodyPr>
+                <a:lstStyle/>
+                <a:p>
+                  <a:pPr algn="l">
+                    <a:lnSpc>
+                      <a:spcPts val="3919"/>
+                    </a:lnSpc>
+                  </a:pPr>
+                  <a:r>
+                    <a:rPr lang="en-US" sz="2799" b="1" dirty="0">
+                      <a:solidFill>
+                        <a:srgbClr val="9988FF"/>
+                      </a:solidFill>
+                      <a:latin typeface="Inter Bold"/>
+                      <a:ea typeface="Inter Bold"/>
+                      <a:cs typeface="Inter Bold"/>
+                      <a:sym typeface="Inter Bold"/>
+                    </a:rPr>
+                    <a:t>Exploration vs. Exploitation:</a:t>
+                  </a:r>
+                  <a:r>
+                    <a:rPr lang="en-US" sz="2799" dirty="0">
+                      <a:solidFill>
+                        <a:srgbClr val="292828"/>
+                      </a:solidFill>
+                      <a:latin typeface="Inter"/>
+                      <a:ea typeface="Inter"/>
+                      <a:cs typeface="Inter"/>
+                      <a:sym typeface="Inter"/>
+                    </a:rPr>
+                    <a:t> Balance using </a:t>
+                  </a:r>
+                  <a14:m>
+                    <m:oMath xmlns:m="http://schemas.openxmlformats.org/officeDocument/2006/math">
+                      <m:r>
+                        <a:rPr lang="he-IL" sz="2799" b="0" i="1" smtClean="0">
+                          <a:solidFill>
+                            <a:srgbClr val="292828"/>
+                          </a:solidFill>
+                          <a:latin typeface="Cambria Math" panose="02040503050406030204" pitchFamily="18" charset="0"/>
+                          <a:ea typeface="Inter"/>
+                          <a:cs typeface="Inter"/>
+                          <a:sym typeface="Inter"/>
+                        </a:rPr>
+                        <m:t>𝜖</m:t>
+                      </m:r>
+                      <m:r>
+                        <a:rPr lang="en-US" sz="2799" b="0" i="1" smtClean="0">
+                          <a:solidFill>
+                            <a:srgbClr val="292828"/>
+                          </a:solidFill>
+                          <a:latin typeface="Cambria Math" panose="02040503050406030204" pitchFamily="18" charset="0"/>
+                          <a:ea typeface="Inter"/>
+                          <a:cs typeface="Inter"/>
+                          <a:sym typeface="Inter"/>
+                        </a:rPr>
+                        <m:t>−</m:t>
+                      </m:r>
+                      <m:r>
+                        <a:rPr lang="en-US" sz="2799" b="0" i="1" smtClean="0">
+                          <a:solidFill>
+                            <a:srgbClr val="292828"/>
+                          </a:solidFill>
+                          <a:latin typeface="Cambria Math" panose="02040503050406030204" pitchFamily="18" charset="0"/>
+                          <a:ea typeface="Inter"/>
+                          <a:cs typeface="Inter"/>
+                          <a:sym typeface="Inter"/>
+                        </a:rPr>
+                        <m:t>𝑔𝑟𝑒𝑒𝑑𝑦</m:t>
+                      </m:r>
+                      <m:r>
+                        <a:rPr lang="en-US" sz="2799" b="0" i="1" smtClean="0">
+                          <a:solidFill>
+                            <a:srgbClr val="292828"/>
+                          </a:solidFill>
+                          <a:latin typeface="Cambria Math" panose="02040503050406030204" pitchFamily="18" charset="0"/>
+                          <a:ea typeface="Inter"/>
+                          <a:cs typeface="Inter"/>
+                          <a:sym typeface="Inter"/>
+                        </a:rPr>
+                        <m:t> </m:t>
+                      </m:r>
+                    </m:oMath>
+                  </a14:m>
+                  <a:r>
+                    <a:rPr lang="en-US" sz="2799" dirty="0">
+                      <a:solidFill>
+                        <a:srgbClr val="292828"/>
+                      </a:solidFill>
+                      <a:latin typeface="Inter"/>
+                      <a:ea typeface="Inter"/>
+                      <a:cs typeface="Inter"/>
+                      <a:sym typeface="Inter"/>
+                    </a:rPr>
+                    <a:t>method</a:t>
+                  </a:r>
+                </a:p>
+              </p:txBody>
+            </p:sp>
+          </mc:Choice>
+          <mc:Fallback xmlns="">
+            <p:sp>
+              <p:nvSpPr>
+                <p:cNvPr id="6" name="TextBox 6"/>
+                <p:cNvSpPr txBox="1">
+                  <a:spLocks noRot="1" noChangeAspect="1" noMove="1" noResize="1" noEditPoints="1" noAdjustHandles="1" noChangeArrowheads="1" noChangeShapeType="1" noTextEdit="1"/>
+                </p:cNvSpPr>
+                <p:nvPr/>
+              </p:nvSpPr>
+              <p:spPr>
+                <a:xfrm>
+                  <a:off x="0" y="2418292"/>
+                  <a:ext cx="11252225" cy="1292648"/>
+                </a:xfrm>
+                <a:prstGeom prst="rect">
+                  <a:avLst/>
+                </a:prstGeom>
+                <a:blipFill>
+                  <a:blip r:embed="rId2"/>
+                  <a:stretch>
+                    <a:fillRect l="-2601" t="-8176" b="-20126"/>
+                  </a:stretch>
+                </a:blipFill>
+              </p:spPr>
+              <p:txBody>
+                <a:bodyPr/>
+                <a:lstStyle/>
+                <a:p>
+                  <a:r>
+                    <a:rPr lang="LID4096">
+                      <a:noFill/>
+                    </a:rPr>
+                    <a:t> </a:t>
+                  </a:r>
+                </a:p>
+              </p:txBody>
+            </p:sp>
+          </mc:Fallback>
+        </mc:AlternateContent>
         <p:sp>
           <p:nvSpPr>
             <p:cNvPr id="7" name="AutoShape 7"/>
@@ -5759,6 +6046,323 @@
           <p:nvPr/>
         </p:nvSpPr>
         <p:spPr>
+          <a:xfrm rot="195422">
+            <a:off x="1945643" y="7212734"/>
+            <a:ext cx="16929142" cy="6148532"/>
+          </a:xfrm>
+          <a:custGeom>
+            <a:avLst/>
+            <a:gdLst/>
+            <a:ahLst/>
+            <a:cxnLst/>
+            <a:rect l="l" t="t" r="r" b="b"/>
+            <a:pathLst>
+              <a:path w="16929142" h="6148532">
+                <a:moveTo>
+                  <a:pt x="0" y="0"/>
+                </a:moveTo>
+                <a:lnTo>
+                  <a:pt x="16929143" y="0"/>
+                </a:lnTo>
+                <a:lnTo>
+                  <a:pt x="16929143" y="6148532"/>
+                </a:lnTo>
+                <a:lnTo>
+                  <a:pt x="0" y="6148532"/>
+                </a:lnTo>
+                <a:lnTo>
+                  <a:pt x="0" y="0"/>
+                </a:lnTo>
+                <a:close/>
+              </a:path>
+            </a:pathLst>
+          </a:custGeom>
+          <a:blipFill>
+            <a:blip r:embed="rId2">
+              <a:alphaModFix amt="38000"/>
+              <a:extLst>
+                <a:ext uri="{96DAC541-7B7A-43D3-8B79-37D633B846F1}">
+                  <asvg:svgBlip xmlns:asvg="http://schemas.microsoft.com/office/drawing/2016/SVG/main" r:embed="rId3"/>
+                </a:ext>
+              </a:extLst>
+            </a:blip>
+            <a:stretch>
+              <a:fillRect/>
+            </a:stretch>
+          </a:blipFill>
+        </p:spPr>
+        <p:txBody>
+          <a:bodyPr/>
+          <a:lstStyle/>
+          <a:p>
+            <a:endParaRPr lang="LID4096"/>
+          </a:p>
+        </p:txBody>
+      </p:sp>
+      <p:sp>
+        <p:nvSpPr>
+          <p:cNvPr id="3" name="Freeform 3"/>
+          <p:cNvSpPr/>
+          <p:nvPr/>
+        </p:nvSpPr>
+        <p:spPr>
+          <a:xfrm>
+            <a:off x="571500" y="6667500"/>
+            <a:ext cx="8572500" cy="2042140"/>
+          </a:xfrm>
+          <a:custGeom>
+            <a:avLst/>
+            <a:gdLst/>
+            <a:ahLst/>
+            <a:cxnLst/>
+            <a:rect l="l" t="t" r="r" b="b"/>
+            <a:pathLst>
+              <a:path w="8572500" h="2042140">
+                <a:moveTo>
+                  <a:pt x="0" y="0"/>
+                </a:moveTo>
+                <a:lnTo>
+                  <a:pt x="8572500" y="0"/>
+                </a:lnTo>
+                <a:lnTo>
+                  <a:pt x="8572500" y="2042140"/>
+                </a:lnTo>
+                <a:lnTo>
+                  <a:pt x="0" y="2042140"/>
+                </a:lnTo>
+                <a:lnTo>
+                  <a:pt x="0" y="0"/>
+                </a:lnTo>
+                <a:close/>
+              </a:path>
+            </a:pathLst>
+          </a:custGeom>
+          <a:blipFill>
+            <a:blip r:embed="rId4"/>
+            <a:stretch>
+              <a:fillRect/>
+            </a:stretch>
+          </a:blipFill>
+        </p:spPr>
+        <p:txBody>
+          <a:bodyPr/>
+          <a:lstStyle/>
+          <a:p>
+            <a:endParaRPr lang="LID4096"/>
+          </a:p>
+        </p:txBody>
+      </p:sp>
+      <p:sp>
+        <p:nvSpPr>
+          <p:cNvPr id="4" name="Freeform 4"/>
+          <p:cNvSpPr/>
+          <p:nvPr/>
+        </p:nvSpPr>
+        <p:spPr>
+          <a:xfrm>
+            <a:off x="571500" y="4438650"/>
+            <a:ext cx="8572500" cy="2069485"/>
+          </a:xfrm>
+          <a:custGeom>
+            <a:avLst/>
+            <a:gdLst/>
+            <a:ahLst/>
+            <a:cxnLst/>
+            <a:rect l="l" t="t" r="r" b="b"/>
+            <a:pathLst>
+              <a:path w="8572500" h="2069485">
+                <a:moveTo>
+                  <a:pt x="0" y="0"/>
+                </a:moveTo>
+                <a:lnTo>
+                  <a:pt x="8572500" y="0"/>
+                </a:lnTo>
+                <a:lnTo>
+                  <a:pt x="8572500" y="2069485"/>
+                </a:lnTo>
+                <a:lnTo>
+                  <a:pt x="0" y="2069485"/>
+                </a:lnTo>
+                <a:lnTo>
+                  <a:pt x="0" y="0"/>
+                </a:lnTo>
+                <a:close/>
+              </a:path>
+            </a:pathLst>
+          </a:custGeom>
+          <a:blipFill>
+            <a:blip r:embed="rId5"/>
+            <a:stretch>
+              <a:fillRect/>
+            </a:stretch>
+          </a:blipFill>
+        </p:spPr>
+        <p:txBody>
+          <a:bodyPr/>
+          <a:lstStyle/>
+          <a:p>
+            <a:endParaRPr lang="LID4096"/>
+          </a:p>
+        </p:txBody>
+      </p:sp>
+      <p:grpSp>
+        <p:nvGrpSpPr>
+          <p:cNvPr id="5" name="Group 5"/>
+          <p:cNvGrpSpPr/>
+          <p:nvPr/>
+        </p:nvGrpSpPr>
+        <p:grpSpPr>
+          <a:xfrm>
+            <a:off x="1028700" y="1392764"/>
+            <a:ext cx="9911580" cy="2260384"/>
+            <a:chOff x="0" y="0"/>
+            <a:chExt cx="13215440" cy="3013845"/>
+          </a:xfrm>
+        </p:grpSpPr>
+        <p:sp>
+          <p:nvSpPr>
+            <p:cNvPr id="6" name="TextBox 6"/>
+            <p:cNvSpPr txBox="1"/>
+            <p:nvPr/>
+          </p:nvSpPr>
+          <p:spPr>
+            <a:xfrm>
+              <a:off x="0" y="-9525"/>
+              <a:ext cx="13215440" cy="1317625"/>
+            </a:xfrm>
+            <a:prstGeom prst="rect">
+              <a:avLst/>
+            </a:prstGeom>
+          </p:spPr>
+          <p:txBody>
+            <a:bodyPr lIns="0" tIns="0" rIns="0" bIns="0" rtlCol="0" anchor="t">
+              <a:spAutoFit/>
+            </a:bodyPr>
+            <a:lstStyle/>
+            <a:p>
+              <a:pPr algn="just">
+                <a:lnSpc>
+                  <a:spcPts val="7800"/>
+                </a:lnSpc>
+              </a:pPr>
+              <a:r>
+                <a:rPr lang="en-US" sz="6500">
+                  <a:solidFill>
+                    <a:srgbClr val="9988FF"/>
+                  </a:solidFill>
+                  <a:latin typeface="Inter"/>
+                  <a:ea typeface="Inter"/>
+                  <a:cs typeface="Inter"/>
+                  <a:sym typeface="Inter"/>
+                </a:rPr>
+                <a:t>Results</a:t>
+              </a:r>
+            </a:p>
+          </p:txBody>
+        </p:sp>
+        <p:sp>
+          <p:nvSpPr>
+            <p:cNvPr id="7" name="TextBox 7"/>
+            <p:cNvSpPr txBox="1"/>
+            <p:nvPr/>
+          </p:nvSpPr>
+          <p:spPr>
+            <a:xfrm>
+              <a:off x="0" y="1708920"/>
+              <a:ext cx="11960668" cy="1304925"/>
+            </a:xfrm>
+            <a:prstGeom prst="rect">
+              <a:avLst/>
+            </a:prstGeom>
+          </p:spPr>
+          <p:txBody>
+            <a:bodyPr lIns="0" tIns="0" rIns="0" bIns="0" rtlCol="0" anchor="t">
+              <a:spAutoFit/>
+            </a:bodyPr>
+            <a:lstStyle/>
+            <a:p>
+              <a:pPr algn="just">
+                <a:lnSpc>
+                  <a:spcPts val="3840"/>
+                </a:lnSpc>
+              </a:pPr>
+              <a:r>
+                <a:rPr lang="en-US" sz="3200">
+                  <a:solidFill>
+                    <a:srgbClr val="292828"/>
+                  </a:solidFill>
+                  <a:latin typeface="Inter"/>
+                  <a:ea typeface="Inter"/>
+                  <a:cs typeface="Inter"/>
+                  <a:sym typeface="Inter"/>
+                </a:rPr>
+                <a:t>On this simulation the verification speed the learning by 15%</a:t>
+              </a:r>
+            </a:p>
+          </p:txBody>
+        </p:sp>
+      </p:grpSp>
+      <p:pic>
+        <p:nvPicPr>
+          <p:cNvPr id="9" name="Picture 8">
+            <a:extLst>
+              <a:ext uri="{FF2B5EF4-FFF2-40B4-BE49-F238E27FC236}">
+                <a16:creationId xmlns:a16="http://schemas.microsoft.com/office/drawing/2014/main" id="{4D29434D-62F1-4A0C-1F66-C282B606C815}"/>
+              </a:ext>
+            </a:extLst>
+          </p:cNvPr>
+          <p:cNvPicPr>
+            <a:picLocks noChangeAspect="1"/>
+          </p:cNvPicPr>
+          <p:nvPr/>
+        </p:nvPicPr>
+        <p:blipFill>
+          <a:blip r:embed="rId6"/>
+          <a:srcRect t="1059"/>
+          <a:stretch/>
+        </p:blipFill>
+        <p:spPr>
+          <a:xfrm>
+            <a:off x="11786795" y="4581693"/>
+            <a:ext cx="3910405" cy="3852883"/>
+          </a:xfrm>
+          <a:prstGeom prst="rect">
+            <a:avLst/>
+          </a:prstGeom>
+        </p:spPr>
+      </p:pic>
+    </p:spTree>
+  </p:cSld>
+  <p:clrMapOvr>
+    <a:masterClrMapping/>
+  </p:clrMapOvr>
+</p:sld>
+</file>
+
+<file path=ppt/slides/slide17.xml><?xml version="1.0" encoding="utf-8"?>
+<p:sld xmlns:a="http://schemas.openxmlformats.org/drawingml/2006/main" xmlns:r="http://schemas.openxmlformats.org/officeDocument/2006/relationships" xmlns:p="http://schemas.openxmlformats.org/presentationml/2006/main">
+  <p:cSld>
+    <p:spTree>
+      <p:nvGrpSpPr>
+        <p:cNvPr id="1" name=""/>
+        <p:cNvGrpSpPr/>
+        <p:nvPr/>
+      </p:nvGrpSpPr>
+      <p:grpSpPr>
+        <a:xfrm>
+          <a:off x="0" y="0"/>
+          <a:ext cx="0" cy="0"/>
+          <a:chOff x="0" y="0"/>
+          <a:chExt cx="0" cy="0"/>
+        </a:xfrm>
+      </p:grpSpPr>
+      <p:sp>
+        <p:nvSpPr>
+          <p:cNvPr id="2" name="Freeform 2"/>
+          <p:cNvSpPr/>
+          <p:nvPr/>
+        </p:nvSpPr>
+        <p:spPr>
           <a:xfrm>
             <a:off x="571500" y="6667500"/>
             <a:ext cx="8572500" cy="2087421"/>
@@ -6052,323 +6656,6 @@
 </p:sld>
 </file>
 
-<file path=ppt/slides/slide17.xml><?xml version="1.0" encoding="utf-8"?>
-<p:sld xmlns:a="http://schemas.openxmlformats.org/drawingml/2006/main" xmlns:r="http://schemas.openxmlformats.org/officeDocument/2006/relationships" xmlns:p="http://schemas.openxmlformats.org/presentationml/2006/main">
-  <p:cSld>
-    <p:spTree>
-      <p:nvGrpSpPr>
-        <p:cNvPr id="1" name=""/>
-        <p:cNvGrpSpPr/>
-        <p:nvPr/>
-      </p:nvGrpSpPr>
-      <p:grpSpPr>
-        <a:xfrm>
-          <a:off x="0" y="0"/>
-          <a:ext cx="0" cy="0"/>
-          <a:chOff x="0" y="0"/>
-          <a:chExt cx="0" cy="0"/>
-        </a:xfrm>
-      </p:grpSpPr>
-      <p:sp>
-        <p:nvSpPr>
-          <p:cNvPr id="2" name="Freeform 2"/>
-          <p:cNvSpPr/>
-          <p:nvPr/>
-        </p:nvSpPr>
-        <p:spPr>
-          <a:xfrm rot="195422">
-            <a:off x="1945643" y="7212734"/>
-            <a:ext cx="16929142" cy="6148532"/>
-          </a:xfrm>
-          <a:custGeom>
-            <a:avLst/>
-            <a:gdLst/>
-            <a:ahLst/>
-            <a:cxnLst/>
-            <a:rect l="l" t="t" r="r" b="b"/>
-            <a:pathLst>
-              <a:path w="16929142" h="6148532">
-                <a:moveTo>
-                  <a:pt x="0" y="0"/>
-                </a:moveTo>
-                <a:lnTo>
-                  <a:pt x="16929143" y="0"/>
-                </a:lnTo>
-                <a:lnTo>
-                  <a:pt x="16929143" y="6148532"/>
-                </a:lnTo>
-                <a:lnTo>
-                  <a:pt x="0" y="6148532"/>
-                </a:lnTo>
-                <a:lnTo>
-                  <a:pt x="0" y="0"/>
-                </a:lnTo>
-                <a:close/>
-              </a:path>
-            </a:pathLst>
-          </a:custGeom>
-          <a:blipFill>
-            <a:blip r:embed="rId2">
-              <a:alphaModFix amt="38000"/>
-              <a:extLst>
-                <a:ext uri="{96DAC541-7B7A-43D3-8B79-37D633B846F1}">
-                  <asvg:svgBlip xmlns:asvg="http://schemas.microsoft.com/office/drawing/2016/SVG/main" r:embed="rId3"/>
-                </a:ext>
-              </a:extLst>
-            </a:blip>
-            <a:stretch>
-              <a:fillRect/>
-            </a:stretch>
-          </a:blipFill>
-        </p:spPr>
-        <p:txBody>
-          <a:bodyPr/>
-          <a:lstStyle/>
-          <a:p>
-            <a:endParaRPr lang="LID4096"/>
-          </a:p>
-        </p:txBody>
-      </p:sp>
-      <p:sp>
-        <p:nvSpPr>
-          <p:cNvPr id="3" name="Freeform 3"/>
-          <p:cNvSpPr/>
-          <p:nvPr/>
-        </p:nvSpPr>
-        <p:spPr>
-          <a:xfrm>
-            <a:off x="571500" y="6667500"/>
-            <a:ext cx="8572500" cy="2042140"/>
-          </a:xfrm>
-          <a:custGeom>
-            <a:avLst/>
-            <a:gdLst/>
-            <a:ahLst/>
-            <a:cxnLst/>
-            <a:rect l="l" t="t" r="r" b="b"/>
-            <a:pathLst>
-              <a:path w="8572500" h="2042140">
-                <a:moveTo>
-                  <a:pt x="0" y="0"/>
-                </a:moveTo>
-                <a:lnTo>
-                  <a:pt x="8572500" y="0"/>
-                </a:lnTo>
-                <a:lnTo>
-                  <a:pt x="8572500" y="2042140"/>
-                </a:lnTo>
-                <a:lnTo>
-                  <a:pt x="0" y="2042140"/>
-                </a:lnTo>
-                <a:lnTo>
-                  <a:pt x="0" y="0"/>
-                </a:lnTo>
-                <a:close/>
-              </a:path>
-            </a:pathLst>
-          </a:custGeom>
-          <a:blipFill>
-            <a:blip r:embed="rId4"/>
-            <a:stretch>
-              <a:fillRect/>
-            </a:stretch>
-          </a:blipFill>
-        </p:spPr>
-        <p:txBody>
-          <a:bodyPr/>
-          <a:lstStyle/>
-          <a:p>
-            <a:endParaRPr lang="LID4096"/>
-          </a:p>
-        </p:txBody>
-      </p:sp>
-      <p:sp>
-        <p:nvSpPr>
-          <p:cNvPr id="4" name="Freeform 4"/>
-          <p:cNvSpPr/>
-          <p:nvPr/>
-        </p:nvSpPr>
-        <p:spPr>
-          <a:xfrm>
-            <a:off x="571500" y="4438650"/>
-            <a:ext cx="8572500" cy="2069485"/>
-          </a:xfrm>
-          <a:custGeom>
-            <a:avLst/>
-            <a:gdLst/>
-            <a:ahLst/>
-            <a:cxnLst/>
-            <a:rect l="l" t="t" r="r" b="b"/>
-            <a:pathLst>
-              <a:path w="8572500" h="2069485">
-                <a:moveTo>
-                  <a:pt x="0" y="0"/>
-                </a:moveTo>
-                <a:lnTo>
-                  <a:pt x="8572500" y="0"/>
-                </a:lnTo>
-                <a:lnTo>
-                  <a:pt x="8572500" y="2069485"/>
-                </a:lnTo>
-                <a:lnTo>
-                  <a:pt x="0" y="2069485"/>
-                </a:lnTo>
-                <a:lnTo>
-                  <a:pt x="0" y="0"/>
-                </a:lnTo>
-                <a:close/>
-              </a:path>
-            </a:pathLst>
-          </a:custGeom>
-          <a:blipFill>
-            <a:blip r:embed="rId5"/>
-            <a:stretch>
-              <a:fillRect/>
-            </a:stretch>
-          </a:blipFill>
-        </p:spPr>
-        <p:txBody>
-          <a:bodyPr/>
-          <a:lstStyle/>
-          <a:p>
-            <a:endParaRPr lang="LID4096"/>
-          </a:p>
-        </p:txBody>
-      </p:sp>
-      <p:grpSp>
-        <p:nvGrpSpPr>
-          <p:cNvPr id="5" name="Group 5"/>
-          <p:cNvGrpSpPr/>
-          <p:nvPr/>
-        </p:nvGrpSpPr>
-        <p:grpSpPr>
-          <a:xfrm>
-            <a:off x="1028700" y="1392764"/>
-            <a:ext cx="9911580" cy="2260384"/>
-            <a:chOff x="0" y="0"/>
-            <a:chExt cx="13215440" cy="3013845"/>
-          </a:xfrm>
-        </p:grpSpPr>
-        <p:sp>
-          <p:nvSpPr>
-            <p:cNvPr id="6" name="TextBox 6"/>
-            <p:cNvSpPr txBox="1"/>
-            <p:nvPr/>
-          </p:nvSpPr>
-          <p:spPr>
-            <a:xfrm>
-              <a:off x="0" y="-9525"/>
-              <a:ext cx="13215440" cy="1317625"/>
-            </a:xfrm>
-            <a:prstGeom prst="rect">
-              <a:avLst/>
-            </a:prstGeom>
-          </p:spPr>
-          <p:txBody>
-            <a:bodyPr lIns="0" tIns="0" rIns="0" bIns="0" rtlCol="0" anchor="t">
-              <a:spAutoFit/>
-            </a:bodyPr>
-            <a:lstStyle/>
-            <a:p>
-              <a:pPr algn="just">
-                <a:lnSpc>
-                  <a:spcPts val="7800"/>
-                </a:lnSpc>
-              </a:pPr>
-              <a:r>
-                <a:rPr lang="en-US" sz="6500">
-                  <a:solidFill>
-                    <a:srgbClr val="9988FF"/>
-                  </a:solidFill>
-                  <a:latin typeface="Inter"/>
-                  <a:ea typeface="Inter"/>
-                  <a:cs typeface="Inter"/>
-                  <a:sym typeface="Inter"/>
-                </a:rPr>
-                <a:t>Results</a:t>
-              </a:r>
-            </a:p>
-          </p:txBody>
-        </p:sp>
-        <p:sp>
-          <p:nvSpPr>
-            <p:cNvPr id="7" name="TextBox 7"/>
-            <p:cNvSpPr txBox="1"/>
-            <p:nvPr/>
-          </p:nvSpPr>
-          <p:spPr>
-            <a:xfrm>
-              <a:off x="0" y="1708920"/>
-              <a:ext cx="11960668" cy="1304925"/>
-            </a:xfrm>
-            <a:prstGeom prst="rect">
-              <a:avLst/>
-            </a:prstGeom>
-          </p:spPr>
-          <p:txBody>
-            <a:bodyPr lIns="0" tIns="0" rIns="0" bIns="0" rtlCol="0" anchor="t">
-              <a:spAutoFit/>
-            </a:bodyPr>
-            <a:lstStyle/>
-            <a:p>
-              <a:pPr algn="just">
-                <a:lnSpc>
-                  <a:spcPts val="3840"/>
-                </a:lnSpc>
-              </a:pPr>
-              <a:r>
-                <a:rPr lang="en-US" sz="3200">
-                  <a:solidFill>
-                    <a:srgbClr val="292828"/>
-                  </a:solidFill>
-                  <a:latin typeface="Inter"/>
-                  <a:ea typeface="Inter"/>
-                  <a:cs typeface="Inter"/>
-                  <a:sym typeface="Inter"/>
-                </a:rPr>
-                <a:t>On this simulation the verification speed the learning by 15%</a:t>
-              </a:r>
-            </a:p>
-          </p:txBody>
-        </p:sp>
-      </p:grpSp>
-      <p:pic>
-        <p:nvPicPr>
-          <p:cNvPr id="9" name="Picture 8">
-            <a:extLst>
-              <a:ext uri="{FF2B5EF4-FFF2-40B4-BE49-F238E27FC236}">
-                <a16:creationId xmlns:a16="http://schemas.microsoft.com/office/drawing/2014/main" id="{4D29434D-62F1-4A0C-1F66-C282B606C815}"/>
-              </a:ext>
-            </a:extLst>
-          </p:cNvPr>
-          <p:cNvPicPr>
-            <a:picLocks noChangeAspect="1"/>
-          </p:cNvPicPr>
-          <p:nvPr/>
-        </p:nvPicPr>
-        <p:blipFill>
-          <a:blip r:embed="rId6"/>
-          <a:srcRect t="1059"/>
-          <a:stretch/>
-        </p:blipFill>
-        <p:spPr>
-          <a:xfrm>
-            <a:off x="11786795" y="4581693"/>
-            <a:ext cx="3910405" cy="3852883"/>
-          </a:xfrm>
-          <a:prstGeom prst="rect">
-            <a:avLst/>
-          </a:prstGeom>
-        </p:spPr>
-      </p:pic>
-    </p:spTree>
-  </p:cSld>
-  <p:clrMapOvr>
-    <a:masterClrMapping/>
-  </p:clrMapOvr>
-</p:sld>
-</file>
-
 <file path=ppt/slides/slide2.xml><?xml version="1.0" encoding="utf-8"?>
 <p:sld xmlns:a="http://schemas.openxmlformats.org/drawingml/2006/main" xmlns:r="http://schemas.openxmlformats.org/officeDocument/2006/relationships" xmlns:p="http://schemas.openxmlformats.org/presentationml/2006/main">
   <p:cSld>
@@ -6680,7 +6967,7 @@
         </p:nvGrpSpPr>
         <p:grpSpPr>
           <a:xfrm>
-            <a:off x="9593322" y="921012"/>
+            <a:off x="9605612" y="4285795"/>
             <a:ext cx="8254416" cy="1715409"/>
             <a:chOff x="0" y="0"/>
             <a:chExt cx="11005889" cy="2287212"/>
@@ -6754,7 +7041,7 @@
                 </a:lnSpc>
               </a:pPr>
               <a:r>
-                <a:rPr lang="en-US" sz="2999">
+                <a:rPr lang="en-US" sz="2999" dirty="0">
                   <a:solidFill>
                     <a:srgbClr val="292828"/>
                   </a:solidFill>
@@ -6777,7 +7064,7 @@
         </p:nvGrpSpPr>
         <p:grpSpPr>
           <a:xfrm>
-            <a:off x="9593322" y="4531537"/>
+            <a:off x="9593322" y="1200097"/>
             <a:ext cx="8254416" cy="1157238"/>
             <a:chOff x="0" y="0"/>
             <a:chExt cx="11005889" cy="1542984"/>
@@ -6810,7 +7097,7 @@
                 </a:lnSpc>
               </a:pPr>
               <a:r>
-                <a:rPr lang="en-US" sz="3399" b="1">
+                <a:rPr lang="en-US" sz="3399" b="1" dirty="0">
                   <a:solidFill>
                     <a:srgbClr val="292828"/>
                   </a:solidFill>
@@ -6851,7 +7138,7 @@
                 </a:lnSpc>
               </a:pPr>
               <a:r>
-                <a:rPr lang="en-US" sz="2999">
+                <a:rPr lang="en-US" sz="2999" dirty="0">
                   <a:solidFill>
                     <a:srgbClr val="292828"/>
                   </a:solidFill>
@@ -6907,7 +7194,7 @@
                 </a:lnSpc>
               </a:pPr>
               <a:r>
-                <a:rPr lang="en-US" sz="3399" b="1">
+                <a:rPr lang="en-US" sz="3399" b="1" dirty="0">
                   <a:solidFill>
                     <a:srgbClr val="292828"/>
                   </a:solidFill>
@@ -6971,7 +7258,7 @@
         </p:nvSpPr>
         <p:spPr>
           <a:xfrm>
-            <a:off x="8572500" y="1572457"/>
+            <a:off x="8572500" y="4937240"/>
             <a:ext cx="571500" cy="412519"/>
           </a:xfrm>
           <a:custGeom>
@@ -7089,7 +7376,7 @@
         </p:nvSpPr>
         <p:spPr>
           <a:xfrm>
-            <a:off x="8606942" y="4848463"/>
+            <a:off x="8572500" y="1452119"/>
             <a:ext cx="537058" cy="523387"/>
           </a:xfrm>
           <a:custGeom>
@@ -9653,7 +9940,7 @@
                 </a:lnSpc>
               </a:pPr>
               <a:r>
-                <a:rPr lang="en-US" sz="2780">
+                <a:rPr lang="en-US" sz="2780" dirty="0">
                   <a:solidFill>
                     <a:srgbClr val="9988FF"/>
                   </a:solidFill>
@@ -9665,7 +9952,7 @@
                 <a:t>Robustness:</a:t>
               </a:r>
               <a:r>
-                <a:rPr lang="en-US" sz="2780">
+                <a:rPr lang="en-US" sz="2780" dirty="0">
                   <a:solidFill>
                     <a:srgbClr val="292828"/>
                   </a:solidFill>
@@ -9683,7 +9970,7 @@
                   <a:spcPts val="3892"/>
                 </a:lnSpc>
               </a:pPr>
-              <a:endParaRPr lang="en-US" sz="2780">
+              <a:endParaRPr lang="en-US" sz="2780" dirty="0">
                 <a:solidFill>
                   <a:srgbClr val="292828"/>
                 </a:solidFill>

</xml_diff>

<commit_message>
swap slides and removed trash reward sys
</commit_message>
<xml_diff>
--- a/presentation.pptx
+++ b/presentation.pptx
@@ -16,8 +16,8 @@
     <p:sldId id="264" r:id="rId10"/>
     <p:sldId id="265" r:id="rId11"/>
     <p:sldId id="266" r:id="rId12"/>
-    <p:sldId id="267" r:id="rId13"/>
-    <p:sldId id="268" r:id="rId14"/>
+    <p:sldId id="268" r:id="rId13"/>
+    <p:sldId id="267" r:id="rId14"/>
     <p:sldId id="269" r:id="rId15"/>
     <p:sldId id="270" r:id="rId16"/>
     <p:sldId id="272" r:id="rId17"/>
@@ -301,6 +301,91 @@
       </pc:sldChg>
     </pc:docChg>
   </pc:docChgLst>
+  <pc:docChgLst>
+    <pc:chgData name="Erel Dekel" userId="5861eaf1660df668" providerId="LiveId" clId="{6EFC724E-2FF8-4FE0-BFA6-FFB0768DC26D}"/>
+    <pc:docChg chg="undo custSel modSld sldOrd">
+      <pc:chgData name="Erel Dekel" userId="5861eaf1660df668" providerId="LiveId" clId="{6EFC724E-2FF8-4FE0-BFA6-FFB0768DC26D}" dt="2024-09-15T15:01:59.816" v="261" actId="20577"/>
+      <pc:docMkLst>
+        <pc:docMk/>
+      </pc:docMkLst>
+      <pc:sldChg chg="modSp mod">
+        <pc:chgData name="Erel Dekel" userId="5861eaf1660df668" providerId="LiveId" clId="{6EFC724E-2FF8-4FE0-BFA6-FFB0768DC26D}" dt="2024-09-15T11:41:53.331" v="3" actId="20577"/>
+        <pc:sldMkLst>
+          <pc:docMk/>
+          <pc:sldMk cId="0" sldId="265"/>
+        </pc:sldMkLst>
+        <pc:spChg chg="mod">
+          <ac:chgData name="Erel Dekel" userId="5861eaf1660df668" providerId="LiveId" clId="{6EFC724E-2FF8-4FE0-BFA6-FFB0768DC26D}" dt="2024-09-15T11:41:53.331" v="3" actId="20577"/>
+          <ac:spMkLst>
+            <pc:docMk/>
+            <pc:sldMk cId="0" sldId="265"/>
+            <ac:spMk id="4" creationId="{00000000-0000-0000-0000-000000000000}"/>
+          </ac:spMkLst>
+        </pc:spChg>
+      </pc:sldChg>
+      <pc:sldChg chg="modSp mod">
+        <pc:chgData name="Erel Dekel" userId="5861eaf1660df668" providerId="LiveId" clId="{6EFC724E-2FF8-4FE0-BFA6-FFB0768DC26D}" dt="2024-09-15T12:37:17.414" v="253" actId="108"/>
+        <pc:sldMkLst>
+          <pc:docMk/>
+          <pc:sldMk cId="0" sldId="267"/>
+        </pc:sldMkLst>
+        <pc:spChg chg="mod">
+          <ac:chgData name="Erel Dekel" userId="5861eaf1660df668" providerId="LiveId" clId="{6EFC724E-2FF8-4FE0-BFA6-FFB0768DC26D}" dt="2024-09-15T12:37:17.414" v="253" actId="108"/>
+          <ac:spMkLst>
+            <pc:docMk/>
+            <pc:sldMk cId="0" sldId="267"/>
+            <ac:spMk id="12" creationId="{00000000-0000-0000-0000-000000000000}"/>
+          </ac:spMkLst>
+        </pc:spChg>
+        <pc:spChg chg="mod">
+          <ac:chgData name="Erel Dekel" userId="5861eaf1660df668" providerId="LiveId" clId="{6EFC724E-2FF8-4FE0-BFA6-FFB0768DC26D}" dt="2024-09-15T12:37:11.709" v="252" actId="1076"/>
+          <ac:spMkLst>
+            <pc:docMk/>
+            <pc:sldMk cId="0" sldId="267"/>
+            <ac:spMk id="13" creationId="{00000000-0000-0000-0000-000000000000}"/>
+          </ac:spMkLst>
+        </pc:spChg>
+      </pc:sldChg>
+      <pc:sldChg chg="modSp mod ord">
+        <pc:chgData name="Erel Dekel" userId="5861eaf1660df668" providerId="LiveId" clId="{6EFC724E-2FF8-4FE0-BFA6-FFB0768DC26D}" dt="2024-09-15T11:50:47.566" v="230" actId="20577"/>
+        <pc:sldMkLst>
+          <pc:docMk/>
+          <pc:sldMk cId="0" sldId="268"/>
+        </pc:sldMkLst>
+        <pc:spChg chg="mod">
+          <ac:chgData name="Erel Dekel" userId="5861eaf1660df668" providerId="LiveId" clId="{6EFC724E-2FF8-4FE0-BFA6-FFB0768DC26D}" dt="2024-09-15T11:50:47.566" v="230" actId="20577"/>
+          <ac:spMkLst>
+            <pc:docMk/>
+            <pc:sldMk cId="0" sldId="268"/>
+            <ac:spMk id="19" creationId="{00000000-0000-0000-0000-000000000000}"/>
+          </ac:spMkLst>
+        </pc:spChg>
+      </pc:sldChg>
+      <pc:sldChg chg="modSp mod">
+        <pc:chgData name="Erel Dekel" userId="5861eaf1660df668" providerId="LiveId" clId="{6EFC724E-2FF8-4FE0-BFA6-FFB0768DC26D}" dt="2024-09-15T15:01:59.816" v="261" actId="20577"/>
+        <pc:sldMkLst>
+          <pc:docMk/>
+          <pc:sldMk cId="0" sldId="269"/>
+        </pc:sldMkLst>
+        <pc:spChg chg="mod">
+          <ac:chgData name="Erel Dekel" userId="5861eaf1660df668" providerId="LiveId" clId="{6EFC724E-2FF8-4FE0-BFA6-FFB0768DC26D}" dt="2024-09-15T15:00:16.579" v="257" actId="20577"/>
+          <ac:spMkLst>
+            <pc:docMk/>
+            <pc:sldMk cId="0" sldId="269"/>
+            <ac:spMk id="2" creationId="{00000000-0000-0000-0000-000000000000}"/>
+          </ac:spMkLst>
+        </pc:spChg>
+        <pc:spChg chg="mod">
+          <ac:chgData name="Erel Dekel" userId="5861eaf1660df668" providerId="LiveId" clId="{6EFC724E-2FF8-4FE0-BFA6-FFB0768DC26D}" dt="2024-09-15T15:01:59.816" v="261" actId="20577"/>
+          <ac:spMkLst>
+            <pc:docMk/>
+            <pc:sldMk cId="0" sldId="269"/>
+            <ac:spMk id="7" creationId="{00000000-0000-0000-0000-000000000000}"/>
+          </ac:spMkLst>
+        </pc:spChg>
+      </pc:sldChg>
+    </pc:docChg>
+  </pc:docChgLst>
 </pc:chgInfo>
 </file>
 
@@ -484,7 +569,7 @@
             <a:fld id="{1D8BD707-D9CF-40AE-B4C6-C98DA3205C09}" type="datetimeFigureOut">
               <a:rPr lang="en-US" smtClean="0"/>
               <a:pPr/>
-              <a:t>9/14/2024</a:t>
+              <a:t>9/15/2024</a:t>
             </a:fld>
             <a:endParaRPr lang="en-US"/>
           </a:p>
@@ -649,7 +734,7 @@
             <a:fld id="{1D8BD707-D9CF-40AE-B4C6-C98DA3205C09}" type="datetimeFigureOut">
               <a:rPr lang="en-US" smtClean="0"/>
               <a:pPr/>
-              <a:t>9/14/2024</a:t>
+              <a:t>9/15/2024</a:t>
             </a:fld>
             <a:endParaRPr lang="en-US"/>
           </a:p>
@@ -824,7 +909,7 @@
             <a:fld id="{1D8BD707-D9CF-40AE-B4C6-C98DA3205C09}" type="datetimeFigureOut">
               <a:rPr lang="en-US" smtClean="0"/>
               <a:pPr/>
-              <a:t>9/14/2024</a:t>
+              <a:t>9/15/2024</a:t>
             </a:fld>
             <a:endParaRPr lang="en-US"/>
           </a:p>
@@ -989,7 +1074,7 @@
             <a:fld id="{1D8BD707-D9CF-40AE-B4C6-C98DA3205C09}" type="datetimeFigureOut">
               <a:rPr lang="en-US" smtClean="0"/>
               <a:pPr/>
-              <a:t>9/14/2024</a:t>
+              <a:t>9/15/2024</a:t>
             </a:fld>
             <a:endParaRPr lang="en-US"/>
           </a:p>
@@ -1231,7 +1316,7 @@
             <a:fld id="{1D8BD707-D9CF-40AE-B4C6-C98DA3205C09}" type="datetimeFigureOut">
               <a:rPr lang="en-US" smtClean="0"/>
               <a:pPr/>
-              <a:t>9/14/2024</a:t>
+              <a:t>9/15/2024</a:t>
             </a:fld>
             <a:endParaRPr lang="en-US"/>
           </a:p>
@@ -1513,7 +1598,7 @@
             <a:fld id="{1D8BD707-D9CF-40AE-B4C6-C98DA3205C09}" type="datetimeFigureOut">
               <a:rPr lang="en-US" smtClean="0"/>
               <a:pPr/>
-              <a:t>9/14/2024</a:t>
+              <a:t>9/15/2024</a:t>
             </a:fld>
             <a:endParaRPr lang="en-US"/>
           </a:p>
@@ -1929,7 +2014,7 @@
             <a:fld id="{1D8BD707-D9CF-40AE-B4C6-C98DA3205C09}" type="datetimeFigureOut">
               <a:rPr lang="en-US" smtClean="0"/>
               <a:pPr/>
-              <a:t>9/14/2024</a:t>
+              <a:t>9/15/2024</a:t>
             </a:fld>
             <a:endParaRPr lang="en-US"/>
           </a:p>
@@ -2043,7 +2128,7 @@
             <a:fld id="{1D8BD707-D9CF-40AE-B4C6-C98DA3205C09}" type="datetimeFigureOut">
               <a:rPr lang="en-US" smtClean="0"/>
               <a:pPr/>
-              <a:t>9/14/2024</a:t>
+              <a:t>9/15/2024</a:t>
             </a:fld>
             <a:endParaRPr lang="en-US"/>
           </a:p>
@@ -2135,7 +2220,7 @@
             <a:fld id="{1D8BD707-D9CF-40AE-B4C6-C98DA3205C09}" type="datetimeFigureOut">
               <a:rPr lang="en-US" smtClean="0"/>
               <a:pPr/>
-              <a:t>9/14/2024</a:t>
+              <a:t>9/15/2024</a:t>
             </a:fld>
             <a:endParaRPr lang="en-US"/>
           </a:p>
@@ -2407,7 +2492,7 @@
             <a:fld id="{1D8BD707-D9CF-40AE-B4C6-C98DA3205C09}" type="datetimeFigureOut">
               <a:rPr lang="en-US" smtClean="0"/>
               <a:pPr/>
-              <a:t>9/14/2024</a:t>
+              <a:t>9/15/2024</a:t>
             </a:fld>
             <a:endParaRPr lang="en-US"/>
           </a:p>
@@ -2656,7 +2741,7 @@
             <a:fld id="{1D8BD707-D9CF-40AE-B4C6-C98DA3205C09}" type="datetimeFigureOut">
               <a:rPr lang="en-US" smtClean="0"/>
               <a:pPr/>
-              <a:t>9/14/2024</a:t>
+              <a:t>9/15/2024</a:t>
             </a:fld>
             <a:endParaRPr lang="en-US"/>
           </a:p>
@@ -2864,7 +2949,7 @@
             <a:fld id="{1D8BD707-D9CF-40AE-B4C6-C98DA3205C09}" type="datetimeFigureOut">
               <a:rPr lang="en-US" smtClean="0"/>
               <a:pPr/>
-              <a:t>9/14/2024</a:t>
+              <a:t>9/15/2024</a:t>
             </a:fld>
             <a:endParaRPr lang="en-US"/>
           </a:p>
@@ -3592,7 +3677,7 @@
           <p:spPr>
             <a:xfrm>
               <a:off x="0" y="0"/>
-              <a:ext cx="12526683" cy="2108200"/>
+              <a:ext cx="12526683" cy="2021152"/>
             </a:xfrm>
             <a:prstGeom prst="rect">
               <a:avLst/>
@@ -3610,7 +3695,7 @@
                 </a:lnSpc>
               </a:pPr>
               <a:r>
-                <a:rPr lang="en-US" sz="10400">
+                <a:rPr lang="en-US" sz="10400" dirty="0">
                   <a:solidFill>
                     <a:srgbClr val="9988FF"/>
                   </a:solidFill>
@@ -3619,7 +3704,7 @@
                   <a:cs typeface="Inter"/>
                   <a:sym typeface="Inter"/>
                 </a:rPr>
-                <a:t>MarabouPy</a:t>
+                <a:t>Marabou</a:t>
               </a:r>
             </a:p>
           </p:txBody>
@@ -4094,6 +4179,691 @@
         </p:nvSpPr>
         <p:spPr>
           <a:xfrm>
+            <a:off x="1389008" y="3154103"/>
+            <a:ext cx="6994749" cy="405765"/>
+          </a:xfrm>
+          <a:prstGeom prst="rect">
+            <a:avLst/>
+          </a:prstGeom>
+        </p:spPr>
+        <p:txBody>
+          <a:bodyPr lIns="0" tIns="0" rIns="0" bIns="0" rtlCol="0" anchor="t">
+            <a:spAutoFit/>
+          </a:bodyPr>
+          <a:lstStyle/>
+          <a:p>
+            <a:pPr algn="l">
+              <a:lnSpc>
+                <a:spcPts val="3359"/>
+              </a:lnSpc>
+            </a:pPr>
+            <a:r>
+              <a:rPr lang="en-US" sz="2400" b="1">
+                <a:solidFill>
+                  <a:srgbClr val="292828"/>
+                </a:solidFill>
+                <a:latin typeface="Inter Bold"/>
+                <a:ea typeface="Inter Bold"/>
+                <a:cs typeface="Inter Bold"/>
+                <a:sym typeface="Inter Bold"/>
+              </a:rPr>
+              <a:t>Reward different rewards if the step was:</a:t>
+            </a:r>
+          </a:p>
+        </p:txBody>
+      </p:sp>
+      <p:sp>
+        <p:nvSpPr>
+          <p:cNvPr id="3" name="AutoShape 3"/>
+          <p:cNvSpPr/>
+          <p:nvPr/>
+        </p:nvSpPr>
+        <p:spPr>
+          <a:xfrm>
+            <a:off x="1389008" y="3757612"/>
+            <a:ext cx="6994749" cy="0"/>
+          </a:xfrm>
+          <a:prstGeom prst="line">
+            <a:avLst/>
+          </a:prstGeom>
+          <a:ln w="9525" cap="rnd">
+            <a:solidFill>
+              <a:srgbClr val="292828"/>
+            </a:solidFill>
+            <a:prstDash val="solid"/>
+            <a:headEnd type="none" w="sm" len="sm"/>
+            <a:tailEnd type="none" w="sm" len="sm"/>
+          </a:ln>
+        </p:spPr>
+        <p:txBody>
+          <a:bodyPr/>
+          <a:lstStyle/>
+          <a:p>
+            <a:endParaRPr lang="LID4096"/>
+          </a:p>
+        </p:txBody>
+      </p:sp>
+      <p:sp>
+        <p:nvSpPr>
+          <p:cNvPr id="4" name="TextBox 4"/>
+          <p:cNvSpPr txBox="1"/>
+          <p:nvPr/>
+        </p:nvSpPr>
+        <p:spPr>
+          <a:xfrm>
+            <a:off x="1389008" y="3905250"/>
+            <a:ext cx="6994749" cy="405765"/>
+          </a:xfrm>
+          <a:prstGeom prst="rect">
+            <a:avLst/>
+          </a:prstGeom>
+        </p:spPr>
+        <p:txBody>
+          <a:bodyPr lIns="0" tIns="0" rIns="0" bIns="0" rtlCol="0" anchor="t">
+            <a:spAutoFit/>
+          </a:bodyPr>
+          <a:lstStyle/>
+          <a:p>
+            <a:pPr algn="l">
+              <a:lnSpc>
+                <a:spcPts val="3359"/>
+              </a:lnSpc>
+            </a:pPr>
+            <a:r>
+              <a:rPr lang="en-US" sz="2400">
+                <a:solidFill>
+                  <a:srgbClr val="292828"/>
+                </a:solidFill>
+                <a:latin typeface="Inter"/>
+                <a:ea typeface="Inter"/>
+                <a:cs typeface="Inter"/>
+                <a:sym typeface="Inter"/>
+              </a:rPr>
+              <a:t>Wasteful, did not change the state</a:t>
+            </a:r>
+          </a:p>
+        </p:txBody>
+      </p:sp>
+      <p:sp>
+        <p:nvSpPr>
+          <p:cNvPr id="5" name="AutoShape 5"/>
+          <p:cNvSpPr/>
+          <p:nvPr/>
+        </p:nvSpPr>
+        <p:spPr>
+          <a:xfrm>
+            <a:off x="1389008" y="4508566"/>
+            <a:ext cx="6994749" cy="0"/>
+          </a:xfrm>
+          <a:prstGeom prst="line">
+            <a:avLst/>
+          </a:prstGeom>
+          <a:ln w="9525" cap="rnd">
+            <a:solidFill>
+              <a:srgbClr val="292828"/>
+            </a:solidFill>
+            <a:prstDash val="solid"/>
+            <a:headEnd type="none" w="sm" len="sm"/>
+            <a:tailEnd type="none" w="sm" len="sm"/>
+          </a:ln>
+        </p:spPr>
+        <p:txBody>
+          <a:bodyPr/>
+          <a:lstStyle/>
+          <a:p>
+            <a:endParaRPr lang="LID4096"/>
+          </a:p>
+        </p:txBody>
+      </p:sp>
+      <p:sp>
+        <p:nvSpPr>
+          <p:cNvPr id="6" name="TextBox 6"/>
+          <p:cNvSpPr txBox="1"/>
+          <p:nvPr/>
+        </p:nvSpPr>
+        <p:spPr>
+          <a:xfrm>
+            <a:off x="1389008" y="4656203"/>
+            <a:ext cx="6994749" cy="405765"/>
+          </a:xfrm>
+          <a:prstGeom prst="rect">
+            <a:avLst/>
+          </a:prstGeom>
+        </p:spPr>
+        <p:txBody>
+          <a:bodyPr lIns="0" tIns="0" rIns="0" bIns="0" rtlCol="0" anchor="t">
+            <a:spAutoFit/>
+          </a:bodyPr>
+          <a:lstStyle/>
+          <a:p>
+            <a:pPr algn="l">
+              <a:lnSpc>
+                <a:spcPts val="3359"/>
+              </a:lnSpc>
+            </a:pPr>
+            <a:r>
+              <a:rPr lang="en-US" sz="2400">
+                <a:solidFill>
+                  <a:srgbClr val="292828"/>
+                </a:solidFill>
+                <a:latin typeface="Inter"/>
+                <a:ea typeface="Inter"/>
+                <a:cs typeface="Inter"/>
+                <a:sym typeface="Inter"/>
+              </a:rPr>
+              <a:t>Final, the game is solved</a:t>
+            </a:r>
+          </a:p>
+        </p:txBody>
+      </p:sp>
+      <p:grpSp>
+        <p:nvGrpSpPr>
+          <p:cNvPr id="7" name="Group 7"/>
+          <p:cNvGrpSpPr/>
+          <p:nvPr/>
+        </p:nvGrpSpPr>
+        <p:grpSpPr>
+          <a:xfrm>
+            <a:off x="9904243" y="1252714"/>
+            <a:ext cx="7355057" cy="5000271"/>
+            <a:chOff x="0" y="0"/>
+            <a:chExt cx="9806743" cy="6667029"/>
+          </a:xfrm>
+        </p:grpSpPr>
+        <p:sp>
+          <p:nvSpPr>
+            <p:cNvPr id="8" name="TextBox 8"/>
+            <p:cNvSpPr txBox="1"/>
+            <p:nvPr/>
+          </p:nvSpPr>
+          <p:spPr>
+            <a:xfrm>
+              <a:off x="0" y="-9525"/>
+              <a:ext cx="9806743" cy="1304925"/>
+            </a:xfrm>
+            <a:prstGeom prst="rect">
+              <a:avLst/>
+            </a:prstGeom>
+          </p:spPr>
+          <p:txBody>
+            <a:bodyPr lIns="0" tIns="0" rIns="0" bIns="0" rtlCol="0" anchor="t">
+              <a:spAutoFit/>
+            </a:bodyPr>
+            <a:lstStyle/>
+            <a:p>
+              <a:pPr algn="l">
+                <a:lnSpc>
+                  <a:spcPts val="7680"/>
+                </a:lnSpc>
+              </a:pPr>
+              <a:r>
+                <a:rPr lang="en-US" sz="6400">
+                  <a:solidFill>
+                    <a:srgbClr val="9988FF"/>
+                  </a:solidFill>
+                  <a:latin typeface="Inter"/>
+                  <a:ea typeface="Inter"/>
+                  <a:cs typeface="Inter"/>
+                  <a:sym typeface="Inter"/>
+                </a:rPr>
+                <a:t>Hot or Cold</a:t>
+              </a:r>
+            </a:p>
+          </p:txBody>
+        </p:sp>
+        <p:sp>
+          <p:nvSpPr>
+            <p:cNvPr id="9" name="TextBox 9"/>
+            <p:cNvSpPr txBox="1"/>
+            <p:nvPr/>
+          </p:nvSpPr>
+          <p:spPr>
+            <a:xfrm>
+              <a:off x="0" y="2551059"/>
+              <a:ext cx="9806743" cy="525145"/>
+            </a:xfrm>
+            <a:prstGeom prst="rect">
+              <a:avLst/>
+            </a:prstGeom>
+          </p:spPr>
+          <p:txBody>
+            <a:bodyPr lIns="0" tIns="0" rIns="0" bIns="0" rtlCol="0" anchor="t">
+              <a:spAutoFit/>
+            </a:bodyPr>
+            <a:lstStyle/>
+            <a:p>
+              <a:pPr algn="l">
+                <a:lnSpc>
+                  <a:spcPts val="3359"/>
+                </a:lnSpc>
+              </a:pPr>
+              <a:r>
+                <a:rPr lang="en-US" sz="2400">
+                  <a:solidFill>
+                    <a:srgbClr val="292828"/>
+                  </a:solidFill>
+                  <a:latin typeface="Inter"/>
+                  <a:ea typeface="Inter"/>
+                  <a:cs typeface="Inter"/>
+                  <a:sym typeface="Inter"/>
+                </a:rPr>
+                <a:t>Use variation of BFS to calculate state value</a:t>
+              </a:r>
+            </a:p>
+          </p:txBody>
+        </p:sp>
+        <p:sp>
+          <p:nvSpPr>
+            <p:cNvPr id="10" name="AutoShape 10"/>
+            <p:cNvSpPr/>
+            <p:nvPr/>
+          </p:nvSpPr>
+          <p:spPr>
+            <a:xfrm>
+              <a:off x="0" y="3595451"/>
+              <a:ext cx="9806743" cy="0"/>
+            </a:xfrm>
+            <a:prstGeom prst="line">
+              <a:avLst/>
+            </a:prstGeom>
+            <a:ln w="12700" cap="rnd">
+              <a:solidFill>
+                <a:srgbClr val="292828"/>
+              </a:solidFill>
+              <a:prstDash val="solid"/>
+              <a:headEnd type="none" w="sm" len="sm"/>
+              <a:tailEnd type="none" w="sm" len="sm"/>
+            </a:ln>
+          </p:spPr>
+          <p:txBody>
+            <a:bodyPr/>
+            <a:lstStyle/>
+            <a:p>
+              <a:endParaRPr lang="LID4096"/>
+            </a:p>
+          </p:txBody>
+        </p:sp>
+        <p:sp>
+          <p:nvSpPr>
+            <p:cNvPr id="11" name="TextBox 11"/>
+            <p:cNvSpPr txBox="1"/>
+            <p:nvPr/>
+          </p:nvSpPr>
+          <p:spPr>
+            <a:xfrm>
+              <a:off x="0" y="4067072"/>
+              <a:ext cx="9806743" cy="1083945"/>
+            </a:xfrm>
+            <a:prstGeom prst="rect">
+              <a:avLst/>
+            </a:prstGeom>
+          </p:spPr>
+          <p:txBody>
+            <a:bodyPr lIns="0" tIns="0" rIns="0" bIns="0" rtlCol="0" anchor="t">
+              <a:spAutoFit/>
+            </a:bodyPr>
+            <a:lstStyle/>
+            <a:p>
+              <a:pPr algn="l">
+                <a:lnSpc>
+                  <a:spcPts val="3359"/>
+                </a:lnSpc>
+              </a:pPr>
+              <a:r>
+                <a:rPr lang="en-US" sz="2400">
+                  <a:solidFill>
+                    <a:srgbClr val="292828"/>
+                  </a:solidFill>
+                  <a:latin typeface="Inter"/>
+                  <a:ea typeface="Inter"/>
+                  <a:cs typeface="Inter"/>
+                  <a:sym typeface="Inter"/>
+                </a:rPr>
+                <a:t>Estimate the value of the state before and the state after the step</a:t>
+              </a:r>
+            </a:p>
+          </p:txBody>
+        </p:sp>
+        <p:sp>
+          <p:nvSpPr>
+            <p:cNvPr id="12" name="AutoShape 12"/>
+            <p:cNvSpPr/>
+            <p:nvPr/>
+          </p:nvSpPr>
+          <p:spPr>
+            <a:xfrm>
+              <a:off x="0" y="5670263"/>
+              <a:ext cx="9806743" cy="0"/>
+            </a:xfrm>
+            <a:prstGeom prst="line">
+              <a:avLst/>
+            </a:prstGeom>
+            <a:ln w="12700" cap="rnd">
+              <a:solidFill>
+                <a:srgbClr val="292828"/>
+              </a:solidFill>
+              <a:prstDash val="solid"/>
+              <a:headEnd type="none" w="sm" len="sm"/>
+              <a:tailEnd type="none" w="sm" len="sm"/>
+            </a:ln>
+          </p:spPr>
+          <p:txBody>
+            <a:bodyPr/>
+            <a:lstStyle/>
+            <a:p>
+              <a:endParaRPr lang="LID4096"/>
+            </a:p>
+          </p:txBody>
+        </p:sp>
+        <p:sp>
+          <p:nvSpPr>
+            <p:cNvPr id="13" name="TextBox 13"/>
+            <p:cNvSpPr txBox="1"/>
+            <p:nvPr/>
+          </p:nvSpPr>
+          <p:spPr>
+            <a:xfrm>
+              <a:off x="0" y="6141884"/>
+              <a:ext cx="9806743" cy="525145"/>
+            </a:xfrm>
+            <a:prstGeom prst="rect">
+              <a:avLst/>
+            </a:prstGeom>
+          </p:spPr>
+          <p:txBody>
+            <a:bodyPr lIns="0" tIns="0" rIns="0" bIns="0" rtlCol="0" anchor="t">
+              <a:spAutoFit/>
+            </a:bodyPr>
+            <a:lstStyle/>
+            <a:p>
+              <a:pPr algn="l">
+                <a:lnSpc>
+                  <a:spcPts val="3359"/>
+                </a:lnSpc>
+              </a:pPr>
+              <a:r>
+                <a:rPr lang="en-US" sz="2400">
+                  <a:solidFill>
+                    <a:srgbClr val="292828"/>
+                  </a:solidFill>
+                  <a:latin typeface="Inter"/>
+                  <a:ea typeface="Inter"/>
+                  <a:cs typeface="Inter"/>
+                  <a:sym typeface="Inter"/>
+                </a:rPr>
+                <a:t>Reward positively if better and negatively if worse </a:t>
+              </a:r>
+            </a:p>
+          </p:txBody>
+        </p:sp>
+      </p:grpSp>
+      <p:sp>
+        <p:nvSpPr>
+          <p:cNvPr id="14" name="Freeform 14"/>
+          <p:cNvSpPr/>
+          <p:nvPr/>
+        </p:nvSpPr>
+        <p:spPr>
+          <a:xfrm>
+            <a:off x="12438772" y="6936866"/>
+            <a:ext cx="2286000" cy="2286000"/>
+          </a:xfrm>
+          <a:custGeom>
+            <a:avLst/>
+            <a:gdLst/>
+            <a:ahLst/>
+            <a:cxnLst/>
+            <a:rect l="l" t="t" r="r" b="b"/>
+            <a:pathLst>
+              <a:path w="2286000" h="2286000">
+                <a:moveTo>
+                  <a:pt x="0" y="0"/>
+                </a:moveTo>
+                <a:lnTo>
+                  <a:pt x="2286000" y="0"/>
+                </a:lnTo>
+                <a:lnTo>
+                  <a:pt x="2286000" y="2286000"/>
+                </a:lnTo>
+                <a:lnTo>
+                  <a:pt x="0" y="2286000"/>
+                </a:lnTo>
+                <a:lnTo>
+                  <a:pt x="0" y="0"/>
+                </a:lnTo>
+                <a:close/>
+              </a:path>
+            </a:pathLst>
+          </a:custGeom>
+          <a:blipFill>
+            <a:blip r:embed="rId2"/>
+            <a:stretch>
+              <a:fillRect l="-2727" t="-5455" r="-2727"/>
+            </a:stretch>
+          </a:blipFill>
+        </p:spPr>
+        <p:txBody>
+          <a:bodyPr/>
+          <a:lstStyle/>
+          <a:p>
+            <a:endParaRPr lang="LID4096"/>
+          </a:p>
+        </p:txBody>
+      </p:sp>
+      <p:sp>
+        <p:nvSpPr>
+          <p:cNvPr id="15" name="Freeform 15"/>
+          <p:cNvSpPr/>
+          <p:nvPr/>
+        </p:nvSpPr>
+        <p:spPr>
+          <a:xfrm>
+            <a:off x="3743382" y="6936866"/>
+            <a:ext cx="2286000" cy="2286000"/>
+          </a:xfrm>
+          <a:custGeom>
+            <a:avLst/>
+            <a:gdLst/>
+            <a:ahLst/>
+            <a:cxnLst/>
+            <a:rect l="l" t="t" r="r" b="b"/>
+            <a:pathLst>
+              <a:path w="2286000" h="2286000">
+                <a:moveTo>
+                  <a:pt x="0" y="0"/>
+                </a:moveTo>
+                <a:lnTo>
+                  <a:pt x="2286000" y="0"/>
+                </a:lnTo>
+                <a:lnTo>
+                  <a:pt x="2286000" y="2286000"/>
+                </a:lnTo>
+                <a:lnTo>
+                  <a:pt x="0" y="2286000"/>
+                </a:lnTo>
+                <a:lnTo>
+                  <a:pt x="0" y="0"/>
+                </a:lnTo>
+                <a:close/>
+              </a:path>
+            </a:pathLst>
+          </a:custGeom>
+          <a:blipFill>
+            <a:blip r:embed="rId3"/>
+            <a:stretch>
+              <a:fillRect l="-877" t="-1755" r="-877"/>
+            </a:stretch>
+          </a:blipFill>
+        </p:spPr>
+        <p:txBody>
+          <a:bodyPr/>
+          <a:lstStyle/>
+          <a:p>
+            <a:endParaRPr lang="LID4096"/>
+          </a:p>
+        </p:txBody>
+      </p:sp>
+      <p:sp>
+        <p:nvSpPr>
+          <p:cNvPr id="16" name="AutoShape 16"/>
+          <p:cNvSpPr/>
+          <p:nvPr/>
+        </p:nvSpPr>
+        <p:spPr>
+          <a:xfrm>
+            <a:off x="1389008" y="5253038"/>
+            <a:ext cx="6994749" cy="0"/>
+          </a:xfrm>
+          <a:prstGeom prst="line">
+            <a:avLst/>
+          </a:prstGeom>
+          <a:ln w="9525" cap="rnd">
+            <a:solidFill>
+              <a:srgbClr val="292828"/>
+            </a:solidFill>
+            <a:prstDash val="solid"/>
+            <a:headEnd type="none" w="sm" len="sm"/>
+            <a:tailEnd type="none" w="sm" len="sm"/>
+          </a:ln>
+        </p:spPr>
+        <p:txBody>
+          <a:bodyPr/>
+          <a:lstStyle/>
+          <a:p>
+            <a:endParaRPr lang="LID4096"/>
+          </a:p>
+        </p:txBody>
+      </p:sp>
+      <p:grpSp>
+        <p:nvGrpSpPr>
+          <p:cNvPr id="17" name="Group 17"/>
+          <p:cNvGrpSpPr/>
+          <p:nvPr/>
+        </p:nvGrpSpPr>
+        <p:grpSpPr>
+          <a:xfrm>
+            <a:off x="1389008" y="1245570"/>
+            <a:ext cx="6994749" cy="4566416"/>
+            <a:chOff x="0" y="-9525"/>
+            <a:chExt cx="9326333" cy="6088554"/>
+          </a:xfrm>
+        </p:grpSpPr>
+        <p:sp>
+          <p:nvSpPr>
+            <p:cNvPr id="18" name="TextBox 18"/>
+            <p:cNvSpPr txBox="1"/>
+            <p:nvPr/>
+          </p:nvSpPr>
+          <p:spPr>
+            <a:xfrm>
+              <a:off x="0" y="-9525"/>
+              <a:ext cx="9326333" cy="1304925"/>
+            </a:xfrm>
+            <a:prstGeom prst="rect">
+              <a:avLst/>
+            </a:prstGeom>
+          </p:spPr>
+          <p:txBody>
+            <a:bodyPr lIns="0" tIns="0" rIns="0" bIns="0" rtlCol="0" anchor="t">
+              <a:spAutoFit/>
+            </a:bodyPr>
+            <a:lstStyle/>
+            <a:p>
+              <a:pPr algn="l">
+                <a:lnSpc>
+                  <a:spcPts val="7680"/>
+                </a:lnSpc>
+              </a:pPr>
+              <a:r>
+                <a:rPr lang="en-US" sz="6400">
+                  <a:solidFill>
+                    <a:srgbClr val="9988FF"/>
+                  </a:solidFill>
+                  <a:latin typeface="Inter"/>
+                  <a:ea typeface="Inter"/>
+                  <a:cs typeface="Inter"/>
+                  <a:sym typeface="Inter"/>
+                </a:rPr>
+                <a:t>Simple Reward</a:t>
+              </a:r>
+            </a:p>
+          </p:txBody>
+        </p:sp>
+        <p:sp>
+          <p:nvSpPr>
+            <p:cNvPr id="19" name="TextBox 19"/>
+            <p:cNvSpPr txBox="1"/>
+            <p:nvPr/>
+          </p:nvSpPr>
+          <p:spPr>
+            <a:xfrm>
+              <a:off x="0" y="5546489"/>
+              <a:ext cx="9326333" cy="532540"/>
+            </a:xfrm>
+            <a:prstGeom prst="rect">
+              <a:avLst/>
+            </a:prstGeom>
+          </p:spPr>
+          <p:txBody>
+            <a:bodyPr lIns="0" tIns="0" rIns="0" bIns="0" rtlCol="0" anchor="t">
+              <a:spAutoFit/>
+            </a:bodyPr>
+            <a:lstStyle/>
+            <a:p>
+              <a:pPr algn="l">
+                <a:lnSpc>
+                  <a:spcPts val="3359"/>
+                </a:lnSpc>
+              </a:pPr>
+              <a:r>
+                <a:rPr lang="en-US" sz="2400" dirty="0">
+                  <a:solidFill>
+                    <a:srgbClr val="292828"/>
+                  </a:solidFill>
+                  <a:latin typeface="Inter"/>
+                  <a:ea typeface="Inter"/>
+                  <a:cs typeface="Inter"/>
+                  <a:sym typeface="Inter"/>
+                </a:rPr>
+                <a:t>Step, did not solve the game</a:t>
+              </a:r>
+            </a:p>
+          </p:txBody>
+        </p:sp>
+      </p:grpSp>
+    </p:spTree>
+  </p:cSld>
+  <p:clrMapOvr>
+    <a:masterClrMapping/>
+  </p:clrMapOvr>
+</p:sld>
+</file>
+
+<file path=ppt/slides/slide13.xml><?xml version="1.0" encoding="utf-8"?>
+<p:sld xmlns:a="http://schemas.openxmlformats.org/drawingml/2006/main" xmlns:r="http://schemas.openxmlformats.org/officeDocument/2006/relationships" xmlns:p="http://schemas.openxmlformats.org/presentationml/2006/main">
+  <p:cSld>
+    <p:spTree>
+      <p:nvGrpSpPr>
+        <p:cNvPr id="1" name=""/>
+        <p:cNvGrpSpPr/>
+        <p:nvPr/>
+      </p:nvGrpSpPr>
+      <p:grpSpPr>
+        <a:xfrm>
+          <a:off x="0" y="0"/>
+          <a:ext cx="0" cy="0"/>
+          <a:chOff x="0" y="0"/>
+          <a:chExt cx="0" cy="0"/>
+        </a:xfrm>
+      </p:grpSpPr>
+      <p:sp>
+        <p:nvSpPr>
+          <p:cNvPr id="2" name="TextBox 2"/>
+          <p:cNvSpPr txBox="1"/>
+          <p:nvPr/>
+        </p:nvSpPr>
+        <p:spPr>
+          <a:xfrm>
             <a:off x="1288834" y="4373561"/>
             <a:ext cx="5600551" cy="1377953"/>
           </a:xfrm>
@@ -4135,10 +4905,10 @@
         </p:nvGrpSpPr>
         <p:grpSpPr>
           <a:xfrm>
-            <a:off x="8270918" y="965517"/>
-            <a:ext cx="8439169" cy="8355965"/>
-            <a:chOff x="0" y="0"/>
-            <a:chExt cx="11252225" cy="11141287"/>
+            <a:off x="8270918" y="915511"/>
+            <a:ext cx="8439169" cy="8414586"/>
+            <a:chOff x="0" y="-66675"/>
+            <a:chExt cx="11252225" cy="11219448"/>
           </a:xfrm>
         </p:grpSpPr>
         <p:sp>
@@ -4612,7 +5382,7 @@
           <p:spPr>
             <a:xfrm>
               <a:off x="0" y="9873192"/>
-              <a:ext cx="11252225" cy="632248"/>
+              <a:ext cx="11252225" cy="1279581"/>
             </a:xfrm>
             <a:prstGeom prst="rect">
               <a:avLst/>
@@ -4630,7 +5400,7 @@
                 </a:lnSpc>
               </a:pPr>
               <a:r>
-                <a:rPr lang="en-US" sz="2799" b="1">
+                <a:rPr lang="en-US" sz="2799" b="1" dirty="0">
                   <a:solidFill>
                     <a:srgbClr val="9988FF"/>
                   </a:solidFill>
@@ -4642,7 +5412,29 @@
                 <a:t>Export ONNX: </a:t>
               </a:r>
               <a:r>
-                <a:rPr lang="en-US" sz="2799">
+                <a:rPr lang="en-US" sz="2799" dirty="0">
+                  <a:solidFill>
+                    <a:srgbClr val="292828"/>
+                  </a:solidFill>
+                  <a:latin typeface="Inter"/>
+                  <a:ea typeface="Inter"/>
+                  <a:sym typeface="Inter Bold"/>
+                </a:rPr>
+                <a:t>Marabou and </a:t>
+              </a:r>
+              <a:r>
+                <a:rPr lang="en-US" sz="2799" dirty="0">
+                  <a:solidFill>
+                    <a:srgbClr val="292828"/>
+                  </a:solidFill>
+                  <a:latin typeface="Inter"/>
+                  <a:ea typeface="Inter"/>
+                  <a:sym typeface="Inter"/>
+                </a:rPr>
+                <a:t>Visualize </a:t>
+              </a:r>
+              <a:r>
+                <a:rPr lang="en-US" sz="2799" dirty="0">
                   <a:solidFill>
                     <a:srgbClr val="292828"/>
                   </a:solidFill>
@@ -4651,7 +5443,7 @@
                   <a:cs typeface="Inter"/>
                   <a:sym typeface="Inter"/>
                 </a:rPr>
-                <a:t>Visualize the Neural Network</a:t>
+                <a:t>the Neural Network</a:t>
               </a:r>
             </a:p>
           </p:txBody>
@@ -4698,691 +5490,6 @@
 </p:sld>
 </file>
 
-<file path=ppt/slides/slide13.xml><?xml version="1.0" encoding="utf-8"?>
-<p:sld xmlns:a="http://schemas.openxmlformats.org/drawingml/2006/main" xmlns:r="http://schemas.openxmlformats.org/officeDocument/2006/relationships" xmlns:p="http://schemas.openxmlformats.org/presentationml/2006/main">
-  <p:cSld>
-    <p:spTree>
-      <p:nvGrpSpPr>
-        <p:cNvPr id="1" name=""/>
-        <p:cNvGrpSpPr/>
-        <p:nvPr/>
-      </p:nvGrpSpPr>
-      <p:grpSpPr>
-        <a:xfrm>
-          <a:off x="0" y="0"/>
-          <a:ext cx="0" cy="0"/>
-          <a:chOff x="0" y="0"/>
-          <a:chExt cx="0" cy="0"/>
-        </a:xfrm>
-      </p:grpSpPr>
-      <p:sp>
-        <p:nvSpPr>
-          <p:cNvPr id="2" name="TextBox 2"/>
-          <p:cNvSpPr txBox="1"/>
-          <p:nvPr/>
-        </p:nvSpPr>
-        <p:spPr>
-          <a:xfrm>
-            <a:off x="1389008" y="3154103"/>
-            <a:ext cx="6994749" cy="405765"/>
-          </a:xfrm>
-          <a:prstGeom prst="rect">
-            <a:avLst/>
-          </a:prstGeom>
-        </p:spPr>
-        <p:txBody>
-          <a:bodyPr lIns="0" tIns="0" rIns="0" bIns="0" rtlCol="0" anchor="t">
-            <a:spAutoFit/>
-          </a:bodyPr>
-          <a:lstStyle/>
-          <a:p>
-            <a:pPr algn="l">
-              <a:lnSpc>
-                <a:spcPts val="3359"/>
-              </a:lnSpc>
-            </a:pPr>
-            <a:r>
-              <a:rPr lang="en-US" sz="2400" b="1">
-                <a:solidFill>
-                  <a:srgbClr val="292828"/>
-                </a:solidFill>
-                <a:latin typeface="Inter Bold"/>
-                <a:ea typeface="Inter Bold"/>
-                <a:cs typeface="Inter Bold"/>
-                <a:sym typeface="Inter Bold"/>
-              </a:rPr>
-              <a:t>Reward different rewards if the step was:</a:t>
-            </a:r>
-          </a:p>
-        </p:txBody>
-      </p:sp>
-      <p:sp>
-        <p:nvSpPr>
-          <p:cNvPr id="3" name="AutoShape 3"/>
-          <p:cNvSpPr/>
-          <p:nvPr/>
-        </p:nvSpPr>
-        <p:spPr>
-          <a:xfrm>
-            <a:off x="1389008" y="3757612"/>
-            <a:ext cx="6994749" cy="0"/>
-          </a:xfrm>
-          <a:prstGeom prst="line">
-            <a:avLst/>
-          </a:prstGeom>
-          <a:ln w="9525" cap="rnd">
-            <a:solidFill>
-              <a:srgbClr val="292828"/>
-            </a:solidFill>
-            <a:prstDash val="solid"/>
-            <a:headEnd type="none" w="sm" len="sm"/>
-            <a:tailEnd type="none" w="sm" len="sm"/>
-          </a:ln>
-        </p:spPr>
-        <p:txBody>
-          <a:bodyPr/>
-          <a:lstStyle/>
-          <a:p>
-            <a:endParaRPr lang="LID4096"/>
-          </a:p>
-        </p:txBody>
-      </p:sp>
-      <p:sp>
-        <p:nvSpPr>
-          <p:cNvPr id="4" name="TextBox 4"/>
-          <p:cNvSpPr txBox="1"/>
-          <p:nvPr/>
-        </p:nvSpPr>
-        <p:spPr>
-          <a:xfrm>
-            <a:off x="1389008" y="3905250"/>
-            <a:ext cx="6994749" cy="405765"/>
-          </a:xfrm>
-          <a:prstGeom prst="rect">
-            <a:avLst/>
-          </a:prstGeom>
-        </p:spPr>
-        <p:txBody>
-          <a:bodyPr lIns="0" tIns="0" rIns="0" bIns="0" rtlCol="0" anchor="t">
-            <a:spAutoFit/>
-          </a:bodyPr>
-          <a:lstStyle/>
-          <a:p>
-            <a:pPr algn="l">
-              <a:lnSpc>
-                <a:spcPts val="3359"/>
-              </a:lnSpc>
-            </a:pPr>
-            <a:r>
-              <a:rPr lang="en-US" sz="2400">
-                <a:solidFill>
-                  <a:srgbClr val="292828"/>
-                </a:solidFill>
-                <a:latin typeface="Inter"/>
-                <a:ea typeface="Inter"/>
-                <a:cs typeface="Inter"/>
-                <a:sym typeface="Inter"/>
-              </a:rPr>
-              <a:t>Wasteful, did not change the state</a:t>
-            </a:r>
-          </a:p>
-        </p:txBody>
-      </p:sp>
-      <p:sp>
-        <p:nvSpPr>
-          <p:cNvPr id="5" name="AutoShape 5"/>
-          <p:cNvSpPr/>
-          <p:nvPr/>
-        </p:nvSpPr>
-        <p:spPr>
-          <a:xfrm>
-            <a:off x="1389008" y="4508566"/>
-            <a:ext cx="6994749" cy="0"/>
-          </a:xfrm>
-          <a:prstGeom prst="line">
-            <a:avLst/>
-          </a:prstGeom>
-          <a:ln w="9525" cap="rnd">
-            <a:solidFill>
-              <a:srgbClr val="292828"/>
-            </a:solidFill>
-            <a:prstDash val="solid"/>
-            <a:headEnd type="none" w="sm" len="sm"/>
-            <a:tailEnd type="none" w="sm" len="sm"/>
-          </a:ln>
-        </p:spPr>
-        <p:txBody>
-          <a:bodyPr/>
-          <a:lstStyle/>
-          <a:p>
-            <a:endParaRPr lang="LID4096"/>
-          </a:p>
-        </p:txBody>
-      </p:sp>
-      <p:sp>
-        <p:nvSpPr>
-          <p:cNvPr id="6" name="TextBox 6"/>
-          <p:cNvSpPr txBox="1"/>
-          <p:nvPr/>
-        </p:nvSpPr>
-        <p:spPr>
-          <a:xfrm>
-            <a:off x="1389008" y="4656203"/>
-            <a:ext cx="6994749" cy="405765"/>
-          </a:xfrm>
-          <a:prstGeom prst="rect">
-            <a:avLst/>
-          </a:prstGeom>
-        </p:spPr>
-        <p:txBody>
-          <a:bodyPr lIns="0" tIns="0" rIns="0" bIns="0" rtlCol="0" anchor="t">
-            <a:spAutoFit/>
-          </a:bodyPr>
-          <a:lstStyle/>
-          <a:p>
-            <a:pPr algn="l">
-              <a:lnSpc>
-                <a:spcPts val="3359"/>
-              </a:lnSpc>
-            </a:pPr>
-            <a:r>
-              <a:rPr lang="en-US" sz="2400">
-                <a:solidFill>
-                  <a:srgbClr val="292828"/>
-                </a:solidFill>
-                <a:latin typeface="Inter"/>
-                <a:ea typeface="Inter"/>
-                <a:cs typeface="Inter"/>
-                <a:sym typeface="Inter"/>
-              </a:rPr>
-              <a:t>Final, the game is solved</a:t>
-            </a:r>
-          </a:p>
-        </p:txBody>
-      </p:sp>
-      <p:grpSp>
-        <p:nvGrpSpPr>
-          <p:cNvPr id="7" name="Group 7"/>
-          <p:cNvGrpSpPr/>
-          <p:nvPr/>
-        </p:nvGrpSpPr>
-        <p:grpSpPr>
-          <a:xfrm>
-            <a:off x="9904243" y="1252714"/>
-            <a:ext cx="7355057" cy="5000271"/>
-            <a:chOff x="0" y="0"/>
-            <a:chExt cx="9806743" cy="6667029"/>
-          </a:xfrm>
-        </p:grpSpPr>
-        <p:sp>
-          <p:nvSpPr>
-            <p:cNvPr id="8" name="TextBox 8"/>
-            <p:cNvSpPr txBox="1"/>
-            <p:nvPr/>
-          </p:nvSpPr>
-          <p:spPr>
-            <a:xfrm>
-              <a:off x="0" y="-9525"/>
-              <a:ext cx="9806743" cy="1304925"/>
-            </a:xfrm>
-            <a:prstGeom prst="rect">
-              <a:avLst/>
-            </a:prstGeom>
-          </p:spPr>
-          <p:txBody>
-            <a:bodyPr lIns="0" tIns="0" rIns="0" bIns="0" rtlCol="0" anchor="t">
-              <a:spAutoFit/>
-            </a:bodyPr>
-            <a:lstStyle/>
-            <a:p>
-              <a:pPr algn="l">
-                <a:lnSpc>
-                  <a:spcPts val="7680"/>
-                </a:lnSpc>
-              </a:pPr>
-              <a:r>
-                <a:rPr lang="en-US" sz="6400">
-                  <a:solidFill>
-                    <a:srgbClr val="9988FF"/>
-                  </a:solidFill>
-                  <a:latin typeface="Inter"/>
-                  <a:ea typeface="Inter"/>
-                  <a:cs typeface="Inter"/>
-                  <a:sym typeface="Inter"/>
-                </a:rPr>
-                <a:t>Hot or Cold</a:t>
-              </a:r>
-            </a:p>
-          </p:txBody>
-        </p:sp>
-        <p:sp>
-          <p:nvSpPr>
-            <p:cNvPr id="9" name="TextBox 9"/>
-            <p:cNvSpPr txBox="1"/>
-            <p:nvPr/>
-          </p:nvSpPr>
-          <p:spPr>
-            <a:xfrm>
-              <a:off x="0" y="2551059"/>
-              <a:ext cx="9806743" cy="525145"/>
-            </a:xfrm>
-            <a:prstGeom prst="rect">
-              <a:avLst/>
-            </a:prstGeom>
-          </p:spPr>
-          <p:txBody>
-            <a:bodyPr lIns="0" tIns="0" rIns="0" bIns="0" rtlCol="0" anchor="t">
-              <a:spAutoFit/>
-            </a:bodyPr>
-            <a:lstStyle/>
-            <a:p>
-              <a:pPr algn="l">
-                <a:lnSpc>
-                  <a:spcPts val="3359"/>
-                </a:lnSpc>
-              </a:pPr>
-              <a:r>
-                <a:rPr lang="en-US" sz="2400">
-                  <a:solidFill>
-                    <a:srgbClr val="292828"/>
-                  </a:solidFill>
-                  <a:latin typeface="Inter"/>
-                  <a:ea typeface="Inter"/>
-                  <a:cs typeface="Inter"/>
-                  <a:sym typeface="Inter"/>
-                </a:rPr>
-                <a:t>Use variation of BFS to calculate state value</a:t>
-              </a:r>
-            </a:p>
-          </p:txBody>
-        </p:sp>
-        <p:sp>
-          <p:nvSpPr>
-            <p:cNvPr id="10" name="AutoShape 10"/>
-            <p:cNvSpPr/>
-            <p:nvPr/>
-          </p:nvSpPr>
-          <p:spPr>
-            <a:xfrm>
-              <a:off x="0" y="3595451"/>
-              <a:ext cx="9806743" cy="0"/>
-            </a:xfrm>
-            <a:prstGeom prst="line">
-              <a:avLst/>
-            </a:prstGeom>
-            <a:ln w="12700" cap="rnd">
-              <a:solidFill>
-                <a:srgbClr val="292828"/>
-              </a:solidFill>
-              <a:prstDash val="solid"/>
-              <a:headEnd type="none" w="sm" len="sm"/>
-              <a:tailEnd type="none" w="sm" len="sm"/>
-            </a:ln>
-          </p:spPr>
-          <p:txBody>
-            <a:bodyPr/>
-            <a:lstStyle/>
-            <a:p>
-              <a:endParaRPr lang="LID4096"/>
-            </a:p>
-          </p:txBody>
-        </p:sp>
-        <p:sp>
-          <p:nvSpPr>
-            <p:cNvPr id="11" name="TextBox 11"/>
-            <p:cNvSpPr txBox="1"/>
-            <p:nvPr/>
-          </p:nvSpPr>
-          <p:spPr>
-            <a:xfrm>
-              <a:off x="0" y="4067072"/>
-              <a:ext cx="9806743" cy="1083945"/>
-            </a:xfrm>
-            <a:prstGeom prst="rect">
-              <a:avLst/>
-            </a:prstGeom>
-          </p:spPr>
-          <p:txBody>
-            <a:bodyPr lIns="0" tIns="0" rIns="0" bIns="0" rtlCol="0" anchor="t">
-              <a:spAutoFit/>
-            </a:bodyPr>
-            <a:lstStyle/>
-            <a:p>
-              <a:pPr algn="l">
-                <a:lnSpc>
-                  <a:spcPts val="3359"/>
-                </a:lnSpc>
-              </a:pPr>
-              <a:r>
-                <a:rPr lang="en-US" sz="2400">
-                  <a:solidFill>
-                    <a:srgbClr val="292828"/>
-                  </a:solidFill>
-                  <a:latin typeface="Inter"/>
-                  <a:ea typeface="Inter"/>
-                  <a:cs typeface="Inter"/>
-                  <a:sym typeface="Inter"/>
-                </a:rPr>
-                <a:t>Estimate the value of the state before and the state after the step</a:t>
-              </a:r>
-            </a:p>
-          </p:txBody>
-        </p:sp>
-        <p:sp>
-          <p:nvSpPr>
-            <p:cNvPr id="12" name="AutoShape 12"/>
-            <p:cNvSpPr/>
-            <p:nvPr/>
-          </p:nvSpPr>
-          <p:spPr>
-            <a:xfrm>
-              <a:off x="0" y="5670263"/>
-              <a:ext cx="9806743" cy="0"/>
-            </a:xfrm>
-            <a:prstGeom prst="line">
-              <a:avLst/>
-            </a:prstGeom>
-            <a:ln w="12700" cap="rnd">
-              <a:solidFill>
-                <a:srgbClr val="292828"/>
-              </a:solidFill>
-              <a:prstDash val="solid"/>
-              <a:headEnd type="none" w="sm" len="sm"/>
-              <a:tailEnd type="none" w="sm" len="sm"/>
-            </a:ln>
-          </p:spPr>
-          <p:txBody>
-            <a:bodyPr/>
-            <a:lstStyle/>
-            <a:p>
-              <a:endParaRPr lang="LID4096"/>
-            </a:p>
-          </p:txBody>
-        </p:sp>
-        <p:sp>
-          <p:nvSpPr>
-            <p:cNvPr id="13" name="TextBox 13"/>
-            <p:cNvSpPr txBox="1"/>
-            <p:nvPr/>
-          </p:nvSpPr>
-          <p:spPr>
-            <a:xfrm>
-              <a:off x="0" y="6141884"/>
-              <a:ext cx="9806743" cy="525145"/>
-            </a:xfrm>
-            <a:prstGeom prst="rect">
-              <a:avLst/>
-            </a:prstGeom>
-          </p:spPr>
-          <p:txBody>
-            <a:bodyPr lIns="0" tIns="0" rIns="0" bIns="0" rtlCol="0" anchor="t">
-              <a:spAutoFit/>
-            </a:bodyPr>
-            <a:lstStyle/>
-            <a:p>
-              <a:pPr algn="l">
-                <a:lnSpc>
-                  <a:spcPts val="3359"/>
-                </a:lnSpc>
-              </a:pPr>
-              <a:r>
-                <a:rPr lang="en-US" sz="2400">
-                  <a:solidFill>
-                    <a:srgbClr val="292828"/>
-                  </a:solidFill>
-                  <a:latin typeface="Inter"/>
-                  <a:ea typeface="Inter"/>
-                  <a:cs typeface="Inter"/>
-                  <a:sym typeface="Inter"/>
-                </a:rPr>
-                <a:t>Reward positively if better and negatively if worse </a:t>
-              </a:r>
-            </a:p>
-          </p:txBody>
-        </p:sp>
-      </p:grpSp>
-      <p:sp>
-        <p:nvSpPr>
-          <p:cNvPr id="14" name="Freeform 14"/>
-          <p:cNvSpPr/>
-          <p:nvPr/>
-        </p:nvSpPr>
-        <p:spPr>
-          <a:xfrm>
-            <a:off x="12438772" y="6936866"/>
-            <a:ext cx="2286000" cy="2286000"/>
-          </a:xfrm>
-          <a:custGeom>
-            <a:avLst/>
-            <a:gdLst/>
-            <a:ahLst/>
-            <a:cxnLst/>
-            <a:rect l="l" t="t" r="r" b="b"/>
-            <a:pathLst>
-              <a:path w="2286000" h="2286000">
-                <a:moveTo>
-                  <a:pt x="0" y="0"/>
-                </a:moveTo>
-                <a:lnTo>
-                  <a:pt x="2286000" y="0"/>
-                </a:lnTo>
-                <a:lnTo>
-                  <a:pt x="2286000" y="2286000"/>
-                </a:lnTo>
-                <a:lnTo>
-                  <a:pt x="0" y="2286000"/>
-                </a:lnTo>
-                <a:lnTo>
-                  <a:pt x="0" y="0"/>
-                </a:lnTo>
-                <a:close/>
-              </a:path>
-            </a:pathLst>
-          </a:custGeom>
-          <a:blipFill>
-            <a:blip r:embed="rId2"/>
-            <a:stretch>
-              <a:fillRect l="-2727" t="-5455" r="-2727"/>
-            </a:stretch>
-          </a:blipFill>
-        </p:spPr>
-        <p:txBody>
-          <a:bodyPr/>
-          <a:lstStyle/>
-          <a:p>
-            <a:endParaRPr lang="LID4096"/>
-          </a:p>
-        </p:txBody>
-      </p:sp>
-      <p:sp>
-        <p:nvSpPr>
-          <p:cNvPr id="15" name="Freeform 15"/>
-          <p:cNvSpPr/>
-          <p:nvPr/>
-        </p:nvSpPr>
-        <p:spPr>
-          <a:xfrm>
-            <a:off x="3743382" y="6936866"/>
-            <a:ext cx="2286000" cy="2286000"/>
-          </a:xfrm>
-          <a:custGeom>
-            <a:avLst/>
-            <a:gdLst/>
-            <a:ahLst/>
-            <a:cxnLst/>
-            <a:rect l="l" t="t" r="r" b="b"/>
-            <a:pathLst>
-              <a:path w="2286000" h="2286000">
-                <a:moveTo>
-                  <a:pt x="0" y="0"/>
-                </a:moveTo>
-                <a:lnTo>
-                  <a:pt x="2286000" y="0"/>
-                </a:lnTo>
-                <a:lnTo>
-                  <a:pt x="2286000" y="2286000"/>
-                </a:lnTo>
-                <a:lnTo>
-                  <a:pt x="0" y="2286000"/>
-                </a:lnTo>
-                <a:lnTo>
-                  <a:pt x="0" y="0"/>
-                </a:lnTo>
-                <a:close/>
-              </a:path>
-            </a:pathLst>
-          </a:custGeom>
-          <a:blipFill>
-            <a:blip r:embed="rId3"/>
-            <a:stretch>
-              <a:fillRect l="-877" t="-1755" r="-877"/>
-            </a:stretch>
-          </a:blipFill>
-        </p:spPr>
-        <p:txBody>
-          <a:bodyPr/>
-          <a:lstStyle/>
-          <a:p>
-            <a:endParaRPr lang="LID4096"/>
-          </a:p>
-        </p:txBody>
-      </p:sp>
-      <p:sp>
-        <p:nvSpPr>
-          <p:cNvPr id="16" name="AutoShape 16"/>
-          <p:cNvSpPr/>
-          <p:nvPr/>
-        </p:nvSpPr>
-        <p:spPr>
-          <a:xfrm>
-            <a:off x="1389008" y="5253038"/>
-            <a:ext cx="6994749" cy="0"/>
-          </a:xfrm>
-          <a:prstGeom prst="line">
-            <a:avLst/>
-          </a:prstGeom>
-          <a:ln w="9525" cap="rnd">
-            <a:solidFill>
-              <a:srgbClr val="292828"/>
-            </a:solidFill>
-            <a:prstDash val="solid"/>
-            <a:headEnd type="none" w="sm" len="sm"/>
-            <a:tailEnd type="none" w="sm" len="sm"/>
-          </a:ln>
-        </p:spPr>
-        <p:txBody>
-          <a:bodyPr/>
-          <a:lstStyle/>
-          <a:p>
-            <a:endParaRPr lang="LID4096"/>
-          </a:p>
-        </p:txBody>
-      </p:sp>
-      <p:grpSp>
-        <p:nvGrpSpPr>
-          <p:cNvPr id="17" name="Group 17"/>
-          <p:cNvGrpSpPr/>
-          <p:nvPr/>
-        </p:nvGrpSpPr>
-        <p:grpSpPr>
-          <a:xfrm>
-            <a:off x="1389008" y="1252714"/>
-            <a:ext cx="6994749" cy="4553726"/>
-            <a:chOff x="0" y="0"/>
-            <a:chExt cx="9326333" cy="6071634"/>
-          </a:xfrm>
-        </p:grpSpPr>
-        <p:sp>
-          <p:nvSpPr>
-            <p:cNvPr id="18" name="TextBox 18"/>
-            <p:cNvSpPr txBox="1"/>
-            <p:nvPr/>
-          </p:nvSpPr>
-          <p:spPr>
-            <a:xfrm>
-              <a:off x="0" y="-9525"/>
-              <a:ext cx="9326333" cy="1304925"/>
-            </a:xfrm>
-            <a:prstGeom prst="rect">
-              <a:avLst/>
-            </a:prstGeom>
-          </p:spPr>
-          <p:txBody>
-            <a:bodyPr lIns="0" tIns="0" rIns="0" bIns="0" rtlCol="0" anchor="t">
-              <a:spAutoFit/>
-            </a:bodyPr>
-            <a:lstStyle/>
-            <a:p>
-              <a:pPr algn="l">
-                <a:lnSpc>
-                  <a:spcPts val="7680"/>
-                </a:lnSpc>
-              </a:pPr>
-              <a:r>
-                <a:rPr lang="en-US" sz="6400">
-                  <a:solidFill>
-                    <a:srgbClr val="9988FF"/>
-                  </a:solidFill>
-                  <a:latin typeface="Inter"/>
-                  <a:ea typeface="Inter"/>
-                  <a:cs typeface="Inter"/>
-                  <a:sym typeface="Inter"/>
-                </a:rPr>
-                <a:t>Simple Reward</a:t>
-              </a:r>
-            </a:p>
-          </p:txBody>
-        </p:sp>
-        <p:sp>
-          <p:nvSpPr>
-            <p:cNvPr id="19" name="TextBox 19"/>
-            <p:cNvSpPr txBox="1"/>
-            <p:nvPr/>
-          </p:nvSpPr>
-          <p:spPr>
-            <a:xfrm>
-              <a:off x="0" y="5546489"/>
-              <a:ext cx="9326333" cy="525145"/>
-            </a:xfrm>
-            <a:prstGeom prst="rect">
-              <a:avLst/>
-            </a:prstGeom>
-          </p:spPr>
-          <p:txBody>
-            <a:bodyPr lIns="0" tIns="0" rIns="0" bIns="0" rtlCol="0" anchor="t">
-              <a:spAutoFit/>
-            </a:bodyPr>
-            <a:lstStyle/>
-            <a:p>
-              <a:pPr algn="l">
-                <a:lnSpc>
-                  <a:spcPts val="3359"/>
-                </a:lnSpc>
-              </a:pPr>
-              <a:r>
-                <a:rPr lang="en-US" sz="2400">
-                  <a:solidFill>
-                    <a:srgbClr val="292828"/>
-                  </a:solidFill>
-                  <a:latin typeface="Inter"/>
-                  <a:ea typeface="Inter"/>
-                  <a:cs typeface="Inter"/>
-                  <a:sym typeface="Inter"/>
-                </a:rPr>
-                <a:t>None of the above</a:t>
-              </a:r>
-            </a:p>
-          </p:txBody>
-        </p:sp>
-      </p:grpSp>
-    </p:spTree>
-  </p:cSld>
-  <p:clrMapOvr>
-    <a:masterClrMapping/>
-  </p:clrMapOvr>
-</p:sld>
-</file>
-
 <file path=ppt/slides/slide14.xml><?xml version="1.0" encoding="utf-8"?>
 <p:sld xmlns:a="http://schemas.openxmlformats.org/drawingml/2006/main" xmlns:r="http://schemas.openxmlformats.org/officeDocument/2006/relationships" xmlns:p="http://schemas.openxmlformats.org/presentationml/2006/main">
   <p:cSld>
@@ -5435,7 +5542,7 @@
               </a:lnSpc>
             </a:pPr>
             <a:r>
-              <a:rPr lang="en-US" sz="3099">
+              <a:rPr lang="en-US" sz="3099" dirty="0">
                 <a:solidFill>
                   <a:srgbClr val="FFFFFF"/>
                 </a:solidFill>
@@ -5444,7 +5551,7 @@
                 <a:cs typeface="Inter"/>
                 <a:sym typeface="Inter"/>
               </a:rPr>
-              <a:t>Instead, We coded previous loop detection to simulate veirifcation</a:t>
+              <a:t>Instead, We coded previous loop detection to simulate verification</a:t>
             </a:r>
           </a:p>
         </p:txBody>
@@ -5683,7 +5790,7 @@
               </a:lnSpc>
             </a:pPr>
             <a:r>
-              <a:rPr lang="en-US" sz="3200">
+              <a:rPr lang="en-US" sz="3200" dirty="0">
                 <a:solidFill>
                   <a:srgbClr val="FFFFFF"/>
                 </a:solidFill>
@@ -5692,7 +5799,31 @@
                 <a:cs typeface="Inter"/>
                 <a:sym typeface="Inter"/>
               </a:rPr>
-              <a:t>Using Maraboupy was unsuccessful, some operations in ONNX format weren’t recognized </a:t>
+              <a:t>Using </a:t>
+            </a:r>
+            <a:r>
+              <a:rPr lang="en-US" sz="3200" dirty="0" err="1">
+                <a:solidFill>
+                  <a:srgbClr val="FFFFFF"/>
+                </a:solidFill>
+                <a:latin typeface="Inter"/>
+                <a:ea typeface="Inter"/>
+                <a:cs typeface="Inter"/>
+                <a:sym typeface="Inter"/>
+              </a:rPr>
+              <a:t>Maraboupy</a:t>
+            </a:r>
+            <a:r>
+              <a:rPr lang="en-US" sz="3200" dirty="0">
+                <a:solidFill>
+                  <a:srgbClr val="FFFFFF"/>
+                </a:solidFill>
+                <a:latin typeface="Inter"/>
+                <a:ea typeface="Inter"/>
+                <a:cs typeface="Inter"/>
+                <a:sym typeface="Inter"/>
+              </a:rPr>
+              <a:t> was unsuccessful, some operations in ONNX format weren’t recognized </a:t>
             </a:r>
           </a:p>
         </p:txBody>

</xml_diff>